<commit_message>
Day 1 final presentations
</commit_message>
<xml_diff>
--- a/day 1/Day 1 Whiteboard.pptx
+++ b/day 1/Day 1 Whiteboard.pptx
@@ -26,12 +26,6 @@
     <p:sldId id="274" r:id="rId20"/>
     <p:sldId id="275" r:id="rId21"/>
     <p:sldId id="276" r:id="rId22"/>
-    <p:sldId id="277" r:id="rId23"/>
-    <p:sldId id="278" r:id="rId24"/>
-    <p:sldId id="279" r:id="rId25"/>
-    <p:sldId id="280" r:id="rId26"/>
-    <p:sldId id="281" r:id="rId27"/>
-    <p:sldId id="282" r:id="rId28"/>
   </p:sldIdLst>
   <p:sldSz cx="12192000" cy="6858000"/>
   <p:notesSz cx="6858000" cy="9144000"/>
@@ -1332,13 +1326,13 @@
   <inkml:trace contextRef="#ctx0" brushRef="#br0" timeOffset="-9853.65">813 589 0,'0'-24'16,"0"-1"-16,0 50 46,0-1-30,0 0 0,0 25-16,24-24 0,-24 24 15,0-1-15,25 1 16,-1 0-16,0 0 0,1-25 16,-1 25-16,1-24 0,24-1 15,-25-24-15,25 0 16,0 0-16,-25-24 0,25 24 15,-25-25-15,25-24 16,-24 25-16,-1-25 0,1 25 16,-25-25-16,0 0 0,0 0 15,0 0-15,-25 0 16,1 25-16,-1-25 0,1 25 16,-1-1-16,1 1 15,24-1-15,-24 25 0,-1 0 16,25 25-1,0-1 1,25-24-16</inkml:trace>
   <inkml:trace contextRef="#ctx0" brushRef="#br0" timeOffset="-9123.65">1570 442 0,'24'0'0,"1"0"47,-25 25-47,24-1 16,-24 1-16,25 24 15,-25-25-15,0 25 0,24-25 16,-24 25-16,24 0 15,-24 0-15,25 0 0,-25-25 16,0 25-16,0-25 16,24 1-16,-24-1 15,0-48 17,0-1-32,0 1 15,0-25-15,-24 25 16,24-25-16,0 0 0,-25 0 15,25 0-15,-24-24 0,0 24 16,24 0-16,0-24 16,-25 24-16,25 0 0,0 25 15,25-25-15,-25 25 16,24-1-16,0 25 0,1-24 16,-1 24-16,1 0 0,-1 0 15,1 0-15,-1 24 16,0-24-16,1 25 0,-1-1 15,-24 0-15,25 25 16,-25-24-16,0-1 0,0 25 16,-25-25-16,25 1 0,-24-1 15,-1 1-15,1-1 16,0 1-16,-1-1 16,1-24-1,-1-24-15,25-1 16,25 25 15,-1 0-15,1 0-16,-1 25 0,0-1 15,25 0-15,-24 1 16,-1-1-16,25 1 0,-25-1 16,1 1-16,24-25 15,-49 24-15,24 0 0,0-24 16,-24 25-16,25-25 15</inkml:trace>
   <inkml:trace contextRef="#ctx0" brushRef="#br0" timeOffset="-8373.65">2303 271 0,'-25'-24'15,"1"24"-15,-1 0 16,1 0-16,24 24 31,0 1-31,24-25 0,-24 24 16,25 25-16,-1-24 16,-24 23-16,25-23 0,-25 24 15,24 0-15,-24-25 0,24 25 16,-24-25-16,25 1 15,-25-1-15,0 1 0,0-1 16,24 0-16,-24-48 31,0 0-31,0-1 16,-24-24 0,24 25-16,-25-25 0,25 25 15,-24-25-15,0-25 0,-1 26 16,25-1-16,-24-25 15,-1 26-15,25-1 0,0 0 16,0 24-16,0-23 16,0 23-16,25 25 0,-1-24 15,1 24-15,-1 0 16,25 24-16,-25-24 0,1 25 16,-1-1-16,1 0 0,-1 1 15,-24 24-15,24-25 16,-24 25-16,25-25 0,-25 1 15,0-1-15,0 25 16,0-24-16,-25-1 0,1-24 16,24 24-16,-24-24 0,24 25 15,-25-25-15,1 0 16,-1-25 0,25 1-1,0 0-15,25-1 16,-1 1-16,1 24 15,-1 0 1,0 24-16,1 1 16,-1-1-16,1 0 0,-1 1 15,25-1-15,-25 1 16,25 24-16,-24-25 0,23 0 16,-23-24-16,24 25 15,-25-1-15,1-24 0,-1 0 16,0 25-16,1-25 0</inkml:trace>
-  <inkml:trace contextRef="#ctx0" brushRef="#br0" timeOffset="-7633.66">1814 1297 0,'-24'-24'0,"-1"24"32,50 24-1,-1 1-15,-24-1-16,0 25 15,25-25-15,-25 25 16,0 0-16,24 0 0,-24 0 15,0 0-15,24-1 16,-24 1-16,25 0 0,-25 0 16,24 0-16,-24-25 0,25 1 15,-1 23-15,-24-23 16,0-1-16,24-24 0,-24 25 16,25-25-16,-1 24 15,1-24-15,24-24 16,-25 24-16,25-25 15,-25 25-15,25-24 16,0-1-16,24 1 0,-24 24 16,0-24-16,0-1 0,0 25 15,0-24-15,-1 24 16,-23-25-16,-1 25 0,1 0 16,-1-24-16,-24 0 31,-24 24-16</inkml:trace>
+  <inkml:trace contextRef="#ctx0" brushRef="#br0" timeOffset="-7633.67">1814 1297 0,'-24'-24'0,"-1"24"32,50 24-1,-1 1-15,-24-1-16,0 25 15,25-25-15,-25 25 16,0 0-16,24 0 0,-24 0 15,0 0-15,24-1 16,-24 1-16,25 0 0,-25 0 16,24 0-16,-24-25 0,25 1 15,-1 23-15,-24-23 16,0-1-16,24-24 0,-24 25 16,25-25-16,-1 24 15,1-24-15,24-24 16,-25 24-16,25-25 15,-25 25-15,25-24 16,0-1-16,24 1 0,-24 24 16,0-24-16,0-1 0,0 25 15,0-24-15,-1 24 16,-23-25-16,-1 25 0,1 0 16,-1-24-16,-24 0 31,-24 24-16</inkml:trace>
   <inkml:trace contextRef="#ctx0" brushRef="#br0" timeOffset="-7313.65">2596 1688 0,'-25'0'15,"50"0"17,-1 0-32,0 0 15,1 0-15,-1 24 0,25-24 16,-24 25-16,23-25 16,1 24-16,-24 1 0,24-25 15,-25 24-15,0 1 0,1-1 16,-1 0-16,-24 1 15,0-1-15,-24 1 16,24-1-16,-25 1 16,1-1-16,0 0 0,-1-24 15,1 25-15,-1-25 0,1 0 16,-1 0-16</inkml:trace>
   <inkml:trace contextRef="#ctx0" brushRef="#br0" timeOffset="-6883.65">3744 1517 0,'0'-24'0,"0"-1"31,-25 25-31,1 0 16,-1 0-16,1 25 0,-1-25 15,-23 24-15,23 0 16,1-24-16,-1 25 0,1-1 16,-1 25-16,25-24 15,0-1-15,0 25 0,0-25 16,0 25-16,25 0 0,-1-25 15,-24 25-15,25-24 16,24-1-16,-25 1 0,0-1 16,25 0-16,-24 1 0,24-25 15,-1 24-15,-23-24 16,24 0-16,-25 0 0,0-24 16,25 24-16,-49-25 15,25 1-15,-1 24 0,-24-24 16,0-1-16</inkml:trace>
   <inkml:trace contextRef="#ctx0" brushRef="#br0" timeOffset="-6383.65">4134 1566 0,'-24'0'16,"-1"0"0,25 24 31,25 1-47,-25-1 15,24 1-15,-24-1 0,25 25 16,-25-25-16,24 25 15,1-24-15,-1-1 0,0 25 16,1-25-16,-1 1 16,25-25-16,-24 24 0,-1-24 15,0 0-15,1 0 0,-1 0 16,1 0-16,-1-24 16,0-1-16,1 1 0,-1-1 15,-24-23-15,0 23 16,25-24-16,-25 25 0,0-25 15,0 0-15,-25 0 0,25 25 16,-24-1-16,24 1 16,-25 0-16,25-1 0,-24 25 15,24-24-15,-24 24 0,-1 0 32,25 24-17</inkml:trace>
   <inkml:trace contextRef="#ctx0" brushRef="#br0" timeOffset="-6093.65">4818 1346 0,'0'-24'0,"0"48"62,25 0-46,-1 1-16,-24 24 0,24-25 16,1 25-16,-1 0 15,1 0-15,-1-25 0,1 25 16,-1-25-16,0 1 0,1-1 15,-1 1 1,-24-50 0</inkml:trace>
   <inkml:trace contextRef="#ctx0" brushRef="#br0" timeOffset="-5693.65">5258 1322 0,'0'-25'0,"24"25"16,-24-24-16,25 24 16,-50 0 15,25 24-31,-24-24 16,-1 25-16,1-1 0,-25 1 15,25-1-15,-1 25 0,-24-25 16,25 1-16,0-1 15,-1-24-15,25 24 0,0 1 32,25-25-17,-1 0-15,0 0 16,1 0-16,-1 24 16,25-24-16,-24 25 0,-1-25 15,0 24-15,1 1 16,24-25-16,-25 24 0,0 0 15,1 1-15,-1-1 16,1-24-16,-1 0 16,1 0-1,-1 0 1</inkml:trace>
-  <inkml:trace contextRef="#ctx0" brushRef="#br0" timeOffset="-5143.65">5649 1297 0,'-25'-24'15,"25"-1"1,-24 25-16,24 25 47,24-25-47,1 24 15,-25 1-15,24-25 16,0 24-16,1 0 0,-1-24 16,1 25-16,-1-25 15,25 24-15,-25-24 0,1 0 16,-1 0-16,1 0 0,-1 0 16,0-24-16,1-1 15,-25 1-15,0 0 16,0-1-16,0 1 0,0-1 15,-25 1-15,25 0 16,0-1-16,0 1 0,-24-1 16,24 1-16,-24 48 31,24 1-31,0-1 0,0 25 16,0 0-16,0 0 15,0-1-15,0 1 0,0 0 16,24 0-16,-24 24 15,0-48-15,24 24 0,-24-1 16,0 1-16,25-24 0,-25-1 16,24 1-16,-24-1 15,0 0-15,25 1 16,-50-50 15,25 1-31,-24 0 16</inkml:trace>
+  <inkml:trace contextRef="#ctx0" brushRef="#br0" timeOffset="-5143.67">5649 1297 0,'-25'-24'15,"25"-1"1,-24 25-16,24 25 47,24-25-47,1 24 15,-25 1-15,24-25 16,0 24-16,1 0 0,-1-24 16,1 25-16,-1-25 15,25 24-15,-25-24 0,1 0 16,-1 0-16,1 0 0,-1 0 16,0-24-16,1-1 15,-25 1-15,0 0 16,0-1-16,0 1 0,0-1 15,-25 1-15,25 0 16,0-1-16,0 1 0,-24-1 16,24 1-16,-24 48 31,24 1-31,0-1 0,0 25 16,0 0-16,0 0 15,0-1-15,0 1 0,0 0 16,24 0-16,-24 24 15,0-48-15,24 24 0,-24-1 16,0 1-16,25-24 0,-25-1 16,24 1-16,-24-1 15,0 0-15,25 1 16,-50-50 15,25 1-31,-24 0 16</inkml:trace>
   <inkml:trace contextRef="#ctx0" brushRef="#br0" timeOffset="-3413.65">520 3398 0,'0'-25'16,"-25"1"-16,25-1 15,-24 25-15,24-24 0,-25 24 16,25-25-16,-24 25 16,0 0-16,-1 0 15,1 0 1,-1 25-16,25-1 0,-24 25 16,24 0-16,-25 0 0,25 0 15,0 0-15,0-1 16,25 26-16,-1-25 0,1-1 15,-1 1-15,25-24 16,-25 24-16,25-25 0,0 0 16,-24-24-16,23 0 0,1 0 15,0-24-15,0 24 16,0-24-16,-25-25 0,25 24 16,-25-24-16,-24 25 15,25-25-15,-25 0 0,-25-24 16,1 24-16,0 0 0,-1-24 15,-24 24-15,1 0 16,-1 0-16,24 25 0,-24 0 16,25-1-16,-25 1 0,25 24 15,-1 0-15,25 24 16,-24 1-16,24-1 0,0 0 16,0 1-16</inkml:trace>
   <inkml:trace contextRef="#ctx0" brushRef="#br0" timeOffset="-2983.65">617 3764 0,'0'-24'0,"0"-1"31,-24 25-31,24-24 16,-24 24 0,24-25-16,0 1 15,24 24 1,0-25-1,1 25-15,-1 0 16,1 25-16,-1-25 16,0 24-16,1 1 0,-1-25 15,1 49-15,-1-25 0,1 0 16,23 1-16,-23 24 16,-1-25-16,25 0 0,-24 1 15,23-1-15,-23 1 16,-1-1-16,1-24 0,-1 0 15,1 0-15,-1 0 16</inkml:trace>
   <inkml:trace contextRef="#ctx0" brushRef="#br0" timeOffset="-2493.65">1204 3324 0,'-25'0'0,"1"0"0,-1-24 15,1 24 17,24 24-17,0 1 1,0-1-16,0 1 0,0-1 15,0 0-15,24 25 16,1-24-16,-25 24 0,24-1 16,1-23-16,-1 24 0,0-25 15,25 1-15,-24-1 16,-1 0-16,25-24 0,-25 25 16,1-25-16,24-25 15,-25 25-15,0-24 0,1 0 16,-25-25-16,24 24 0,1-24 15,-25 1-15,0 23 16,0-48-16,0 24 0,-25 0 16,1 0-16,24 0 15,-25 25-15,1-25 0,0 25 16,-1-1-16,1 25 0,-1 0 31,25 25-31,0-1 16,0 1-16,0-1 15,0 0-15,25 1 16</inkml:trace>
@@ -1348,8 +1342,8 @@
   <inkml:trace contextRef="#ctx0" brushRef="#br0" timeOffset="-403.65">2229 3862 0,'-24'0'0,"24"-25"16,0 1 0,24 48 31,-24 1-47,0-1 0,25 1 15,-25-1-15,24 25 16,1-25-16,-1 25 0,-24 0 15,24 0-15,1-25 0,-1 25 16,1 0-16,-1 0 16,-24-25-16,25 1 0,-25-1 15,0 0-15,0 1 16,24-1-16,0-24 16,1 0-16,-1 0 15,1-24-15,-1 24 16,25-25-16,0 1 0,0 0 15,-1-1-15,1 1 16,0-1-16,-24 1 0,23-1 16,1 1-16,-24 24 0,24-24 15,-25 24-15,-24-25 16,24 25-16,-24-24 0,0-1 31</inkml:trace>
   <inkml:trace contextRef="#ctx0" brushRef="#br0" timeOffset="-83.65">2986 4057 0,'-24'0'16,"0"0"0,48 0-1,0 0 1,1 0-1,-1 0-15,1 0 0,-1 0 16,1 0-16,23 0 0,-23 0 16,-1 0-16,25 24 15,-24-24-15,23 25 0,-23-25 16,-1 24-16,1 1 16,-1-25-16,-24 24 0,0 1 15,0-1-15,-24 0 16,-1 1-1,1-25-15,24 24 0,-49 1 16,25-25-16,-1 24 16,1 1-16,-1-25 0,1 0 15</inkml:trace>
   <inkml:trace contextRef="#ctx0" brushRef="#br0" timeOffset="476.35">3670 3764 0,'-24'0'16,"24"-24"0,0 48-1,0 0 1,24 1-16,-24 24 16,25-25-16,-25 25 15,24 0-15,-24-25 0,25 25 16,-1 0-16,0 0 0,1 0 15,-1-25-15,1 0 16,-1 25-16,25-24 0,-25-25 16,25 24-16,-24-24 0,23 0 15,-23-24-15,24-1 16,-25 1-16,1-1 0,23 1 16,-23-25-16,-25 25 15,24-25-15,-24 0 0,0 0 16,0 0-16,0 1 0,-24-1 15,-1 0-15,1 24 16,0-23-16,-1 23 0,1 1 16,-1 24-16,1 0 15,-1 0-15,1 0 16,0 24-16,24 1 31</inkml:trace>
-  <inkml:trace contextRef="#ctx0" brushRef="#br0" timeOffset="806.35">4501 3666 0,'-25'0'0,"25"-24"32,0 48 15,25 1-47,-25-1 0,0 25 15,24-25-15,0 25 16,-24 0-16,25 0 0,-25 0 15,0-25-15,0 25 0,24-25 16,-24 25-16,0-24 16,0-1-16,-24-24 15,24-24-15</inkml:trace>
-  <inkml:trace contextRef="#ctx0" brushRef="#br0" timeOffset="1286.35">4501 3666 0,'0'-24'0,"24"24"31,-24 24-15,24-24-16,1 25 15,-1-1-15,25 1 0,-24-1 16,23 25-16,1-25 0,0 1 15,-24-1-15,23 0 16,1 1-16,0-25 0,-24 24 16,-1-24-16,0 0 15,1 0-15,-1 0 0,-24-24 16,0-1-16,0-23 16,0 23-16,-24 1 15,24-25-15,-25 0 0,25 25 16,-24-25-16,0 0 0,24 0 15,-25 25-15,1-1 16,24 1-16,-25-1 0,25 1 16,-24 24-1,24 24 1,24 1-16,-24-1 16,0 1-16,25-1 15,-1 1-15,-24-1 0,25 0 16,-1 1-16,0 24 15,-24-25-15,25 1 0,-1-1 16,-24 0-16,25 1 0,-25-1 16</inkml:trace>
+  <inkml:trace contextRef="#ctx0" brushRef="#br0" timeOffset="806.33">4501 3666 0,'-25'0'0,"25"-24"32,0 48 15,25 1-47,-25-1 0,0 25 15,24-25-15,0 25 16,-24 0-16,25 0 0,-25 0 15,0-25-15,0 25 0,24-25 16,-24 25-16,0-24 16,0-1-16,-24-24 15,24-24-15</inkml:trace>
+  <inkml:trace contextRef="#ctx0" brushRef="#br0" timeOffset="1286.33">4501 3666 0,'0'-24'0,"24"24"31,-24 24-15,24-24-16,1 25 15,-1-1-15,25 1 0,-24-1 16,23 25-16,1-25 0,0 1 15,-24-1-15,23 0 16,1 1-16,0-25 0,-24 24 16,-1-24-16,0 0 15,1 0-15,-1 0 0,-24-24 16,0-1-16,0-23 16,0 23-16,-24 1 15,24-25-15,-25 0 0,25 25 16,-24-25-16,0 0 0,24 0 15,-25 25-15,1-1 16,24 1-16,-25-1 0,25 1 16,-24 24-1,24 24 1,24 1-16,-24-1 16,0 1-16,25-1 15,-1 1-15,-24-1 0,25 0 16,-1 1-16,0 24 15,-24-25-15,25 1 0,-1-1 16,-24 0-16,25 1 0,-25-1 16</inkml:trace>
   <inkml:trace contextRef="#ctx0" brushRef="#br0" timeOffset="1636.35">5355 3373 0,'0'-24'16,"0"-1"15,0 50-16,25-25 1,-25 24-16,0 1 16,0-1-16,0 0 0,24 1 15,-24 24-15,0 0 16,25-1-16,-25 1 0,24 0 16,-24-24-16,25 23 0,-25 1 15,0-24-15,24-1 16,-24 0-16,24 1 0,-24-1 15,0-48 1</inkml:trace>
   <inkml:trace contextRef="#ctx0" brushRef="#br0" timeOffset="2126.35">5600 3398 0,'-25'0'0,"25"-25"15,0 1 1,0-1-16,25 25 16,-1-24-1,1 24-15,-1-25 0,25 25 16,-25-24-16,25 24 0,0-24 15,0-1-15,-25 25 16,25-24-16,-25 24 0,-24-25 16,25 25-16,-25-24 15,-25 24-15,1 0 16,0 0-16,-1 0 0,1 0 16,-25 0-16,24 0 15,25 24-15,-24-24 0,0 25 16,-1-25-16,25 24 15,-24 1-15,24 23 16,0-23-16,0-1 0,0 25 16,24 0-16,1 0 15,-25-25-15,24 25 0,0 0 16,-24-25-16,25 1 16,-1 24-16,1-25 0,-1 1 15,-24-1-15,25-24 16,-25 24-16</inkml:trace>
 </inkml:ink>
@@ -1897,11 +1891,11 @@
   <inkml:trace contextRef="#ctx0" brushRef="#br0" timeOffset="-56774">19074 2528 0,'-49'0'16,"25"0"-16</inkml:trace>
   <inkml:trace contextRef="#ctx0" brushRef="#br0" timeOffset="-56161">18928 2479 0,'0'-24'16,"0"-1"15,24 25-31,-24-24 16,0-1-16,0 1 16,-24-1-1,-1 25-15,1-24 0,-1 24 16,1 0-16,-1 0 0,-23 24 15,23-24-15,1 25 16,-1-1-16,1 25 0,24-24 16,0-1-16,0 25 0,24-25 15,1 25-15,72 0 16,-23-25-16,-25 1 16,24-1-16,-24 1 15,24-25-15,-24 24 0,-25 0 16,1-24-16,-25 25 15,-25-25-15,-24 24 16,1-24-16,-1 0 0,0 0 16,-24 0-16,24 0 15,24 0-15,-24 0 0</inkml:trace>
   <inkml:trace contextRef="#ctx0" brushRef="#br0" timeOffset="-55988">19025 2455 0,'0'-25'0,"25"1"16,-25-1-16,-25 25 16,1 25-1,-1 24-15,1-25 0,0 25 16,-25 0-16,24 24 16,-24-24-16,25 24 0,0 0 15,-25-24-15,24 24 16</inkml:trace>
-  <inkml:trace contextRef="#ctx0" brushRef="#br0" timeOffset="-165786.73">5787 3895 0,'-24'0'15,"24"-24"1,24 24 0,-24 24 15,0 1-16,24-1 1,-24 1 0,0-1-16,25 25 0,-25-25 15,0 25-15,24 0 16,-24 0-16,25 0 0,-25 0 16,24-1-16,-24 1 0,0 0 15,0 0-15,0 0 16,24 0-16,-24 0 0,0-1 15,0 1-15,25 0 16,-25 24-16,24-24 0,-24 0 16,25 24-16,-25-24 0,24 24 15,-24 1-15,25-1 16,-1 0-16,0 1 0,1-26 16,-1 26-16,-24-1 15,25 0-15,-1-24 0,-24 24 16,25-24-16,-25 0 0,0 24 15,24-24-15,-24 0 16,0 0-16,0 0 0,0 0 16,-24-1-16,24 1 15,0 0-15,-25 24 0,25-24 16,0 0-16,0 24 0,0-24 16,0 0-16,0 0 15,0 0-15,0-1 0,0 1 16,0 0-16,0 0 15,0 0-15,0-25 0,0 25 16,0 0-16,-24 0 0,24-25 16,0 25-16,0 0 15,0-25-15,0 25 0,0-24 16,0 24-16,0-25 16,0 25-16,0-25 0,0 1 15,0 23-15,0-23 0,0-1 16,0 1-16,0-1 15,0 1-15,0-1 0,0 0 16,0 1-16,0-1 0,0 1 16,0-1-1,0 1 1,0-1 0,24-24-1,-24 24-15,0 1 16,0-1-16,0 1 15,0-1-15,0 0 16,25 1 0,-25-1-16,0 1 0,0-1 15,0 1-15,0-1 32,24-24-17,-24 24 1,0 1 31</inkml:trace>
-  <inkml:trace contextRef="#ctx0" brushRef="#br0" timeOffset="-164527.73">4274 6851 0,'0'24'32,"0"1"-17,0-1 1,24-24 0,1 0 30,-25 24-30,24-24 0,0 0-1,1 0 1,-1 0-16,1 0 16,-1 0-1,1-24-15,-1 24 0,0 0 16,25 0-16,-24 0 0,-1-24 15,25 24-15,-25 0 16,25 0-16,-24 0 0,23 0 16,1-25-16,-24 25 15,24 0-15,-1 0 0,1 0 16,-24-24-16,23 24 0,1 0 16,0 0-16,0-25 15,0 25-15,0 0 0,0 0 16,-1-24-16,1 24 15,-24 0-15,24 0 0,-25-25 16,0 25-16,1 0 0,-1 0 16,1 0-16,-1 0 15,1-24-15,-1 24 0,0 0 16,1 0 0,-1 0-16,1-24 0,-1 24 15,0 0-15,1 0 16,-50 0 46</inkml:trace>
-  <inkml:trace contextRef="#ctx0" brushRef="#br0" timeOffset="-163297.73">4054 6094 0,'24'0'15,"1"0"16,-1 0-31,1 0 16,-1 0-16,0 0 16,1 0-16,-1-25 0,25 25 15,-24 0-15,23 0 16,1-24-16,-24 24 0,48 0 16,-24 0-16,0 0 0,24-25 15,-24 25-15,24 0 16,-24 0-16,24-24 0,-24 24 15,24 0-15,-24-25 0,24 25 16,-24 0-16,24-24 16,-24 24-16,25 0 0,-26 0 15,1-24-15,0 24 16,0 0-16,0-25 0,-25 25 16,25 0-16,-24 0 0,-1 0 15,25 0-15,-25-24 16,1 24-16,-1 0 0,0 0 15,1 0 1,-1 0-16,1 0 16,-1 0-1,1 0 1,-25-25-16,24 25 0,0 0 47,-48 0-16,0 0-15</inkml:trace>
-  <inkml:trace contextRef="#ctx0" brushRef="#br0" timeOffset="-161689.73">3492 5165 0,'25'0'15,"-1"0"-15,0 0 16,1 0-1,-1 0-15,1 0 0,-1 0 16,1 0-16,23 0 0,-23 0 16,24 0-16,-25 0 15,25-24-15,0 24 0,0 0 16,-1-24-16,1 24 0,0 0 16,0-25-16,0 25 15,0 0-15,0-24 0,-1 24 16,1 0-16,0 0 15,0-25-15,0 25 0,0 0 16,-1 0-16,1-24 16,0 24-16,0 0 0,0 0 15,0-24-15,0 24 0,-1 0 16,1-25-16,-24 25 16,23 0-16,1 0 0,-24-24 15,24 24-15,-25 0 16,25 0-16,-25 0 0,25-25 15,-24 25-15,-1 0 0,0 0 16,1 0-16,-1-24 16,1 24-16,-1 0 15,1 0 17,-1 0-1,0 0-31,1 0 15,-1 0-15,1 0 0,-1 0 16,1 0 0,-1 0-1,0 0 48,1 0-32,-1 0-15,1 0-1,-25-25 32,24 25-47,0 0 31,1 0-15,-1 0 0,1 0-1,-25 25 63</inkml:trace>
-  <inkml:trace contextRef="#ctx0" brushRef="#br0" timeOffset="-160358.73">5934 6753 0,'0'-24'16,"0"-1"-1,0 1 16,25 24 32,-1 0-32,-24-25-15,25 25-16,-1 0 15,1 0 1,-1 0-16,0 0 16,1 0-16,-1 0 15,1 0 1,-1 0-16,1 0 31,-1 0 0,-24-24-31,24 24 32,1 0 30,-25 24 16</inkml:trace>
+  <inkml:trace contextRef="#ctx0" brushRef="#br0" timeOffset="-165786.75">5787 3895 0,'-24'0'15,"24"-24"1,24 24 0,-24 24 15,0 1-16,24-1 1,-24 1 0,0-1-16,25 25 0,-25-25 15,0 25-15,24 0 16,-24 0-16,25 0 0,-25 0 16,24-1-16,-24 1 0,0 0 15,0 0-15,0 0 16,24 0-16,-24 0 0,0-1 15,0 1-15,25 0 16,-25 24-16,24-24 0,-24 0 16,25 24-16,-25-24 0,24 24 15,-24 1-15,25-1 16,-1 0-16,0 1 0,1-26 16,-1 26-16,-24-1 15,25 0-15,-1-24 0,-24 24 16,25-24-16,-25 0 0,0 24 15,24-24-15,-24 0 16,0 0-16,0 0 0,0 0 16,-24-1-16,24 1 15,0 0-15,-25 24 0,25-24 16,0 0-16,0 24 0,0-24 16,0 0-16,0 0 15,0 0-15,0-1 0,0 1 16,0 0-16,0 0 15,0 0-15,0-25 0,0 25 16,0 0-16,-24 0 0,24-25 16,0 25-16,0 0 15,0-25-15,0 25 0,0-24 16,0 24-16,0-25 16,0 25-16,0-25 0,0 1 15,0 23-15,0-23 0,0-1 16,0 1-16,0-1 15,0 1-15,0-1 0,0 0 16,0 1-16,0-1 0,0 1 16,0-1-1,0 1 1,0-1 0,24-24-1,-24 24-15,0 1 16,0-1-16,0 1 15,0-1-15,0 0 16,25 1 0,-25-1-16,0 1 0,0-1 15,0 1-15,0-1 32,24-24-17,-24 24 1,0 1 31</inkml:trace>
+  <inkml:trace contextRef="#ctx0" brushRef="#br0" timeOffset="-164527.75">4274 6851 0,'0'24'32,"0"1"-17,0-1 1,24-24 0,1 0 30,-25 24-30,24-24 0,0 0-1,1 0 1,-1 0-16,1 0 16,-1 0-1,1-24-15,-1 24 0,0 0 16,25 0-16,-24 0 0,-1-24 15,25 24-15,-25 0 16,25 0-16,-24 0 0,23 0 16,1-25-16,-24 25 15,24 0-15,-1 0 0,1 0 16,-24-24-16,23 24 0,1 0 16,0 0-16,0-25 15,0 25-15,0 0 0,0 0 16,-1-24-16,1 24 15,-24 0-15,24 0 0,-25-25 16,0 25-16,1 0 0,-1 0 16,1 0-16,-1 0 15,1-24-15,-1 24 0,0 0 16,1 0 0,-1 0-16,1-24 0,-1 24 15,0 0-15,1 0 16,-50 0 46</inkml:trace>
+  <inkml:trace contextRef="#ctx0" brushRef="#br0" timeOffset="-163297.75">4054 6094 0,'24'0'15,"1"0"16,-1 0-31,1 0 16,-1 0-16,0 0 16,1 0-16,-1-25 0,25 25 15,-24 0-15,23 0 16,1-24-16,-24 24 0,48 0 16,-24 0-16,0 0 0,24-25 15,-24 25-15,24 0 16,-24 0-16,24-24 0,-24 24 15,24 0-15,-24-25 0,24 25 16,-24 0-16,24-24 16,-24 24-16,25 0 0,-26 0 15,1-24-15,0 24 16,0 0-16,0-25 0,-25 25 16,25 0-16,-24 0 0,-1 0 15,25 0-15,-25-24 16,1 24-16,-1 0 0,0 0 15,1 0 1,-1 0-16,1 0 16,-1 0-1,1 0 1,-25-25-16,24 25 0,0 0 47,-48 0-16,0 0-15</inkml:trace>
+  <inkml:trace contextRef="#ctx0" brushRef="#br0" timeOffset="-161689.75">3492 5165 0,'25'0'15,"-1"0"-15,0 0 16,1 0-1,-1 0-15,1 0 0,-1 0 16,1 0-16,23 0 0,-23 0 16,24 0-16,-25 0 15,25-24-15,0 24 0,0 0 16,-1-24-16,1 24 0,0 0 16,0-25-16,0 25 15,0 0-15,0-24 0,-1 24 16,1 0-16,0 0 15,0-25-15,0 25 0,0 0 16,-1 0-16,1-24 16,0 24-16,0 0 0,0 0 15,0-24-15,0 24 0,-1 0 16,1-25-16,-24 25 16,23 0-16,1 0 0,-24-24 15,24 24-15,-25 0 16,25 0-16,-25 0 0,25-25 15,-24 25-15,-1 0 0,0 0 16,1 0-16,-1-24 16,1 24-16,-1 0 15,1 0 17,-1 0-1,0 0-31,1 0 15,-1 0-15,1 0 0,-1 0 16,1 0 0,-1 0-1,0 0 48,1 0-32,-1 0-15,1 0-1,-25-25 32,24 25-47,0 0 31,1 0-15,-1 0 0,1 0-1,-25 25 63</inkml:trace>
+  <inkml:trace contextRef="#ctx0" brushRef="#br0" timeOffset="-160358.75">5934 6753 0,'0'-24'16,"0"-1"-1,0 1 16,25 24 32,-1 0-32,-24-25-15,25 25-16,-1 0 15,1 0 1,-1 0-16,0 0 16,1 0-16,-1 0 15,1 0 1,-1 0-16,1 0 31,-1 0 0,-24-24-31,24 24 32,1 0 30,-25 24 16</inkml:trace>
 </inkml:ink>
 </file>
 
@@ -2180,6 +2174,34 @@
 </inkml:ink>
 </file>
 
+<file path=ppt/ink/ink149.xml><?xml version="1.0" encoding="utf-8"?>
+<inkml:ink xmlns:inkml="http://www.w3.org/2003/InkML">
+  <inkml:definitions>
+    <inkml:context xml:id="ctx0">
+      <inkml:inkSource xml:id="inkSrc0">
+        <inkml:traceFormat>
+          <inkml:channel name="X" type="integer" max="1920" units="cm"/>
+          <inkml:channel name="Y" type="integer" max="1080" units="cm"/>
+          <inkml:channel name="T" type="integer" max="2.14748E9" units="dev"/>
+        </inkml:traceFormat>
+        <inkml:channelProperties>
+          <inkml:channelProperty channel="X" name="resolution" value="55.81395" units="1/cm"/>
+          <inkml:channelProperty channel="Y" name="resolution" value="55.6701" units="1/cm"/>
+          <inkml:channelProperty channel="T" name="resolution" value="1" units="1/dev"/>
+        </inkml:channelProperties>
+      </inkml:inkSource>
+      <inkml:timestamp xml:id="ts0" timeString="2020-11-17T13:45:47.573"/>
+    </inkml:context>
+    <inkml:brush xml:id="br0">
+      <inkml:brushProperty name="width" value="0.05" units="cm"/>
+      <inkml:brushProperty name="height" value="0.05" units="cm"/>
+      <inkml:brushProperty name="fitToCurve" value="1"/>
+    </inkml:brush>
+  </inkml:definitions>
+  <inkml:trace contextRef="#ctx0" brushRef="#br0">196 0 0,'0'-24'31,"0"48"79,0 1-95,0-1-15,0 1 16,0-1-16,0 25 16,-24-25-16,24 1 0,0 24 15,-24-25-15,24 25 0,0 0 16,0-25-16,-25 25 16,25 0-16,0 0 0,0-1 15,0 1-15,-24 25 16,24-26-16,0 1 0,0 25 15,0-26-15,-25 26 16,25-1-16,0-24 0,-24 24 16,24-24-16,0 24 0,-25 0 15,25-24-15,0 0 16,0 73 0,0-73-16,-24-24 0,24 23 15,0-23-15,0-1 0,0 1 16,0-1-16,0 0 15,24-24 1,1 0 15,-25-24-15,24 24-16,1 0 16,-1 0-1,1 0-15,-1 0 16,0 0-16,1 0 15,-1 0-15,25 0 16,0 0-16,0 0 0,24 0 16,0-24-16,25 24 15,0 0-15,-1 0 0,26 0 16,-1 0-16,0 0 0,0 0 16,24-25-16,1 25 15,24 0-15,0-24 0,24 24 16,1 0-16,-1-25 15,25 25-15,0-24 0,24 24 16,-24-24-16,24 24 0,0 0 16,0 0-16,1 0 15,23-25-15,-24 25 0,1 0 16,-1 0-16,0 0 0,25 0 16,-25 0-16,25 0 15,-1-24-15,1 24 0,0 0 16,24 0-16,-25 0 15,1 0-15,0-25 0,-1 25 16,-23 0-16,23 0 16,-24 0-16,1 0 0,-1 0 15,0 0-15,0-24 0,1 24 16,-1 0-16,0 0 16,0 0-16,-24-25 0,0 25 15,-25 0-15,25 0 16,-49 0-16,24 0 0,-24-24 15,0 24-15,0 0 0,0 0 16,-24 0-16,-1 0 16,25 0-16,-24-24 0,-1 24 15,1 0-15,-25 0 16,25 0-16,-1 24 0,1-24 16,-25 0-16,24 0 0,-24 24 15,25-24-15,0 0 16,-1 0-16,1 0 0,-1 0 15,25 0-15,0-24 0,-24 24 16,24 0-16,0 0 16,-1 0-16,1 0 0,0 0 15,-24 0-15,24 0 16,-25-24-16,25 24 0,-24 0 16,24 0-1,-25 0-15,1 0 0,0 0 0,-1 0 16,-24 0-16,0 0 0,-24 24 15,0-24-15,24 0 16,-49 24-16,25-24 0,-25 0 16,25 0-16,-25 0 0,25 25 15,-25-25-15,0 0 16,1 0-16,23 0 0,-24 0 16,-24 0-16,25 0 15,-1 0-15,-24 0 0,0 0 16,-1-25-16,-23 25 0,-1 0 15,1-24-15,-1 24 16,-24-24-16,0-1 16</inkml:trace>
+</inkml:ink>
+</file>
+
 <file path=ppt/ink/ink15.xml><?xml version="1.0" encoding="utf-8"?>
 <inkml:ink xmlns:inkml="http://www.w3.org/2003/InkML">
   <inkml:definitions>
@@ -2238,6 +2260,391 @@
 </inkml:ink>
 </file>
 
+<file path=ppt/ink/ink150.xml><?xml version="1.0" encoding="utf-8"?>
+<inkml:ink xmlns:inkml="http://www.w3.org/2003/InkML">
+  <inkml:definitions>
+    <inkml:context xml:id="ctx0">
+      <inkml:inkSource xml:id="inkSrc0">
+        <inkml:traceFormat>
+          <inkml:channel name="X" type="integer" max="1920" units="cm"/>
+          <inkml:channel name="Y" type="integer" max="1080" units="cm"/>
+          <inkml:channel name="T" type="integer" max="2.14748E9" units="dev"/>
+        </inkml:traceFormat>
+        <inkml:channelProperties>
+          <inkml:channelProperty channel="X" name="resolution" value="55.81395" units="1/cm"/>
+          <inkml:channelProperty channel="Y" name="resolution" value="55.6701" units="1/cm"/>
+          <inkml:channelProperty channel="T" name="resolution" value="1" units="1/dev"/>
+        </inkml:channelProperties>
+      </inkml:inkSource>
+      <inkml:timestamp xml:id="ts0" timeString="2020-11-17T13:45:50.708"/>
+    </inkml:context>
+    <inkml:brush xml:id="br0">
+      <inkml:brushProperty name="width" value="0.05" units="cm"/>
+      <inkml:brushProperty name="height" value="0.05" units="cm"/>
+      <inkml:brushProperty name="fitToCurve" value="1"/>
+    </inkml:brush>
+  </inkml:definitions>
+  <inkml:trace contextRef="#ctx0" brushRef="#br0">0 814 0,'0'-24'16,"0"-1"15,24 25 16,0 0-32,25 0-15,-24 0 16,23 0-16,1 0 0,25 0 16,-1 0-16,25 0 0,-25-24 15,25 24-15,-1 0 16,1-24-16,0 24 0,24 0 15,0-25-15,0 25 16,0-24-16,25 24 0,-1-25 16,25 25-16,-24-24 0,24-1 15,0 25-15,0-24 16,-1 24-16,1-24 0,25 24 16,-25-25-16,0 25 15,0-24-15,24 24 0,-24-25 16,24 25-16,1-24 0,-1 0 15,1 24-15,-1-25 16,0 25-16,1-24 0,24-1 16,-25 25-16,25-24 15,0-1-15,-1 25 0,1-24 16,24 24-16,-24-24 0,0 24 16,0-25-16,0 25 15,-1 0-15,-23 0 0,-25-24 16,24 24-16,1 0 15,-25 0-15,-1-25 0,1 25 16,0 0-16,25-24 0,-1 24 16,-24 0-16,25-25 15,-1 25-15,-24 0 0,24 0 16,-48 0-16,24-24 0,-25 24 16,-24 0-16,25 0 15,-1 0-15,148 0 16,-148 0-16,1-24 15,24 24-15,0 0 0,0 0 16,-1 0-16,-23 0 16,24-25-16,0 25 0,0 0 15,0 0-15,0 0 0,0 0 16,0 0-16,24-24 16,1 24-16,-25 0 0,24 0 15,0 0-15,1-25 16,-1 25-16,-24 0 0,24 0 15,1 0-15,-25 0 0,24 0 16,-24 0-16,0 0 16,0 0-16,0 0 0,0 0 15,0 0-15,0 0 16,0 0-16,0 25 0,-25-25 16,25 0-16,-24 0 0,-25 0 15,24 0-15,-23 0 16,-26 0-16,25 0 0,-24 0 15,-25 0-15,25 0 0,0 0 16,-25 0-16,25 24 16,-25-24-16,25 0 0,-1 0 15,1 0-15,0 0 16,-1 0-16,1 0 0,-25 0 16,25 0-16,-25 0 0,25 0 15,-25 0-15,-24 0 16,24 0-16,-24 0 0,0 0 15,0 0-15,0 0 16,0 0-16,-25 0 0,25 0 16,-25 0-16,25 0 15,-24 0-15,-1 0 16,0 0 62,-24 25-62,0-1-1,25 0-15,-25 1 16,0-1-16,0 1 16,24 24-16,-24-25 0,0 25 15,0 0-15,25 0 0,-25-1 16,0 1-16,0 0 15,24 24-15,-24-24 0,0 0 16,0 24-16,0-24 16,0 0-16,0 24 0,0-24 15,0 0-15,0 0 0,0 0 16,0 0-16,0-1 16,0 1-16,0 0 0,25-25 15,-25 25-15,0 0 0,0-24 16,24 23-16,-24 1 15,0-24-15,0 24 0,24-25 16,-24 25-16,0-25 16,0 25-16,0-25 0,0 25 15,25-24-15,-25-1 0,0 25 16,0-25-16,0 1 16,0 24-16,0-25 0,0 1 15,0-1-15,0 0 16,-25 1-16,25-1 0,0 1 15,0-1-15,-24-24 16,24 25 0,0-1-1,-24-24 17,24 24-17,-25-24 48,1 0-48,-1 0 1,25 25-16,-24-25 16,-1 0-16,1 0 15,0-25 1,-1 25-16,1 0 0,-1-24 15,-23 24-15,23-24 16,-24 24-16,0-25 0,1 25 16,-1-24-16,0-1 15,-24 25-15,24 0 0,0-24 16,0 24-16,25 0 0,-25 0 16,0 0-16,24 0 15,1 0-15,-25 0 0,25 24 16,-1-24-16,1 0 0,0 0 15,-1 0-15,1 25 16,-1-25-16,1 0 0,-1 0 16,-23 0-16,23 0 15,1 0-15,-1 0 0,-24 0 16,25-25-16,0 25 0,-1 0 16,1 0-16,-1-24 15,1 24-15,0 0 0,-1 0 16,1-25-1,-1 25 1,1 0 0,-1 25-1,1-25 17,48 0 14,-24-25-46,25 25 16,-25-24 0,0 48 46,-25-24-62,1 0 16,24 25-1,-24-25-15,-1 24 47</inkml:trace>
+  <inkml:trace contextRef="#ctx0" brushRef="#br0" timeOffset="193">19758 2231 0,'-25'0'31,"1"0"-15,0 0 15</inkml:trace>
+  <inkml:trace contextRef="#ctx0" brushRef="#br0" timeOffset="324">19685 2231 0,'0'24'15,"-25"-24"1,1 25 0,-1-1-1,1-24-15,24 25 16,-25-25-16,1 24 15</inkml:trace>
+  <inkml:trace contextRef="#ctx0" brushRef="#br0" timeOffset="2792">4518 399 0,'0'25'32,"0"-1"-17,0 0 1,24-24-16,-24 25 16,0-1-16,0 1 15,0-1-15,0 1 0,0-1 16,0 0-16,0 25 0,25-24 15,-25 23-15,0-23 16,0 24-16,0-25 0,0 25 16,24-25-16,-24 25 0,0-24 15,0 24-15,25-25 16,-25 25-16,0-25 0,0 25 16,0-25-16,24 25 15,-24-24-15,0-1 0,0 25 16,0-25-16,0 1 15,0-1-15,0 25 0,0-24 16,0-1-16,0 0 0,0 1 16,0-1-16,0 1 15,0-1-15,24 1 0,-24-1 16,0 0-16,0 1 16,0-1-16,0 1 15,0-1-15,0 1 16,0-1-1,0 0-15,0 1 0,0-1 16,0 1-16,25-1 16,-25 0-16,0 1 15,0-1-15,0 1 16,0-1-16,24 1 16,-24-1-16,0 0 15,0 1-15,0-1 0,0 1 16,0-1-1,0 1 1,25-1 0,-25 0-1,0 1 1,0-1 0,0 1-16,0-1 15,0 0-15,0 1 31,0-1-15,0-48 47,0-1-63</inkml:trace>
+  <inkml:trace contextRef="#ctx0" brushRef="#br0" timeOffset="4140">11283 82 0,'0'24'62,"0"0"-62,0 1 16,-24-1-16,24 1 16,0-1-16,0 25 0,0 0 15,0 0-15,0 0 0,24-1 16,-24 1-16,0 0 16,0 0-16,24 24 0,-24-24 15,0 0-15,0 0 0,0 0 16,0-1-16,0 1 15,0-24-15,0 24 0,0-1 16,0-23-16,0 24 16,0 0-16,25-25 0,-25 25 15,0-25-15,0 1 0,0-1 16,24 25-16,-24-25 16,0 1-16,0-1 0,0 1 15,0-1-15,25 0 16,-25 1-16,0-1 0,0 1 15,0-1-15,0 1 16,0-1-16,0 0 16,0 1-16,0-1 0,0 1 15,0-1 1,0 0-16,0 1 0,0-1 16,0 1-16,0-1 15,0 1 1,0-1-16,0 0 15,0 1-15,0-1 16,-25 1-16,25 24 16,0-1-1,0-23-15,0-1 0,25 1 16,-25-1-16,0 1 0,0-1 16,0 0-16,24-24 15,-24 25-15,0-1 0,0 1 16,0-1-1,25-24-15,-25-24 32,0-1-17,0 1-15,0-1 16</inkml:trace>
+  <inkml:trace contextRef="#ctx0" brushRef="#br0" timeOffset="8870">5202 1107 0,'0'-24'0,"24"24"31,-24-24-15,0 48-1,0 0 1,0 1-16,24 24 16,-24 0-16,0-1 0,0 1 15,0 0-15,25 0 16,-25 0-16,0 0 0,0-25 15,0 25-15,0-25 16,0 25-16,0-24 16,0-1-16</inkml:trace>
+  <inkml:trace contextRef="#ctx0" brushRef="#br0" timeOffset="9386">5226 1352 0,'24'0'31,"1"-25"-31,24 25 16,-25 0-16,1 0 0,-1 0 15,25-24-15,-25 24 16,25 0-16,-24 0 0,-1 0 16,0 0-16,1-25 15,-1 25-15,-24-24 16,0 0-16,-24 24 16,24-25-16,-25 1 15,1-1-15,0 1 16,24-1-1,-25 25-15,25-24 0,-24 24 16,24-24 0,0 48 31,24 0-47,-24 25 15,0-24-15,25 24 0,-25-25 16,0 25-16,0 0 15,0-1-15,24 1 0,-24 0 16,0-24-16,24 23 16,-24-23-16,0-1 0,0 1 15</inkml:trace>
+  <inkml:trace contextRef="#ctx0" brushRef="#br0" timeOffset="9854">5934 1229 0,'0'-24'31,"-24"24"-15,24 24 0,-24 1-16,24-1 15,0 1-15,-25-1 16,25 25-16,-24-25 0,24 25 16,0-24-16,0-1 0,24 1 15,-24 23-15,25-23 16,-1-1-16,0-24 15,1 0-15,-1 0 16,1 0-16,-1 0 0,0-24 16,1-1-16,-1 1 15,-24-25-15,25 25 0,-25-25 16,-25 24-16,25-23 0,-24 23 16,-1-24-16,1 25 15,0 24-15,-1-25 0,1 25 16,-1 0-16,1 0 0,24 25 15,-24-25-15,24 24 16</inkml:trace>
+  <inkml:trace contextRef="#ctx0" brushRef="#br0" timeOffset="10610">6301 1205 0,'-25'0'0,"1"0"31,24 24 1,0 1-17,0-1-15,0 1 0,0-1 16,24 25-16,-24-25 15,0 1-15,0 24 0,25-25 16,-25 1-16,0-1 16,0 0-16,0 1 15,0-50 17,-25 1-17,25 0-15,0-1 16,0 1-16,-24-25 0,24 24 15,0-23-15,0-1 0,0 24 16,0-24 0,24 25-16,-24 0 0,0-1 0,25 1 15,-1 24-15,1 0 16,-1 0 0,-24 24-16,24 1 0,1-1 15,-25 0-15,24 1 16,1-1-16,-25 1 0,24 24 15,0-25-15,-24 0 0,25 1 16,-25-1-16,24 1 16,-24-1-16,0 1 15,0-50 17,0 1-32,0-1 15,0 1-15,0-25 16,0 25-16,25-25 0,-25 24 15,24 1-15,-24-1 16,25-23-16,-1 23 16,0 1-16,1 24 0,-1 0 15,1 0 1,-1 24-16,1-24 0,-1 25 16,-24-1-16,24 25 15,-24-25-15,25 1 0,-25 24 16,0-25-16,0 0 0,0 1 15,0-1-15,0 1 16,0-1-16,0 1 0</inkml:trace>
+  <inkml:trace contextRef="#ctx0" brushRef="#br0" timeOffset="11139">7424 1059 0,'0'-25'0,"-24"1"16,-1-1-1,1 25-15,-1 0 16,1 0-1,0 0-15,-1 0 16,1 0-16,-1 25 16,1-25-16,0 24 0,-1-24 15,25 25-15,0-1 32,0 0-17,0 1-15,25-25 16,-25 24-16,0 1 15,0-1-15,0 0 16,0 1-16,24-1 16,-24 1-16,0-1 0,0 25 15,0-25-15,0 1 16,0-1-16,0 1 0,0-1 16,24 1-16,-24-1 0,0 0 15,0 1 1,25-25-1,-25 24-15,24-24 0,1 0 16,-1 0-16,25 0 16,-25 0-16,1-24 0,-1-1 15,1 25-15,-1-24 16</inkml:trace>
+  <inkml:trace contextRef="#ctx0" brushRef="#br0" timeOffset="11336">7107 1376 0,'24'0'0,"0"0"16,1 0-16,-1-24 16,1 24-16,-1 0 15,25-25-15,-25 25 0,1 0 16,-1-24-16,1 24 0,-1 0 15,1 0-15</inkml:trace>
+  <inkml:trace contextRef="#ctx0" brushRef="#br0" timeOffset="11648">7864 1498 0,'-25'0'0,"25"25"15,25-25 16,-1 0-15,1-25 0,-1 25-16,0 0 0,1 0 15,-1 0-15,1-24 0,-1 24 16,1 0-16</inkml:trace>
+  <inkml:trace contextRef="#ctx0" brushRef="#br0" timeOffset="12794">8352 1107 0,'0'-24'0,"-24"24"16,24-24-16,0 48 47,0 0-32,0 1-15,0-1 16,0 1-16,0 24 0,0-25 16,0 0-16,0 25 15,0-24-15,0-1 0,0 0 16,0 1-16,0-1 0,0 1 15,24-25-15,-24 24 16,0-48 47,0-1-32,25 25-31,-25-24 31,0-1 188,-25 25-204,25-24 32</inkml:trace>
+  <inkml:trace contextRef="#ctx0" brushRef="#br0" timeOffset="14787">8596 1010 0,'0'-25'31,"-24"25"-15,0 0-1,24 25-15,-25-25 16,1 24 0,-1-24-16,1 25 0,-1-1 15,1-24-15,0 24 0,-1 1 16,1-1-16,-1 1 15,25-1-15,-24 1 0,24-1 16,0 0-16,0 1 16,0-1-16,24 1 15,-24-1-15,25-24 0,-25 24 16,24 1-16,1-1 16,-1 1-16,0-25 15,-24 24-15,25-24 16,-1 0-16,25 0 0,-24 0 15,-1 0-15,25 0 0,-25 0 16,1 0-16,24-24 16,-25 24-16,0 0 15,-24-25 1,-24 25 0</inkml:trace>
+  <inkml:trace contextRef="#ctx0" brushRef="#br0" timeOffset="15338">9036 1010 0,'0'24'62,"-24"1"-62,24-1 16,0 0-16,0 1 0,0 24 15,0 0-15,24-25 0,-24 25 16,0 0-16,24-1 16,-24-23-16,0 24 0,25-25 15,-25 1-15,0-1 0,24-24 16,-24 24-16</inkml:trace>
+  <inkml:trace contextRef="#ctx0" brushRef="#br0" timeOffset="15662">9329 1010 0,'0'-25'0,"-24"25"0,48 0 46,1-24-30,23 24-16,-23 0 0,24 0 16,0-25-16,-1 25 0,1 0 15,0 0-15,0-24 16,-25 24-16,1 0 0,-1 0 16</inkml:trace>
+  <inkml:trace contextRef="#ctx0" brushRef="#br0" timeOffset="15907">9427 985 0,'24'25'16,"-24"-1"-1,25 1-15,-25-1 16,0 0-16,0 1 0,24 24 15,-24-25-15,0 25 16,0-25-16,25 25 0,-25 0 16,24-25-16,-24 1 15,0-1-15,24 1 0,-24-1 16,25-24-16</inkml:trace>
+  <inkml:trace contextRef="#ctx0" brushRef="#br0" timeOffset="16486">9866 985 0,'0'-24'16,"25"24"30,-25 24-30,0 1-16,0 24 16,0-25-16,0 0 15,24 25-15,-24-24 0,25-1 16,-1 1-16,1-1 16,-1 0-16,0-24 0,1 25 15,-1-25-15,25 0 16,-24-25-16,-1 1 0,25 0 15,-25-1-15,1 1 0,-1-1 16,0 1-16,-24-25 16,0 25-16,25-1 0,-25 1 15,0-1-15,0 1 0,-25 24 16,1 24 0,0 25-1,24-24-15,0 23 16,-25 1-16,25 0 0,-24 24 15,24-24-15,0 0 16,0 24-16,24-24 0,-24 0 16,25 0-16,-25 0 0,24 0 15,-24-1-15,24-23 16,-24-1-16,0 1 0,25-1 16,-25 0-16,0-48 62,0 0-46</inkml:trace>
+</inkml:ink>
+</file>
+
+<file path=ppt/ink/ink151.xml><?xml version="1.0" encoding="utf-8"?>
+<inkml:ink xmlns:inkml="http://www.w3.org/2003/InkML">
+  <inkml:definitions>
+    <inkml:context xml:id="ctx0">
+      <inkml:inkSource xml:id="inkSrc0">
+        <inkml:traceFormat>
+          <inkml:channel name="X" type="integer" max="1920" units="cm"/>
+          <inkml:channel name="Y" type="integer" max="1080" units="cm"/>
+          <inkml:channel name="T" type="integer" max="2.14748E9" units="dev"/>
+        </inkml:traceFormat>
+        <inkml:channelProperties>
+          <inkml:channelProperty channel="X" name="resolution" value="55.81395" units="1/cm"/>
+          <inkml:channelProperty channel="Y" name="resolution" value="55.6701" units="1/cm"/>
+          <inkml:channelProperty channel="T" name="resolution" value="1" units="1/dev"/>
+        </inkml:channelProperties>
+      </inkml:inkSource>
+      <inkml:timestamp xml:id="ts0" timeString="2020-11-17T13:46:11.010"/>
+    </inkml:context>
+    <inkml:brush xml:id="br0">
+      <inkml:brushProperty name="width" value="0.05" units="cm"/>
+      <inkml:brushProperty name="height" value="0.05" units="cm"/>
+      <inkml:brushProperty name="fitToCurve" value="1"/>
+    </inkml:brush>
+  </inkml:definitions>
+  <inkml:trace contextRef="#ctx0" brushRef="#br0">26 269 0,'0'-24'31,"0"-1"-15,-24 25-16,24 25 31,0 24-16,0-25-15,0 25 0,0 0 16,0 0-16,0 24 16,0-24-16,0 0 0,24-1 15,-24 1-15,24 0 16,-24-24-16,25 23 0,-1-23 16,-24-1-16,25-24 15,-1 0 1,-24-24-16,25-1 0,-1 1 15,-24 0-15,24-1 16,1-24-16,-25 0 0,24 1 16,-24 23-16,25-24 15,-25 1-15,24 23 0,-24 1 16,0-1-16,25 25 0,-25-24 16,24 24-1,-24 24-15,24-24 0,-24 25 16,25-1-16,-1 1 0,1-1 15,-1 0-15,0 25 16,1-24-16,24-1 0,-25 0 16,25 1-16,-25-1 15,1-24-15,24 25 16,-25-25-16,1 0 0,-1 0 0,0 0 16,1-25-16,-1 1 15,1-1-15,-25 1 0,24-25 16,-24 0-16,0 1 15,0-1-15,0 0 0,-24 0 16,24 0-16,-25 0 0,1 25 16,24-1-16,-25 1 15,25 0-15,-24 24 16,0 24 0,24 0-16</inkml:trace>
+  <inkml:trace contextRef="#ctx0" brushRef="#br0" timeOffset="457">1394 245 0,'-25'0'47,"1"0"-31,-1 24-16,1-24 15,0 49 1,-1-24-16,1-1 0,-1 25 16,1-25-16,24 25 0,0-25 15,24 1-15,-24 24 16,25-25-16,24 1 0,-25-1 15,25-24-15,0 24 0,0-24 16,-1 0-16,1 0 16,0-24-16,-24 0 0,-1 24 15,0-25-15,1 1 16,-25-25-16,0 24 0,0 1 16,0-25-16,-25 25 0,1-25 15,0 25-15,-1-1 16,1 1-16,-25-1 0,24 1 15,1-1-15,0 25 16,-1 0-16,1 0 0,-1 0 16,50 0-1</inkml:trace>
+  <inkml:trace contextRef="#ctx0" brushRef="#br0" timeOffset="1190">1882 220 0,'0'25'47,"0"-1"-32,0 1-15,0-1 0,0 25 16,25-25-16,-25 25 0,0 0 16,0 0-16,0-25 15,0 25-15,0-24 0,0-1 16,0 0-16,24 1 16,-24-50 15,0 1-16,-24 0-15,24-1 0,0 1 16,-25-25-16,25 25 16,-24-25-16,24 0 0,-25 0 15,25-24-15,0 24 0,0 0 16,25 0-16,-1 0 16,1 0-16,-1 25 0,0 0 15,25 24-15,-24 0 16,24 0-16,-25 0 0,25 0 15,-25 24-15,1 0 0,-1 1 16,1-1-16,-25 1 16,24-1-16,-24 1 0,0 23 15,-24-23-15,-1-1 16,1 1-16,-1-1 0,1-24 16,-1 25-16,1-1 0,0-24 15,-1 24-15,1-24 16,-1 0-16,1 0 0,-1 0 15,50 0 17,-1 0-17,-24 25-15,25-25 16,-1 0-16,1 24 0,-1-24 16,0 25-16,1-1 15,-1 1-15,1-1 0,-1 0 16,1 1-16,-1-1 0,0-24 15,1 25-15,-1-25 16,1 24-16,-1-24 0,0 0 16</inkml:trace>
+  <inkml:trace contextRef="#ctx0" brushRef="#br0" timeOffset="1477">2615 172 0,'-25'0'15,"25"-25"-15,-24 25 16,24-24-16,0 48 31,0 1-31,24-1 0,-24 0 16,25 1-16,-25 24 0,24 0 15,-24-25-15,25 25 16,-25 0-16,24-1 0,-24-23 16,0 24-16,0-25 15,0 1-15,0-1 0,0 0 16</inkml:trace>
+  <inkml:trace contextRef="#ctx0" brushRef="#br0" timeOffset="1914">2932 172 0,'0'-25'0,"25"25"16,-25-24-16,24 24 16,-24 24 15,-24 25-31,-1-25 15,1 25-15,0-24 0,-1 24 16,1-1-16,-25-23 16,24-1-16,1 25 0,0-25 15,24 1 1,0-50 0,0 1-1,0 0 1,24 24-16,-24-25 0,24 25 15,1 0-15,-1 25 16,1-25-16,-25 24 16,24 0-16,1-24 0,-1 25 15,0 24-15,1-25 16,-1 1-16,25-1 0,-25-24 16,1 24-16,-1 1 15,-24-1-15,25-24 0,-1 0 16,-24 25-16</inkml:trace>
+  <inkml:trace contextRef="#ctx0" brushRef="#br0" timeOffset="2251">3592 733 0,'-25'0'16,"50"0"15,-1 0-15,1 0-1,-1 0-15,-24-24 0,24 24 16,25 0-16,-24 0 0,-1 0 16,1 0-16,23 0 15,-23-25-15,-1 25 16,1 0-16,-50 0 31</inkml:trace>
+  <inkml:trace contextRef="#ctx0" brushRef="#br0" timeOffset="2665">4520 269 0,'0'-24'0,"0"-1"0,0 1 15,-25 0 1,1 24-16,0-25 16,-1 25-16,1 0 0,-1 0 15,-24 0-15,25 25 16,-25-1-16,25 0 0,-1 1 15,1-1-15,0 1 0,-1 24 16,25-1-16,0-23 16,0 24-16,25-1 0,-1-23 15,0 24-15,25-25 16,-24 1-16,23-1 0,1 0 16,0-24-16,0 25 0,-25-25 15,25 0-15,-24 0 16,-1 0-16,1-25 0,-1 25 15,-24-24 1</inkml:trace>
+  <inkml:trace contextRef="#ctx0" brushRef="#br0" timeOffset="2952">4862 269 0,'0'-24'16,"0"-1"-16,0 1 16,24 24-1,-24 24 1,0 1-16,0-1 0,0 1 16,0-1-16,0 1 15,25-1-15,-25 25 0,0-25 16,0 25-16,24-24 15,-24 23-15,25-23 0,-25-1 16,0 1-16,24-1 0,-24 0 16</inkml:trace>
+  <inkml:trace contextRef="#ctx0" brushRef="#br0" timeOffset="3270">5301 147 0,'-24'0'0,"24"-24"0,-24 24 16,24-25-1,24 25 16,0 0-31,1 0 0,-1 0 16,25 0-16,0 0 16,24 0-16,1 0 0,-26 0 15,26 0-15,-1 0 16,-24-24-16,0 24 0,-25 0 16,-24-25-1,-24 25-15,-1 0 16,-24 0-16,0 0 0</inkml:trace>
+  <inkml:trace contextRef="#ctx0" brushRef="#br0" timeOffset="3503">5472 74 0,'25'0'0,"-25"24"16,24-24-1,-24 25-15,0-1 16,25 1-16,-25-1 15,0 0-15,0 25 16,0-24-16,0 24 0,0-1 16,24 1-16,-24-24 15,0 24-15,24-1 0,-24-23 16,0-1-16,25 1 0,-25-1 16,0 0-16,24-24 15</inkml:trace>
+  <inkml:trace contextRef="#ctx0" brushRef="#br0" timeOffset="4151">6205 172 0,'-24'-25'0,"24"1"16,0-1 0,0 1-1,24 24 17,-24 24-32,0 1 15,24-1-15,-24 1 0,25 23 16,-25-23-16,24-1 15,1 25-15,-25-24 0,24-1 16,1 0-16,-1 1 16,-24-1-16,24-24 0,1 0 15,-1 0-15,1 0 16,-25-24-16,24-1 16,1 1-16,-25 0 0,24-1 15,-24 1-15,24-1 16,-24-24-16,0 25 0,25 0 15,-25-1-15,-25 25 32,25 25-32,-24-1 0,24 0 15,-24 1-15,24 24 16,0 0-16,0-25 0,-25 25 16,25 0-16,0 0 0,0-1 15,0 1-15,0-24 16,0 23-16,0-23 0,0 24 15,-24-25-15,24 1 16,0-1-16,0 0 0,0 1 16,0-1-16,0 1 15,-25-1-15,25 1 16,0-1 0,0-48 15</inkml:trace>
+</inkml:ink>
+</file>
+
+<file path=ppt/ink/ink152.xml><?xml version="1.0" encoding="utf-8"?>
+<inkml:ink xmlns:inkml="http://www.w3.org/2003/InkML">
+  <inkml:definitions>
+    <inkml:context xml:id="ctx0">
+      <inkml:inkSource xml:id="inkSrc0">
+        <inkml:traceFormat>
+          <inkml:channel name="X" type="integer" max="1920" units="cm"/>
+          <inkml:channel name="Y" type="integer" max="1080" units="cm"/>
+          <inkml:channel name="T" type="integer" max="2.14748E9" units="dev"/>
+        </inkml:traceFormat>
+        <inkml:channelProperties>
+          <inkml:channelProperty channel="X" name="resolution" value="55.81395" units="1/cm"/>
+          <inkml:channelProperty channel="Y" name="resolution" value="55.6701" units="1/cm"/>
+          <inkml:channelProperty channel="T" name="resolution" value="1" units="1/dev"/>
+        </inkml:channelProperties>
+      </inkml:inkSource>
+      <inkml:timestamp xml:id="ts0" timeString="2020-11-17T13:46:36.176"/>
+    </inkml:context>
+    <inkml:brush xml:id="br0">
+      <inkml:brushProperty name="width" value="0.05" units="cm"/>
+      <inkml:brushProperty name="height" value="0.05" units="cm"/>
+      <inkml:brushProperty name="fitToCurve" value="1"/>
+    </inkml:brush>
+  </inkml:definitions>
+  <inkml:trace contextRef="#ctx0" brushRef="#br0">396 322 0,'-25'0'0,"25"-24"16,-24 24-1,-1 0-15,1 24 16,-1-24-16,-23 24 31,-1 25-31,0-24 0,24 23 0,-23-23 16,23-1-16,25 25 15,-24 0-15,24-25 0,0 25 16,24-24-16,1 24 0,23-25 16,-23 0-16,24 1 15,0-1-15,-25 1 0,25-1 16,-25-24-16,25 0 15,-24 0-15,-1 0 0,0-24 16</inkml:trace>
+  <inkml:trace contextRef="#ctx0" brushRef="#br0" timeOffset="378">689 444 0,'0'-24'15,"24"-1"1,-24 1-1,0 48 17,0 1-17,24-1 1,-24 25-16,0-25 0,0 25 16,0-24-16,25 23 0,-25-23 15,0 24-15,0-25 16,0 1-16,0-1 0</inkml:trace>
+  <inkml:trace contextRef="#ctx0" brushRef="#br0" timeOffset="768">786 664 0,'0'-25'0,"0"1"15,25 0 16,-1 24-15,1 0-16,-1 0 0,25-25 16,-25 25-16,25 0 0,-24-24 15,23 24-15,-23 0 16,-1 0-16,1-25 0,-1 1 16,-24-1-1,0 1-15,-24-25 16,24 25-1,0-1-15,0 1 16,0 0-16,0 48 31,0 0-15,24 1-16,-24-1 0,0 1 16,25-1-16,-25 25 15,24-25-15,0 1 0,-24 24 16,25-25-16,-25 0 15,0 1-15,24-1 0,-24 1 16,0-1-16</inkml:trace>
+  <inkml:trace contextRef="#ctx0" brushRef="#br0" timeOffset="1308">1666 273 0,'-25'0'16,"25"25"15,0-1-15,0 0-16,0 1 15,0 24-15,0-25 0,0 1 16,0 23-16,0-23 16,25-1-16,-25 25 0,0-25 15,0 1 1,0-1-16,0-48 47,-25-1-47,25 1 0,0 0 15,0-25-15,0 0 16,0 0-16,25 0 0,-25-24 16,0 24-16,24 0 0,0 25 15,-24-1-15,0 1 16,25 0-16,-1 24 16,-24 24-16,25-24 15,-25 24-15,24 25 0,1-24 16,-25 24-16,24-1 0,0-23 15,1 24-15,-25 0 16,24-1-16,1-23 0,-25 24 16,24-25-16,-24 0 0,24 1 15,-24-1 1</inkml:trace>
+  <inkml:trace contextRef="#ctx0" brushRef="#br0" timeOffset="1483">1714 542 0,'-24'0'0,"0"-25"15,24 1 1,24-1 0,0 25-16,1 0 15,-1-24-15,1 24 0,24 0 16,-25-24-16,0 24 15</inkml:trace>
+  <inkml:trace contextRef="#ctx0" brushRef="#br0" timeOffset="2123">2178 224 0,'0'25'31,"0"-1"-15,-24 1 0,24-1-16,0 0 0,0 1 15,0 24-15,0-25 0,0 25 16,0-25-16,24 1 16,-24 24-16,0-25 0,0 0 15,0 1-15,25-25 0,-25 24 16,0-48-1,0-1 1,0 1 0,0 0-16,0-25 0,0 24 15,0-24-15,0 1 16,0-26-16,0 26 0,0-1 16,24 0-16,1 0 0,-25 0 15,24 25-15,1-25 16,-1 49-16,0-25 0,1 25 15,-1 0-15,1 25 16,-1-1-16,1 1 16,-1-1-16,-24 1 0,0-1 15,0 0-15,0 1 16,-24-1-16,-1 1 0,1-1 16,-25-24-16,24 25 0,-23-1 15,23-24-15,1 0 16,-1 24-16,25 1 31,25-25-31,-1 24 16,1-24-16,-1 25 0,25-1 15,-25 0-15,1 1 16,24-25-16,-25 24 0,0 1 16,1-25-16,-1 24 15,1 1-15,-1-25 16,-24 24-16,24-24 15,1 0-15</inkml:trace>
+  <inkml:trace contextRef="#ctx0" brushRef="#br0" timeOffset="2418">3009 371 0,'-25'-25'0,"1"25"16,0 0-16,-1 0 15,50 0 17,-1 0-32,0 0 15,1 0-15,24 0 0,-25 0 16,1 0-16,-1 0 15,0 0-15,1 0 0,-1 0 16,-24-24 0</inkml:trace>
+  <inkml:trace contextRef="#ctx0" brushRef="#br0" timeOffset="2694">3546 102 0,'0'25'47,"0"-1"-31,25 0-16,-25 25 0,0-24 15,24 24-15,-24-1 0,0 1 16,24 0-16,-24-25 16,0 25-16,25 0 0,-25-24 15,0-1-15,0 0 16,0 1-16</inkml:trace>
+  <inkml:trace contextRef="#ctx0" brushRef="#br0" timeOffset="3113">4181 224 0,'0'-24'0,"0"-1"31,-24 25-31,-1 0 16,1 25-16,-1-25 15,1 24-15,0 1 16,-1-1-16,1 1 0,24-1 16,-25 25-16,25 0 15,0-25-15,25 25 0,-25 0 16,24 0-16,1-25 0,23 25 16,-23-25-16,24 1 15,0-25-15,-1 24 0,1-24 16,0 0-16,0-24 15,0-1-15,0 1 0,-25-25 16,1 0-16,-1 25 0,-24-49 16,0 24-16,0 0 15,-24 0-15,-1 0 0,-24 25 16,25-1-16,-25 1 16,0-1-16,0 25 0,0 0 15,1 0-15,-1 0 0,24 25 16,1-1-16,-1 1 15</inkml:trace>
+</inkml:ink>
+</file>
+
+<file path=ppt/ink/ink153.xml><?xml version="1.0" encoding="utf-8"?>
+<inkml:ink xmlns:inkml="http://www.w3.org/2003/InkML">
+  <inkml:definitions>
+    <inkml:context xml:id="ctx0">
+      <inkml:inkSource xml:id="inkSrc0">
+        <inkml:traceFormat>
+          <inkml:channel name="X" type="integer" max="1920" units="cm"/>
+          <inkml:channel name="Y" type="integer" max="1080" units="cm"/>
+          <inkml:channel name="T" type="integer" max="2.14748E9" units="dev"/>
+        </inkml:traceFormat>
+        <inkml:channelProperties>
+          <inkml:channelProperty channel="X" name="resolution" value="55.81395" units="1/cm"/>
+          <inkml:channelProperty channel="Y" name="resolution" value="55.6701" units="1/cm"/>
+          <inkml:channelProperty channel="T" name="resolution" value="1" units="1/dev"/>
+        </inkml:channelProperties>
+      </inkml:inkSource>
+      <inkml:timestamp xml:id="ts0" timeString="2020-11-17T13:46:30.770"/>
+    </inkml:context>
+    <inkml:brush xml:id="br0">
+      <inkml:brushProperty name="width" value="0.05" units="cm"/>
+      <inkml:brushProperty name="height" value="0.05" units="cm"/>
+      <inkml:brushProperty name="fitToCurve" value="1"/>
+    </inkml:brush>
+  </inkml:definitions>
+  <inkml:trace contextRef="#ctx0" brushRef="#br0">6936 757 0,'0'-24'31,"0"-1"-15,0 50 31,0-1-32,0 1-15,0-1 0,0 0 16,0 1-16,0-1 0,0 1 16,0-1-16,0 1 15,0-1-15</inkml:trace>
+  <inkml:trace contextRef="#ctx0" brushRef="#br0" timeOffset="402">7327 220 0,'0'-25'0,"0"1"0,-24 24 16,24-24-16,0 48 16,24 0-1,-24 1-15,0-1 16,24 25-16,-24-24 16,25 23-16,-25 1 0,0-24 15,24 24-15,-24-1 0,0-23 16,25 24-16,-25-25 15,0 1-15,24-1 0,-24 0 16,0 1-16,25-25 16,-1 0-16,0 0 15,1 0-15,24 0 16,-25-25-16,25 25 16,0 0-16,-25-24 0,25 24 15,-25 0-15,1 0 0,-1 0 16,1 0-16,-25-24 15</inkml:trace>
+  <inkml:trace contextRef="#ctx0" brushRef="#br0" timeOffset="954">8133 318 0,'0'-25'16,"-24"25"0,24 25-1,0-1 1,0 0-16,0 1 16,0-1-16,0 25 15,0-24-15,0 23 0,0-23 16,24-1-16,-24 25 0,0-24 15,0-1-15,24-24 16,-24 24-16,0 1 16,0-50-1,-24 25-15,24-24 16,0 0-16,0-1 0,0 1 16,-24-25-16,24 0 15,0 0-15,0 0 0,0-24 16,24 24-16,-24-24 0,24 24 15,-24 0-15,25 0 16,-1 25-16,-24-1 0,25 1 16,-1 24-16,1 0 15,-1 24-15,0 1 0,1-1 16,-25 1-16,24 24 0,1-1 16,-1 1-16,0 0 15,1 0-15,-1 0 0,1 0 16,-1-25-16,1 25 15,-1-25-15,0 25 16,-24-24-16,25-25 0,-25 24 0,24-24 16,-24 25-16,-24-25 15,-1-25 1</inkml:trace>
+  <inkml:trace contextRef="#ctx0" brushRef="#br0" timeOffset="1181">8182 513 0,'-25'0'0,"25"-24"16,0-1-16,0 1 15,25 24-15,-1 0 16,1-25-16,-1 25 16,1-24-16,23 24 0,-23 0 15,24-25-15,0 25 16,-1-24-16,-23 24 0,24 0 15,-1 0-15,-23-24 0,-1 24 16,1 0 0</inkml:trace>
+  <inkml:trace contextRef="#ctx0" brushRef="#br0" timeOffset="-2275">3883 1075 0,'-24'0'0,"0"-25"16,24 50 30,24-25-30,-24 24-16,0 1 16,0-1-1,-24 0-15,24 1 0,0-1 16,-25 25-16,25-25 0,0 1 16,-24-25-16</inkml:trace>
+  <inkml:trace contextRef="#ctx0" brushRef="#br0" timeOffset="-1401">4347 708 0,'0'-24'16,"0"0"-1,0 48 48,0 0-63,0 1 15,0-1-15,0 1 0,0-1 16,0 0-16,25 25 16,-25-24-16,0-1 0,0 1 15,0-1-15,0 0 16,0-48 15,0 0-15,0-1-16,0-24 15,0 25-15,0-25 16,0 0-16,0 0 0,0 25 16,24-25-16,-24 0 0,25 25 15,-25-25-15,24 25 16,1 24-16,-1 0 0,0 0 15,1 0-15,-1 24 16,1 0-16,-25 1 0,24-1 16,1 25-16,-1-24 0,0-1 15,1 25-15,-25-25 16,24 1-16,-24-1 0,25 0 16,-25 1-16,0-1 15,24-24 16,-24-24-15,0-1-16,0 1 0,0 0 16,24-25-16,-24 24 15,0-23-15,25-1 0,-25 0 16,24 24-16,1 1 0,-1 0 16,1-1-16,-1 25 15,0 0-15,1 25 16,-1-1-16,-24 0 0,25 25 15,-25-24-15,24 24 16,-24-25-16,0 0 0,25 25 16,-25-24-16,0-1 15,0 0-15,24-24 0,-24 25 16</inkml:trace>
+  <inkml:trace contextRef="#ctx0" brushRef="#br0" timeOffset="-1128">5495 562 0,'0'-25'0,"0"1"16,-24 24-16,24-24 0,0-1 15,-25 25-15,25 25 31,0-1-15,25 0-16,-25 1 16,0 24-16,0-25 0,0 25 15,24 0-15,-24-25 0,0 25 16,0-25-16,0 1 16,0-1-16,0 1 0,0-1 15</inkml:trace>
+  <inkml:trace contextRef="#ctx0" brushRef="#br0" timeOffset="-635">5862 464 0,'24'0'0,"-48"0"46,24 25-46,0-1 16,-25 0-16,25 1 16,0 24-16,0-25 0,0 25 15,0 0-15,-24-25 16,24 25-16,0 0 0,0-25 16,0 1-16,24-25 15,-24 24-15,25-48 16,-25-1-1,24 1-15,-24-25 16,0 0-16,0 0 0,24 1 16,-24-1-16,0-25 0,0 26 15,0-1-15,0 0 16,0 0-16,0 25 0,25-1 16,-1 25-1,1 0-15,-1 0 0,-24 25 16,25-1-16,-1 25 0,0 0 15,1-25-15,-1 25 16,1 0-16,-1 0 0,1 0 16,-1-1-16,0 1 15,1-24-15,-1 23 0,-24-23 16,25-1-16,-25 1 16</inkml:trace>
+  <inkml:trace contextRef="#ctx0" brushRef="#br0" timeOffset="-426">5886 733 0,'-24'0'16,"-1"0"-16,25-25 16,0 1-1,25 24-15,-1-24 16,25 24-16,-25-25 15,25 25-15,0 0 0,0-24 16,0 24-16,-25 0 16,25-25-16,-25 25 0,1 0 15</inkml:trace>
+  <inkml:trace contextRef="#ctx0" brushRef="#br0" timeOffset="-3804">1441 757 0,'0'-24'31,"0"-1"16,0 50-16,0-1-31,0 1 16,0-1-16,0 0 0,0 25 15,0 0-15,0 0 16,0 0-16,0 0 0,0 0 15,0-25-15,25 25 16,-25-25-16,0 25 0,0-25 16,0 1-16</inkml:trace>
+  <inkml:trace contextRef="#ctx0" brushRef="#br0" timeOffset="-3385">1612 904 0,'-24'-25'0,"-1"1"16,1 24-16,24-25 15,-25 1 1,50 24 0,-1 0-1,-24 24-15,25-24 16,23 25-16,-23-1 15,-1 1-15,25-1 0,0 1 16,0-1-16,0 0 16,-25 1-16,25-1 0,-25 1 15,25-25-15,-24 0 0,-25 24 16,24-24-16,-24-24 31,0-1-31,0 1 0,0-1 16,0 1-16,0-25 15,0 0-15,-24 0 0,24 1 16,0-1-16,0 24 16,0-24-16,0 25 0,0 0 15,0 48 1,0 0 0,24 1-16,-24-1 15</inkml:trace>
+  <inkml:trace contextRef="#ctx0" brushRef="#br0" timeOffset="-2925">2320 611 0,'-24'0'31,"24"24"0,0 1-15,0-1-16,24 0 0,-24 1 15,25-1-15,-25 1 16,0-1-16,24 0 0,1 1 16,-1 24-1,0-49-15,1 0 16,-1-25-16,1 25 0,-1-24 15,1-1-15,-25 1 16,24 0-16,-24-25 0,24 24 16,-24 1-16,0 0 0,0-25 15,0 24 1,-24 25 0,24 25-16,0-1 15,0 1-15,0 23 0,0 1 16,-24-24-16,24 23 0,0 1 15,0 0-15,0 0 16,24-25-16,-24 1 0,0 24 16,0-25-16,24 1 15</inkml:trace>
+  <inkml:trace contextRef="#ctx0" brushRef="#br0" timeOffset="-2568">3224 611 0,'24'0'0,"-24"-25"16,-24 25 0,0 0-1,-1 0-15,1 0 16,-50 25-1,50-1-15,0 1 0,-25-1 0,24 0 16,1 1-16,-1 24 16,25-25-16,-24 25 0,24-25 15,0 25-15,0 0 0,0-25 16,24 1-16,1 24 16,-1-25-16,1-24 0,-1 25 15,25-25-15,-25 0 16,25 0-16,0 0 0,-24 0 15,-1 0-15,0-25 0,1 25 16,-1-24-16,-24-1 16</inkml:trace>
+  <inkml:trace contextRef="#ctx0" brushRef="#br0" timeOffset="2864">0 1099 0,'25'0'94,"-1"0"-94,25 0 16,0-24-16,0 24 0,-1 0 15,26-25-15,-1 1 16,0 24-16,25-25 0,-49 1 15,24 24-15,-24-24 16,0 24-16,-25 0 0,0 0 16,1 0-16,-50 0 31,1 0-15</inkml:trace>
+  <inkml:trace contextRef="#ctx0" brushRef="#br0" timeOffset="3311">733 830 0,'-25'0'0,"25"-24"16,-24 24-1,24 24 1,24-24 15,1 0-31,-1 0 16,1 0-16,-1 25 0,0-25 16,1 0-16,-1 0 15,1 0-15,-1 24 0,1-24 16,-1 0-1,-24 25-15,24-25 0,-24 24 32,0 1-17,0-1 1,-24-24-16,24 24 16,-24 1-16,24-1 0,-25 1 15,25-1-15,0 1 0,-24-1 16,24 0-1,0 1-15,-25-25 32</inkml:trace>
+  <inkml:trace contextRef="#ctx0" brushRef="#br0" timeOffset="4554">9452 293 0,'-25'0'15,"1"0"-15,0 0 16,48 0 15,0 0-15,1 0-16,-1 0 15,25 0-15,0 0 0,0-24 16,24 24-16,-24-25 0,24 25 16,-24 0-16,24-24 15,-24 24-15,0 0 0,-25 0 16,1 0-16,-25-25 0,-25 25 31,1 0-15</inkml:trace>
+  <inkml:trace contextRef="#ctx0" brushRef="#br0" timeOffset="4921">9965 49 0,'24'0'94,"-24"24"-94,25-24 0,-1 0 16,25 0-16,-25 25 15,25-25-15,-24 24 0,23-24 16,1 25-16,-24-25 16,-1 0-16,0 24 0,-24 0 15,0 1-15,-24-1 16,0 1 0,-1-25-16,1 24 0,-25 1 15,25-1-15,-1-24 16,1 24-16,-1 1 0,1-25 15,-1 24-15</inkml:trace>
+  <inkml:trace contextRef="#ctx0" brushRef="#br0" timeOffset="9865">5813 1563 0,'-25'0'0,"25"-24"16,25 24 30,-1-25-46,25 25 16,0-24-16,24-1 0,25 1 16,24 0-16,-24-1 15,24 1-15,0-1 0,-24 1 16,-1 24-16,-48 0 0,0 0 16,-25 0-16,-48 0 15</inkml:trace>
+  <inkml:trace contextRef="#ctx0" brushRef="#br0" timeOffset="10099">6350 1465 0,'25'0'16,"-1"0"-16,0 0 16,1 25-1,-1-25-15,-24 24 0,25-24 0,-1 25 16,-24-1-16,25 25 15,-25-25-15,24 25 0,-24 0 16,24 0-16,-24 0 16,25 24-16,-25-24 0,24-25 15,-24 25-15,25-24 0,-25-1 16,24 0-16,-24 1 16,24-25-16</inkml:trace>
+  <inkml:trace contextRef="#ctx0" brushRef="#br0" timeOffset="10524">7181 1856 0,'24'25'0,"-48"-25"31,48 0 0,0 0-15,1 0-16,24-25 16,-25 25-16,0 0 0,25-24 15,-24 24-15,-1-25 16,1 25-16,-1-24 0,0 0 16,-24-1-1,0 1-15,0-1 16,-24 25-16,0 0 0,-25 0 15,24 0-15,-24 0 16,1 25-16,23-1 0,-24-24 16,1 25-16,23-1 0,1 0 15,-1 25-15,25-24 16,0-1-16,25 1 0,-1-1 16,1 0-16,-1 1 15,25-1-15,0-24 0,-1 25 16,1-25-16,0 0 0,0 0 15,-25-25-15</inkml:trace>
+  <inkml:trace contextRef="#ctx0" brushRef="#br0" timeOffset="10830">8328 1759 0,'0'-25'15,"25"1"-15,-25-1 16,0 1-16,-25-1 0,1 25 16,-25-24-1,25 24-15,-1 0 0,-24 24 16,25-24-16,-25 25 16,25-1-16,-1 1 0,1-25 15,-1 24-15,1 1 16,24 23-16,0-23 0,0-1 15,0 1-15,24-1 0,1 1 16,-1-1-16,1 0 16,24-24-16,-25 25 0,25-25 15,0 0-15,-25-25 0,25 1 16</inkml:trace>
+  <inkml:trace contextRef="#ctx0" brushRef="#br0" timeOffset="11256">8524 1368 0,'0'-25'16,"-25"1"-16,1 24 15,24 24 1,24 1 0,-24 24-16,25-25 15,-1 25-15,1-25 16,-1 74-16,0-49 15,-24-25-15,25 25 16,-25 0-16,0-25 0,24 1 16,-24-1-16,0 1 0,25-25 31,-25-25-15,0 1-16,24-1 15,-24 1-15,25-25 0,-25 25 16,24-1-16,0 1 0,1-1 15,-1 25-15,1 0 16,-1 0-16,1 0 0,23 0 16,-23 25-16,-1-1 15,1 1-15,-1-1 0,-24 1 16,24-1-16,-24 0 0,25 1 16,-25-1-16,0 1 15,0-1-15</inkml:trace>
+  <inkml:trace contextRef="#ctx0" brushRef="#br0" timeOffset="11711">9452 1612 0,'-25'0'0,"1"0"0,0 0 16,-1 0-16,1-24 15,24-1 1,24 25 0,1 25-1,-1-1 1,-24 0 0,24 1-16,-24-1 0,0 1 15,25-1-15,-25 1 16,0-50 15,0 1-15,0-1-16,24 1 15,-24-1-15,25 1 0,-1-25 16,1 25-16,-1-1 16,0 1-16,1-1 0,-1 25 15,1 0-15,-1 25 16,0-1-16,-24 1 15,25 24-15,-25-25 0,0 0 16,0 25-16,24-24 16,-24-1-16,0 1 0,0-1 15</inkml:trace>
+  <inkml:trace contextRef="#ctx0" brushRef="#br0" timeOffset="11910">9989 1490 0,'25'-25'16,"-1"25"-1,-24 25 1,0-1 0,0 1-16,0 24 15,0-25-15,24 0 16,-24 25-16,0-24 0,0-1 15,0 1-15,25-1 16</inkml:trace>
+  <inkml:trace contextRef="#ctx0" brushRef="#br0" timeOffset="12061">10062 1172 0,'0'-24'0,"-24"0"15,0 24 1,24 24-16,0 0 16,0 1-1</inkml:trace>
+  <inkml:trace contextRef="#ctx0" brushRef="#br0" timeOffset="13757">10697 1417 0,'25'0'16,"-25"-25"0,0 1-1,-25-1-15,1 25 16,0 0 0,-1 25-16,1-25 0,-25 24 15,24-24-15,1 25 0,0-1 16,-1 25-16,1-25 15,-1 1-15,25-1 16,0 1-16,0 23 0,25-23 16,-1-1-16,1 1 0,23-1 15,1 1-15,0-1 0,0-24 16,24 0-16,1 0 16,-1-24-16,0-1 0,0 1 15,-24-1-15,24-24 16,-24 25-16,0-25 0,-24 25 15,-1-25-15,0 24 0,-24 1 16,0 0-16,0-1 16,-24 1-16,0 24 15,-25-25-15,24 25 16,1 0-16,-1 0 0,-23 0 16,23 0-16,1 0 0,-1 25 15,1-25-15,-1 24 16,1 1-16,24-1 0,-24 0 15,24 1-15,0-1 0,0 1 16,24-1-16,-24 1 16,24-1-16,1 0 0,-1-24 15,1 25-15,-1-25 16,25 0-16,-25 0 0,1-25 16,-1 25-16,1-24 0,-1 0 15,1-1-15,-1 1 16,-24-1-16,0 1 0,24-1 15,-24 50 17,0-1-17,25 1 1,-25-1-16,24-24 0,1 25 16,-1-1-1,1-24-15,-1 0 0,0 0 16,25 0-16,-24-24 0,-1-1 15,1 1-15,-1-1 16,0 1-16,-24-1 0,25-23 16,-25-1-16,24 0 15,-24 0-15,0-24 0,-24 24 16,-1 0-16,25 0 0,-24 0 16,0 25-16,-1 0 15,25-1-15,-24 25 0,24 25 16,-25 23-1,25 1-15,0 0 0,25 0 16,-25 24-16,24-24 0,1 0 16,-1 24-16,0-48 15,1 23-15,-1 1 0,25-24 16,-25-1-16,1-24 16,-1 0-16,25-24 0,-24 24 15,-1-25-15,0-24 0,1 1 16,-1 23-16,-24-48 15,25 48-15,-25-23 0,0-1 16,0 0-16,0 0 16,-25 25-16,25-1 0,-24 1 15,24-1-15,0 1 0,-25 0 16,25 48 15,0 0-31,0 1 0,0-1 16,0 25-16,0 0 15,0-25-15,25 25 0,-25 0 16,0 0-16,24-25 16,1 1-16,-1-1 0,1 1 15,-1-25-15,0 0 16,1 0-16,-1 0 0,25-25 16,-25 1-16,1-1 0,-25-24 15,24 25-15,1-25 16,-25 25-16,0-1 0,0 1 15,0 0-15,0 48 32,0 0-32,0 1 15,0-1-15,24 1 16,-24-1-16,25 0 0,-1 1 16,0-1-16,1 1 15,-1-1-15,1-24 0,-1 25 16,1-25-16,-1 0 0,0-25 15,1 1-15,-1-1 16,1 1-16,-25-1 0,24-23 16,-24 23-16,0-24 0,0 25 15,0 0-15,0-1 16,-24 25-16,-1 49 16,25-25-1,0 25-15,0 24 0,0 1 16,25-1-16,-1 0 0,1 1 15,-25-1-15,24 0 16,0 0-16,1-24 0,-1-24 16,-24 24-16,0-25 15,-24 0-15,-25-24 16,25 0-16,-25 0 0,0 0 16,-24 0-16,24 0 15,24-24-15,-24 24 0,25-24 16,0-1-16,24 1 15,0-1-15,24-24 0,0 25 16,25-25-16,-24 0 0,24 25 16,-1-1-16,1 1 15,-24 0-15,24-1 0,-25 25 16,0 0-16,1 0 16,-25-24-16,-25 48 15,1-24 1,0 0-16</inkml:trace>
+</inkml:ink>
+</file>
+
+<file path=ppt/ink/ink154.xml><?xml version="1.0" encoding="utf-8"?>
+<inkml:ink xmlns:inkml="http://www.w3.org/2003/InkML">
+  <inkml:definitions>
+    <inkml:context xml:id="ctx0">
+      <inkml:inkSource xml:id="inkSrc0">
+        <inkml:traceFormat>
+          <inkml:channel name="X" type="integer" max="1920" units="cm"/>
+          <inkml:channel name="Y" type="integer" max="1080" units="cm"/>
+          <inkml:channel name="T" type="integer" max="2.14748E9" units="dev"/>
+        </inkml:traceFormat>
+        <inkml:channelProperties>
+          <inkml:channelProperty channel="X" name="resolution" value="55.81395" units="1/cm"/>
+          <inkml:channelProperty channel="Y" name="resolution" value="55.6701" units="1/cm"/>
+          <inkml:channelProperty channel="T" name="resolution" value="1" units="1/dev"/>
+        </inkml:channelProperties>
+      </inkml:inkSource>
+      <inkml:timestamp xml:id="ts0" timeString="2020-11-17T13:46:54.360"/>
+    </inkml:context>
+    <inkml:brush xml:id="br0">
+      <inkml:brushProperty name="width" value="0.05" units="cm"/>
+      <inkml:brushProperty name="height" value="0.05" units="cm"/>
+      <inkml:brushProperty name="fitToCurve" value="1"/>
+    </inkml:brush>
+  </inkml:definitions>
+  <inkml:trace contextRef="#ctx0" brushRef="#br0">464 73 0,'0'-24'15,"0"0"17,0-1-1,0 50 78,0-1-93,0 0-1,0 1 1,-24-1-16,24 1 16,0-1-16,-25 0 0,25 1 15,0-1-15,-24 25 16,24-24-16,0 23 0,0 1 16,-25-24-16,25 24 15,0-1-15,-24-23 0,24 24 16,0-1-16,0-23 0,-25 24 15,25 0-15,0-1 16,0-23-16,0 24 0,0-25 16,0 25-16,0-25 15,0 1-15,0-1 0,0 1 16,0-1-16,25 1 0,-25-1 16,0 0-1,0 1-15,0-1 16,24 1-1</inkml:trace>
+  <inkml:trace contextRef="#ctx0" brushRef="#br0" timeOffset="438">49 1096 0,'-25'-24'16,"25"-1"0,-24 25-1,48 25 32,1-1-31,-1 1-16,-24-1 0,25 0 15,-1 1-15,0-1 16,1 1-16,-1 23 0,1-23 16,-1-1-16,-24 1 0,25-1 15,-1 1-15,-24-1 16,24 0-16,1-24 0,-1 0 31</inkml:trace>
+  <inkml:trace contextRef="#ctx0" brushRef="#br0" timeOffset="882">733 1145 0,'0'-24'31,"0"48"16,-25-24-31,25 24-1,-24-24-15,-1 25 16,1-1-16,0 1 16,-1-1-16,1 0 15,-25 1-15,24-1 0,1 1 16,0-1-16,-1 1 0,1-25 16,-1 24-16,1 0 15,24 1 1,24-1-1,1-24 17,-25-24 15</inkml:trace>
+</inkml:ink>
+</file>
+
+<file path=ppt/ink/ink155.xml><?xml version="1.0" encoding="utf-8"?>
+<inkml:ink xmlns:inkml="http://www.w3.org/2003/InkML">
+  <inkml:definitions>
+    <inkml:context xml:id="ctx0">
+      <inkml:inkSource xml:id="inkSrc0">
+        <inkml:traceFormat>
+          <inkml:channel name="X" type="integer" max="1920" units="cm"/>
+          <inkml:channel name="Y" type="integer" max="1080" units="cm"/>
+          <inkml:channel name="T" type="integer" max="2.14748E9" units="dev"/>
+        </inkml:traceFormat>
+        <inkml:channelProperties>
+          <inkml:channelProperty channel="X" name="resolution" value="55.81395" units="1/cm"/>
+          <inkml:channelProperty channel="Y" name="resolution" value="55.6701" units="1/cm"/>
+          <inkml:channelProperty channel="T" name="resolution" value="1" units="1/dev"/>
+        </inkml:channelProperties>
+      </inkml:inkSource>
+      <inkml:timestamp xml:id="ts0" timeString="2020-11-17T13:46:56.443"/>
+    </inkml:context>
+    <inkml:brush xml:id="br0">
+      <inkml:brushProperty name="width" value="0.05" units="cm"/>
+      <inkml:brushProperty name="height" value="0.05" units="cm"/>
+      <inkml:brushProperty name="fitToCurve" value="1"/>
+    </inkml:brush>
+  </inkml:definitions>
+  <inkml:trace contextRef="#ctx0" brushRef="#br0">293 113 0,'0'-25'0,"0"1"32,0-1-17,25 25 1,-25-24-1,0 0 64,0 48-17,0 0-46,0 1-16,0-1 15,0 1-15,0-1 16,0 25-16,0-25 0,0 25 16,0 0-16,0 0 0,0 0 15,24 0-15,-24-1 16,0 1-16,0 0 0,0 0 15,0-25-15,0 25 0,0 0 16,0-25-16,0 25 16,0-24-16,0 24 0,0-25 15,24 0-15,-24 1 16,0-1-16,0 1 0,25-25 16,-25 24-16,0-48 46,-25-1-30</inkml:trace>
+  <inkml:trace contextRef="#ctx0" brushRef="#br0" timeOffset="329">73 920 0,'-24'0'15,"0"0"-15,-1 0 16,50 0 15,-25 24-15,24-24-1,-24 24-15,24-24 16,1 25-16,-25-1 0,24-24 16,1 25-16,-1-1 15,1 1-15,-1-25 0,0 24 16,1 0 0,-1 1-16,1-25 0,-1 0 15,0 0 1</inkml:trace>
+  <inkml:trace contextRef="#ctx0" brushRef="#br0" timeOffset="762">733 968 0,'0'-24'31,"0"48"16,-25-24-15,25 25-17,-24-25-15,0 0 16,-1 24-16,1-24 15,-1 25-15,1-25 0,-1 24 16,1 1-16,0-1 16,-1-24-16,1 24 0,-1 1 15,1-25-15,24 24 16,-25 1-16,25-1 16,25-24 30,-25-24-30,-25 24 15</inkml:trace>
+</inkml:ink>
+</file>
+
+<file path=ppt/ink/ink156.xml><?xml version="1.0" encoding="utf-8"?>
+<inkml:ink xmlns:inkml="http://www.w3.org/2003/InkML">
+  <inkml:definitions>
+    <inkml:context xml:id="ctx0">
+      <inkml:inkSource xml:id="inkSrc0">
+        <inkml:traceFormat>
+          <inkml:channel name="X" type="integer" max="1920" units="cm"/>
+          <inkml:channel name="Y" type="integer" max="1080" units="cm"/>
+          <inkml:channel name="T" type="integer" max="2.14748E9" units="dev"/>
+        </inkml:traceFormat>
+        <inkml:channelProperties>
+          <inkml:channelProperty channel="X" name="resolution" value="55.81395" units="1/cm"/>
+          <inkml:channelProperty channel="Y" name="resolution" value="55.6701" units="1/cm"/>
+          <inkml:channelProperty channel="T" name="resolution" value="1" units="1/dev"/>
+        </inkml:channelProperties>
+      </inkml:inkSource>
+      <inkml:timestamp xml:id="ts0" timeString="2020-11-17T13:47:22.668"/>
+    </inkml:context>
+    <inkml:brush xml:id="br0">
+      <inkml:brushProperty name="width" value="0.05" units="cm"/>
+      <inkml:brushProperty name="height" value="0.05" units="cm"/>
+      <inkml:brushProperty name="fitToCurve" value="1"/>
+    </inkml:brush>
+  </inkml:definitions>
+  <inkml:trace contextRef="#ctx0" brushRef="#br0">323 244 0,'0'-24'15,"0"48"32,0 1-47,0-1 16,0 0-16,0 1 0,0 24 15,0 0-15,-24-1 16,24 1-16,0 0 0,0 0 16,0 0-16,0-25 0,24 25 15,-24-24-15,0-1 16,25 0-16,-25 1 0,0-1 15</inkml:trace>
+  <inkml:trace contextRef="#ctx0" brushRef="#br0" timeOffset="456">79 513 0,'-24'0'0,"-1"0"0,25-25 16,-24 25-16,24-24 0,0 0 16,0-1-1,24 1-15,-24-1 16,25 1-16,-25 0 16,24 24-16,1-25 15,23 1-15,-23 24 16,-1 0-16,25-25 15,0 25-15,0 0 0,24 0 16,-24 0-16,0 25 0,0-1 16,-1 1-16,1 23 15,-24-23-15,-25 24 0,0-1 16,0 1-16,0 0 16,-25 0-16,1 0 0,-25 0 15,25-25-15,-25 25 0,0-25 16,-73 25-1,73-49-15,0 25 0,25-25 16,-25 0-16,24 0 16,1 0-16,0 0 15,24-25 1,24 25 0</inkml:trace>
+  <inkml:trace contextRef="#ctx0" brushRef="#br0" timeOffset="942">836 391 0,'-24'-25'16,"-1"25"-16,25-24 15,0 0 1,25 24 0,24 0-16,-25-25 0,25 25 15,0 0-15,0-24 16,-1 24-16,1 0 0,0-25 16,0 25-16,0 0 15,-25-24-15,-48 24 16,-1 0-1,-23 0-15,-1 24 16,0-24-16,0 0 0,25 25 16,-25-25-16,24 0 0,1 0 15,24 24-15,0 1 16,24-25 0,-24 24-16,25 0 15,-25 1-15,0-1 0,24 25 16,-24-25-16,0 25 0,0 0 15,0-24-15,-24 23 16,24-23-16,0-1 0,0 25 16,0-24-16,0-1 15,24 0-15,1-24 16,-1 0-16</inkml:trace>
+  <inkml:trace contextRef="#ctx0" brushRef="#br0" timeOffset="1404">1764 366 0,'25'-24'0,"-1"0"16,-24-1-16,0 1 16,0-1-16,-24 1 15,-1 24 1,1 0-16,-1 0 15,-23 0-15,23 0 0,1 0 16,-1 0-16,1 0 16,-1 24-16,1-24 0,0 0 15,24 25 1,0-1 0,0 1-16,0-1 15,0 0-15,0 1 16,0-1-16,0 25 0,0-25 15,0 25-15,0-24 0,0-1 16,-25 25-16,25-25 16,0 1-16,0-1 0,0 1 15,0-1-15,25 1 0,-25-1 16,24 0 0,0 1-16,1-25 15,-1 0 1,1 0-16,24 0 0,-25-25 15,25 25-15,-25-24 16,1 24-16,-1-24 0,1-1 16</inkml:trace>
+  <inkml:trace contextRef="#ctx0" brushRef="#br0" timeOffset="1590">1642 635 0,'-24'0'0,"-1"0"15,25-24-15,25 24 32,24-25-17,-25 25-15,0 0 16,25 0-16,-24 0 0,24-24 16,-25 24-16,0 0 15,1 0-15</inkml:trace>
+  <inkml:trace contextRef="#ctx0" brushRef="#br0" timeOffset="1842">2277 708 0,'-24'25'0,"-1"-1"16,1-24-1,48 0 1,1-24 0,-1 24-1,1-25-15,-1 25 0,0-24 16,1 24 0,-25-25-16,24 25 15</inkml:trace>
+  <inkml:trace contextRef="#ctx0" brushRef="#br0" timeOffset="2135">2546 122 0,'-25'-24'0,"25"-1"16,0 1-16,0-1 15,0 50 1,0-1-16,0 1 16,0-1-16,0 1 0,25 23 15,-25 1-15,0 0 16,24 0-16,-24 0 0,25 0 16,-25-1-16,0 1 0,24 0 15,-24 0-15,24-25 16,-24 1-16,0-1 0,25 1 15</inkml:trace>
+  <inkml:trace contextRef="#ctx0" brushRef="#br0" timeOffset="2568">2668 415 0,'0'-24'16,"0"-1"-16,24 1 31,1 24-15,-1 0-1,25-24-15,-25 24 0,25 0 16,-24-25-16,-1 25 0,25 0 16,-25 0-16,1-24 15,-1 24-15,-24-25 16,0 1-1,-24 24-15,24-25 16,-25 1-16,25 0 0,-24-1 16,24 1-16,-24-1 15,24 1-15,0-1 16,0 50 0,0-1-1,24 1-15,-24-1 0,24 25 16,-24 0-16,0 24 15,25-24-15,-25 0 0,24 0 16,-24-1-16,0 1 0,25-24 16,-25 24-16,0-25 15,0 0-15,0 1 16</inkml:trace>
+  <inkml:trace contextRef="#ctx0" brushRef="#br0" timeOffset="2898">3474 513 0,'0'24'0,"-25"1"15,50-25 17,-1 0-17,1 0-15,-1 0 0,25 0 16,0 0-16,-25-25 16,25 25-16,-24 0 0,-1 0 15,0 0-15,-24 25 47,-24-25-47</inkml:trace>
+  <inkml:trace contextRef="#ctx0" brushRef="#br0" timeOffset="3301">4378 98 0,'0'-25'0,"-25"1"16,1 24-16,-1-25 0,1 25 16,-1-24-16,1 24 15,0 0-15,-1 0 16,1 24-1,24 1-15,-25-1 0,1 25 16,-1-24-16,1 23 0,24 1 16,-24-24-16,24 24 15,0-1-15,24 1 0,0-24 16,1 23-16,-1-23 0,25-1 16,-24 1-16,23-1 15,1 1-15,0-25 0,0 0 16,0 0-16,0 0 15,-25 0-15,1-25 0,-1 25 16,0-24-16,-24-1 31</inkml:trace>
+</inkml:ink>
+</file>
+
+<file path=ppt/ink/ink157.xml><?xml version="1.0" encoding="utf-8"?>
+<inkml:ink xmlns:inkml="http://www.w3.org/2003/InkML">
+  <inkml:definitions>
+    <inkml:context xml:id="ctx0">
+      <inkml:inkSource xml:id="inkSrc0">
+        <inkml:traceFormat>
+          <inkml:channel name="X" type="integer" max="1920" units="cm"/>
+          <inkml:channel name="Y" type="integer" max="1080" units="cm"/>
+          <inkml:channel name="T" type="integer" max="2.14748E9" units="dev"/>
+        </inkml:traceFormat>
+        <inkml:channelProperties>
+          <inkml:channelProperty channel="X" name="resolution" value="55.81395" units="1/cm"/>
+          <inkml:channelProperty channel="Y" name="resolution" value="55.6701" units="1/cm"/>
+          <inkml:channelProperty channel="T" name="resolution" value="1" units="1/dev"/>
+        </inkml:channelProperties>
+      </inkml:inkSource>
+      <inkml:timestamp xml:id="ts0" timeString="2020-11-17T13:47:27.224"/>
+    </inkml:context>
+    <inkml:brush xml:id="br0">
+      <inkml:brushProperty name="width" value="0.05" units="cm"/>
+      <inkml:brushProperty name="height" value="0.05" units="cm"/>
+      <inkml:brushProperty name="fitToCurve" value="1"/>
+    </inkml:brush>
+  </inkml:definitions>
+  <inkml:trace contextRef="#ctx0" brushRef="#br0">443 106 0,'0'-25'16,"-24"1"-16,24 0 15,0-1-15,0 50 32,0 23-17,-25-23-15,25 24 16,0 0-16,0-1 0,0 1 15,25 25-15,-25-26 0,24 1 16,-24 0-16,25 0 16,-25-25-16,0 25 0,24-24 15</inkml:trace>
+  <inkml:trace contextRef="#ctx0" brushRef="#br0" timeOffset="381">77 326 0,'-25'-25'0,"1"1"16,0-1-16,24 1 0,0 0 16,0-1-16,0 1 0,0-1 15,24 1-15,25-1 16,-25 1-16,25 24 0,0-24 15,-25 24-15,50 0 16,-25 24-16,-1-24 0,1 24 16,49 50-1,-74-50-15,1 25 0,-1 0 16,1 0-16,-25 0 0,0-1 16,0 1-16,0 0 15,-25-25-15,-24 25 0,25-24 16,-25 24-16,0-25 0,0 0 15,25 1-15,-25-25 16,0 24-16,25-24 0,-25 0 16,25 25-16,-1-25 15,25-25 1</inkml:trace>
+  <inkml:trace contextRef="#ctx0" brushRef="#br0" timeOffset="842">858 204 0,'-24'0'0,"0"-25"15,48 1 1,0-1-1,25 25-15,-24 0 16,23 0-16,1-24 16,0 24-16,0 0 0,0 0 15,0 0-15,-25-25 0,1 25 16,-1 0-16,-48 0 16,-1 0-1,1 0 1,-25 0-16,24 0 0,-23 0 0,23 0 15,-24 0-15,25 0 0,-1 0 16,1 0-16,24 25 16,0-1-1,0 1-15,0-1 16,0 25-16,24 0 16,-24-25-16,0 25 0,25 0 15,-25 0-15,0 0 16,24 48-1,-24-72-15,0-1 0,0 1 16,25-1-16,-25 0 0</inkml:trace>
+  <inkml:trace contextRef="#ctx0" brushRef="#br0" timeOffset="1190">1957 155 0,'-24'0'0,"0"-25"0,-1 25 16,1 0-16,-1-24 15,1 24-15,-1 0 0,1 0 16,0 0-16,-1 0 0,1 24 15,-1 1-15,1-1 16,0 1-16,-1-1 0,25 25 16,-24 0-16,-1 0 15,25-1-15,0 1 0,25-24 16,-25 24-16,24-1 16,1-23-16,23-1 0,-23 1 15,24-1-15,-25 0 0,25-24 16,-25 0-16,25 0 15,-24-24-15</inkml:trace>
+  <inkml:trace contextRef="#ctx0" brushRef="#br0" timeOffset="1400">1640 472 0,'-25'0'0,"1"0"16,48 0-1,1 0-15,-1 0 16,1 0-16,-1-24 16,25 24-16,0 0 0,0-25 15,0 25-15,-1 0 0,-23-24 16,-1 24-16,1 0 16,-1 0-16,-24-24 0</inkml:trace>
+  <inkml:trace contextRef="#ctx0" brushRef="#br0" timeOffset="1713">2421 716 0,'-24'0'16,"24"-24"15,24 24-15,1 0-1,-25-24-15,24 24 16,25 0-16,-24 0 0,-1 0 16,25 0-16,-25-25 15,1 25-15,24 0 0,-25 0 16,0 0-16,1 0 0,-50-24 31</inkml:trace>
+  <inkml:trace contextRef="#ctx0" brushRef="#br0" timeOffset="2557">3081 179 0,'0'-24'16,"0"-1"15,0 50-15,24-25-1,-24 24-15,25 1 0,-25-1 16,0 25-16,24-25 16,-24 25-16,25 0 0,-25 24 15,0-24-15,24 0 0,-24 0 16,0-25-16,24 25 15,-24-25-15,25 1 0,-25-1 16,24-24-16,-24 25 16,25-25-16,-25-25 15,24 1-15,-24-1 16,25 1-16,-1 0 0,-24-25 16,24 0-16,-24 0 0,25 0 15,-1 0-15,-24 1 16,25 23-16,-25 1 0,24-1 15,-24 1-15,25 24 16,-25 24-16,24-24 0,-24 25 16,24 24-16,1-25 0,-1 25 15,1-25-15,23 25 16,-23-24-16,24 23 0,-25-23 16,25-1-16,-25-24 15,25 25-15,-24-25 0,-1 0 16,25-25-16,-25 1 0,-24-25 15,25 25-15,-25-25 16,24 0-16,-24-24 0,0 24 16,0 0-16,0 0 0,-24 0 15,24 25-15,0-1 16,-25 1-16,25-1 0,-24 25 31,24 25-31,24-1 16</inkml:trace>
+  <inkml:trace contextRef="#ctx0" brushRef="#br0" timeOffset="2852">4473 497 0,'0'24'0,"0"0"16,-24-24-1,24 25 1,-25-25-16,50 24 31,-1-24-15,0 0 0,25-24-16,-24 24 0,-1 0 15,25-25-15,-25 25 0,25 0 16,-24-24-16,-1 24 15,-24-24 17,-24 24-32</inkml:trace>
+  <inkml:trace contextRef="#ctx0" brushRef="#br0" timeOffset="3201">5523 155 0,'0'-25'15,"-24"1"1,-1 24-16,1 0 16,24-25-16,-25 25 0,1 0 15,0 0-15,-1 0 16,1 25-16,-25-1 0,25-24 15,-1 25-15,1 24 16,-1-25-16,1 0 0,24 25 16,0 0-16,0 0 0,0-25 15,24 25-15,1 0 16,24-25-16,-25 25 0,25-24 16,0-1-16,-25 1 0,25-25 15,0 24-15,-25-24 16,25 0-16,-25 0 0,1-24 15,-1 24-15,1-25 16</inkml:trace>
+  <inkml:trace contextRef="#ctx0" brushRef="#br0" timeOffset="3476">5890 204 0,'0'-25'16,"-25"25"-16,25-24 15,-24-1 1,-1 25 0,25 25-1,25-1-15,-25 1 16,24-1-16,-24 25 0,25 0 16,-25 0-16,24-1 15,-24 1-15,24 0 0,1-24 16,-25 23-16,0-23 15,0 24-15,0-25 0,24-24 16,-24 24-16</inkml:trace>
+  <inkml:trace contextRef="#ctx0" brushRef="#br0" timeOffset="3903">6158 228 0,'-24'-24'0,"24"-1"16,-25 25-16,25-24 15,25 24 17,-1-25-32,1 25 15,23 0-15,-23 0 16,24 0-16,-25 0 0,25 0 15,-25 0-15,1-24 0,-1 24 16,-48 0 0,-1 0-1,1 0-15,0 0 16,-1 0-16,-24 0 0,25 0 16,-1 24-16,25 1 15,0-1 1,0 1-16,0-1 0,0 0 15,25 25-15,-25-24 16,0 24-16,24-1 0,-24-23 16,0 24-16,0-25 0,25 25 15,-25-25-15,0 1 16,0-1-16,0 1 16</inkml:trace>
+  <inkml:trace contextRef="#ctx0" brushRef="#br0" timeOffset="4450">6573 155 0,'0'-25'15,"-24"25"-15,0 0 31,24 25-15,0-1-16,0 1 16,0-1-1,24 0-15,-24 1 0,24-1 16,-24 1-16,25-25 16,-1 24-16,1 1 0,-1-25 15,-24 24-15,24-24 0,1 0 16,-1 0-16,1-24 15,-1 24-15,-24-25 0,25 1 16,-1-1-16,-24 1 16,0-1-16,24 25 15,-24-24-15,0 48 16,-24 1 0,24-1-16,0 1 0,-24 24 15,24-1-15,-25 1 16,25 24-16,0-24 0,0 0 15,0 24-15,0-24 0,0 0 16,25-24-16,-25 23 16,0-23-16,24-1 0,-24 1 15,0-1-15,0 1 32,0-50-1,0 1-16</inkml:trace>
+</inkml:ink>
+</file>
+
+<file path=ppt/ink/ink158.xml><?xml version="1.0" encoding="utf-8"?>
+<inkml:ink xmlns:inkml="http://www.w3.org/2003/InkML">
+  <inkml:definitions>
+    <inkml:context xml:id="ctx0">
+      <inkml:inkSource xml:id="inkSrc0">
+        <inkml:traceFormat>
+          <inkml:channel name="X" type="integer" max="1920" units="cm"/>
+          <inkml:channel name="Y" type="integer" max="1080" units="cm"/>
+          <inkml:channel name="T" type="integer" max="2.14748E9" units="dev"/>
+        </inkml:traceFormat>
+        <inkml:channelProperties>
+          <inkml:channelProperty channel="X" name="resolution" value="55.81395" units="1/cm"/>
+          <inkml:channelProperty channel="Y" name="resolution" value="55.6701" units="1/cm"/>
+          <inkml:channelProperty channel="T" name="resolution" value="1" units="1/dev"/>
+        </inkml:channelProperties>
+      </inkml:inkSource>
+      <inkml:timestamp xml:id="ts0" timeString="2020-11-17T13:47:40.434"/>
+    </inkml:context>
+    <inkml:brush xml:id="br0">
+      <inkml:brushProperty name="width" value="0.05" units="cm"/>
+      <inkml:brushProperty name="height" value="0.05" units="cm"/>
+      <inkml:brushProperty name="fitToCurve" value="1"/>
+    </inkml:brush>
+  </inkml:definitions>
+  <inkml:trace contextRef="#ctx0" brushRef="#br0">0 27 0,'0'-25'16,"24"25"15,1 0-15,-1 0-1,1 25-15,23-25 0,1 24 16,24-24-16,1 25 16,23-1-16,1 1 0,0-1 15,24 0-15,0 1 0,0-1 16,0 1-16,-24-1 15,24 1-15,-24-1 0,-25 0 16,25 1-16,-25-25 16,0 24-16,-24 1 0,24-25 15,-24 24-15,0 1 0,0-25 16,-25 24-16,25-24 16,-24 0-16,-1 24 15,-24-48 16,0 0-15</inkml:trace>
+  <inkml:trace contextRef="#ctx0" brushRef="#br0" timeOffset="384">2076 271 0,'0'-24'0,"-25"24"16,1 0-16,-1-25 16,50 25 15,-1 25-15,1-25-16,-1 24 15,1-24-15,23 25 0,-23-1 16,24 0-16,-25 1 0,1-1 15,-1 1-15,0-1 16,-24 25-16,25-25 0,-25 1 16,0-1-16,-25 1 15,25-1-15,-24-24 0,0 25 16,24-1-16,-25 0 0,1 1 16,-1-1-16,-24 1 15,25-1-15,0-24 0,-1 24 16,1 1-16,24-1 0,-25-24 15,1 0-15,24 25 16,-25-25-16</inkml:trace>
+  <inkml:trace contextRef="#ctx0" brushRef="#br0" timeOffset="3354">2931 906 0,'24'-24'15,"-24"-1"1,0 1-16,0-1 15,-24 25 1,-1 25 0,25-1-16,-24 1 15,-1 24-15,25-1 16,-24 26-16,24-25 0,0-1 0,0 1 16,0 0-16,0-25 15,0 1-15,24-1 0,-24 1 16,25-25-16,-1 0 0,1 0 15,-1 0-15,0 0 16,1-25-16,24 1 0,-25-1 16,1 1-16,23-25 15,-23 25-15,-1-25 0,-24 25 16,25-25-16,-25 24 0,24 1 16,-24 48-1,0 1 1,25-1-16,-25 25 15,24-25-15,0 25 0,-24-24 16,49-1-16,-24 0 0,-1-24 16,25 25-16,-25-25 15,25 0-15,-24 0 0,23-25 16,-23 1-16,-1 0 16,1-1-16,-1-24 0,-24 1 15,25 23-15,-25-24 0,0 0 16,-25 1-16,25 23 15,-24-24-15,-1 49 0,25-24 16,-24 24-16,-1 0 16,1 24-16,24 1 0,0-1 15,24 1-15,-24-1 16,25 0-16,24 1 16,-25-1-16,25-24 0,-25 25 15,25-25-15,-24 0 16,48 0-16,-24 0 15,-25 0-15,1 0 0,-1-25 16,-24 1 0,-24 24 15,-1 0-15,25 24-16,0 1 0,0-1 15,0 1-15,0-1 16,0 0-16,0 1 0,0-1 15,25 1-15,-1-1 16,-24 0-16,24-24 0,25 25 16,-24-25-16,-1 0 0,1-25 15,-1 25-15,0-24 16,1 0-16,-25-1 0,0 1 16,0-1-16,0 1 15,-25 0-15,1-1 0,0 1 16,-1-1-16,1 1 0,-1-1 15,1 25-15,-1-24 16,50 24 15,-1 0-31,1 0 16,-1 0-16,1 0 0,-1 0 16,25 0-16,-25 0 15,1 0-15,-1 0 0,25 0 16,-25 0-16,25 0 0,-24 0 15,24 0-15,-25 0 16,25 24-16,-25-24 0,1 25 16,-1-1-16,0 1 15,1-1-15,-25 1 0,0-1 16,0 0 0,-25-24-16,1 25 15,0-25-15,-1 0 0,1-25 16,24 1-1,0 0 1,24-1-16,1 1 0,-1-25 16,25 24-16,-25-23 15,25-1-15,-24 0 0,23 24 16,-23-23-16,-25 23 16,24-24-16,-24 25 0,0 0 15,0-1-15,0 1 16,0-1-1,-24 25-15,24-24 16,0 48 0,0 1-1,0-1-15,24 25 16,-24 0-16,0 0 16,25-1-16,-25 1 0,24 0 15,-24 0-15,25 0 16,-25-25-16,0 1 0,24-1 15,-24 1-15,0-1 16,24-48 0,1-1-1,-25 1-15,24-1 16,1 1-16,-1-1 0,25-23 16,-25 23-16,1 1 0,-1 24 15,1-25-15,-1 25 16,0 0-16,-48 25 31,0-25-31,-25 24 0,24 1 16,-24-25-16,25 24 0,-25-24 15,25 24-15,-1-24 16,1 0-16,48 25 31,1-25-31,-1 0 0,1 24 16,-1-24-16,25 25 0,-25-1 15,25 1-15,-24-1 16,23 0-16,-23 1 0,-1-1 16,1 1-16,-1-25 15,1 24-15,-1 0 0,0-24 16,1 25-16,-1-25 0,1 0 16,-1 0-16,1 0 15,-1 0-15,0 0 0,-24-25 16,25 1-16,-25 0 0,0-1 15</inkml:trace>
+  <inkml:trace contextRef="#ctx0" brushRef="#br0" timeOffset="4145">6252 1102 0,'0'-25'16,"0"1"-16,0-1 0,0 1 15,0-1 1,0 1-16,-24 24 16,-1 0-16,1 0 15,-25 0-15,25 24 16,-1 1-1,1-1-15,-25 50 0,24-50 0,1 25 16,24-25-16,0 25 16,24-25-16,1 1 0,-1-1 15,1 1-15,24-1 16,24-24-16,-24 0 0,0 0 16,-1 0-16,1 0 0,0 0 15,0-24-15,-25-1 16,1 1-16,-25-1 0,24 1 15,-24 0-15,0-25 16,-24 24-16,24-23 0,-25 23 16,25 1-16,0-1 0,-24 1 15,24-1-15,24 50 32,-24-1-32,0 1 15,25-1-15,-25 25 0,24-25 16,-24 1-16,25 24 0,-25-25 15,24 0-15,-24 1 16,24-1-16,1-24 16</inkml:trace>
+  <inkml:trace contextRef="#ctx0" brushRef="#br0" timeOffset="4296">6594 833 0,'0'-25'15,"-24"-23"-15,24 23 0,0 1 16,0 48 15,0 1-15</inkml:trace>
+  <inkml:trace contextRef="#ctx0" brushRef="#br0" timeOffset="4548">6789 711 0,'0'-25'15,"25"25"-15,-25 25 32,0-1-32,24 1 15,-24 23-15,0 1 16,25 0-16,-25 24 0,0-24 15,0 25-15,24-26 0,-24 1 16,0 0-16,0 0 16,25-25-16,-25 1 0,0-1 15</inkml:trace>
+  <inkml:trace contextRef="#ctx0" brushRef="#br0" timeOffset="5304">6887 1150 0,'-24'-24'15,"24"0"-15,-25-1 16,25 1-16,-24 24 0,24-25 16,-25 25-16,50 0 31,-1 25-31,1-25 16,-1 0-1,25 0-15,-25 0 0,1 0 16,-1 0-16,1 0 0,-1 0 15,1 0-15,-1 0 16,-24-25-16,24 25 16,-24-24-1,0 48 17,0 1-17,0-1-15,25-24 16,-1 25-16,1-1 15,23 0-15,-23-24 16,-1 25-16,1-25 0,24 0 16,-25 0-16,0 0 15,1-25-15,-1 1 16,-24 0-16,0-1 16,0 1-16,0-1 15,0 1-15,0-1 16,-24 1-16,24 0 15,0 48-15,-25 0 16,25 1-16,0-1 0,0 25 16,0 0-16,0 0 15,0 24-15,0-24 0,0 24 16,0 0-16,25 1 16,-25-25-16,24 24 0,-24 0 15,25-24-15,-25 0 0,24 0 16,-24-25-16,25 0 15,-25 1-15,0-50 32,-25 25-32,1-24 0,-1 0 15,1-25-15,-1 24 0,1-23 16,24 23-16,-24-24 16,24 0-16,-25 1 0,25-1 15,0 24-15,0 1 16,25-25-16,-25 25 0,24 24 15,0-25-15,1 25 0,-1-24 16,1 24-16,-1 0 16,1 0-16,-1 0 0,0-25 15,1 25-15,-1 0 16,-24-24-16,-24 24 16</inkml:trace>
+</inkml:ink>
+</file>
+
+<file path=ppt/ink/ink159.xml><?xml version="1.0" encoding="utf-8"?>
+<inkml:ink xmlns:inkml="http://www.w3.org/2003/InkML">
+  <inkml:definitions>
+    <inkml:context xml:id="ctx0">
+      <inkml:inkSource xml:id="inkSrc0">
+        <inkml:traceFormat>
+          <inkml:channel name="X" type="integer" max="1920" units="cm"/>
+          <inkml:channel name="Y" type="integer" max="1080" units="cm"/>
+          <inkml:channel name="T" type="integer" max="2.14748E9" units="dev"/>
+        </inkml:traceFormat>
+        <inkml:channelProperties>
+          <inkml:channelProperty channel="X" name="resolution" value="55.81395" units="1/cm"/>
+          <inkml:channelProperty channel="Y" name="resolution" value="55.6701" units="1/cm"/>
+          <inkml:channelProperty channel="T" name="resolution" value="1" units="1/dev"/>
+        </inkml:channelProperties>
+      </inkml:inkSource>
+      <inkml:timestamp xml:id="ts0" timeString="2020-11-17T13:47:34.098"/>
+    </inkml:context>
+    <inkml:brush xml:id="br0">
+      <inkml:brushProperty name="width" value="0.05" units="cm"/>
+      <inkml:brushProperty name="height" value="0.05" units="cm"/>
+      <inkml:brushProperty name="fitToCurve" value="1"/>
+    </inkml:brush>
+  </inkml:definitions>
+  <inkml:trace contextRef="#ctx0" brushRef="#br0">1029 2264 0,'0'-24'0,"-25"24"15,25-25-15,-24 25 0,24 25 16,0-1 0,0 25-16,0-25 15,0 25-15,24 24 0,-24-24 16,25 25-16,-25-26 0,24 26 15,-24-25-15,25-1 16,-25 1-16,24 0 0,-24 0 16,24-25-16,-24 1 15,0-1-15,25-24 0,-25 25 16</inkml:trace>
+  <inkml:trace contextRef="#ctx0" brushRef="#br0" timeOffset="366">1102 2728 0,'-24'-49'16,"-1"25"-16,25-1 0,-24 1 16,24 0-16,0-1 15,24 25-15,1 0 16,-1-24-16,25 24 16,0-25-16,0 25 0,-1 0 15,1-24-15,24 24 0,-48-24 16,24 24-16,-25-25 15,1 25-15,-1-24 0,-24-1 16,0 1 0,0-1-16,0 1 0,-24 0 15,24-1-15,0 1 16,-25 24-16,25 24 16,25 25-1,-25-25-15,0 25 16,24 0-16,-24 24 0,24-24 15,1 0-15,-25 24 0,24-24 16,1 0-16,-25 0 16,24-25-16,1 1 0,-25-1 15,24 1-15</inkml:trace>
+  <inkml:trace contextRef="#ctx0" brushRef="#br0" timeOffset="-1398">8502 799 0,'-24'24'47,"-1"-24"-32,1 0-15,-25 0 16,0 25-16,-24-25 0,0 24 16,-25-24-16,-24 24 15,-25 1-15,-24 24 0,0-25 16,-24 1-16,0 23 0,-1-23 16,1 24-16,24-25 15,0 25-15,24-25 0,25 1 16,0-1-16,49 1 15,0-1-15,-1-24 0,50 24 16,-25-24-16,25 0 0</inkml:trace>
+  <inkml:trace contextRef="#ctx0" brushRef="#br0" timeOffset="-918">5622 1019 0,'0'-25'16,"0"50"30,0-1-46,0 0 16,-24 1 0,24-1-16,-25 1 0,1 24 15,-25-25-15,25 25 0,-25 0 16,0-1-16,0 1 16,0 0-16,-24 0 0,24 0 15,0 0-15,1 0 16,23-25-16,1 0 0,-1 1 15,25-1-15,49-24 16,-24 0 0,23 0-16,26 0 0,-1-24 15,25 24-15,-1 0 16,-23 0-16,-1 0 0,0-25 16,0 25-16,-24 0 0,-24 0 15,23 0-15,-23 0 16,-50 0 15</inkml:trace>
+  <inkml:trace contextRef="#ctx0" brushRef="#br0" timeOffset="1596">1957 2557 0,'24'0'16,"-24"-24"-16,25 24 0,-25-25 15,0 50 1,0-1 0,0 1-16,-25-1 15,25 0-15,0 1 16,0 24-16,0-25 0,0 1 15,0-1-15,25 0 16,-25 1-16,24-1 0,0 1 16,1-25-16,-1 24 0,25-24 15,-24 0-15,-1 0 16,0-24-16,25 24 0,-49-25 16,25 1-16,-1-1 15,-24 1-15,0 0 0,-24-1 16,-1 1-16,-24-1 15,25 1-15,-25-1 0,0 1 16,0 0-16,1-1 0,23 25 16,1-24-16,-1 24 15,1 0-15,24 24 16,24-24-16,-24 25 0,25-1 16,-1-24-16,1 24 15,-1 1-15,0-25 16,1 0-1,-1 0-15,1 0 16,-1-25-16,1 25 16,-1-24-16,0 0 15,1-1-15,-1 25 0,1-24 16,-1 24-16,1 0 16,-1 0-16,0 0 15,1 24-15,-1-24 0,-24 25 16,25 23-16,-25-23 15,24-1-15,-24 1 0,0-1 16,24 25-16,-24-25 16,0 1-16,0-50 31,0 1-15,25 0-16,-25-1 0,0 1 15,24-25-15,-24 24 16,25-23-16,-1-1 0,1 24 15,-25-24-15,24 25 0,0 0 16,1 24-16,-1 0 16,1 0-16,-1 0 0,-24 24 15,25 0-15,-1 1 16,-24-1-16,24 25 0,-24-24 16,0-1-16,25 0 0,-25 1 15,0-1-15,0 1 16,0-1-16,0-48 31,0-1-15,0 1-16,0-1 0,0 1 15,0-25-15,0 25 16,24-1-16,-24-24 0,25 49 16,-1-24-16,-24 0 15,25 24-15,-1 24 16,-24 0-16,24 1 0,-24-1 15,0 1-15,25-1 16,-25 1-16,0 23 0,0-23 16,24-1-16,1 1 15,-1-25-15,1 0 16,23 0-16,-23 0 0,24-25 16,-1 25-16,-23-24 15,24-1-15,-25 1 0,25-25 16,-25 25-16,-24-1 0,0 1 15,0-25-15,0 25 16,-24-1-16,0 1 0,24-1 16,-49 1-16,24 24 15,1 0-15,-1 0 0,1 0 16,0 24-16,-1 1 0,25-1 16,0 25-16,0-25 15,0 25-15,0 0 0,25-24 16,-1 23-16,0-23 15,25-1-15,-24 1 0,24-25 16,-25 0-16,25 0 0,0 0 16</inkml:trace>
+  <inkml:trace contextRef="#ctx0" brushRef="#br0" timeOffset="2195">4277 2313 0,'24'0'0,"-24"-24"15,0-1-15,25 1 16,-25-1 0,0 1-16,-25 24 15,1 0-15,0 0 0,-1 0 16,1 0-16,-1 24 16,1 25-16,-1-24 0,1-1 15,24 25-15,-24 0 16,24 0-16,0-25 0,0 25 15,24 0-15,0-25 0,1 0 16,24 1-16,0-25 16,-1 24-16,1-24 0,0 0 15,0-24-15,-25 24 16,25-25-16,-24 1 0,-1-25 16,-24 25-16,0-1 15,24-23-15,-24 23 0,0-24 16,0 25-16,0-1 0,0 1 15,0 0 1,0 48 15,25-24-31,-25 24 16,0 1-16,24 24 0,-24-25 16,25 25-16,-25-25 15,0 25-15,24-24 0,-24 23 16,25-23-16,-25-1 15</inkml:trace>
+  <inkml:trace contextRef="#ctx0" brushRef="#br0" timeOffset="2364">4692 1971 0,'0'-24'16,"0"-1"-16,-24 25 15,-1-24-15,25 48 47</inkml:trace>
+  <inkml:trace contextRef="#ctx0" brushRef="#br0" timeOffset="2598">4888 1898 0,'24'0'16,"-24"24"15,0 1-31,0-1 16,24 0-16,-24 1 16,0 24-16,0 0 0,0 24 15,25-24-15,-25 24 16,24 0-16,-24-24 0,0 0 15,25 0-15,-25 0 0,24-25 16,-24 0-16,0 1 16</inkml:trace>
+  <inkml:trace contextRef="#ctx0" brushRef="#br0" timeOffset="3265">4912 2386 0,'0'-24'0,"-24"24"0,24-25 15,24 25 17,0-24-32,1 24 15,24-24-15,-1 24 16,1-25-16,0 1 0,0-1 16,0 25-16,-25-24 0,1 24 15,-1-25-15,1 25 16,-25-24-16,-25 24 15,1 0 1,-1 0-16,25 24 31,0 1-31,0-1 16,25 1-16,-25-1 0,24 1 16,1 23-16,-1-23 15,0-1-15,1 1 0,-1-1 16,1 1-16,-1-1 0,1-24 15,-1 0-15,0 0 16,1-24-16,-1-1 0,-24 1 16,25-1-16,-1 1 15,-24-25-15,25 25 0,-25-25 16,0 24-16,0-24 0,0 25 16,0 0-16,-25 24 15,1 24 1,24 0-16,0 25 15,-25 0-15,25 0 0,0 0 16,0 24-16,0 0 0,25 1 16,-25-1-16,24 0 15,-24 0-15,25-24 0,-1 25 16,-24-26-16,0 1 16,0-24-16,0-1 0,0 0 15,0 1-15,0-1 0,-24-24 16,-1 0-1,1 0 1,24-24 0,-25 24-16,25-25 47</inkml:trace>
+  <inkml:trace contextRef="#ctx0" brushRef="#br0" timeOffset="17486">784 188 0,'0'-24'16,"0"-1"-16,-48 25 0,23 0 15,-24 0-15,25 0 16,24 25 0,-24-1-16,24 25 0,0 0 15,0 0-15,0 24 16,24-24-16,-24 24 0,0 0 15,24-24-15,-24 24 16,0-24-16,0 0 0,0 0 16,0 0-16,0 0 0,0-25 15</inkml:trace>
+  <inkml:trace contextRef="#ctx0" brushRef="#br0" timeOffset="17918">101 359 0,'-49'-24'0,"24"-25"0,1 0 16,24 25-16,0-25 15,0 24-15,24 1 0,1-1 16,24 1-16,-25 0 0,49-1 15,-24 25-15,0-24 16,24 24-16,1 0 0,-1 24 16,0-24-16,0 49 15,49 49-15,-73-25 16,0-24-16,0 49 0,-25-25 16,-24 0-16,0 25 15,0-25-15,0 0 0,-24-24 16,0 24-16,-25-24 15,0 0-15,0 0 0,0-25 16,0 25-16,-24-24 0,24-25 16,0 24-16,1-24 15,-1 25-15,0-25 0,24 0 16,-23-25-16,23 25 16,1 0-16,-1-24 15</inkml:trace>
+  <inkml:trace contextRef="#ctx0" brushRef="#br0" timeOffset="18548">1126 335 0,'-24'-25'16,"0"25"-16,24-24 16,-25 24-16,50 0 15,-1 0 1,0-25-16,25 25 0,0 0 16,24-24-16,25 24 0,-25-24 15,25-1-15,-25 25 16,49-24-1,-73 24-15,0-25 0,-25 25 16,-48 0 0,0 0-16,-25 0 0,24 0 15,-23 0-15,-1 0 16,0 0-16,24 0 0,-23 0 16,23 0-16,1 0 15,-1 25 1,25-1-16,0 1 0,0-1 15,25 25-15,-25 0 16,0 24-16,0 0 0,0 0 16,24 1-16,-24-1 15,0-24-15,0 24 0,0-24 16,0 0-16,0 0 0,0 0 16,0-25-16,0 0 15,0 1-15,25-25 16</inkml:trace>
+  <inkml:trace contextRef="#ctx0" brushRef="#br0" timeOffset="19124">2738 237 0,'0'-24'16,"0"-1"0,-24 1-16,-1 24 0,25-25 15,-24 25-15,0 0 0,-1-24 16,1 24-16,-1 0 16,-24 0-16,25 0 0,0 0 15,-25 0-15,24 0 16,-23 0-16,23 0 0,1 24 15,-25-24-15,24 0 0,25 25 16,-24-25-16,0 24 16,24 1-16,-25-1 15,25 25-15,0-25 0,-24 25 16,24-24-16,0 23 16,0 1-16,0 0 0,0 0 15,0 0-15,0 0 16,24 48-1,-24-72-15,25 24 0,-25-25 16,24 25-16,-24-25 0,24 1 16,-24-1-16,25 1 0,-25-1 15,24 0-15,-24 1 16,0-1-16,25-24 16,-25 25-16,24-25 15,-24 24-15,25-24 16,-1 0-1,0 0-15,1 0 0,-1 0 16,1 0-16,-1 0 0,0 0 16,1 0-16,-1 0 0,1-24 15,-1-1-15,1 25 16</inkml:trace>
+  <inkml:trace contextRef="#ctx0" brushRef="#br0" timeOffset="19436">2054 799 0,'-24'0'15,"48"0"-15,1-25 16,24 25-1,-25 0-15,25 0 0,0-24 16,0 24-16,0 0 0,-1-25 16,1 25-16,0 0 15,0-24-15,0 24 0,-25 0 16,1 0-16,-1 0 16,0 0-16,1 0 0,-25-24 15,-25 24 16</inkml:trace>
+  <inkml:trace contextRef="#ctx0" brushRef="#br0" timeOffset="19932">3618 628 0,'-25'0'15,"1"0"-15,-1 0 16,25-25-1,25 25-15,-1 0 0,1 0 16,23 0-16,1 0 16,24 0-16,1-24 0,48 24 15,-24 0-15,48-25 16,1 25-16,-1-24 0,25 24 16,0 0-16,0-24 15,24 24-15,-24-25 0,0 25 16,25-24-16,-50 24 0,25 0 15,-49-25-15,0 25 16,1 0-16,-50-24 0,0 24 16,-24 0-16,0 0 0,-25 0 15,-48 0 17,-1 0-32,1 0 15,0 0-15,-25 0 16</inkml:trace>
+  <inkml:trace contextRef="#ctx0" brushRef="#br0" timeOffset="20289">6328 188 0,'-24'0'15,"0"0"-15,-25-24 0,24 24 16,25-25-16,25 25 31,-1 0-15,1 0-16,-1 0 16,25 25-16,-25-25 0,25 24 15,0 1-15,0-25 0,0 24 16,0 0-16,-1 1 15,1-1-15,-24 1 0,24-25 16,-25 24-16,0 1 16,-24-1-16,25 0 0,-25 1 15,-25-1-15,1 1 16,0-1-16,-25 1 16,0-1-16,-24 0 0,-1 25 15,1-24-15</inkml:trace>
+</inkml:ink>
+</file>
+
 <file path=ppt/ink/ink16.xml><?xml version="1.0" encoding="utf-8"?>
 <inkml:ink xmlns:inkml="http://www.w3.org/2003/InkML">
   <inkml:definitions>
@@ -2265,6 +2672,272 @@
   <inkml:trace contextRef="#ctx0" brushRef="#br0">195 122 0,'0'-25'0,"25"1"31,-25 0-31,24 24 16,-24-25-16,25 25 15,-25-24-15,24 24 16,0 0 15,1 24-31,-1-24 16,1 25 0,-1-1-1,-24 0 1,0 1-16,-24-1 0,-1-24 15,1 25-15,-1-1 0,-23 1 16,23-1-16,-24 0 16,25 1-16,-25-1 0,25-24 15,-1 25-15,1-25 16,24 24-16,-25-24 0,1 0 16,24 24-16,24-24 31,1 0-16,-1 0-15,1 0 16,23 0 0,-23 0-16,-1 0 0,25 0 15,-24 0-15,23 0 16,-23 0-16,-1 0 0,1 0 16,-1 0-16</inkml:trace>
   <inkml:trace contextRef="#ctx0" brushRef="#br0" timeOffset="672">879 366 0,'-24'24'62,"24"1"-46,0-1-16,0 1 15,-25-25-15,25 24 16,0 1-16</inkml:trace>
   <inkml:trace contextRef="#ctx0" brushRef="#br0" timeOffset="1452">1246 146 0,'0'-24'15,"0"-1"1,0 1 0,0 0-1,24 24-15,0-25 16,1 25 0,-1 0-16,1 0 15,-1 0 1,-24 25-16,24-25 15,-24 24-15,25-24 0,-25 24 16,0 1-16,24-1 0,-24 1 16,0-1-16,-24 1 15,-1-1-15,25 0 16,-24 1-16,0-25 16,-1 24-16,1 1 0,-1-1 15,1-24 1,24 24-16,-24-24 15,24 25 1,-25-25 0,50 0 15,-1 0-15,0 0-16,1 0 15,-1 0-15,1 0 16,23 0-16,-23 0 0,24 0 15,-25 0-15,25 0 0,0 0 16,0 24-16,-25-24 16,25 0-16,-25 0 0,1 0 15,-1 0-15,-48 0 32</inkml:trace>
+</inkml:ink>
+</file>
+
+<file path=ppt/ink/ink160.xml><?xml version="1.0" encoding="utf-8"?>
+<inkml:ink xmlns:inkml="http://www.w3.org/2003/InkML">
+  <inkml:definitions>
+    <inkml:context xml:id="ctx0">
+      <inkml:inkSource xml:id="inkSrc0">
+        <inkml:traceFormat>
+          <inkml:channel name="X" type="integer" max="1920" units="cm"/>
+          <inkml:channel name="Y" type="integer" max="1080" units="cm"/>
+          <inkml:channel name="T" type="integer" max="2.14748E9" units="dev"/>
+        </inkml:traceFormat>
+        <inkml:channelProperties>
+          <inkml:channelProperty channel="X" name="resolution" value="55.81395" units="1/cm"/>
+          <inkml:channelProperty channel="Y" name="resolution" value="55.6701" units="1/cm"/>
+          <inkml:channelProperty channel="T" name="resolution" value="1" units="1/dev"/>
+        </inkml:channelProperties>
+      </inkml:inkSource>
+      <inkml:timestamp xml:id="ts0" timeString="2020-11-17T13:47:01.436"/>
+    </inkml:context>
+    <inkml:brush xml:id="br0">
+      <inkml:brushProperty name="width" value="0.05" units="cm"/>
+      <inkml:brushProperty name="height" value="0.05" units="cm"/>
+      <inkml:brushProperty name="fitToCurve" value="1"/>
+    </inkml:brush>
+  </inkml:definitions>
+  <inkml:trace contextRef="#ctx0" brushRef="#br0">4240 5144 0,'0'24'62,"0"1"-62,-24-25 16,24 24-16,0 25 0,0-25 16,0 1-16,0 24 15,0 0-15,0-1 0,0 1 16,0 0-16,-25 0 0,25 0 16,0 0-16,0 0 15,-24-1-15,24 1 0,0 0 16,0 0-16,0-25 15,0 25-15,0-24 0,0 23 16,0-23-16,24-1 0,-24 1 16,0-1-16,25 1 15,-25-1-15,24-24 16,-24 24 0,24-24-16,1 0 15,-1 0-15,1 0 0,-1 0 16,0-24-16,1 24 15,24 0-15,-25 0 0,25 0 16,0 0-16,0 0 16,24 0-16,0 0 0,1 0 15,-1-24-15,25 24 0,-1-25 16,1 25-16,24-24 16,0 24-16,0-25 0,0 25 15,25 0-15,-25-24 16,0 24-16,25-25 0,-1 25 15,1 0-15,-25 0 0,24-24 16,1 24-16,-1 0 16,1-24-16,0 24 0,-25 0 15,24 0-15,-24-25 16,0 25-16,1 0 0,-1 0 16,0 0-16,0-24 0,0 24 15,0 0-15,0 0 16,0 0-16,0-25 0,1 25 15,-1 0-15,0-24 16,0 24-16,-24 0 0,24 0 16,-25-25-16,1 25 0,-25 0 15,25 0-15,-25 0 16,1 0-16,-1 0 0,0 0 16,0 0-16,1 0 15,-1-24-15,0 24 0,0 0 16,1 0-16,-25 0 0,24-24 15,-24 24-15,24 0 16,-24 0-16,0 0 0,0 0 16,-1 0-16,-23 0 15,24 0-15,0-25 0,-25 25 16,25 0-16,-25 0 0,1 0 16,-1-24-16,0 24 15,1 0-15,-1 0 16,-24-25 46,0 1-46,0 0 0,0-1-16,0 1 15,0-1-15,0 1 0,0-1 16,0 1-16,0 0 15,0-1-15,0-24 0,0 25 16,0-1-16,0-23 0,0 23 16,0-24-16,-24 25 15,24-25-15,0 0 16,0 25-16,0-25 0,0 0 16,-25 0-16,25 25 0,0-25 15,-24 0-15,24 25 0,0-25 16,-24 24-16,24 1 15,0 0-15,0-25 0,0 24 16,-25 1-16,25-1 16,0 1-16,0 0 0,0-1 15,0 1-15,0-1 0,0 1 16,0 0-16,0-1 16,0 1-1,0-1 1,0 1-1,-24 24 32,-1 0-31,1 0-16,0 24 16,-1-24-16,1 0 0,-25 0 15,0 0-15,0 0 16,0 0-16,-24 0 0,0 0 15,-25 25-15,0-25 0,-24 0 16,0 0-16,-24 0 16,-1 0-16,1 0 0,-25 0 15,0 0-15,0 24 16,0-24-16,0 0 0,24 0 16,-24 0-16,25 0 15,-1 25-15,1-25 0,23 0 16,1 0-16,0 24 0,0-24 15,0 24-15,24-24 16,-24 0-16,25 25 0,-26-25 16,26 0-16,-1 24 15,0-24-15,1 0 0,-1 25 16,0-25-16,1 0 0,-1 0 16,25 24-16,-25-24 15,25 0-15,-1 24 0,1-24 16,0 0-16,0 25 15,-1-25-15,1 0 0,0 0 16,24 24-16,-24-24 0,-1 0 16,25 0-16,1 0 15,-26 25-15,26-25 0,-1 0 16,-25 24-16,26-24 0,-1 0 16,0 25-16,24-25 15,-23 0-15,23 24 0,1-24 16,-1 0-16,25 24 47,-24-24-47,0 0 15,-1 0 1,1 25-16,-1-25 16,1 0-16,-1 0 0,1 0 15,0 24-15,-1-24 0,1 0 16,-1 0-1,1 0-15,-1 0 0,1 0 16,0 0 0,-1 0-16,1 0 0,-25 0 15,24 0 1,1 0-16,0 25 16,-1-25-16,1 24 15,-1-24 1,25 25-16,-24-25 15,24 24 1,-25-24-16,1 0 16,24 24-1,0 1 1,0-1 0,0 1-1,-24-1 1,24 0-16,-25 1 15,1-1 1,-1 1-16,25-1 16,0 1 15,0-1-15,0 0-1,0 1-15,0-1 16,0 1-1,0-1-15,0 1 16</inkml:trace>
+  <inkml:trace contextRef="#ctx0" brushRef="#br0" timeOffset="451">4728 5339 0,'0'25'62,"0"-1"-46,25 1 0,-25-1-16,0 0 0,24 1 15,-24 24-15,25-25 0,-25 25 16,0-25-16,24 1 16,-24-1-16,0 1 0,0-1 15,0 1-15</inkml:trace>
+  <inkml:trace contextRef="#ctx0" brushRef="#br0" timeOffset="870">4509 5388 0,'-25'0'0,"25"-24"16,0-1-16,0 1 16,0-1-16,25 25 15,-1 0-15,0-24 16,25 24-16,-24 0 0,24-24 16,-1 24-16,26 0 0,-25 0 15,-1 0-15,1 0 16,0 24-16,-24-24 0,23 24 15,-23 25-15,-25-24 16,24 24-16,-24-25 0,0 25 16,0 0-16,-24-25 0,-1 25 15,1-25-15,0 1 16,-1-1-16,1 1 0,-1-1 16,-24-24-16,25 24 15,-25-24-15,25 0 0,-1 0 16,-24 0-16,25 0 15,0 0-15,24-24 16,-25 24-16</inkml:trace>
+  <inkml:trace contextRef="#ctx0" brushRef="#br0" timeOffset="1332">5437 5461 0,'0'-24'16,"-25"24"-1,1 0 1,24 24-16,-25-24 15,25 25-15,-24-25 0,24 24 16,-24 1-16,24-1 16,0 25-16,0-25 0,24 1 15,0-1-15,1 25 0,-1-24 16,25-25-16,-24 24 16,23-24-16,1 0 0,-24 0 15,24-24-15,-25-1 16,0 25-16,1-49 0,-25 25 15,0-1-15,0-23 0,-25 23 16,1 1-16,0-25 16,-1 24-16,-24 25 0,25-24 15,-25 0-15,25 24 0,-1 0 16,1 0-16,-1 0 16,25 24-1,0 0 1</inkml:trace>
+  <inkml:trace contextRef="#ctx0" brushRef="#br0" timeOffset="2010">5852 5486 0,'-25'0'16,"1"0"-1,24-25-15,24 25 32,1 25-17,-25-1 1,24 1-16,-24 24 16,25-25-16,-25 0 15,24 1-15,-24-1 16,0 1-16,25-25 0,-25 24 15,0-48 17,-25 24-17,25-25-15,0 1 0,0-1 16,0 1-16,0-25 0,0 25 16,0-25-16,0 24 15,25 1-15,-1 0 0,-24-1 16,24 25-16,1 0 15,-1 0-15,1 0 0,-25 25 16,24-25-16,1 24 0,-25 0 16,24 25-16,-24-24 15,24-1-15,-24 1 0,0-1 16,0 0-16,0 1 16,25-25-16,-50-25 31,25 1-16,0 0-15,0-1 16,0 1-16,0-1 0,0 1 16,25-25-16,-1 25 15,1-1-15,-1 25 0,0-24 16,1 24-16,-1 0 16,1 24-16,-1-24 0,1 49 15,-25-25 1,0 1-16,0-1 0,0 1 15,0-1-15,0 1 0,0-1 16,0 0-16,24-24 16,-24 25-16</inkml:trace>
+  <inkml:trace contextRef="#ctx0" brushRef="#br0" timeOffset="2585">6853 5486 0,'0'-25'16,"0"1"-1,25 0-15,-25-1 16,0 1-1,-25-1 1,1 25-16,-1 0 0,1 0 16,0 0-16,-25 0 0,24 0 15,1 25-15,-1-1 16,1 1-16,0-1 0,24 0 16,0 1-16,0-1 15,24 1-15,0-1 0,-24 1 16,25-1-16,-1 0 0,1 1 15,-1-25-15,1 0 16,-1 0-16,0 0 0,1 0 16,-1-25-16,1 25 15,-1-24-15,-24 0 0,24-1 16,-24-24-16,25 25 0,-25-1 16,0 1-16,0 0 15,0-1-15,0 1 0,0-1 16,0 50 15,0-1-31,24-24 0,-24 25 16,25-1-16,-1 0 15,1 25 1,-1-24-16,-24-1 0,24-24 16,1 25-16,-1-25 0,1 0 15,-1 0-15,1 0 16</inkml:trace>
+  <inkml:trace contextRef="#ctx0" brushRef="#br0" timeOffset="2826">7317 5388 0,'-24'0'0,"24"-24"16,0-1 15,0 50-16,24-1 1,-24 1-16,25-1 16,-25 0-16,24 1 0,-24-1 15,25 1-15,-25-1 16,24 1-16,-24-1 0,0 0 16</inkml:trace>
+  <inkml:trace contextRef="#ctx0" brushRef="#br0" timeOffset="2989">7293 5119 0,'0'-24'16,"-25"24"-16,1 0 15,0 0 1,24 24-1</inkml:trace>
+  <inkml:trace contextRef="#ctx0" brushRef="#br0" timeOffset="3467">7488 5315 0,'0'24'16,"0"-48"15,25-1-15,-1 25-1,-24 25 1,25-1-16,-1 1 16,0-1-16,1-24 15,-25 25-15,24-1 0,-24 0 16,25-24-16,-25 25 15,0-1-15,0 1 16,-25-25 15,25-25-31,-24 25 16,24-24-16,0-1 16,-25 1-16,25 0 0,0-1 15,25 1-15,-1-1 0,1 1 16,-1-1-16,0 1 15,1 0-15,-1 24 0,25 0 16,-24 0-16,-1 24 16,0-24-16,25 24 0,-24 1 15,-25-1-15,24 1 0,1-1 16,-25 1-16,0-1 16,0 0-16,0 1 0,0-1 15,-25 1-15,25-1 16,-24 1-16</inkml:trace>
+  <inkml:trace contextRef="#ctx0" brushRef="#br0" timeOffset="4164">8734 5169 0,'0'-24'31,"24"24"-16,-24-25-15,-24 25 47,-1 0-47,1 0 0,0 0 16,-25 25-16,24-1 16,1 1-16,-1-1 0,25 1 15,-24 23-15,24-23 0,0-1 16,0 25-16,0-24 15,24-1-15,1 25 0,-1-25 16,1 1-16,-1-25 16,1 24-16,-1 1 0,0-25 15,25 0-15,-24-25 0,24 25 16</inkml:trace>
+  <inkml:trace contextRef="#ctx0" brushRef="#br0" timeOffset="4602">9125 5120 0,'-25'0'0,"25"-25"16,-24 25-16,24 25 31,0-1-15,0 0-16,0 1 15,0-1-15,0 1 0,24 23 16,-24 1-16,0-24 0,25 24 16,-25-25-16,24 0 15,-24 25-15,24-49 0,-24 25 16,25-25-16</inkml:trace>
+  <inkml:trace contextRef="#ctx0" brushRef="#br0" timeOffset="4998">9149 5315 0,'-24'0'16,"-1"0"-1,50 0 1,-1 0-1,25 0-15,-25-25 16,25 25-16,-24-24 0,23 24 16,1 0-16,0-24 15,0 24-15,-25 0 0,1-25 16,-1 25-16,-24-24 16,0-1-16,0 1 15,-24-1-15,24 1 16,-25 24-16,25-24 15,0-1-15,-24 25 0,24 25 32,0-1-17,0 0-15,0 1 0,0-1 16,24 25-16,-24-24 16,0-1-16,25 25 0,-25-25 15,24 1-15,-24-1 16,0 1-16,25-1 0,-25 0 15,24-24-15</inkml:trace>
+  <inkml:trace contextRef="#ctx0" brushRef="#br0" timeOffset="5473">9833 5144 0,'-25'0'15,"25"-24"-15,-24 24 16,0 0 0,24 24-1,0 0 1,0 1-16,0 24 16,24-25-16,-24 25 15,0-25-15,0 1 0,24 24 16,-24-25-16,0 0 0,0 1 15,0-1 1,0-48 0,0-1-1,0 1-15,0-25 16,0 25-16,0-25 0,0 0 16,0 0-16,0 0 15,0 25-15,0-25 0,25 25 16,-1-1-16,-24 1 0,25 24 15,-1 0-15,-24 24 16,25-24-16,-1 49 0,0-24 16,-24 23-16,25-23 15,-1 24-15,1-1 0,-25 1 16,24-24-16,-24 24 0,25-25 16,-25 0-16,0 1 15,0-1-15,0 1 0,24-25 16</inkml:trace>
+  <inkml:trace contextRef="#ctx0" brushRef="#br0" timeOffset="5641">9833 5339 0,'-25'0'15,"1"0"-15,48 0 31,1 0-31,24-24 16,-25 24-16,25 0 16,-25-25-16,25 25 0</inkml:trace>
+  <inkml:trace contextRef="#ctx0" brushRef="#br0" timeOffset="6252">10272 5120 0,'0'-25'0,"-24"25"16,24 25 0,0-1-1,0 0 1,0 1-16,0 24 16,24-25-16,-24 0 0,25 25 15,-25-24-15,0 24 16,0-25-16,24 0 0,-24 1 15,0-1-15,0 1 16,-24-25 0,24-25-1,0 1-15,-25-1 16,25 1-16,-24 0 0,24-1 16,0-24-16,0 0 15,-24 1-15,24 23 0,0-24 16,0 25-16,24-25 0,-24 25 15,24-1-15,1 25 16,-25-24-16,24 24 0,1 0 16,-25 24-16,24-24 15,-24 25-15,25-25 16,-25 24-16,24 1 0,-24-1 16,0 0-16,0 1 15,-24-1-15,24 1 16,-25-25-16,1 24 0,-1-24 15,25 24 1,-24-24-16,24 25 31,24-25-31,1 24 16,-1 1 0,1-1-16,-25 1 15,24-25-15,0 24 0,1 0 16,-1 1-1,1-25-15,-25 24 16,24-24 0</inkml:trace>
+  <inkml:trace contextRef="#ctx0" brushRef="#br0" timeOffset="6511">10712 5315 0,'-24'-25'0,"48"25"63,0 0-48,1 0-15,-1-24 16,1 24-16,-1 0 0,1 0 15</inkml:trace>
+  <inkml:trace contextRef="#ctx0" brushRef="#br0" timeOffset="6816">10907 5119 0,'0'-24'15,"25"24"-15,-25 24 47,0 1-31,0-1-16,0 1 0,0-1 15,0 1-15,0-1 16,0 0-16,24 1 0,-24 24 16,25-25-16,-25 1 15,24-1-15,-24 0 16,25-24 0</inkml:trace>
+  <inkml:trace contextRef="#ctx0" brushRef="#br0" timeOffset="7188">11323 5217 0,'24'-24'0,"-24"-1"16,0 1 15,-24 24-31,-1 0 0,1 0 16,-1 0-1,25 24 1,-24 1-16,24-1 16,0 1-16,0-1 15,0 0-15,0 1 0,0-1 16,0 1-16,24-1 16,1-24-16,-25 25 0,24-25 15,1 0-15,23 0 0,-23 0 16,-1 0-16,1 0 15,-1-25-15,1 1 16,-25-1-16,0-24 16,0 25-16,0 0 0,-25-25 15,1 24-15,-25 1 0,0 0 16,0 24-16,0 0 16,-24 0-16,24 0 0</inkml:trace>
+  <inkml:trace contextRef="#ctx0" brushRef="#br0" timeOffset="8522">503 5608 0,'0'-24'16,"-24"24"-16,24-25 16,-25 1-16,25-1 15,-24 25 1,0 0-1,-1 0-15,1 0 16,-25 25-16,24-25 16,-23 49-16,23-25 0,-24 0 15,25 1-15,24 24 0,-25-25 16,25 25-16,0-25 16,25 1-16,-25 24 0,49-25 15,-25 0-15,25 1 16,-25-25-16,25 24 0,0-24 15,0 0-15,0 0 0,-25 0 16,1 0-16,23 0 16,-23-24-16,-1-1 15</inkml:trace>
+  <inkml:trace contextRef="#ctx0" brushRef="#br0" timeOffset="8839">943 5535 0,'0'-25'15,"-25"25"-15,1 0 16,24-24-16,-24 24 0,-1 0 16,25 24 15,0 1-31,0-1 15,0 1 1,0-1-16,25 0 0,-25 1 16,0-1-16,24 1 15,-24-1-15,24 0 0,-24 1 16,25-1-16,-25 1 0,24-1 16,-24 1-1</inkml:trace>
+  <inkml:trace contextRef="#ctx0" brushRef="#br0" timeOffset="9356">1431 5486 0,'-24'0'0,"-1"0"0,1 0 16,0-25-16,48 25 47,0 0-31,25 0-16,-24-24 0,24 24 15,-1 0-15,1 0 0,0-24 16,0 24-16,-25 0 15,25 0-15,-24-25 0,-50 50 32,-24-25-17,25 0-15,0 24 0,-25-24 16,24 0-16,1 24 16,-1-24-16,1 0 0,24 25 31,0-1 0,24 1-15,-24-1-16,0 1 0,0-1 15,25 0-15,-25 1 16,24-1-16,-24 1 16,25-1-16,-25 0 0,24 1 15,-24-1-15,25-24 16,-1 25-16,0-25 15,1 0-15</inkml:trace>
+  <inkml:trace contextRef="#ctx0" brushRef="#br0" timeOffset="10010">2213 5437 0,'-25'0'16,"25"-24"-16,-24 24 0,0 0 16,24-25-1,-25 25-15,1 25 32,24-1-17,0 0-15,0 1 0,0-1 16,0 1-16,24-1 0,-24 1 15,25-1-15,-1-24 16,0 24-16,1 1 0,-1-1 16,1-24-16,-1 0 15,1 0-15,23 0 0,-23 0 16,-1 0-16,1-24 0,-1-1 16,0 25-16,-24-24 15,25-25-15,-25 25 0,0-1 16,0 1-16,0-1 15,0 1-15,0 0 16,0 48 0,-25 0-1,25 1-15,0-1 0,-24 25 16,0-24-16,24 23 16,-25 1-16,25 0 0,0 0 15,-24 0-15,24 0 0,0-1 16,0 1-16,0 0 15,0 0-15,0-25 0,0 1 16,24 24-16,-24-25 16,0 1-1,0-50 48,0 1-16</inkml:trace>
+  <inkml:trace contextRef="#ctx0" brushRef="#br0" timeOffset="13558">64 577 0,'-25'24'15,"25"1"-15,-24 23 16,24-23-16,0 24 0,0 0 16,0-1-16,0 26 15,0-1-15,0 0 0,0 25 16,0-25-16,24 25 0,-24 0 16,0-1-16,25-23 15,-25 23-15,0-23 0,24 23 16,-24-24-16,0 1 15,0-1-15,0 0 0,0 1 16,0-26-16,0 1 0,0 0 16,0 0-16,0-25 15,0 1-15,0-1 0,0 1 16,0-1-16,0 1 31,24-25-15,-24-25-1,25 25 1,-1 0-16,1-24 16,-1 24-1,1 0-15,23 0 0,-23 0 16,24 0-16,24 0 16,-24-25-16,24 25 0,25 0 15,24 0-15,-24-24 0,24 24 16,24 0-16,1-25 15,-1 25-15,25 0 0,0 0 16,-24-24-16,24 24 16,0 0-16,-25 0 15,25 0-15,0 0 0,0 0 16,0 0-16,0 0 0,24 0 16,-24-24-16,-24 24 0,24 0 15,-25 0-15,1 0 16,-1 0-16,1 0 0,0-25 15,-1 25-15,-24 0 0,0 0 16,0 0-16,1 0 16,-26 0-16,1 0 0,0 0 15,-1 0-15,-23 0 16,-1 0-16,0 0 0,0 0 16,1 0-16,-25 0 0,24 0 15,-24 0-15,0 0 16,-1-24-16,1 24 0,0 0 15,-25 0-15,25 0 16,-24-25-16,-1 25 0,1 0 16,-1 0-16,0 0 0,1 0 15,-1-24 1,1 24-16,-1 0 16,1 0-16,-1 0 15,0 0-15,1 0 0,-1 0 16,1 0-16,-1 0 15,-24-25 1,-24 25 0,24-24-1,-25 0 1,25-1 0,0 1-1,0-1 1,0 1-16,0-1 15,0 1-15,0 0 0,0-1 16,0 1-16,0-25 0,0 24 16,0-23-16,0-1 15,0 0-15,0-24 0,0-1 16,0 1-16,0 0 16,0 0-16,0-25 0,0 25 15,0-25-15,0 25 0,-24-1 16,24 1-16,0 24 15,-25-24-15,25 24 0,0 0 16,-24 0-16,24 1 16,-24-1-16,24 24 0,0-23 15,-25 23-15,25 1 0,-24-1 16,24 1-16,0-1 16,0 1-16,-25 24 0,25-24 15,0-1 1,-24 25-16,24-24 15,-25 24 17,25-25-32,-24 25 31,0 0-15,-1 0-1,1 0 1,-1 0-16,1 0 0,-25 25 15,25-25-15,-25 0 16,0 24-16,0-24 0,-24 0 16,0 25-16,-1-25 0,-23 0 15,-1 24-15,0-24 16,-24 0-16,24 0 0,-48 0 16,24 24-16,0-24 0,-25 0 15,1 25-15,-1-25 16,-24 0-16,24 24 0,-23-24 15,-1 25-15,24-25 16,-24 0-16,25 24 0,-1-24 16,0 25-16,1-25 15,24 0-15,24 0 0,-24 24 16,24-24-16,1 0 0,-1 0 16,25 0-16,-25 24 15,25-24-15,-1 0 0,-23 0 16,23 0-16,-23 0 0,23 0 15,1 0-15,0 0 16,0 0-16,-1 0 0,1 0 16,0 0-16,24 0 15,-24 0-15,0 0 0,-1 0 16,25 25-16,-24-25 0,24 0 16,0 0-16,25 0 15,0 0-15,-25 0 0,24 24 16,1-24-1,-1 0-15,1 0 16,0 0 0,-1 0-16,1 0 15,-1-24-15,1 24 0,-1 0 16,1 0-16,0 0 16,-1 0-16,1 0 0,-1 0 15,-23 0-15,23 0 0,1 0 16,-1 0-16,1 0 15,-1 0-15,1 0 0,0 0 16,-1 0 0,1 0 109,24 24-125,-25 1 31,25-1-15,25-24-16</inkml:trace>
+  <inkml:trace contextRef="#ctx0" brushRef="#br0" timeOffset="16469">8783 430 0,'0'-24'16,"0"-1"-16,0 1 16,0 0-16,0-1 15,0 50 16,0 23-31,0-23 16,0 24-16,0 0 16,0 24-16,0-24 0,0 24 15,24 0-15,-24 0 16,0 25-16,24-25 0,-24 1 16,0-1-16,25 98 15,-25-98-15,0 0 16,0 1-16,0-25 0,-25 24 15,25-24-15,0 24 0,-24-24 16,24 0-16,0-1 16,-24-23-16,24 24 0,0-25 15,0 1-15,0-1 16,24-24-16,0 0 31,1 0 16,-25-24-31,24 24-16,1 0 0,97-25 31,-98 25-31,25-24 0,0 24 16,0 0-16,0 0 15,0 0-15,-1 0 0,26 0 16,-25 0-16,-1 0 0,26 0 15,-1 0-15,25 0 16,-1 0-16,1 0 0,0 0 16,24 0-16,0 0 15,0 0-15,25 24 0,-25-24 16,0 0-16,24 0 0,-24 0 16,1 0-16,-26 0 15,25 0-15,-24 0 0,0 0 16,-1 0-16,26 0 15,-26 0-15,1 0 0,24 0 16,0 0-16,0 0 0,25 0 16,-25 0-16,24 0 15,1 0-15,0 0 0,-25 0 16,24 0-16,1 0 16,-25 0-16,24 0 0,-24 0 15,25 0-15,-25 0 0,0 0 16,25 0-16,-25 0 15,0 0-15,0 0 0,0 0 16,0 0-16,-24 0 16,0 0-16,-1 0 0,-23 0 15,23 0-15,-23 0 0,23 25 16,-23-25-16,23 0 16,-23 0-16,-1 24 0,0-24 15,-24 0-15,24 0 16,-24 0-16,0 24 0,0-24 15,-25 0-15,1 0 0,-1-24 16,0 24-16,-24-24 16,25 24-16,-25-25 15,-25 25 1,25-24 0,0-1 15,0 1 0,0-1-31,0 1 16,0 0-16,0-1 0,0 1 15,-24-25-15,24 0 16,0 0-16,0 0 0,0-24 16,0 0-16,0 0 0,0-1 15,0-23-15,0 23 16,0-23-16,0 23 0,-24 1 15,24-25-15,0 25 16,0 0-16,-25 0 0,25 24 16,-24-24-16,24 24 0,0 0 15,-25 0-15,25 0 16,-24 25-16,24-25 0,-24 24 16,24 1-16,0 0 15,-25 24-15,25-25 0,0 1 16,-24 24-1,24-25-15,0 1 32,0 0 30,-25 24-46,1 0 15,-1 0-31,1 0 0,0 0 16,-25 0-16,0 0 15,0 0-15,-24 0 0,0 0 16,-25 0-16,0 0 16,0 24-16,1-24 0,-25 0 15,-1 0-15,-23 0 0,24 0 16,-25 0-16,1 0 15,-1 0-15,-24 0 0,25 0 16,-1 0-16,25 0 16,-24 0-16,-1 0 0,0 0 15,1 0-15,-1 24 0,1-24 16,-1 0-16,-24 0 16,25 0-16,-1 0 0,1 0 15,24 0-15,-25 25 16,25-25-16,0 0 0,0 0 15,24 0-15,0 0 0,1 0 16,23 24-16,1-24 16,0 0-16,0 0 0,24 25 15,-25-25-15,26 0 16,-1 0-16,0 0 0,-24 24 16,24-24-16,0 0 0,0 0 15,-24 24-15,24-24 16,0 0-16,25 0 0,-25 0 15,0 25-15,25-25 0,-25 0 16,0 0-16,0 0 16,25 0-16,-25 0 0,0 0 15,0 0-15,25 0 16,-25 0-16,24 0 0,1 0 16,0 0-16,-1 0 0,1 0 15,-1 0 1,1 0-1,-1 0-15,1 0 16,0 0-16,-1 0 16,1 0-16,-25 0 0,25 0 15,-25 0-15,24 0 16,1 0-16,-25 0 0,25 0 16,-1 0-1,1 0-15,-1 0 31,25 24-31,-24-24 16,-1 0-16,1 0 16,0 25-16,-1-25 15,1 0 1,-1 0 15,1 0-15,-1 0-1,1 0-15,24 24 16,-24-24-16,-1 0 0,1 0 31,-1 0 16,1 0-31,24 25-16,-25-25 15,1 0-15,0 0 16,24 24 47,0 0-32,0 1-31</inkml:trace>
+  <inkml:trace contextRef="#ctx0" brushRef="#br0" timeOffset="56794">4533 2482 0,'24'0'15,"-24"-25"1,25 25-16,-25-24 16,24 24 15,-24-24-31,0 48 31,25 0-15,-25 1-16,24-1 0,1 1 15,-1 23-15,0-23 16,1 24-16,24 0 0,-25-1 16,25 1-16,0 0 15,0 0-15,24 24 0,-24-24 16,24 0-16,-24 24 0,0-24 15,24 24-15,-24-24 16,0 24-16,0-24 0,-1 0 16,-23 0-16,24 0 0,-25 0 15,25 0-15,-25-1 16,25-23-16,-24 24 0,-1-25 16,0 25-16,1-25 15,-1 1-15,1 24 0,-1-25 16,1 25-16,-1-25 15,0 1-15,1-1 0,-1 1 16,25-1-16,-24 0 0,-1 1 16,25-1-16,-25 1 15,1-1-15,-1 1 0,0-1 16,-24 0-16,25 1 0,-25-1 16,24-24-16,-24 25 15,0-1-15,0 1 31,25-25-31,-25-25 47,-25 25-47,1-24 16</inkml:trace>
+  <inkml:trace contextRef="#ctx0" brushRef="#br0" timeOffset="57136">5974 4436 0,'-24'0'0,"-1"-25"16,1 25-16,-1-24 15,1 24 16,48 0-15,-24 24 0,25-24-16,-1 0 15,1 25 1,23-25-16,-23 0 0,24 0 16,0 0-16,-25 0 0,25 0 15,0 0-15,-1 0 16,-23 0-16,24 0 0,-25 0 15,1 0 1,-25-25 0</inkml:trace>
+  <inkml:trace contextRef="#ctx0" brushRef="#br0" timeOffset="57522">6633 4143 0,'0'-25'16,"-24"25"-16,24-24 0,-24 24 16,24-25-16,-25 25 0,25-24 15,-24 24 1,24 24 15,-25-24-15,25 25-16,-24-25 0,24 24 15,-25 1-15,25-1 16,-24 25-16,0-25 0,-1 1 16,25 24-16,-24-25 15,-1 25-15,25-25 0,-24 1 16,24-1-16,0 1 0,0-1 16,0-48 46,0-1-46,24 1-16,-24-1 15</inkml:trace>
+  <inkml:trace contextRef="#ctx0" brushRef="#br0" timeOffset="58607">10712 2164 0,'25'-24'16,"-25"-1"-16,0 1 31,24 24-31,-48 0 47,24 24-31,-25-24-16,25 25 15,-24-1-15,-1-24 16,1 25-16,24 24 15,-49-25-15,25 25 0,-1 0 16,-24 24-16,0 0 0,1 0 16,-1 1-16,0-1 15,0 25-15,-24-25 0,24 25 16,-24-25-16,24 25 16,-24-25-16,24 0 0,-25 0 15,26-24-15,-1 25 16,-25-26-16,26 1 0,-1 0 15,0 0-15,0 0 0,25 0 16,-25-1-16,24-23 16,-23 24-16,23-25 0,25 1 15,-24-1-15,-1 0 0,25 1 16,-24-1 0,24 1-16,-25-25 0,1 24 31,0-24-31,24 25 15,-25-25 1,1 24 0,-1-24-16,1-24 93</inkml:trace>
+  <inkml:trace contextRef="#ctx0" brushRef="#br0" timeOffset="59230">8929 3801 0,'-24'0'16,"-1"0"-16,1 0 15,24-25 1,24 25 15,-24 25-15,0-1 15,25-24-31,-25 25 0,0-1 16,0 0-16,0 1 15,0-1-15,24 1 0,-24 23 16,0-23-16,0-1 0,0 1 16,0-1-16,0 1 15,0-1-15,0 0 0,0 1 16,0-1 15,25-24 0,-1 0-15,0 0 0,1-24-16,24 24 15,-25 0-15,25-25 0,0 25 16,0 0-16,24-24 15,-24 24-15,24 0 0,0-24 16,1 24-16,-1 0 16,-24-25-16,0 25 0,-25 0 15,25 0-15,-25 0 16,-48 0 15,-1 0-15</inkml:trace>
+</inkml:ink>
+</file>
+
+<file path=ppt/ink/ink161.xml><?xml version="1.0" encoding="utf-8"?>
+<inkml:ink xmlns:inkml="http://www.w3.org/2003/InkML">
+  <inkml:definitions>
+    <inkml:context xml:id="ctx0">
+      <inkml:inkSource xml:id="inkSrc0">
+        <inkml:traceFormat>
+          <inkml:channel name="X" type="integer" max="1920" units="cm"/>
+          <inkml:channel name="Y" type="integer" max="1080" units="cm"/>
+          <inkml:channel name="T" type="integer" max="2.14748E9" units="dev"/>
+        </inkml:traceFormat>
+        <inkml:channelProperties>
+          <inkml:channelProperty channel="X" name="resolution" value="55.81395" units="1/cm"/>
+          <inkml:channelProperty channel="Y" name="resolution" value="55.6701" units="1/cm"/>
+          <inkml:channelProperty channel="T" name="resolution" value="1" units="1/dev"/>
+        </inkml:channelProperties>
+      </inkml:inkSource>
+      <inkml:timestamp xml:id="ts0" timeString="2020-11-17T13:48:21.446"/>
+    </inkml:context>
+    <inkml:brush xml:id="br0">
+      <inkml:brushProperty name="width" value="0.05" units="cm"/>
+      <inkml:brushProperty name="height" value="0.05" units="cm"/>
+      <inkml:brushProperty name="fitToCurve" value="1"/>
+    </inkml:brush>
+  </inkml:definitions>
+  <inkml:trace contextRef="#ctx0" brushRef="#br0">439 49 0,'-24'0'16,"24"-24"-16,-25 24 16,25-25-16,25 25 0,-25 25 78,0-1-78,0 1 15,0-1-15,24 25 16,-24-25-16,0 25 16,25 0-16,-25 0 0,24 0 15,1-25-15,-25 25 16,24 0-16,-24-25 0,0 25 15,0-24-15,24-1 0,-24 1 16,0-1-16,-24-24 16</inkml:trace>
+  <inkml:trace contextRef="#ctx0" brushRef="#br0" timeOffset="329">0 465 0,'24'24'47,"0"-24"-32,-24 24-15,25-24 0,-1 25 16,1-1-16,-1 1 0,1-1 15,-1 0 1,0 1-16,1-25 0,-1 24 16,1 1-16,-1-1 15,1-24-15,23 25 0,-23-25 16,-1 0-16,1 0 0,24 0 16,-25 0-16,0 0 15,1-25-15,-1 1 0,1 24 16,-25-25-16</inkml:trace>
+  <inkml:trace contextRef="#ctx0" brushRef="#br0" timeOffset="698">830 465 0,'24'0'16,"1"0"-16,-25-25 0,24 25 15,1 0 1,-50 0 15,25 25-15,-24-25-1,24 24-15,-25 0 0,1-24 16,24 49-16,-24-24 16,-1-1-16,1 0 0,-1 1 15,1-1-15,0-24 0,24 25 16,-25-1-16,1 1 15,24-1 1,-25-24 0,25 24-16,-24-24 47,24 25-32</inkml:trace>
+</inkml:ink>
+</file>
+
+<file path=ppt/ink/ink162.xml><?xml version="1.0" encoding="utf-8"?>
+<inkml:ink xmlns:inkml="http://www.w3.org/2003/InkML">
+  <inkml:definitions>
+    <inkml:context xml:id="ctx0">
+      <inkml:inkSource xml:id="inkSrc0">
+        <inkml:traceFormat>
+          <inkml:channel name="X" type="integer" max="1920" units="cm"/>
+          <inkml:channel name="Y" type="integer" max="1080" units="cm"/>
+          <inkml:channel name="T" type="integer" max="2.14748E9" units="dev"/>
+        </inkml:traceFormat>
+        <inkml:channelProperties>
+          <inkml:channelProperty channel="X" name="resolution" value="55.81395" units="1/cm"/>
+          <inkml:channelProperty channel="Y" name="resolution" value="55.6701" units="1/cm"/>
+          <inkml:channelProperty channel="T" name="resolution" value="1" units="1/dev"/>
+        </inkml:channelProperties>
+      </inkml:inkSource>
+      <inkml:timestamp xml:id="ts0" timeString="2020-11-17T13:48:23.293"/>
+    </inkml:context>
+    <inkml:brush xml:id="br0">
+      <inkml:brushProperty name="width" value="0.05" units="cm"/>
+      <inkml:brushProperty name="height" value="0.05" units="cm"/>
+      <inkml:brushProperty name="fitToCurve" value="1"/>
+    </inkml:brush>
+  </inkml:definitions>
+  <inkml:trace contextRef="#ctx0" brushRef="#br0">49 152 0,'0'-25'93,"24"25"-93,1-24 32,-25 0-17,24 24-15,-24-25 32,24 25-17,-24-24 1,25 24-16,-1 0 0,1-25 15,-1 25-15,1 0 0,23 0 16,-23 0-16,-1 0 16,1 0-16,-1 25 0,1-1 15,-25 1 1,0-1-16,0 0 0,0 1 16,0-1-16,-25 1 0,1 23 15,-1-23-15,1-1 16,-25 1-16,25-1 0,-1 25 15,-24-25-15,25-24 16,-1 25-16,-23-1 0,23 1 16,1-25-16,24 24 0,-25-24 15,1 25 1,48-25 15,1 0-31,24 0 16,-25 0-16,25 0 0,0 0 15,0 0-15,24 0 16,-24 0-16,0-25 0,-1 25 16,-23 0-16,-1 0 15,1 0-15,-1 0 0,0 0 16,-24-24 31</inkml:trace>
+  <inkml:trace contextRef="#ctx0" brushRef="#br0" timeOffset="547">1026 200 0,'0'-25'32,"-25"25"-17,1 0 17,24 25-32,-25-1 15,1 0-15,24 1 16,0-1-1,0 1-15,0-1 0,0 1 16,0-1-16,0 0 16,0 1-16,0-1 0,24 1 15,1-1-15,-1 1 16,1-25 0,-1 0-16,1 0 0,-1 0 15,0-25-15,1 1 16,-1-1-16,1 1 15,-25-1-15,24-23 0,-24 23 16,0 1-16,0-25 16,0 24-16,0 1 0,0 0 15,0-1-15,-24 25 16,-1-24-16,1 24 16,-1-25-16,1 25 0,0 0 15,-1 0-15,1 0 16,-1 25-16</inkml:trace>
+</inkml:ink>
+</file>
+
+<file path=ppt/ink/ink163.xml><?xml version="1.0" encoding="utf-8"?>
+<inkml:ink xmlns:inkml="http://www.w3.org/2003/InkML">
+  <inkml:definitions>
+    <inkml:context xml:id="ctx0">
+      <inkml:inkSource xml:id="inkSrc0">
+        <inkml:traceFormat>
+          <inkml:channel name="X" type="integer" max="1920" units="cm"/>
+          <inkml:channel name="Y" type="integer" max="1080" units="cm"/>
+          <inkml:channel name="T" type="integer" max="2.14748E9" units="dev"/>
+        </inkml:traceFormat>
+        <inkml:channelProperties>
+          <inkml:channelProperty channel="X" name="resolution" value="55.81395" units="1/cm"/>
+          <inkml:channelProperty channel="Y" name="resolution" value="55.6701" units="1/cm"/>
+          <inkml:channelProperty channel="T" name="resolution" value="1" units="1/dev"/>
+        </inkml:channelProperties>
+      </inkml:inkSource>
+      <inkml:timestamp xml:id="ts0" timeString="2020-11-17T15:23:30.668"/>
+    </inkml:context>
+    <inkml:brush xml:id="br0">
+      <inkml:brushProperty name="width" value="0.05" units="cm"/>
+      <inkml:brushProperty name="height" value="0.05" units="cm"/>
+      <inkml:brushProperty name="fitToCurve" value="1"/>
+    </inkml:brush>
+  </inkml:definitions>
+  <inkml:trace contextRef="#ctx0" brushRef="#br0">1050 2966 0,'-24'0'0,"24"-24"0,0 48 47,0 1-47,24 23 16,1-23-16,-25 24 16,24 24-16,1-24 0,-1 24 15,0-24-15,1 24 16,-25 0-16,24-24 0,-24 0 15,25-24-15,-25 23 0,0-23 16,-25-1 0,1-48-16,-1 24 15,1-49-15,-25 25 16,25-50-16,-25 25 0,25-48 16,-1 24-16,1-25 0,24 0 15,0 0-15,0 25 16,0 0-16,24 0 0,1 24 15,48 0 1,-49 25-16,25 24 0,0 24 16,0 0-16,-25 1 0,1 24 15,-1-25-15,0 25 16,-24 0-16,0 0 0,-24-1 16,0 1-16,-25-24 15,24-1-15,-24 1 0,1-1 16,23-24-16,1 0 15,-1 0-15,1 0 0</inkml:trace>
+  <inkml:trace contextRef="#ctx0" brushRef="#br0" timeOffset="378">1343 2992 0,'49'-25'16,"-24"25"-16,-1 0 15,1-24-15,-1 24 0,0 0 16,-24 24 15,0 1-31,0-1 16,0 25-16,0-25 15,0 1-15,0 24 16,0-25-16,25 25 0,-1-25 0,1 25 16,-1-24-16,25-1 15,0 0-15,0-24 0,-1 0 16,-23-24-16,24 0 15,-25-1-15,1-24 0,-1 0 16,-24 1-16,0-1 0,0 0 16,-49 0-16,25 0 15,-1 25-15,-24-25 0,1 24 16,-1 25-16,24 0 16,1 0-16,0 25 0,-1-1 15,1 1-15,24-1 0,0 1 16,0-1-16,24-24 15,1 24-15,-1-24 0</inkml:trace>
+  <inkml:trace contextRef="#ctx0" brushRef="#br0" timeOffset="-4818">342 280 0,'0'-25'31,"0"-24"-15,-98 25-1,74 48 1,-25 1-16,25-1 0,-25 25 16,24 0-16,1-25 15,0 25-15,-1 0 0,25 0 16,0 0-16,25 0 0,-25-1 16,24-23-16,25-1 15,-25 1-15,25-1 0,24-24 16,-24 0-16,0 0 15,24-24-15,-24-1 0,0 1 16,-24-1-16,-1 1 0,0 0 16,1-25-16,-25 24 15,24 1-15,-24-25 0,0 25 16,0-1 0,0 1-16,25 48 31,-25 1-16,0-1-15,24-24 0,0 49 16,-24-25-16,25 1 16,-1-1-16,1 1 15,-1-1 1</inkml:trace>
+  <inkml:trace contextRef="#ctx0" brushRef="#br0" timeOffset="-4663">733 133 0,'0'-24'16,"-25"-1"-16,25 1 15,-24 24-15,24 24 16,-24 1 0,24-1-16,0 1 0</inkml:trace>
+  <inkml:trace contextRef="#ctx0" brushRef="#br0" timeOffset="-4434">953 11 0,'0'-24'0,"24"48"47,-24 0-47,25 1 0,-1 73 15,0-50 1,1 26-16,-1-26 0,-24 1 16,25 25-16,-1-50 15,1 25-15,-1-25 0,-24 1 16,24-1-16</inkml:trace>
+  <inkml:trace contextRef="#ctx0" brushRef="#br0" timeOffset="-3792">1124 402 0,'-25'-25'0,"1"25"16,-1-24-16,1 24 0,24-24 16,-24 24-16,48 0 31,0 0-31,1 0 16,-1 0-16,25 0 15,0-25-15,0 25 16,0-24-16,-1 24 0,1-25 15,0 1-15,-24 24 0,23-25 16,-23 1-16,-1 0 16,-24-1-1,-24 25 1,24 25 15,0-1-31,24 0 16,-24 1-16,25-1 15,-1 1-15,1-25 16,-1 0-16,25 0 16,-25 0-16,1-25 0,-1 25 15,1-24-15,-1-1 0,-24 1 16,0 0-16,0-25 16,0 24-16,0 1 0,0-1 15,0 1-15,-24 24 16,24 24-1,0 1-15,0 48 0,0-24 16,0 24-16,0 25 16,0 0-16,24-1 0,0 1 15,1 0-15,-25-25 16,24 0-16,1-24 0,-25 0 16,0 0-16,0-25 0,-25-24 15,1 0-15,-1-24 16,-48-25-1,24 24-15,25 1 0,-25-25 0,25 25 16,-1-1-16,1 25 16,24-24-16,-25 24 15</inkml:trace>
+  <inkml:trace contextRef="#ctx0" brushRef="#br0" timeOffset="-3000">562 1525 0,'0'-24'15,"0"-1"-15,24 25 16,-24-24-16,0 0 16,0-1-16,0 1 0,0-1 0,0 1 15,-24 24-15,-1-25 16,1 25-16,0 25 0,-1-1 15,-24 1-15,25-1 0,-25 25 16,25 0-16,-1 24 16,-24 0-16,49 1 0,-24-1 15,24 0-15,0 25 16,24-25-16,1-24 0,24 0 16,-25 0-16,25-1 15,0-23-15,0-25 0,-1 0 16,1 0-16,0-25 0,0 1 15,0 0-15</inkml:trace>
+  <inkml:trace contextRef="#ctx0" brushRef="#br0" timeOffset="-2184">879 1843 0,'0'-25'16,"25"1"-16,-25-1 0,-25 1 16,1 0-1,0 24 1,24 24 15,0 0-31,0 25 16,0-24-16,0 24 15,0-25-15,0 25 0,0 0 16,24-25-16,0 25 0,1-25 16,-1 1-16,1-25 15,-1 0-15,25 0 0,-25 0 16,25 0-16,-24-25 15,-1 1-15,25-25 0,-49 25 16,24-25-16,-24 24 0,0-23 16,-24-1-16,-1 0 15,1 24-15,0-23 0,-1 23 16,1 1-16,-1-1 16,-23 25-16,23 0 0,1 0 15,-1 0-15,25 25 16,-24-25-16,24 24 15,0 1-15,0-1 16,0 0-16,24 1 16,1-1-16,-1-24 15,1 0-15,23 0 0,-23 0 16,24-24-16,-1-1 16,1 25-16,0-24 0,0 0 15,-25-25-15,1 24 16,-1 1-16,1-1 0,-1 1 15,1 0-15,-50 48 47,25 0-47,0 1 16,-24-1-16,24 25 0,0-24 16,0 48-1,24-49-15,-24 1 0,25-1 16,-1 1-16,0-1 0,25-24 15,-24 0-15,24 0 0,-25-24 16,25-1-16,0 1 16,0-25-1,-49 0-15,24 25 0,-48-99 16,24 99 0,-25 0-16,25-25 15,-24 49-15,24-25 0,0 1 16,0 48-1,0 1-15,0-1 16,24 1-16,-24-1 0,25 25 16,-1-25-16,-24 25 15,49 24-15,-49-48 16,24-1-16</inkml:trace>
+  <inkml:trace contextRef="#ctx0" brushRef="#br0" timeOffset="-1794">2052 1452 0,'-49'0'0,"24"-24"16,1 24-16,24 24 16,0 0-1,24 1-15,1-1 16,-1 25-1,1 0-15,-25-25 0,24 1 16,-24 24-16,0-25 16,0-48 15,0-1-31,0 1 16,0-1-16,0-23 0,0-1 15,0 0-15,25 0 0,-25 0 16,24 0-16,0 25 15,1-1-15,-1 25 16,1 25-16,-1-1 0,1 1 16,-1-1-16,0 25 15,1-25-15,-1 1 0,-24 24 16,25-49-16,-25 24 16,0 1-16</inkml:trace>
+  <inkml:trace contextRef="#ctx0" brushRef="#br0" timeOffset="-864">2394 1110 0,'0'-24'0,"0"-25"16,0 24-16,0 1 16,0 48-16,0 1 15,0-1-15,0 25 16,0 0-16,24 0 0,-24 0 15,24-1-15,-24 26 16,25-25-16,-1-1 0,-24 26 16,25-50-16,-1 25 0,-24-25 15,25 1-15,-50-25 32,25-25-32,-24 25 15,-1-24-15,25-1 0,-24 1 16,24 0-16,0-1 0,-25 1 15,25-1-15,0 1 16,0 0-16,0-1 0,0 1 16,25-1-16,-1 1 15,1-1-15,-1 1 16,1 0-16,-1-1 16,25 25-16,-25 0 0,25 0 15,-24 25-15,-1-1 0,0 0 16,-24 25-16,25-24 0,-25-1 15,24 25-15,-24-25 16,0 1-16,0-1 16,0-48 15,-24-1-31,24 1 16,0-25-16,0 25 15,0-25-15,0 24 0,0 1 16,0 0-16,24 24 15,-24-25-15,25 25 0,-1 25 16,-24-1-16,25 0 16,-1 1-1,-24-1-15,24 1 0,1-1 16,-1-24 0,1 0-16,-1 0 0,1 0 15,-1 0-15,25-24 0,-25-1 16,1 1-16,-1-1 15,-24-23-15,24 23 0,-24-24 16,0 25-16,-24-25 0,24 25 16,-24-1-16,24 1 15,-25 24-15,1 0 0,24 24 16,0 1-16,0 23 16,0 26-16,0-1 0,0 0 15,24 123 1,1-74-16,-1-25 0,25 1 15,-25 73 1,1-122-16,-25 0 0,0 0 16,-25-25-16,1-24 0,-1-24 15,-23-25-15,-1 0 16,0 0-16,25-49 0,-25 1 16,24-1-16,1 25 0,24-25 15,24 0-15,1 25 16,24 24-16,-1 25 15,26-25-15,-26 49 0,1 0 16,0 0-16</inkml:trace>
+  <inkml:trace contextRef="#ctx0" brushRef="#br0" timeOffset="1662">2101 2722 0,'-25'-98'15,"25"74"1,0-1-16,0 1 0,0 0 16,0 48 15,0 0-31,0 1 15,0-1-15,25 25 16,-25 0-16,24 0 0,0 24 16,1-24-16,-1 0 0,1-25 15,-25 25-15,24-25 16,1 1-16,-25-1 0,24-24 16,-48-24-1,24-1 1,-25-23-16,25 23 0,-24-24 31,24-73-31,0 49 0,0 24 0,0 0 16,24 0-16,1 1 0,23 23 15,-23 1-15,-1-1 16,25 25-16,-25 0 0,1 0 16,-1 0-16,1 25 15,-1-1-15,1-24 0,-25 25 16,0-1-1,0 0-15,0 25 0,0-24 0,-25-1 16,1 1-16,-1-1 0,1 0 16,-1 1-16,1-1 15,0-24-15,24 25 16,0-50 0,24 25-16,0-24 15,25 24 1,-24 0-16,-1 0 0,25 0 15,-25 24-15,25-24 0,0 25 16,-24-1-16,-1 0 0,0 1 16,1-1-16,-25 1 15,-25-1-15,25 1 0,-48-1 16,23 0-16,-24 1 16,0-1-16,25-24 15,-25 0-15,25 0 0,-1-24 0,25-25 16,0 0-1,0 25-15,49-25 0,-24 0 16,23 0-16,1 0 16,25 25-16,-26-25 0,26 25 15,-25-1-15,24 1 0,0-25 16,-48 49 0,-1-24-16,-48 24 31,-1 0-31,1 0 15,24 24-15,-25 0 0,25 1 16,0 24-16,0-25 16,25 25-16,-25 0 0,24-25 15,1 25-15,-1-25 16,0 1-16,25-1 0,-24 1 16,23-25-16,1 0 0,-24-25 15,24 1-15,-25-1 16,0 1-16,1-25 0,-25 0 15,0 25-15,-25-25 16,1 0-16,0 0 0,-25 25 16,-25-25-1,50 49-15,-49 0 16,73 25-16,-25-25 0,25 24 16,0 0-16,0 1 0,25-1 15,-1-24-15,1 25 16,23-25-16,-23 0 0,-1 0 15,25-25-15,-24 25 16,23-24 0,-23-1-16,-1 1 0,-24 0 0,25-1 15,-25 1-15,0-1 16,0 1-16,0-1 16,24 25-1,1 0-15,-1 0 0,0 0 16,1 25-16,-1-1 0,25 1 15,-25-1-15,1-24 16,24 25-16,-25-1 0,1 0 16,-1-24-16,0 0 15</inkml:trace>
+  <inkml:trace contextRef="#ctx0" brushRef="#br0" timeOffset="1825">3761 2258 0,'-24'0'0,"24"24"16,-24 1-16,-1 24 0,25-1 16,-24 26-16,24-1 15,-25 0-15,1 1 0,-1-1 16,1-24-16,0 24 16,-1-24-16</inkml:trace>
+</inkml:ink>
+</file>
+
+<file path=ppt/ink/ink164.xml><?xml version="1.0" encoding="utf-8"?>
+<inkml:ink xmlns:inkml="http://www.w3.org/2003/InkML">
+  <inkml:definitions>
+    <inkml:context xml:id="ctx0">
+      <inkml:inkSource xml:id="inkSrc0">
+        <inkml:traceFormat>
+          <inkml:channel name="X" type="integer" max="1920" units="cm"/>
+          <inkml:channel name="Y" type="integer" max="1080" units="cm"/>
+          <inkml:channel name="T" type="integer" max="2.14748E9" units="dev"/>
+        </inkml:traceFormat>
+        <inkml:channelProperties>
+          <inkml:channelProperty channel="X" name="resolution" value="55.81395" units="1/cm"/>
+          <inkml:channelProperty channel="Y" name="resolution" value="55.6701" units="1/cm"/>
+          <inkml:channelProperty channel="T" name="resolution" value="1" units="1/dev"/>
+        </inkml:channelProperties>
+      </inkml:inkSource>
+      <inkml:timestamp xml:id="ts0" timeString="2020-11-17T15:22:53.571"/>
+    </inkml:context>
+    <inkml:brush xml:id="br0">
+      <inkml:brushProperty name="width" value="0.05" units="cm"/>
+      <inkml:brushProperty name="height" value="0.05" units="cm"/>
+      <inkml:brushProperty name="fitToCurve" value="1"/>
+    </inkml:brush>
+  </inkml:definitions>
+  <inkml:trace contextRef="#ctx0" brushRef="#br0">12090 1905 0,'-24'0'15,"48"-25"-15,1 1 16,-1-1-16,-24 1 0,25 0 15,-25-1-15,24 1 16,0-1-16,-24 1 16,25 24-16,-25-24 15,49 24 1,24 0 0,-49-25-16,1 25 0,-1-24 15,25-1-15,-24 1 0,-1-1 16,0-23-16,-24 23 15,0-24-15,0 25 0,0-1 16,-24 1-16,-25 24 0,25-24 16,-25 24-16,0 24 15,0 0-15,0 1 16,0-1-16,25 25 0,0 0 16,24 24-16,0-24 0,0 24 15,24 1-15,25-26 0,0 1 16,0 0-16,24 0 15,-24-25-15,24 1 0,0-25 16,-24 0-16,24-25 16</inkml:trace>
+  <inkml:trace contextRef="#ctx0" brushRef="#br0" timeOffset="509">12921 1538 0,'-25'-24'15,"1"0"-15,24-1 16,-25 1-16,50 24 15,-25 24 1,24 1 0,-24-1-16,25 0 0,-25 1 0,24 24 15,-24-25-15,0 25 16,25-25-16,-25 1 0,0-1 16,0 1-16,0-1 0,0-48 31,0-50-16,0 26 1,0-1-16,0-25 0,0 26 16,0-1-16,0 0 0,0 24 15,24 1-15,0 0 16,1 48-16,-1 0 16,1 1-16,-1 24 0,1 0 15,-25-1-15,24-23 16,-24 24-16,24-25 0,-24 1 15,25-1-15,-25 0 16,0-48 0,24 24-16,-24-24 0,25-25 15,-25 0-15,24 24 16,0-23-16,1-1 0,24 0 16,-25 0-16,1 25 15,-1 24-15,0 0 16,1 48-16,-25-23 0,0 24 15,0 0-15,0-1 16,0 1-16,0 0 0,0 0 16,0 0-16,0-25 15</inkml:trace>
+  <inkml:trace contextRef="#ctx0" brushRef="#br0" timeOffset="935">13800 1172 0,'0'-24'0,"0"-1"0,0 1 16,0 48-1,0 1-15,0 24 16,0-1-16,24 26 16,1-26-16,-25 26 0,24 23 15,1-23-15,-1 23 0,25-23 16,-25-1-16,1 0 15,-1 0-15,-24 1 0,25-25 16,-1-25-16,-24 25 16,-24-49-1,-1-49 1,1 0-16,24-24 0,-25 0 16,1-25-16,24 0 0,-25 1 15,25 23-15,0-23 16,25 48-16,-1-25 0,1 50 15,24 0-15,-1 24 0,-23 0 16,24 0-16,0 24 16,-1 0-16,-23 1 0,-1 24 15,1-25-15,-25 1 16,-25 23-16,1-23 0,-25-1 16,-24 1-16,-1-1 0,1 1 15</inkml:trace>
+  <inkml:trace contextRef="#ctx0" brushRef="#br0" timeOffset="3202">12823 3004 0,'-24'-73'0,"-1"48"15,25 1-15,0-1 0,-24 1 0,24 48 16,-25 1 0,25-1-16,0 25 0,0 24 15,0 25-15,0 0 0,0-1 16,25 50-16,-25-1 0,24 1 16,-24-1-16,0 25 15,0-24-15,0 24 0,0 146 16,0-170-1,0-25-15,-24 25 0,24-1 16,0 1-16,0-1 16,-25-24-16,25 25 0,0-1 15,0-23-15,0-1 0,0 0 16,0 0-16,-24-24 16,24-1-16,0 1 0,-25-25 15,25 0-15,-24 1 16,24-25-16,0-1 0,0 1 15,-24 0-15,24 0 0,0 0 16,0 0-16,0 0 16,0-25-16,-25 25 0,25-25 15,0 25-15,0-24 0,-24 23 16,24-23-16,0-1 16,-25 1-16,25-1 15,0 0-15,0 1 16,25-25-1,-1 0 1,1 0-16,-1 0 16,0-25-16,1 25 15,24-24-15,-25 24 0,49 0 16,-24-24-16,49 24 0,-25-25 16,49 25-16,1 0 0,47 0 15,1 0-15,25 0 16,-1 25-16,25-25 0,0 0 15,24 0-15,0 24 16,25-24-16,-25 24 0,25-24 16,-1 0-16,1 25 15,0-25-15,-1 0 0,-23 24 16,23-24-16,1 0 0,-25 25 16,0-25-16,-24 0 15,0 24-15,-25-24 0,1 25 16,-25-25-16,0 24 0,-25-24 15,74 24 1,-98-24-16,-49 0 0,25 0 16,-25 0-16,1 0 15,-25 0-15,24 0 0,-24 0 16,24 0-16,-49-24 0,25 24 16,-24 0-16,-1-24 15,0 24-15,-24-25 0,0 1 16,0-1-1,-24 25-15,0-24 0,-1-1 16,1 1-16,-1 0 0,1-25 16,24 24-1,-25 1-15,25-25 0,0-24 16,0 0-16,-24-1 16,24 1-16,0-25 0,-24 1 15,-1-1-15,25 0 16,-24-24-16,24 0 0,0-25 15,0 25-15,0-24 0,0-1 16,0-24-16,0 25 0,0-25 16,0 24-16,-25-24 15,1 25-15,24-1 16,-24 1-16,-1 24 0,1-25 16,-25-97-16,24 146 15,1-24-15,24 24 16,-24 1-16,-1-1 0,25 25 15,-24-1-15,24 1 0,-25 0 16,25 24-16,-24 0 16,24 0-16,-25 0 0,1 25 15,24 0-15,-24-1 16,24 1-16,-25-1 16,25 1-16,-24-1 0,-1 25 46,25-24-14,-24 24-1,0 0-31,-1 0 16,1-24-16,-25 24 15,0 0-15,-24 0 0,-25-25 16,0 25-16,-24 0 0,-24-24 15,-25 24-15,0 0 16,-25-25-16,1 25 0,0 0 16,-1 0-1,-24 0-15,25 0 0,0 0 0,-1 0 16,1 0-16,-1 0 0,1 0 16,-25 0-16,25 25 15,0-25-15,-1 24 0,1-24 16,-1 25-16,50-25 0,-1 0 15,25 24-15,-73-24 16,97 0 0,49 0-16,0 0 0,1 0 15,-1 0-15,24 24 0,-24-24 16,25 0-16,-25 0 16,25 0-16,-25 0 0,24 0 15,1 0-15,-25 0 0,25 25 16,-1-25-16,1 0 15,-1 0-15,1 0 0,-25 0 16,25 24-16,-25-24 0,0 0 16,0 0-16,0 0 15,1 25-15,-1-25 0,0 0 16,0 0-16,0 0 16,25 0-16,-1 0 0,-23 0 15,23-25-15,1 25 0,-50 0 31,26-24-31,-1 24 0,24 0 0,-24 0 16,1 0-16,23 0 0,-24 0 16,25 0-16,-1 0 15,1 0-15,0 0 32,-1 0-32,1 0 15,-1 0 1,1 0-16,-1 0 0,1 0 15,0 0-15,-1 0 32,25 24 30,25-24-46</inkml:trace>
+  <inkml:trace contextRef="#ctx0" brushRef="#br0" timeOffset="6383">13385 5300 0,'-25'0'16,"25"-25"-16,-24 25 15,24-24 1,-25 24 0,50 0 15,-1 0-31,1 0 0,24 0 16,-1 0-16,1 0 15,25 0-15,-1 0 0,0 0 16,-24-25-16,24 25 0,-24 0 15,-24 0-15,-1 0 16,0 0-16,-48 0 16,0 0-16</inkml:trace>
+  <inkml:trace contextRef="#ctx0" brushRef="#br0" timeOffset="6689">13629 5324 0,'-24'0'0,"24"24"62,0 1-46,0-1-1,-25 1-15,25-1 0,0 25 16,0-25-16,-24 25 0,24 0 16,0 0-16,0 0 15,0 0-15,0-1 16,0-23-16,-25 24 0,25-25 16,0 1-16,25-50 15</inkml:trace>
+  <inkml:trace contextRef="#ctx0" brushRef="#br0" timeOffset="7222">13824 5666 0,'25'0'62,"-1"0"-31,1 0-31,-1 0 16,-24 24-16,24-24 0,1 0 16,-1 0-16,-24-24 15,25 24-15,-25-25 16,24 1-16,-24 0 16,0-1-16,0 1 15,-24 24-15,24-25 0,-25 1 16,1 24-16,-1-24 0,1 24 15,0 0-15,-1 24 16,1-24-16,-1 24 0,1 1 16,0 24-16,24-25 0,0 25 15,0-25-15,0 25 16,24-24-16,0 23 0,1-23 16,24-1-16,-25 1 15,0-1-15,25-24 0,-24 0 16,24 0-16,-25-24 0,25-1 15</inkml:trace>
+  <inkml:trace contextRef="#ctx0" brushRef="#br0" timeOffset="7882">14337 5519 0,'-24'-24'31,"24"48"32,24 1-47,-24-1-16,0 25 31,25 24-31,-25-24 15,0-24-15,0-1 16,0-48 15,0-1-31,0 1 16,24-1-16,-24-23 16,0 23-16,0 1 15,25-1-15,-25-24 0,24 49 16,-24-24-16,24 0 0,1 24 15,-1 0 1,1 24 0,-25 0-16,24 1 0,-24-1 15,0 1 1,24 24-16,-24-25 16,0 0-16,0-48 46,25 0-30,-25-1-16,0 1 0,24-1 16,1 1-16,-25-1 0,24 1 15,1 0-15,-1-1 16,0 25-16,1 25 16,-25-1-1,0 0-15,0 1 0,0 24 16,0 0-16,0-25 0,0 25 15,0-25-15,0 1 16,0-1-16,0 0 0,0 1 16</inkml:trace>
+  <inkml:trace contextRef="#ctx0" brushRef="#br0" timeOffset="8368">14923 5348 0,'0'-24'0,"0"0"16,0 48 15,0 0-31,0 1 16,0 24-16,0-25 15,0 25-15,0 0 0,0 0 16,25 24-16,-25-24 15,0 0-15,0 24 0,24-24 16,-24 0-16,0-1 0,0-23 16,0-1-16,0 1 15,0-1-15,0 1 0,-24-50 32,24 1-32,0-1 0,-25 1 15,25-25-15,0-24 0,0 24 16,0 0-1,25-24-15,-25 24 0,24 0 0,-24 25 16,25-25-16,-1 49 16,1-25-16,-1 25 0,0 0 15,1 0-15,-1 25 0,-24-1 16,25 1-16,-25-1 16,0 0-16,0 1 0,0-1 15,-25 25-15,1-24 16,-1-1-16,25 0 0,-24 1 15,0-25-15,-1 0 0,1 0 16</inkml:trace>
+  <inkml:trace contextRef="#ctx0" brushRef="#br0" timeOffset="8761">15314 5593 0,'25'0'16,"-25"-25"0,24 25-16,-48 25 31,-1-1-15,25 1-1,0-1-15,-24 0 0,24 1 16,0-1-16,0 1 0,24-1 15,-24 0-15,25 1 16,-1-1-16,0-24 16,1 0-16,-1-49 15,1 25 1,-25 0-16,0-1 0,0 1 16,0-1-16,0 1 15,0 0-15,-25-1 0,1 1 16,-1 24-16,1 0 0,0 0 15,-1 0-15,1 24 16,-1-24-16,25 25 16</inkml:trace>
+  <inkml:trace contextRef="#ctx0" brushRef="#br0" timeOffset="9114">15510 5593 0,'-25'0'0,"50"0"47,-1 0-31,0 0-16,1 0 15,-1 24-15,1-24 0,-25 24 16,24 1-16,1-1 15,-25 1-15,0-1 16,0 1-16,-25-1 16,1-24-1,24-24-15,-25-1 16,25 1 0,0-1-16,0 1 0,25-1 15,-25-23-15,24 23 16,1 1-16,-25-1 0,24 1 15,0 24-15,1-24 0,-1 24 16</inkml:trace>
+  <inkml:trace contextRef="#ctx0" brushRef="#br0" timeOffset="9676">15974 5471 0,'-25'0'16,"1"0"15,24 24-15,-25 0-1,25 1-15,0-1 0,0 1 16,0-1-16,0 0 0,0 1 15,0-1-15,25 1 16,-1-25-16,1 24 0,-1-24 16,0 0-16,1 0 0,-1 0 15,1-24-15,-1-1 16,1 1 0,-1-1-16,-24-23 0,0 23 15,0 1-15,0-1 0,0 1 16,0 0-1,-24 24-15,24 24 16,0 0-16,-25 25 0,25 0 16,0 0-16,0 24 15,0 0-15,0-24 0,0 25 16,25-1-16,-25-24 0,0 0 16,0-1-16,0-23 15,0-1-15,-25 1 0,1-1 16,-1-24-16,1 0 15,-25-24-15,25-1 0,-1 1 16,1-1-16,-1 1 0,1 0 16,-1-1-1,1 25-15,24-24 0,0-1 0,0 1 32</inkml:trace>
+  <inkml:trace contextRef="#ctx0" brushRef="#br0" timeOffset="10199">16560 5544 0,'0'-49'31,"0"25"-31,0 48 47,0 0-47,-25 1 16,25-1-16,-24 1 0,24-1 15,0 1-15,-24 48 16,24-49-16,0 1 15,0-1-15,0 0 16,0-48 0,0 0-1,0-1-15,0 1 16,24-1-16,-24-23 0,24-1 16,-24 0-16,25 0 0,-1-24 15,-24 24 1,25 0-16,-1 25 0,-24-1 15,24 25-15,1 0 16,-1 0-16,-24 25 0,25-1 16,-25 25-16,0-25 0,24 25 15,-24 0-15,25 0 16,-25 0-16,0 0 0,24-1 16,-24 1-16,0 0 15,24-25-15,-24 1 0,0-1 16</inkml:trace>
+  <inkml:trace contextRef="#ctx0" brushRef="#br0" timeOffset="10395">16609 5641 0,'-25'-24'0,"1"24"0,48 0 47,1-24-32,-1 24-15,0 0 16,25-25-16,-24 25 0,24-24 16,-25 24-16,25 0 15,-25-25-15</inkml:trace>
+  <inkml:trace contextRef="#ctx0" brushRef="#br0" timeOffset="10925">17219 5519 0,'25'25'16,"-1"-25"-1,0 0-15,-24-25 16,25 25 0,-25-24-16,-25 0 15,1 24 1,0 0-16,-1 0 0,-24 0 15,25 0-15,-1 0 16,1 24 0,0-24-16,24 24 0,-25 1 0,1-1 15,-1 1-15,25-1 16,0 25-16,0-25 0,0 25 16,0-24-16,0 23 0,25-23 15,-1-1-15,1 1 16,-1-25-16,0 0 0,1 0 15,-1-25-15,1 25 0,24-24 16,-25-25-16,0 25 16,-24-25-16,25 0 0,-25 0 15,24 0-15,-24 0 16,0 25-16,0-25 0,-24 25 16,24-1-16,-25 25 15,25 25 16,0-1-15,0 1-16,25-1 0,-25 25 16,0-25-16,0 25 15,0 0-15,0 0 0,0 0 16,0-25-16,0 25 0,0-25 16,0 1-16</inkml:trace>
+  <inkml:trace contextRef="#ctx0" brushRef="#br0" timeOffset="11454">17830 5666 0,'0'-24'0,"-25"24"16,25-25-16,0 1 15,-24-1-15,24 1 16,-25-1-16,25 1 0,-24 24 16,24-24-1,-24 24-15,-1 0 16,1 24 0,24 0-16,-25-24 0,1 25 15,24 24-15,-24-25 0,24 1 16,0-1-16,0 0 15,0 1-15,0-1 0,24 1 16,0-1-16,1 0 16,-1-24-16,1 0 0,-1 0 15,25-24-15,-25 0 16,1-1-16,-1 1 0,1-25 16,-1 25-16,0-25 0,-24 0 15,0-24-15,0 24 16,0 0-16,-24 0 0,24 25 15,0-1-15,-24 1 0,24-1 16,-25 25-16,1 25 31,24-1-31,0 25 0,0-25 16,0 25-16,0 0 0,0 0 16,24 24-16,-24-24 0,25 0 15,-25-25-15,0 25 16,24-24-16</inkml:trace>
+  <inkml:trace contextRef="#ctx0" brushRef="#br0" timeOffset="11621">18318 5617 0,'25'0'16,"-1"0"15,-24-24-31,25 24 0,-50 0 16</inkml:trace>
+  <inkml:trace contextRef="#ctx0" brushRef="#br0" timeOffset="13275">13531 6472 0,'-24'0'16,"-1"0"-1,1 0-15,0 24 16,-1 1-16,1-1 16,-1 1-16,25-1 0,-24 0 15,24 25-15,-25-24 16,25 24-16,0-25 0,25 0 15,-1 1-15,25-1 16,-24-24-16,-1 0 16,25-24-16,0 24 0,0-25 15,-25 1-15,25 0 16,-25-25-16,1 24 0,-25-24 16,0 25-16,0 0 0,-25-25 15,1 24-15,-1 1 16,-23-1-16,23 1 15,1 24-15,-1 0 16,-24 24-16,49 1 16,0-1-16,0 1 15</inkml:trace>
+  <inkml:trace contextRef="#ctx0" brushRef="#br0" timeOffset="13600">14142 6325 0,'0'-24'0,"24"24"16,-24-24-16,0-1 15,-49 25 16,1 0-31,23 25 0,1-1 16,-25-24-16,25 24 0,-1 25 16,1-24-16,24-1 15,-25 25-15,25 0 0,0-25 16,0 25-16,0 0 0,0-25 16,25 25-16,-1-24 15,1-1-15,-25 25 16,24-25-16,0-24 0,1 25 15,-1-25-15</inkml:trace>
+  <inkml:trace contextRef="#ctx0" brushRef="#br0" timeOffset="13845">14337 6325 0,'0'-24'15,"-24"24"1,-1 0-16,1 24 16,24 1-16,-24-25 0,-1 24 15,25 25-15,-24-25 0,24 50 16,-25-25 0,25-1-16,0 1 0,0-24 15,0 24-15,0-25 0,0 25 16,0-25-16,0 1 15</inkml:trace>
+  <inkml:trace contextRef="#ctx0" brushRef="#br0" timeOffset="14198">13971 6716 0,'-25'0'0,"1"-24"16,0-1-16,48 1 31,0 24-31,1 0 15,-1-25-15,25 25 0,0 0 16,0-24-16,24 24 16,-24-24-16,24 24 0,-24-25 15,0 25-15,0 0 16,0-24-16,-25 24 0,1 0 16,-1 0-16,-24-25 15,-24 25 1,-1 0-1,25 25 1,0-1 0,0 1-16,0 23 15,0-23 1,25 24-16,-25-25 0,0 1 16,24-1-16,0 0 15</inkml:trace>
+  <inkml:trace contextRef="#ctx0" brushRef="#br0" timeOffset="14355">14728 6302 0,'0'-25'15,"0"50"16,0-1-15</inkml:trace>
+  <inkml:trace contextRef="#ctx0" brushRef="#br0" timeOffset="14660">15143 6496 0,'-24'0'32,"-1"0"-17,1-24-15,0 24 0,-1 0 16,1 0-16,-25 0 16,0 24-1,25 1-15,-1-25 0,25 24 16,0 1-16,0-1 0,0 0 15,0 1-15,25-1 16,-1 1-16,0-1 16,25 1-16,-24-25 0,-1 0 15,25 0-15,0 0 16,-25 0-16</inkml:trace>
+  <inkml:trace contextRef="#ctx0" brushRef="#br0" timeOffset="15051">15461 6570 0,'-25'0'16,"1"24"15,48-24 16,1 0-32,-1 0 1,1-24 0,-1-1-1,0 1-15,-24-1 16,-24 1-16,0 24 16,24-25-16,-25 25 15,1 0-15,-1 0 0,1 0 16,-25 25-16,25-1 0,-1 1 15,25-1-15,-24 1 16,-1 48-16,25-49 16,25 25-16,-1-24 0,1-1 15,-1 0-15,25 1 16,0-25-16,-25 0 0,25 0 16,0-25-16</inkml:trace>
+  <inkml:trace contextRef="#ctx0" brushRef="#br0" timeOffset="15908">16096 6521 0,'24'0'0,"-24"-25"16,25 25-1,-25-24 1,0 48 0,0 1-16,0 24 15,0-25 1,0 0-16,0 25 0,0 0 0,0-24 16,0-1-16,0 25 15,0-25-15,0 1 16,24-50-1,-24 1 1,24-25 0,1 0-16,-25 0 15,0 0-15,24 1 0,-24-1 0,0-25 16,25 26-16,-25-1 0,24 24 16,-24 1-16,25 0 15,-1 48-15,0 0 16,1 1-16,-25 24 15,24-1-15,1 1 0,-1 0 16,0 0-16,1 0 16,-25 0-16,24-25 0,1 25 15,-25-25-15,0 1 16</inkml:trace>
+  <inkml:trace contextRef="#ctx0" brushRef="#br0" timeOffset="16519">16316 6570 0,'-25'0'16,"1"0"-16,-1 0 0,50 0 31,-1 0-15,1 0-16,23 0 16,-23 0-16,24 0 0,0 0 15,-1-25-15,1 25 16,0 0-16,-25-24 0,25 24 15,-24 0-15,24 0 0,-25-25 16,0 25-16,1 0 16,-1 0-16,1-24 15,-1 24 1,-24-25 0,-24 25-1,-1 0-15,1 0 16,-1 0-16,1 25 0,0-25 15,-1 24-15,1-24 16,24 25-16,-25-1 0,25 1 16,0-1-16,0 0 0,0 1 15,0-1-15,25 1 16,-1-25-16,1 0 0,-1 24 16,0-24-16,1 0 15,-1-24-15,25 24 0,-24-25 16,-25 1-16,24-1 0,0 1 15,-24-25-15,0 25 16,0-25-16,0 0 0,0 0 16,0 0-16,0 25 0,0-1 15,0 1-15,0 0 16,0 48 0,0 25-1,0 0-15,0 0 0,0-1 16,0 1-16,0 25 0,0-26 15,25 1-15,-25 0 16,0-24-16,24-1 0,-24 0 16,0 1-16,25-25 15</inkml:trace>
+  <inkml:trace contextRef="#ctx0" brushRef="#br0" timeOffset="17037">17291 6570 0,'25'0'0,"-1"24"16,1-24-16,-1 0 31,-24-24-15,0-1 0,-24 1-1,-1 24-15,1 0 0,-1 0 16,1 0-16,0 0 15,-1 0-15,1 0 0,-1 0 16,1 24 0,0 1-16,24-1 15,0 0-15,0 1 16,0-1-16,24 1 16,-24-1-16,24 1 0,1-25 15,-1 24-15,1-24 16,-1 0-16,0 0 0,1-24 15,24-1 1,-25 1-16,1-1 0,-25-24 16,24 1-16,-24 23 0,0-48 15,0 24-15,0 0 16,-24 0-16,24 25 0,0-25 16,-25 25-16,25-1 0,-24 25 15,24 25 1,0 24-16,0-1 15,0 1-15,24 0 0,-24 0 16,25 0-16,-25 0 16,24-1-16,-24-23 0,24 24 15,-24-25-15,0 1 16,25-25-16</inkml:trace>
+  <inkml:trace contextRef="#ctx0" brushRef="#br0" timeOffset="17212">17683 6545 0,'25'25'16,"-1"-25"15,-24 24-15,25-24-16,-50 0 31,1 0-16</inkml:trace>
+  <inkml:trace contextRef="#ctx0" brushRef="#br0" timeOffset="18302">13458 7278 0,'0'-25'16,"0"1"-1,-24 24-15,24-24 16,0 48 0,0 0-1,0 50 1,24-25-16,-24 24 0,0-24 0,0 0 15,24 24-15,-24-24 16,0-1-16,0 1 0,0-24 16,0 24-16,25-25 15,-25-48 1,0-1 0,0 1-16,0-1 15,0-24-15,-25 1 0,25-1 16,0-24-16,0 24 15,-24 0-15,24 0 0,0 0 16,0 0-16,-24 25 0,24-1 16,0-23-16,0 23 15,24 1-15,-24-1 16,49 1 0,-25 24-16,1 0 0,-1 0 15,1 0-15,-1 24 0,-24 1 16,24-1-1,-24 25-15,0-25 0,0 1 16,-24-1-16,0 1 16,-1-1-16,1 1 0,-25-1 15,0 0 1,25-24-16,-1 0 16,25-24-16</inkml:trace>
+  <inkml:trace contextRef="#ctx0" brushRef="#br0" timeOffset="18735">13873 7400 0,'-24'24'0,"24"1"16,0-1 31,24-24-47,1 0 0,-1 0 31,25-24-31,-25 24 0,-24-25 16,25 25-16,-1-24 0,-24 0 15,0-1 1,0 1-16,-24-1 15,-1 25 1,1-24-16,0 24 0,-25 0 16,24 0-16,-24 0 0,25 0 15,0 24-15,-1 1 16,1-1-16,24 1 0,0-1 16,0 0-16,0 1 15,24-1-15,1 1 0,-1-1 16,0 1-16,1-1 15,-1-24-15,25 24 0,-24-24 16,-1 0-16</inkml:trace>
+  <inkml:trace contextRef="#ctx0" brushRef="#br0" timeOffset="19100">14142 7351 0,'0'-24'15,"0"-1"-15,24 1 16,1 24 0,-1 0-16,1 0 15,-25 24-15,24-24 0,0 25 16,1-1-16,-1 1 31,-24 121-31,0-121 16,0-1-16,-24 0 15,24-48 1,0 0 0,0-1-16,0 1 15,0-25-15,24 0 0,25-24 16,-24 24 0,-1 24-16,0 1 0,1 0 15,-1 24-15,1 0 16,-1 0-16,-24 24 0,25-24 15,-25 24-15</inkml:trace>
+  <inkml:trace contextRef="#ctx0" brushRef="#br0" timeOffset="19746">14606 7351 0,'0'-24'31,"24"24"1,-24 24-17,25 1-15,-25-1 16,24 0-16,-24 1 0,25-1 15,-25 1-15,0 23 16,24-23-16,-24-1 0,0 1 16,24-1-16,-24-48 31,0-1-15,0 1-1,0-25-15,25 25 0,-25-25 16,24 24-16,-24-23 15,25 23-15,-25 1 0,24-25 16,1 49-16,-1 0 0,0 0 16,-24 24-1,25 1-15,-25-1 0,24 1 16,-24 23-16,0 1 0,0-24 16,0-1-16,0 0 15,0 1-15,0-1 0,0 1 16,0-50-1,0 1 1,0-1-16,0 1 0,25 0 16,-25-25-16,24 24 15,1 1-15,-1-25 0,0 49 16,-24-24-16,25 24 16,-1 0-16,1 24 0,-1 1 15,-24-1-15,0 25 16,24 0-16,-24-25 0,0 25 15,0-25-15,0 25 0,0-24 16,0-1 0</inkml:trace>
+  <inkml:trace contextRef="#ctx0" brushRef="#br0" timeOffset="20235">15436 7278 0,'0'-25'16,"0"1"-16,0 0 15,-24-1-15,24 1 16,0 48 15,0 1-31,0-1 16,0 0-1,0 25-15,0 0 0,0 0 0,0 0 16,0 0-16,24-25 0,1 25 16,-1 0-16,1-25 15,-1 1-15,0-1 0,25-24 16,-24 0-16,-1 0 15,1 0-15,-1-24 0,0 24 16</inkml:trace>
+  <inkml:trace contextRef="#ctx0" brushRef="#br0" timeOffset="20394">15485 7473 0,'-24'0'0,"48"0"47,1 0-31,-1 0-16,0-24 15,1 24-15</inkml:trace>
+  <inkml:trace contextRef="#ctx0" brushRef="#br0" timeOffset="20552">15900 7424 0,'0'25'0,"0"-1"16,0 1 15</inkml:trace>
+  <inkml:trace contextRef="#ctx0" brushRef="#br0" timeOffset="21032">16316 7351 0,'0'-24'15,"-25"24"-15,1 0 16,-1 24-1,25 1 1,0-1-16,-24 0 16,24 25-16,0-24 0,0 24 15,-25-25-15,25 49 16,0-48-16,0-1 16,0 0-16,0 1 15,25-25 1,-25-25-16,0-23 15,24 23 1,-24-24-16,25 1 0,-25-26 16,0 25-16,24-24 15,-24 24-15,25 0 0,-25 1 16,0-1-16,24 24 0,0 25 31,1 25-31,-25-1 16,24 25-16,-24 0 0,25 0 15,-25 0-15,24-1 16,-24 1-16,25 0 0,-1-24 16,-24 23-16,24-23 15,-24-1-15,0 1 16</inkml:trace>
+  <inkml:trace contextRef="#ctx0" brushRef="#br0" timeOffset="21632">16317 7546 0,'-25'0'16,"50"-24"15,-1 0-15,25 24-16,-25 0 16,1 0-16,24-25 0,-1 25 15,1 0-15,0-24 0,0 24 16,-25 0-16,25 0 15,-24-25-15,23 25 0,-23 0 16,-1-24-16,1 24 16,-1 0-16,-24-24 15,25 24-15,-25-25 16,-25 25 0,1 0-1,-1 0 1,1 0-16,-1 0 0,1 25 15,0-1-15,-1-24 0,25 24 16,-24 25-16,24-24 16,0-1-16,0 0 0,0 1 15,24-1-15,1 1 16,-25-1-16,24-24 0,0 25 16,1-25-16,-1 0 15,1-25 1,-1 1-16,1-1 0,-1 1 0,0-25 15,-24 25-15,25-25 0,-25-24 16,0 24-16,0 0 16,0 0-16,0 0 0,0 25 15,0-25-15,0 24 16,0 50 0,0 24-1,0-25-15,0 25 0,0 0 16,0 0-16,0 0 0,24 24 15,-24-24-15,0-25 16,0 25-16,0-25 0,25 1 16,-25-1-16</inkml:trace>
+  <inkml:trace contextRef="#ctx0" brushRef="#br0" timeOffset="22161">17463 7400 0,'25'0'16,"-25"-24"-16,-25-1 16,1 25-1,0 0-15,-1 0 16,1 0-16,-1 0 15,1 0-15,-1 25 16,25-1-16,0 0 16,0 1-16,0 24 15,0-25-15,0 25 0,0-25 16,25 1-16,-25-1 16,24 1-16,1-1 0,-1 0 15,1-24-15,-1 0 0,25-24 16,-25 24-1,1-24-15,-1-25 0,-24 24 16,25-23-16,-25-1 0,0 0 16,0-24-16,0 24 15,0-25-15,-25 26 0,25-1 16,0 24-16,-24 1 16,24-1-16,0 1 0,0 48 31,0 1-31,0-1 0,0 25 15,0 0-15,0 0 0,24 0 16,1 24-16,-25-24 16,24 0-16,-24 0 0,24-1 15,1-23-15,-25-1 16,0 1-16,24-25 0</inkml:trace>
+  <inkml:trace contextRef="#ctx0" brushRef="#br0" timeOffset="22335">17927 7498 0,'25'0'16,"-25"24"-16,24-24 16,-48 0 15</inkml:trace>
+  <inkml:trace contextRef="#ctx0" brushRef="#br0" timeOffset="27590">12335 5080 0,'24'0'0,"-24"-25"31,-24 25-31,-1 0 16,1 0-1,-1 25-15,1-25 16,-1 24-16,1 1 0,0-1 16,-1 0-16,1 1 0,-1 24 15,1-25-15,-1 25 16,25-25-16,0 1 0,0-1 15,0 1-15,0-1 0,25 1 16,-1-1 0,1-24-16,-1 0 0,1 0 15,-1-24 1,0 24-16,1 0 16,-1 0-1,1 24 1,-25 0 15,24-24-31,-24 25 0,0-1 0,0 1 16,0-1-1,-24-24-15,24 24 16,-25-24-16,1 0 0,24 25 16,-25-25-16,1 0 15,0 0-15,-1 0 16,1 0-16,48 0 31,-24 24-15,25-24-16,-1 25 15,0-25-15,1 24 0,24 1 16,-25-1-16,1 0 0,23 1 16,-23-1-16,-1 1 15,1-1-15,24 1 16,-25-25-16,0 0 15</inkml:trace>
+  <inkml:trace contextRef="#ctx0" brushRef="#br0" timeOffset="28139">12188 5617 0,'0'24'16,"-24"-24"-1,-50 25 1,1-25-16,0 24 0,-25 1 16,-24-1-16,0 1 0,-25-1 15,-24 0-15,-24 1 16,24-1-16,-49 1 0,25-1 15,-25 1-15,25-1 0,-1-24 16,1 24-16,48 1 16,1-25-16,24 24 0,48-24 15,1 0-15,49 0 16,-1 25-16,50-25 16,-1 0-1,1 0 1,-25-25 46</inkml:trace>
+  <inkml:trace contextRef="#ctx0" brushRef="#br0" timeOffset="28487">9355 5935 0,'0'-25'0,"24"25"16,-24-24-1,0-1 1,-24 25-1,0 0-15,-1 25 16,1-25-16,-1 24 0,1 25 16,-25-25-16,25 25 15,-25 0-15,0-24 0,24 23 16,1 1-16,0 0 16,-1-24-16,25-1 0,0 0 15,0 1-15,25-1 16,23 1-16,-23-25 15,24 0-15,0 24 0,-1-24 16,-23 24-16</inkml:trace>
+  <inkml:trace contextRef="#ctx0" brushRef="#br0" timeOffset="29459">5105 6252 0,'-24'0'31,"24"-24"-15,0-1-16,0 1 15,-25 24 16,1 0-31,0 0 0,-1 24 16,1-24-16,-25 25 16,0-1-16,25 1 0,-25-1 15,0 0-15,25 1 0,-1-1 16,25 1-16,0-1 16,25 0-16,-1-24 0,25 25 15,24-1-15,-24-24 16,24 25-16,-24-1 0,24-24 15,-24 25-15,0-1 0,-25 0 16,-24 1-16,0-1 16,0 1-16,-24-1 0,-25 25 15,0-25-15,0 1 16,1-1-16,-26 1 0,26-25 16,-1 24-16,0-24 15,24 0-15,1 0 0,0 0 16,24-24-16,0-1 0</inkml:trace>
+  <inkml:trace contextRef="#ctx0" brushRef="#br0" timeOffset="29693">5472 6106 0,'24'-25'15,"1"1"-15,-1-1 0,-24 1 16,0-1-16,0 50 31,0-1-31,0 25 0,0 0 16,0 0-16,0 24 0,24 74 15,1-74 1,-25-24-16,0 24 0,24-24 16,-24 0-16,0-25 15,0 1-15</inkml:trace>
+  <inkml:trace contextRef="#ctx0" brushRef="#br0" timeOffset="30096">5472 6545 0,'-25'-24'0,"-24"-25"15,49 24 1,25 1 15,-1 24-31,1-24 0,-1 24 16,25-25-16,-25 1 15,25-1-15,-24 1 0,-1 24 16,25-25-16,-25 25 0,1 0 16,-1 0-16,1 25 15,-1-25-15,0 24 0,1 1 16,-1-1-16,1 1 16,-1-1-16,1 0 0,-25 1 15,24-25-15,-24 24 0,-24-24 31,-1 0-31,1 0 0,-1 0 16,1 0-16,-1-24 16,1 24-16,24-25 0,-24 1 15,24 0-15,24-25 0,0 24 16,1-24-16,-1 1 16,1-1-16,24 24 0,-1 1 15,-23 0-15,24 24 16,24 48-1</inkml:trace>
+  <inkml:trace contextRef="#ctx0" brushRef="#br0" timeOffset="30503">6473 6228 0,'24'0'16,"-24"24"15,25-24 0,-1 0-15,1 0 0,-1 0-1,1-24 1,-1-1-16,-24 1 15,0-1 1,0 1-16,-24 24 0,24-24 16,-25-1-16,1 25 0,-1 0 15,1 0-15,-1 0 16,-48 25 0,49-1-16,24 0 0,-25 1 15,25-1-15,0 25 0,25-24 16,-25-1-16,24 0 0,25 1 15,-25-1-15,25 1 16,-24-25-16,24 0 0,-1 0 16,-23-25-16</inkml:trace>
+  <inkml:trace contextRef="#ctx0" brushRef="#br0" timeOffset="30888">6937 6154 0,'0'-24'0,"25"24"62,-1 0-46,0 0 0,1 0-16,-1 0 0,1-24 15,-1 24-15,25 0 0,-25-25 16,1 25-16,-1-24 15,-24-1-15,25 25 0,-25-24 16,-25-1-16,1 25 16,-1-24-16,1 24 15,-25 0-15,25 0 0,-25 0 16,24 0-16,-23 24 16,23 1-16,25-1 0,-24 1 15,24-1-15,0 1 16,0 23-16,24-23 0,-24 24 15,49 0 1,0-25-16,-25-24 0,25 24 16,0-24-16,-25 0 0,25-24 15</inkml:trace>
+  <inkml:trace contextRef="#ctx0" brushRef="#br0" timeOffset="31199">7548 5690 0,'-25'-24'16,"1"-25"-16,24 25 0,-25-1 15,25 1-15,-24 24 16,24-25-16,0 1 16,-24 24-16,24 24 15,-25 1 1,25-1-16,0 1 15,0 23-15,0-23 16,0 24-16,25 24 0,-25-24 16,24 24-16,0-24 15,1 24-15,-1-24 0,1 0 16,-1 0-16,1 0 0,-25-25 16,24 1-1,0-1-15,-24 0 0,25-24 16</inkml:trace>
+  <inkml:trace contextRef="#ctx0" brushRef="#br0" timeOffset="31402">7377 5935 0,'-25'0'0,"1"0"15,-1 24-15,50-24 31,-1 0-31,25 0 0,0 0 16,-25-24-16,50-1 0,-25 25 16,-1-24-16,1-1 15,0 25-15,-25-24 16</inkml:trace>
+  <inkml:trace contextRef="#ctx0" brushRef="#br0" timeOffset="48044">4397 6228 0,'0'-25'0,"-24"25"63,-1 0-47,25 25-16,-49-25 0,25 0 15,0 24-15,-25-24 16,0 0-16,24 24 0,-23-24 15,-1 25-15,0-25 16,24 24-16,-23-24 0,23 0 16,-24 25-16,25-25 15,0 0-15,24 24 16,0 1 0,0-1-1,24-24-15,-24 24 0,24 1 16,-24-1-16,25 1 0,-1 24 15,-24-25-15,25 25 16,-25 0-16,24 0 0,-24-1 16,24 1-16,1 0 15,-25 24-15,24-24 0,1 24 16,-1 1-16,1-1 0,-1 0 16,0 25-16,1-25 15,-1 25-15,1 0 0,24-1 16,-25-23-16,0 23 0,1 1 15,24-25-15,-25 25 16,0-25-16,1 0 0,24 1 16,-25 23-16,1-23 15,-1-1-15,0 0 0,1 0 16,-1 1-16,-24-1 0,25 0 16,-1 1-16,1-1 15,-1 0-15,0-24 0,1 0 16,-1 24-16,1-24 15,-1 0-15,-24 0 0,25-1 16,-1 26-16,0-25 0,1-1 16,-25 26-16,24-25 15,-24 24-15,25 0 0,-25-24 16,0 0-16,24 24 16,-24-24-16,25 0 0,-1 0 15,0-1-15,1 1 0,-1-24 16,1 24-16,-1-1 15,-24 1-15,24 0 0,1-24 16,-1 23-16,1 1 16,-1 0-16,-24 0 0,25 0 15,-1-25-15,-24 25 0,24-25 16,-24 25-16,25-24 16,-25-1-16,24 1 15,-24-1-15,25 0 16,-25 1-16,0-1 0,0 1 15,0-1 17,24-24-32,1-24 15,-1 24-15,25-25 32,0 1-32,-25 24 0,25-25 0,0 1 15,-25 24-15,25-24 16,0 24-16,0-25 0,0 25 15,-25-24-15,0 24 0,1 0 16,-1 0-16,-24-25 31,-24 25-31,24-24 16,-25 24-16,1-25 0,0-23 16</inkml:trace>
+  <inkml:trace contextRef="#ctx0" brushRef="#br0" timeOffset="49229">4446 9110 0,'0'-25'0,"0"1"32,-24 24-17,24 24-15,-25 1 16,1 23-1,-1-23-15,1 24 0,24 0 16,-25-1-16,1 1 16,0 24-16,-1 1 0,25-1 15,-49 74 1,49-74-16,-24 0 0,24 0 16,-25 1-16,25 23 0,-24-23 15,24-1-15,0 25 16,0-1-16,24-23 0,-24 23 15,25 1-15,-1 0 0,1 24 16,-1-25-16,1 1 16,-1 0-16,25-25 0,-25 25 15,25-25-15,0 0 16,24 1-16,-24-1 0,24 0 16,1 0-1,-1-24-15,25 24 0,-25-24 0,24 25 16,1-26-16,0 1 0,0 0 15,24 0-15,-25 0 16,26 0-16,23-25 0,-24 1 16,25-1-16,24-24 0,0 0 15,24 0-15,0-24 16,1 24-16,-1-25 0,1 1 16,23 24-16,-23-25 15,24 1-15,-25-25 0,25 25 16,-25-25-16,0 0 15,25 0-15,0 0 0,-24-24 16,23 24-16,1-24 0,-25-25 16,25 25-16,-24-25 0,24 25 15,-50-25-15,26 1 16,-25-1-16,0 0 0,-25 25 16,1-25-16,-1 0 15,-23 1-15,-1-1 0,0 0 16,0-24-16,0 25 0,-24-26 15,24 1-15,-25 0 16,1 0-16,24-24 0,-48 23 16,23-23-16,50-98 15,-98 122-15,-1 24 16,1-24-16,-24 49 0,-1-25 16,1 25-16,-1 24 15,0-25-15,1 26 0,-1-1 16,1 0-16,-1 0 15,1 0-15,-25 0 0,0 25 16,24-1-16,-24 1 0,0 0 16,0-1-1,0 1 1,0-1 15,0 1-15,-24 24-1,-1 0-15</inkml:trace>
+  <inkml:trace contextRef="#ctx0" brushRef="#br0" timeOffset="49908">12750 8401 0,'-25'25'0,"1"-1"16,0 1 15,48-50 31,0 1-46,1-1-16,-1 1 16,25-25-1,-25 25-15,25-1 0,-24 1 16,24-25-16,-25 25 0,25-1 15,0-24-15,0 25 16,-1-1-16,1 1 0,0 24 16,0-24-16,-25 24 15,25 0-15,0-25 0,-25 25 16,74 0 0,-49 0-16,0 0 0,0 0 15,0 0-15,-1 25 0,-23-25 16,24 24-16,0-24 0,-25 24 15,0 1-15,25-1 16,-24 25-16,-1-24 0,-24 23 16,24-23-16,1 24 15,-1 24 1,-24-49-16,0 25 0,25 0 0,-25 24 31,24-24-31,-24-24 0,25 23 0,-25-23 16,24 24-16,-24-25 15,0 0-15,24 1 0,-24-1 16,25 1-16,-25-1 16,0-48 15,-25-1-31</inkml:trace>
+  <inkml:trace contextRef="#ctx0" brushRef="#br0" timeOffset="50866">15363 2027 0,'-24'0'0,"-1"0"16,1 0-16,24-25 0,-25 25 16,25-24-1,25 24-15,-1 0 0,1-24 0,-1 24 16,25-25-16,24 1 16,-24 24-16,24-25 0,1 25 15,-1-24-15,0 24 16,-24 0-16,24-25 0,-24 25 15,-25 0-15,1 0 0,-1 0 16</inkml:trace>
+  <inkml:trace contextRef="#ctx0" brushRef="#br0" timeOffset="51126">15485 1905 0,'25'24'16,"-1"-24"-16,-24 25 16,24-25-16,-24 24 0,25 0 15,-25 1-15,0-1 16,0 1-16,0 24 0,0 24 16,0-24-16,0 24 0,0 0 15,24 1-15,-24-1 16,25 49-1,-1-49-15,-24-24 0,25-25 16,-1 25-16,-24-24 0,24-25 16</inkml:trace>
+  <inkml:trace contextRef="#ctx0" brushRef="#br0" timeOffset="51668">16169 2320 0,'0'-24'16,"-24"-1"-1,-1 25 1,25 25-16,-24-1 16,24 0-16,-25 1 15,25 24-15,0-25 0,-24 25 0,24 0 16,0 0-16,0-25 15,0 25-15,0 0 0,0-25 16,0 1-16,0 23 0,0-23 16,0-1-1,0 1-15,0-50 16,0 1 0,0-1-16,0 1 15,0 0-15,24-25 0,-24-25 16,25 26-16,-1-26 15,1 1-15,-1 0 0,0 0 16,1-1-16,-1 1 16,1 24-16,24 0 0,-25 25 15,0-25-15,1 49 16,-25-24-16,24 24 0,1 0 16,-25 24-16,24 0 0,0 1 15,-24-1-15,25 25 16,-1 24-16,-24-24 0,25 25 15,-25 23-15,24-24 0,1 1 16,-25 23-16,0-23 16,24-25-16,0 97 15,-24-97 1,0-25-16</inkml:trace>
+  <inkml:trace contextRef="#ctx0" brushRef="#br0" timeOffset="52581">16291 2686 0,'-24'-24'0,"-1"-1"15,1 1-15,24 0 16,0-1-16,0 1 0,0-1 16,24 1-1,1-1-15,24 25 0,-25-24 16,25 0-16,24-1 0,-24 1 15,49-25 1,-25 25-16,-24-1 0,0 1 16,24-25-1,-49 24-15,1 1 16,-25 0-16,24-1 0,-24 1 16,0 48 15,0 1-16,0 23-15,-24-23 0,24 48 16,0-24-16,0 0 0,0 24 16,0 0-16,0-24 15,0 0-15,0 24 0,0-48 16,0 24-16,0-25 0,0 0 16,0 1-16,-25-50 46,25 1-46,0 0 0,0-25 16,0 0-16,0 0 0,0-24 16,0-1-16,0 1 15,0 0-15,0 24 0,0-24 16,25 0-16,-1 24 16,-24 0-16,25 24 0,-1-23 15,25 48-15,-25-25 0,1 25 16,-1 0-16,25 25 15,-25-1-15,-24 0 0,25 1 16,-25 24-16,0-25 16,0 1-16,-25 23 0,1-23 15,0 24-15,-1-25 16,-48 49-16,48-48 16,1-1-16,0-24 0,24 25 15,-25-1-15,1-24 16,48 0-1,1 0 17,23 0-32,-23 0 0,24-24 15,-25 24-15,25 0 16,0 0-16,0 0 0,-1 0 16,-23 24-16,-1-24 0,25 24 15,-24 25-15,-25-24 16,24-1-16,-24 25 0,0-25 15,0 25-15,0-24 16,-24-1-16,24 25 0,-49-25 16,24-24-1,1 25-15,-25-1 0,0-24 0,0 0 16,25 0-16,-25 0 0,25-24 16,-1 24-16,1-25 15,-1 1-15,25-25 0,0 25 16,25-25-16</inkml:trace>
+  <inkml:trace contextRef="#ctx0" brushRef="#br0" timeOffset="52994">17586 2125 0,'0'-25'0,"24"1"16,-24-1-16,0 1 31,-24 24-31,24 24 16,0 1-1,0-1-15,0 1 0,0-1 16,0 25-16,0 0 16,0 24-16,0 0 0,0-24 15,0 24-15,0 1 0,24 48 16,-24-73-1,0-1-15,0 1 0,0-24 16,0 24-16,0-25 0,0 0 16,24-24 15,1 0-31,-1-24 16,1 24-16,23-24 0,1-1 15,0 25-15,0-24 0,0-1 16,0 25-16,-25-24 15,25 24-15,-25-25 0,1 25 16,-1-24-16,1 24 16</inkml:trace>
+  <inkml:trace contextRef="#ctx0" brushRef="#br0" timeOffset="53546">18611 2149 0,'0'-49'0,"0"25"16,-24-1-16,24 1 0,-25-1 15,-23-23 1,23 48-16,1 0 15,-1-25-15,1 25 16,0 0-16,-1 0 0,1 0 16,-1 0-16,1 0 0,-1 0 15,1 0 1,0 0-16,24 25 0,-25-25 16,1 24-16,-1 0 15,25 1 1,0-1-16,0 1 15,0-1-15,25 25 16,-25-25-16,24 25 0,-24 25 16,25-26-16,-1 1 15,0 24-15,1-24 0,-1 25 16,1-26-16,-25 1 0,24 0 16,-24 0-16,25 0 15,-25-25-15,0 25 0,24-24 16,-24-1-16,24 0 0,-24 1 15,25-1-15,-1 1 16,1-25-16,-1 0 16,25 0-16,0 0 0,-25 0 15,25-25-15,-25 1 0,25-1 16,-24-23 0,-25 23-16</inkml:trace>
+  <inkml:trace contextRef="#ctx0" brushRef="#br0" timeOffset="53713">18318 2686 0,'25'-24'15,"-1"24"1,1-25-16,23 25 16,-23-24-16,48 0 0,-24 24 15,0-25-15,0 1 0,73 24 31</inkml:trace>
+  <inkml:trace contextRef="#ctx0" brushRef="#br0" timeOffset="60789">18880 5373 0,'-24'-25'16,"24"1"0,0 0 46,24 24-46,0 0-16,1 0 0,-1 0 15,1 0-15,-1 0 16,25 0-16,-25 0 0,1 0 16,-1 0-1,-24 24-15,0 0 16,-24 1-16,-1-25 15,1 24-15,0 1 16,-1-25-16,1 24 0,-1-24 16,1 0-16,24 25 15,24-25 1,1 0 0,24 0-16,-25 0 15,25 0-15,-25 0 0,25 0 16,-25 24-16,1-24 15,-1 0-15,-24 24 0,0 1 16,-24-1-16,-25-24 16,25 25-16,-50-1 15,26-24-15,-1 25 0,-25-25 16,26 0-16,-1 0 0</inkml:trace>
+  <inkml:trace contextRef="#ctx0" brushRef="#br0" timeOffset="61527">18440 6276 0,'-24'0'0,"24"-24"15,24 0 1,1-1-16,-1 1 16,74-1-1,-74 25-15,25 0 16,-24 0-16,-1 0 0,0 0 16,1 25-16,-1-25 15,-24 24-15,0 1 16,-24-1-16,-1-24 0,1 24 15,-25 1-15,25-25 16,-25 24-16,0 1 16,25-1-16,-1-24 15,25 25 1,25-25-16,-1 0 16,0 24-16,25-24 15,-24 0-15,24 0 0,-25 24 16,0-24-16,1 0 15,-1 25-15,-48-25 16,-1 24-16,1-24 16,-25 25-16,0-25 15,0 24-15,1-24 0,-1 25 16</inkml:trace>
+  <inkml:trace contextRef="#ctx0" brushRef="#br0" timeOffset="62127">18392 7107 0,'-25'0'15,"25"-25"1,25 1 15,-1 24-15,0 0-16,1 0 0,24 0 15,-25 0-15,0 0 16,25 0-16,-24 0 16,-1 0-16,1 24 0,-25 1 15,-25-25 1,1 24-16,-1 1 15,1-25 1,-1 24-16,1-24 0,0 0 16,24 25-16,24-1 15,0-24 1,1 24-16,24 1 16,-25-25-16,25 24 15,0 1-15,-25-1 0,25 1 16,-24-1-16,-25 0 0,-25 1 15,-48-25-15,0 24 16,-74 1-16,-24-1 0,-24 0 16</inkml:trace>
+  <inkml:trace contextRef="#ctx0" brushRef="#br0" timeOffset="73659">4617 5641 0,'-25'0'0,"25"-24"16,-24 24-1,0-24-15,24-1 0,-25 25 16,25-24-1,-24-25-15,-1 0 0,1 25 16,24-25-16,-25 0 0,25 0 16,0 0-16,-24 0 0,24-24 15,0 24-15,24 1 16,1-1-16,-1 0 16,1 0-16,24 0 0,-25 25 15,25-25-15,24 24 0,-24 1 16,24 24-16,1-24 0,-26-1 15,26 25-15,-1 0 16,0-24-16,0 24 0,-24 0 16,25-25-16,-1 25 0,73-24 15,-48 24 1,0 0-16,-1-25 0,26 1 16,23 24-16,-24-24 15,25-1-15,-1 25 0,-24-24 16,1-1-16,-1 25 0,-25-24 15,1 24-15,-25-25 16,-24 25-16,0 0 0,0 0 16,-25 0-16,1 0 15,-1 25-15,1-1 0,-1 1 16,-24-1-16,24 1 0,1 23 16,-1-23-16,1 24 15,-1 0-15,1 24 0,-1-24 16,0 0-16,1 24 15,24-24-15,-25 0 0,0-1 16,25 1-16,-24 0 0,-25 0 16,24-25-16,-24 1 15,-24 24-15,-1-25 0,1-24 16,-1 24-16</inkml:trace>
+  <inkml:trace contextRef="#ctx0" brushRef="#br0" timeOffset="74085">6058 4445 0,'-25'0'31,"25"-25"-31,-24 25 0,24-24 16,-24 0-16,24-1 0,-25 1 15,25-1-15,-24-24 16,24-24-16,-25 24 0,25-24 15,-24 0-15,-1-25 16,1 0-16,0-24 0,-1 25 16,1-26-16,-1 26 0,25-1 15,-24 0-15,-1 25 16,25 0-16,0 24 0,-24 25 16,24-1-16,0 1 0</inkml:trace>
+  <inkml:trace contextRef="#ctx0" brushRef="#br0" timeOffset="74855">3982 1612 0,'0'-25'16,"0"1"-16,0-1 16,-25 1-16,25 0 0,-24-1 15,24 1-15,-24 24 16,-1-25-16,1 25 0,-1 0 15,-72 49 1,48-24-16,0-1 0,-24 0 16,24 25-16,0-24 0,0 24 15,25-25-15,-1 0 16,1 25-16,24-24 0,24-1 16,1 0-16,-1 25 0,25-24 15,0-1-15,24 1 16,0-1-16,1 25 15,-26-25-15,26 1 0,-1-1 0,-24 1 16,-25-1-16,1 0 16,-1 1-16,-24-1 0,-24 25 15,-25-24-15,0 23 16,0-23-16,-24 24 0,0-25 16,-1 1-16,26-1 0,-26 0 15,25 1-15,1-25 16,23 0-16,1-25 0,24 1 15,0-25-15,24 25 16</inkml:trace>
+  <inkml:trace contextRef="#ctx0" brushRef="#br0" timeOffset="75333">4251 1587 0,'-25'0'15,"1"0"-15,-1 0 0,-24-24 32,25 24-32,48-25 15,1 25-15,-1-24 0,25 24 16,0-24-16,0-1 15,24 1-15,-24 24 0,24-25 16,-24 1-16,-25-1 0,25 25 16,-49-24-16,25 24 15,-50 0 1,1 0-16,-1 0 0,1 0 16,-25 0-16,25 0 0,-1 24 15,1-24-15,0 0 0,-1 25 16,1-1-1,24 1-15,0-1 0,0 1 16,0 23-16,0 1 16,0 0-16,24 0 15,-24 0-15,0 24 0,0-24 0,25 0 16,-25 24-16,24-24 16,-24 0-16,24-25 0,-24 25 15,25-25-15,-1 1 16,-24-1-16,25 1 0</inkml:trace>
+  <inkml:trace contextRef="#ctx0" brushRef="#br0" timeOffset="76047">5008 1636 0,'0'-24'0,"0"48"47,0 1-47,0-1 15,24 25-15,-24-25 16,0 25-16,0 0 0,24 0 16,-24 0-16,0-1 0,0 1 15,0-24-15,0-1 16,0 1-16,0-1 0,0 0 15,0-48 1,-24-25 0,24 25-1,0-25-15,-24 0 0,24 0 16,0-24-16,-25 0 0,25-1 16,-24 1-16,24 0 15,0 0 1,24-74-16,1 98 15,-1 25-15,0-1 0,25 25 16,0 0-16,0 0 0,0 25 16,0-1-16,0 1 15,-1-1-15,1 0 0,-24 25 16,-1-24-16,-24 24 0,0-1 16,0-23-16,-24 24 15,-25-25-15,0 25 0,0-25 16,-24 1-16,24-1 15,0 1-15,0-1 0,0 1 16,25-25-16,0 0 0,-1 0 16,50 0-1,23 0 1,-23 0 0,24 0-16,-25 24 0,25 0 15,0-24-15,-25 25 0,25-1 16,0 1-16,0-1 15,0 0-15,0 1 0,-25-1 16,25 1-16,0-1 16,0 1-16,-1-25 0,1 24 15,49-24 1,-74 0 0,-24-24-16</inkml:trace>
+  <inkml:trace contextRef="#ctx0" brushRef="#br0" timeOffset="77357">3396 3004 0,'-25'0'0,"1"24"16,48-24 15,1 0 0,24 0-31,-1 0 0,1-24 0,49 24 16,24-25-16,25 1 0,48 0 15,0-25-15,25 24 16,24-24-16,25 25 0,0-25 16,24 0-16,-49 0 15,25 25-15,-49-25 0,-25 25 16,-24-1-16,-49 1 15,0-1-15,-49 25 0,-24-24 16,-24 24-16,-1-24 0,-24-1 16,-24 1-1,-1 24 1,25-25-16,-24 25 0,24-24 16,-25 24-1,25-24-15,-24 24 16,24-25-16,-25 1 15,1-1-15,0 1 0,-1-25 16,1 0-16,-1 0 0,-23-24 16,23-25-16,-24 1 15,0-25 1,-48-147-16,48 98 0,0 24 16,0-24-16,0 25 0,25-1 15,-25 25-15,25 0 0,-1 24 16,-24 25-16,25 0 15,0 48-15,24-23 0,-25 23 16,1 25-16,24-24 16,-25 24-16,1 0 15,-1 0 1,25 24 0,0 1-1,-24-25-15,0 24 16,-1-24-1,1 24-15,-1 1 0,-24-1 16,-24 1-16,-25-1 16,1 25-16,-25-25 0,-49 25 15,0 25 1,-49-26-16,-24 1 0,-1 25 0,-23-1 16,24-24-16,-25-1 0,49 1 15,0 0-15,49 0 16,-97 0-16,170-25 15,49-24-15,0 25 16,25-25-16,24 24 47,0 1 0,0-1-32,24 0-15,-24 25 16,25 49 0,-1-25-16,-24 0 0,25 1 15,-1-1-15,0 25 0,1-1 16,-25 1-16,24 0 0,1 24 16,-1-24-16,-24 24 15,25 0-15,-1-25 0,0 1 16,1 0-16,-25-25 0,49 74 31,-49-98-31,24-25 0,-24 25 0,0-25 16,0 1-16,0-1 15,0 1-15,0-1 16,25 0-16,-1-24 16,0 0-16,50-24 15,-1 0-15,0-1 0,171-48 16,-97 24-1,0 0-15,-1 25 0,-24-1 16</inkml:trace>
+  <inkml:trace contextRef="#ctx0" brushRef="#br0" timeOffset="79131">6546 1416 0,'0'-24'16,"25"24"-16,-25-25 31,24 25-31,1 0 47,-1 0-16,0 0-15,1 0-16,-1 0 15,25 0-15,0 25 16,-25-25-16,50 0 0,-25 24 16,24-24-16,0 25 15,25-1-15,-1 1 0,1-1 16,24 0-16,0 1 16,25 24-16,24 0 0,0-1 15,24 26-15,25-25 0,268 97 31,50 25-31,-245-73 0,24-1 16,270 74-16,-319-73 16,1-25-16,-25 1 15,-24-1-15,0 0 0,-49 0 16,0-24-16,-25 0 16,-24-24-16,0 23 0,-24-23 15,-25-1-15,1 1 0,-26-1 16,1-24-16,-24 24 15,-1-24-15,1 0 16,-25-24 47,-25 0-17,1 24-46,-1-25 16,1 1 0,-1-1-16,1 1 0</inkml:trace>
+  <inkml:trace contextRef="#ctx0" brushRef="#br0" timeOffset="79701">12799 2808 0,'0'-24'0,"-25"0"0,25-25 15,0 24 1,0 1-16,25 48 31,-25 1-15,24-25 0,-24 24-1,24 1-15,1-1 0,-1 0 16,25 1-16,-24 24 0,23-25 15,1 25-15,0-25 16,0 25-16,0 0 0,-25-24 16,1 23-16,24-23 0,-49 24 15,24-25-15,-24 0 16,0 1-16,0-1 16,0 1-16,0-1 0,-24 1 15,-1-1-15,1-24 0,-1 24 16,1 1-16,-25-25 15,25 24-15,-25-24 0,0 25 16,0-25-16,0 0 0,-24 0 16,24 24-16,0-24 15,0 0-15,0 0 0,1 0 16,23 0-16,1 0 0,-1 0 16,1 0-16,48 0 78,-48 0-31,24-24-32,0-1-15</inkml:trace>
+  <inkml:trace contextRef="#ctx0" brushRef="#br0" timeOffset="80708">11284 1978 0,'-24'0'15,"24"24"32,24-24-31,-24-24-16,25 24 15,-1-24-15,1 24 16,-1 0-16,25-25 0,-25 25 16,1 0-16,24 0 15,-25 0-15,0 25 0,25-25 16,-24 24-16,-1 0 16,-24 1-16,25-1 0,-25 1 15,0-1-15,-25 1 0,1-1 16,-1 0-16,1 1 15,-1-1-15,1 1 0,0-1 16,-25-24-16,49 25 0,-25-1 16,1-24-16,24 24 15,24-24 17,1 0-17,-1 0-15,1 0 0,23 0 16,-23 25-16,24-25 15,-25 24-15,25-24 0,-25 25 16,25-1-16,-24 0 16,-1 1-16,25 48 15,-49-48-15,0-1 0,-24 0 16,24 25-16,-49-24 16,24-1-16,-24 1 0,1-1 15,-1-24-15,0 24 16,24-24-16,-23 0 0,-1 0 15,0 0-15,25 0 0,-1-24 16,-24 0 0,25-1-16,24 1 31,24 24-15,1 0-1,-1 0 1</inkml:trace>
+  <inkml:trace contextRef="#ctx0" brushRef="#br0" timeOffset="81019">12383 2296 0,'0'-25'15,"0"1"-15,-24 24 16,0-25-16,24 1 16,0 48 15,0 1-31,24-25 0,-24 49 16,0-25-16,24 74 15,-24-49 1,0-1-16,25 1 0,-25 24 0,24-24 15,-24 0-15,25 0 16,-25 0-16,0-25 0,24 1 16,-24-1-16</inkml:trace>
+  <inkml:trace contextRef="#ctx0" brushRef="#br0" timeOffset="81404">12286 2589 0,'-25'-25'0,"25"1"0,-24-1 16,48 25 0,1-24-1,24 24-15,-25 0 16,25 0-16,-25-24 16,25 24-16,0 0 0,0 0 15,-25-25-15,25 25 0,-24 0 16,23 0-16,-23-24 15,-1 24-15,1 0 16,-25-25 0,0 1-1,24 48 32,-24 1-31,0-1-16,24 1 0,-24-1 15,25 25-15,-1 0 0,-24-25 16,25 25-16,-25-25 16,24 1-16,-24-1 15,25 1-15</inkml:trace>
+  <inkml:trace contextRef="#ctx0" brushRef="#br0" timeOffset="81578">12896 2125 0,'-24'0'0,"24"-25"15,-25 25-15,1 0 16,48 0 31</inkml:trace>
+  <inkml:trace contextRef="#ctx0" brushRef="#br0" timeOffset="82666">13189 2369 0,'0'24'0,"0"1"31,0-1-31,25 1 16,-25-1-16,24 0 16,-24 1-16,25-1 15,-1 1-15,0-1 16,1-24-16,-1 24 0,1-24 16,-1 0-16,1-24 15,-1 0-15,0-1 16,-24 1-1,0-1-15,0 1 0,0 0 16,0-1-16,0 1 0,-24-1 16,24-24-16,-24 49 15,24-24-15,-25 0 0,1 24 16,-1 0-16,1 0 16,-1 24-16,25 0 15,-24 25-15,24-24 0,-24 72 16,24-48-1,0 0-15,24 24 0,-24-48 16,24 24-16,1-1 16,-1-23-16,1-1 0,-1-24 15,1 0-15,-1 0 0,49-49 32,-48 25-32,24-25 0,-25 25 15,-24-25-15,24 0 16,1 0-16,-25 0 0,0 1 15,0-1-15,0 0 0,0 24 16,0 1-16,0 0 16,0 48 15,0 0-31,24 25 0,-24-24 16,0 24-16,0-1 0,25-23 15,-25 24-15,24-1 16,-24 1-16,0-24 0,25-1 15,-25 1-15,0-1 16,24-24-16,-24 24 0,0-48 16,0 0-1,24-1-15,-24 1 16,0-25-16,25 24 0,-25-23 16,24-1-16,1-24 15,-1 48-15,-24 1 16,25-1-16,-1 25 0,0 0 15,-24 25 1,0-1-16,25 25 0,-25-25 16,0 25-16,24 0 0,-24-25 15,25 25-15,-25 0 16,24-24-16,-24-1 0,24 0 16,1 1-16,-1-25 15,1 0-15,-1 0 0,1 0 16,23-25-16,-23 1 0,24-25 15,-25 0-15,25 0 16,-25 1-16,1-26 0,-1 26 16,1-1-16,-1 0 15,-24 24-15,0-23 0,0 23 16,-24 25-16,-1 0 16,1 25-1,-1-1-15,1 0 0,24 1 16,-24-1-16,24 25 15,24 0-15,0 0 0,25 0 16,-24-1-16,23 1 0,1 0 16,-24 24-16,-25-24 15,-49 0-15,-49 0 0,-73 0 16,-97 0-16,-99 24 16</inkml:trace>
+  <inkml:trace contextRef="#ctx0" brushRef="#br0" timeOffset="85066">245 8279 0,'-24'0'15,"24"-24"-15,-25 24 0,25-25 16,25 25 0,-1 25-16,1-1 15,-25 1 1,24 23-16,25 26 0,-25-1 16,1-24-16,-1 0 0,25 0 15,-25-25-15,25 25 16,0-25-16,-24 1 0,23-25 15,1 24-15,-24-24 0,-1 0 16,25-24-16,-25-1 16,-24 1-16,25-25 15,-1 0-15,-24 0 0,0 0 16,0-24-16,0 24 0,-24-24 16,24 49-16,-25-25 0,25 24 15,0 1-15,25 48 16,-25 1-16,24 24 15,1-1-15,23 26 0,-23-1 16,-1 25-16,25-25 16,0 25-16,-25-1 0,25 1 15,-24-25-15,23 1 16,-23-1-16,-1-24 0,1-25 16,-1 25-16,1-49 15</inkml:trace>
+  <inkml:trace contextRef="#ctx0" brushRef="#br0" timeOffset="85322">1295 8377 0,'0'-25'0,"0"1"16,0 0-16,0-1 15,0 50 16,25-1-31,-1 25 0,25-25 16,0 25-16,0 0 0,0 0 16,-1 24-16,26-24 15,-25 0-15,-1 0 0,1 0 16,0-1-16,-25-23 0,1-1 16,-25 1-16,0-50 31</inkml:trace>
+  <inkml:trace contextRef="#ctx0" brushRef="#br0" timeOffset="85536">1759 8230 0,'0'-49'16,"0"25"-16,-24 24 16,24 24-1,0 25-15,0 0 0,-24 24 16,24-24-16,-25 25 15,1 23-15,-1-23 0,25 23 16,-24-23-16,-1-1 16,1 0-16,24 0 0,-24-24 15,24 0-15,0-25 0,24-24 16</inkml:trace>
+  <inkml:trace contextRef="#ctx0" brushRef="#br0" timeOffset="85991">2248 8230 0,'0'-73'15,"0"24"1,0 25-16,24-25 0,1 0 16,-1 25-16,1-25 0,23 0 15,1 0-15,24 25 16,-24-1-16,25 25 15,-1 0-15,-24 0 0,0 25 0,-25-1 16,0 25-16,-24 0 16,0 0-16,-24 0 0,0-1 15,-1 1-15,-24 0 16,25 0-16,-25-25 0,25 1 16,-1-1-16,1 1 0,-1-1 15,1-24-15,48 0 31,25 0-15,0 0-16,0-24 0,24 24 16,0 0-16,1 0 0,-1 0 15,0 0-15,-24 24 16,24 0-16,-48 1 0,-1-1 16,-24 25-16,0 0 15,-24 0-15,-25 0 0,0 0 16,-24 24-16,0-24 0,-1-25 15,-97 49 1,98-48-16,0-25 0</inkml:trace>
+  <inkml:trace contextRef="#ctx0" brushRef="#br0" timeOffset="86372">709 9720 0,'-73'49'0,"0"0"0,-1-25 16,26 1-16,-1-1 16,49 1-16,49-25 31,146-25-31,-73 1 0,49-1 15,24-24-15,25 1 0,24-26 16,25 25-16,-25-24 16,25 0-16,-49 0 0,0 24 15,-25 0-15,-48 0 0,-50 0 16,1 25-16,-49 24 16,0-25-16,-25 25 15,-24-24-15,-24 48 31,-1 1-15,1-1 0</inkml:trace>
+  <inkml:trace contextRef="#ctx0" brushRef="#br0" timeOffset="88554">8036 293 0,'25'0'15,"-1"24"17,-24 1-17,0-1-15,0 1 16,0 23-16,0 1 0,0 0 16,0 24-16,0 1 0,0-1 15,0 0-15,0 0 16,24 1-16,-24-1 0,0-24 15,0 24-15,0-24 16,25 0-16,-25-25 0,0 25 16,0-25-16,24 1 15,-24-1 1,0-48 0,0-1-16</inkml:trace>
+  <inkml:trace contextRef="#ctx0" brushRef="#br0" timeOffset="88843">8525 635 0,'-25'0'15,"25"-25"-15,-24 25 0,48 0 31,1 0-31,-1 25 16,0-1-16,1 1 0,-1-1 16,25 0-16,0 25 15,0 0-15,0 0 0,-1 0 16,1 24-16,25-24 0,-26 24 16,1-24-16,0 0 15,0 0-15,49 0 31</inkml:trace>
+  <inkml:trace contextRef="#ctx0" brushRef="#br0" timeOffset="89101">9062 537 0,'0'-24'16,"0"-1"-16,-25 50 31,25-1-31,-24 1 16,0 23-16,-1 1 0,1 24 15,-1 1-15,1-1 0,-49 122 32,48-121-32,1-26 0,24 26 15,0-25-15,-25-25 16,25 25-16,0-25 0,0 1 15,0-1-15</inkml:trace>
+  <inkml:trace contextRef="#ctx0" brushRef="#br0" timeOffset="89690">9575 684 0,'0'-25'16,"0"-24"-16,0 25 15,0-1-15,24 1 16,-24 0-16,25-1 0,-25-24 16,24 49-16,25-24 15,-25 0-15,1-1 0,24 25 16,-25 0-16,0 0 0,25 0 15,-24 25-15,24-1 16,-25-24-16,0 24 0,1 25 16,-1-24-16,-24-1 0,0 25 15,-24 0-15,-1-25 16,1 25-16,-25 0 0,25-25 16,-1 1-16,1 24 15,-1-25-15,1-24 0,24 24 16,24-24-1,1 0 1,-1 0-16,25 0 0,0 0 16,0 0-16,0 0 15,0 0-15,-1 25 0,26-25 16,-26 24-16,-23 1 0,24-1 16,-25 25-16,-24-25 15,0 25-15,0 0 0,-24-24 16,-1 23-16,-24-23 15,1 24-15,-1-25 0,-24 0 16,24-24-16,-25 0 0,26 0 16,-1 0-16,0 0 15,0 0-15,0-24 0,25 24 16,-1-24-16,1-1 16,-1 25-16</inkml:trace>
+  <inkml:trace contextRef="#ctx0" brushRef="#br0" timeOffset="92123">734 7620 0,'-25'0'16,"1"0"-16,-1 0 15,1 0 1,0 0-16,-1 0 16,1 0-1,-1 0-15,1 0 0,-25 24 0,25-24 16,-25 25-16,0-1 0,0 0 16,25 1-16,-25 24 15,0-25-15,24 1 0,-23-1 16,23 0-16,25 1 15,-24-1-15,-1 1 0,25-1 16,0 1-16,0-1 16,-24-24-1,24 24-15,0 1 32</inkml:trace>
 </inkml:ink>
 </file>
 
@@ -2696,36 +3369,36 @@
   <inkml:trace contextRef="#ctx0" brushRef="#br0" timeOffset="-176660.73">4643 12895 0,'0'-24'0,"-24"-1"15,0 1-15,-1 0 16,25-1-16,-24 25 0,-1-24 16,1 24-16,-1-25 15,1 25-15,0 0 0,-1 0 16,1 25-16,-1-1 0,1 1 15,-1-1-15,1 0 16,0 25-16,24 0 0,-25 0 16,25 0-16,0-25 0,0 25 15,0 0-15,25-25 16,-1 25-16,0-24 0,25-1 16,-24 0-16,24-24 15,-1 25-15,26-25 0,-25 0 16,-1-25-16,1 25 15,0-24-15,-24 0 0,-1 24 16,0-25-16,1 1 0</inkml:trace>
   <inkml:trace contextRef="#ctx0" brushRef="#br0" timeOffset="-176042.73">4985 12773 0,'-24'0'0,"24"-24"16,-25 24-16,25 24 31,0 1-31,25-1 16,-25 0-16,0 1 15,24 24-15,-24-25 0,0 25 16,25-25-16,-25 1 16,24 24-16,-24-25 0,0 0 15,0 1-15,25-25 0,-25 24 16,0-48 15,-25-1-15,25 1-1,0-25-15,-24 0 0,24 1 16,-25-1-16,25 0 16,-24 0-16,24 0 0,0 0 15,0 0-15,0 1 16,24 23-16,1 1 0,-1-1 16,1 25-16,23 0 0,-23 0 15,24 0-15,-25 25 16,1-1-16,23 1 0,-23 23 15,-25-23-15,24-1 16,-24 1-16,0-1 0,0 1 16,0-1-16,-24 0 0,24 1 15,-49-25-15,25 24 16,-1-24-16,1 0 0,-1 0 16,1 0-16,-1 0 15,1 0-15,0 0 0,24-24 16,-25 24-16,25-25 0,25 25 31,-1-24-31</inkml:trace>
   <inkml:trace contextRef="#ctx0" brushRef="#br0" timeOffset="-174548.73">5645 12700 0,'-25'0'0,"1"0"15,24 24 16,24 1-15,-24-1-16,25 1 16,-25-1-16,24 0 15,-24 1-15,0-1 0,25 25 16,-25-24-16,0-1 16,0 0-16,0 1 0,0-1 15,0 1-15,0-1 16,24 1-1,-24-50 1,0 1 0,0-1-16,0-24 15,0 25-15,0 0 0,0-25 16,0 0-16,0 0 16,-24 25-16,24-25 0,-25 0 15,25 24-15,0 1 16,-24 0-16,24-1 0,0 1 15,0-1-15,0 1 32,24 24-32,1 0 31,-25-25-31,24 25 62,-24-24-62,24 24 16,1 0-16,-1-24 16,1 24-16,-1 0 15,1 0 1,-1-25 0,-48 25 30,24 25-46,-25-1 94,1-24-63,24 24-15,-25-24 0,1 0-1,-1 0-15,25 25 16,-24-25-16,0 0 16,24 24-1,-25-24-15,25 25 31,0-1-15,0 1-16,25-25 0,-25 24 16,24 0-16,-24 1 15,24-1-15,-24 1 0,25 24 16,-25-25-16,0 0 16,24 25-16,-24-24 0,0-1 15,0 25-15,25-25 0,-25 1 16,0-1-16,24 1 15,1-1-15,-25 1 16,24-25-16,0 0 16,1 0-16,-1 0 0,1 0 15,-1 0-15,1 0 0,23-25 16,-23 25-16,-1-24 16,1-1-16,-1 25 0,0-24 15,1-1-15,-1 25 16,1-24-16,-25 0 0,24-1 15,-24 1-15,0-1 0,0 1 16,0-25-16,0 25 16,0-25-16,0 0 0,0 0 15,0 25-15,-24-25 0,24 0 16,0 24-16,0 1 16,-25 0-16,25-1 0,0 1 15,-24-1 1,-1 25-1,25-24 1,0 0 31,25 24-31,-25 24-1,0 0 1,24-24-16,-24 25 15,25-1 1</inkml:trace>
-  <inkml:trace contextRef="#ctx0" brushRef="#br0" timeOffset="-165630.73">3813 14898 0,'-24'24'16,"24"1"15,0-1-31,0 1 16,0-1-16,-25 0 16,25 1-16,0-1 0,0 1 15,0-1-15,0 25 0,25-25 16,-25 1-16,24-1 15,-24 25-15,0-24 0,24 23 16,-24-23-16,0-1 16,25 25-16,-25-24 0,0 23 15,0-23-15,0 24 0,0-25 16,0 1-16,0 23 16,0-23-16,0 24 0,0-25 15,0 0-15,0 1 16,0-1-16,0 1 0,0-1 15,0 1-15,0-1 0,0 0 16,24 1-16,-24-1 16,0 1-16,0-1 0,0 1 15,25-1-15,-25 0 16,0 1 0,0-1-16,24-24 15,-24 25-15,0-1 16,25-24-16,-25 24 15,24-24 1,-24 25-16,24-25 16,1 0-16,-1 0 15,1 0-15,-1 0 16,1 0-16,23 0 16,-23-25-16,-1 25 15,25 0-15,-25 0 0,25 0 16,25-24-16,-26 24 0,1 0 15,25 0-15,-1 0 16,0-24-16,0 24 0,1 0 16,-1 0-16,0 0 0,0 0 15,25 0-15,-25 0 16,1 0-16,-1 0 0,0-25 16,0 25-16,1 0 15,23 0-15,-23 0 0,-1 0 16,25-24-16,-25 24 0,0 0 15,25 0-15,0-25 16,-25 25-16,0 0 0,0 0 16,25-24-16,-25 24 15,-24 0-15,24 0 0,1 0 16,-1 0-16,-24 0 16,24 0-16,0-24 0,-24 24 15,25 0-15,-26 0 0,26 0 16,-25 0-16,-1 0 15,26 0-15,-26 0 0,1 0 16,0 0-16,-24 0 0,23 0 16,1 0-16,0 0 15,-24-25-15,23 25 0,-23 0 16,24 0-16,-25 0 16,0 0-16,1 0 0,-1 0 15,1 0-15,-1 0 0,1 0 16,-1 0-1,0 0-15,1 0 16,-1 0 0,-24-24-16,25 24 15,-1-25-15,1 1 32,-25-1-32,0 1 15,0 0 1,0-1-16,0 1 15,0-1-15,0 1 16,0-1-16,-25 1 16,25 0-16,0-25 0,0 24 15,0 1-15,0 0 16,0-1-16,0-24 0,0 25 16,0-1-16,0-23 0,0 23 15,0-24-15,0 25 16,0-25-16,0 25 0,0-25 15,0 24-15,0-24 16,0 25-16,0-25 0,0 25 16,0-25-16,0 24 0,0 1 15,0-25-15,0 25 16,-24-1-16,24 1 0,0 0 16,0-1-16,0 1 15,0-1 1,0 1-16,24-1 15,-24 1 1,0 0-16,0-1 16,-24 1-16,-1-1 15,25 1 1,-24-1-16,24 1 16,0 0-1,0-1 1,0 1-16,0-1 15,0 1 1,0 0 0,24-1-1,-24 1 1,0-1 0,0 1 15,0-1-16,0 1 1,0 0 0,0-1-1,0 1 1,0-1 0,0 1-16,25 24 0,-25-25 15,0 1-15,0 0 16,24 24-1,-24-25-15,0 1 16,0-1-16,0 1 16,0-1-1,-24 25 1,-1 0 0,1 0-1,-1 0-15,1 0 16,0 0-1,-1 0-15,1 0 32,-1 0-17,1 0 1,-1 0 0,1-24 15,0 24-16,-1 0 1,25-24 0,-24 24-16,-1 0 15,1 0-15,0 0 16,-1-25-16,1 25 0,-25 0 16,24 0-16,-23 0 15,23 0-15,-24 0 0,25 0 16,-25 0-16,25 0 0,-25-24 15,24 24-15,-23 0 16,23 0-16,1 0 0,-25 0 16,24 0-16,-23 0 0,23 0 15,1 0-15,-25 0 16,24 0-16,-23 0 0,-1 0 16,0 0-16,0 0 15,0 0-15,0 24 0,0-24 16,1 0-16,-26 0 15,26 0-15,-1 0 0,-25 0 16,26 0-16,-26 25 0,25-25 16,1 0-16,-26 0 15,26 0-15,-26 0 0,25 0 16,1 0-16,-26 0 0,25 0 16,1 0-16,-26 0 15,25 0-15,1 0 0,-1 24 16,0-24-16,0 0 15,0 0-15,0 0 0,25 24 16,-25-24-16,0 0 0,0 0 16,1 25-16,-1-25 15,0 0-15,0 0 0,0 0 16,0 0-16,25 24 16,-25-24-16,25 0 0,-25 0 15,24 0-15,-23 0 0,23 0 16,1 0-16,-1 0 15,-24 0-15,25 25 0,0-25 16,-1 0-16,1 0 16,-1 0-16,1 0 0,-1 24 15,-23-24-15,23 0 0,1 0 16,-1 0-16,1 0 16,-1 0-16,-23 0 0,23 25 15,1-25-15,-1 0 16,1 0-16,0 0 0,-1 0 15,1 0-15,-25 24 0,24-24 16,1 0-16,0 0 16,24 24-16,-25-24 0,1 0 15,-1 0-15,1 0 16,-1 25 0,1-25-1,0 0 1,-1 0-1,1 0 1,-1 0-16,1 0 16,0 0-1,-1 0 1,1 0 0,-1 0-1,25 24 173,0 1-173,25-25 1</inkml:trace>
-  <inkml:trace contextRef="#ctx0" brushRef="#br0" timeOffset="-163812.73">4253 14312 0,'0'24'94,"0"1"-78,0-1-1,0 0-15,0 1 0,0-1 16,0 1-16,0-1 16,0 25-16,24-25 0,-24 1 15,0-1-15,0 25 0,24-24 16,-24-1-16,0 0 16,0 1-16,0-1 0,0 1 15,0-1 1,0 1-1,25-25 1,-1 0 0,1-25-1,-1 25-15,1 0 16,-1 0 0,0 0-16,1 0 0,-1 0 15,1 0-15,-1 0 16,1 0-16,-1 0 0,25 0 15,-25 0-15,1 0 16,-1 0-16,1 0 0,-1 0 16,25 0-16,-25 0 0,1 0 15,-1 0 1,1 0-16,-1 0 0,0 0 16,1 0-16,-25-24 0,24 24 15,1 0-15,-25-25 16,24 25-16,-24-24 15,0-1 1,0 1 0,-24 24-16,24-24 15,-25-1 1,25 1-16,0-1 16,-24 1-16,24-1 15,0 1-15,0-25 0,0 25 16,0-1-16,0 1 0,0-1 15,-25 1-15,25 0 16,0-1-16,0 1 16,-24 24-1,24-25 17,0 1 30,-24 24-62,-1 0 31,1 0-31,-1 0 16,1 0 0,-25 0-16,25 0 0,-1 0 15,-24 0-15,0 0 0,1 0 16,-1 24-16,0-24 15,0 0-15,25 0 0,-25 25 16,24-25-16,1 0 16,-1 0-1</inkml:trace>
-  <inkml:trace contextRef="#ctx0" brushRef="#br0" timeOffset="-161928.73">6109 14165 0,'0'25'62,"0"-1"-46,0 1 0,0-1-16,0 0 0,24 1 15,-24-1-15,0 1 0,25-1 16,-25 25-16,0-25 16,0 1-16,0-1 0,24 1 15,-24-1-15,0 0 16,0 1-16,0-1 0,24-24 15,-24 25-15,25-25 79,-1 0-48,1 0-31,-1 0 15,1 0-15,-1 0 16,0-25 0,1 25-16,-1 0 15,1 0-15,-1 0 16,1 0-16,-1 0 0,0 0 16,1 0-16,24 0 0,-25 0 15,1 0-15,-1 0 16,0 0-16,25-24 0,-24 24 15,-1 0-15,25 0 16,-25 0-16,25 0 0,-24-25 16,23 25-16,1 0 0,0 0 15,-24 0-15,23 0 16,1-24-16,0 24 0,0 0 16,-25 0-16,25 0 15,-24 0-15,23 0 0,-23 0 16,-1 0-16,1 0 15,-25-24 17,0-1-1,-25 25-15,25-24-16,0-1 15,-24 25-15,24-24 16,0 0-1,-25 24-15,25-25 0,-24 1 16,24-1-16,0 1 16,-24-1-1,24 1-15,0 0 0,0-1 16,-25 25 0,25-24-16,0-1 15,0 1 32,0-1-16,0 1 1,-24 24-17,24-24 1,-25 24-16,1 0 15,0 0 1,-1 0-16,1 0 16,-1 0-16,1 0 0,-25 0 15,25 0-15,-25 0 0,0 0 16,0 0-16,0 0 16,0 0-16,1 0 0,-1 0 15,0 0-15,0 24 16,0-24-16,0 0 0,0 0 15,25 0-15,-25 0 16,25 0-16,-1 0 0,-24 0 16,25 0-16,0 0 0,-25 0 15,24 24-15,1-24 16,-1 0-16,1 0 0,0 0 16,-1 0-16,1 0 15,-1 0-15,1 0 16,0 0 15</inkml:trace>
-  <inkml:trace contextRef="#ctx0" brushRef="#br0" timeOffset="-160206.73">4521 15484 0,'0'-24'16,"0"-1"-1,25 25 1,-25-24 0,0 48 15,0 1-16,0-1-15,0 25 16,0-25-16,0 1 0,0 24 16,0-25-16,0 25 15,24-25-15,-24 25 0,0-24 16,25-1-16,-25 25 0,0-25 16,24 1-16,-24-1 15,0 1-15,24-1 0,-24 0 16,0 1-16,25-25 15,-25 24-15,24-24 79,1-24-64,-1 24 1,1 0-16,-1-25 15,0 25-15,25 0 0,0-24 16,0 24-16,0 0 16,0-24-16,24 24 0,-24 0 15,24 0-15,-24 0 0,0-25 16,24 25-16,-49 0 16,25 0-16,-24 0 0,24 0 15,-25 0-15,0 0 16,1 0-16,-1-24 15,1 24 1,-25-25 0,24 25-16,-24-24 15,0-1 1,0 1 0,0 0-1,-24-1-15,24 1 16,-25-1-16,25-23 15,0 23-15,0 1 16,-24-25-16,24 24 0,0 1 16,0-25-16,0 25 0,0-1 15,0 1-15,0-1 16,0 1-16,0 0 0,0-1 16,0 1-16,0-1 31,-25 25 63,1 0-79,0 0 1,-1 0-16,1 0 0,-1 0 15,-24 0-15,25 0 16,-25 0-16,0 0 0,0 0 16,-24 0-16,24 0 15,-24 25-15,24-25 0,0 0 16,-24 0-16,24 0 16,0 0-16,1 0 0,-1 0 15,0 0-15,0 0 0,25 0 16,-1 0-16,1 0 15,-1 0-15,1 0 0,-1 0 16,25 24 15,-24-24-15,24 25 0,-24-1-1,48-24 1</inkml:trace>
-  <inkml:trace contextRef="#ctx0" brushRef="#br0" timeOffset="-158688.73">6158 15289 0,'0'-25'0,"0"1"15,24 24-15,-24-25 16,0 1 0,0 48 15,0 1-15,0-1-1,25 25-15,-25-24 0,24 23 16,-24-23-16,24 24 15,-24 0-15,25-25 0,-25 25 16,24-25-16,-24 1 0,25-1 16,-25 25-16,24-25 15,-24 1-15,0-1 16,0 1-16,0-1 16,0 0-1,24-24 16,1 0 1,-1 0-17,1 0-15,-1 0 16,1 0 0,-1 0-16,25 0 15,-25 0-15,1-24 0,-1 24 16,25 0-16,-25 0 15,25-24-15,0 24 0,0 0 16,0-25-16,24 25 16,-24 0-16,24-24 0,0 24 15,1 0-15,-1 0 0,0-25 16,1 25-16,-26 0 16,26 0-16,-26 0 0,1 0 15,0 0-15,0 0 16,-25 0-16,1 0 0,-1 0 15,1 0-15,-1 0 0,1 0 32,-25-24-32,0 0 47,0-1-47,-25 1 15,25-25 1,-24 24-16,24 1 15,-25 0-15,1-25 0,24 24 16,-25-24-16,1 1 16,0-1-16,24 24 0,-25-24 15,25 1-15,-24 23 16,-1-24-16,25 25 0,-24-1 16,24 1-16,-25 0 15,25-1-15,0 1 16,-24 24-16,24-25 15,0 50 48,-24-25-32,-1 24-31,1-24 16,-1 0-16,1 0 0,0 25 15,-1-25-15,-24 0 16,25 0-16,-25 0 0,0 24 16,0-24-16,0 0 15,-24 0-15,24 0 0,-24 0 16,24 0-16,-24 0 0,0 0 16,24 0-16,-24 0 15,24 0-15,0 0 0,-24 0 16,24 0-16,0 0 15,0 0-15,25 0 0,-25 24 16,24-24-16,-23 0 0,23 25 16,1-25-16,-1 24 15,1 1 1,24-1 0,24-24 15</inkml:trace>
-  <inkml:trace contextRef="#ctx0" brushRef="#br0" timeOffset="-157966.73">4497 14507 0,'-25'0'31,"1"0"-31,24 25 0,-24-25 16,-1 0-16,25 24 15,-24 0-15,24 1 16,-25-25-16,25 24 0,0 1 16,25-25-1,-1 24-15,1-24 16,-1 0-16,0 0 16,1 0-16,-1 0 0,1 0 15,-1 0-15</inkml:trace>
-  <inkml:trace contextRef="#ctx0" brushRef="#br0" timeOffset="-157733.73">4717 14532 0,'24'24'63,"-24"0"-63,0 1 15,25-1 1,-25 1-16,24-1 16,-24 1-16</inkml:trace>
-  <inkml:trace contextRef="#ctx0" brushRef="#br0" timeOffset="-157103.73">6573 14385 0,'0'-24'0,"-25"24"15,25-25-15,-24 25 16,24-24 0,-24 24-1,24 24 1,-25-24-1,25 25-15,-24-1 16,24 1-16,0-1 16,0 0-16,24-24 15,1 25-15,-1-25 16,25 0-16,-25 0 16,25 0-16,-24 0 0</inkml:trace>
-  <inkml:trace contextRef="#ctx0" brushRef="#br0" timeOffset="-156761.73">6817 14312 0,'-24'0'0,"24"-25"16,24 1-1,0 24 1,1-24-16,-1 24 16,1 0-16,-1 0 0,1 0 15,-1 0 1,-24 24-16,0 0 0,-24 1 16,-1-1-16,1 1 15,-1-1-15,1 1 16,24-1-16,-25-24 0,25 24 15,25-24-15,-1 0 16,1 25-16,24-25 0,24 0 16,0 0-16,0-25 0,1 25 15,23-24-15</inkml:trace>
-  <inkml:trace contextRef="#ctx0" brushRef="#br0" timeOffset="-155837.73">4814 15533 0,'25'0'0,"-25"24"47,-25-24-47,25 25 15,-24-1-15,24 1 16,-24-1-16,24 0 16,0 1-16,0-1 15,0 1-15,24-1 16,0-24-16,1 25 0,-1-25 16,1 0-16,23 0 15,-23-25-15,24 25 0</inkml:trace>
-  <inkml:trace contextRef="#ctx0" brushRef="#br0" timeOffset="-155406.73">5083 15606 0,'0'-24'15,"24"-1"16,1 1-31,-1 0 16,1 24 0,-1-25-16,1 25 15,-1 0 1,-24 25 0,0-1-16,-24 0 15,24 1 1,-25-25-16,25 24 15,0 1-15,25-25 16,-1 24 0,0-24-16,1 0 15,-1 0-15,25 0 0,-24 25 16,-1-25-16,0 0 16,1 0-16,-1 24 0,1-24 15,-1 0-15,-24 24 16,-24-24-16,-1 25 15,1-25-15,-25 24 0,25-24 16,-25 0-16,0 0 16,24 0-16</inkml:trace>
-  <inkml:trace contextRef="#ctx0" brushRef="#br0" timeOffset="-154890.73">6695 15362 0,'-24'0'16,"24"-24"-16,-25 24 16,25-25-1,-24 25 1,-1 25 0,1-1-1,-1 0-15,25 1 0,-24-1 16,24 1-16,0-1 15,0 1-15,24-25 0,1 24 16,-1 0-16,1-24 16,24 0-16,-1 0 0,1 0 15,0 0-15</inkml:trace>
-  <inkml:trace contextRef="#ctx0" brushRef="#br0" timeOffset="-154457.73">6988 15240 0,'0'-25'16,"24"25"31,1 25-32,-1-1 1,-24 1-16,0-1 16,25-24-16,-25 25 15,24-25-15,-24 24 16,25-24-16,-1 0 16,0 0-1,1-24-15,-1-1 16,-24 1-16,25-1 15,-25 1-15,0-1 16,0 1-16,24 0 0,-24-1 16,25 25-1,-25 25-15,0-1 16,24 25-16,-24-25 0,24 50 16,1-26-16,-25 1 15,24 25-15,1-26 0,-25 26 16</inkml:trace>
-  <inkml:trace contextRef="#ctx0" brushRef="#br0" timeOffset="-140142.73">4570 16021 0,'0'-24'16,"-24"24"46,24 24-46,-25 1-16,-24-1 15,25 25-15,-25-24 16,0 23-16,-24-23 0,24 24 16,-24-25-16,0 25 15,24-25-15,-24 1 0,24-1 16,0 1-16,24-1 15,1-24-15,0 24 0,-1-24 16,1 25-16</inkml:trace>
-  <inkml:trace contextRef="#ctx0" brushRef="#br0" timeOffset="-139500.73">3373 16705 0,'-24'0'15,"0"0"1,-1 0-16,1 25 16,-1-25-16,1 24 0,-1 25 15,1-25-15,0 1 16,-1 24-16,1-25 0,24 0 15,0 25-15,24-24 16,1-1-16,-1-24 0,0 25 16,25-25-16,-24 24 0,24-24 15,-1 0-15,1-24 16,-24 24-16</inkml:trace>
-  <inkml:trace contextRef="#ctx0" brushRef="#br0" timeOffset="-138991.73">3618 16803 0,'-25'-24'16,"25"48"30,0 0-46,0 1 16,25-1-16,-25 1 0,0-1 16,0 1-16,24-1 15,-24 0-15,25 1 16,-25-1 0,0-48 15,0-1-16,-25 1-15,25 0 0,-24-1 16,24 1-16,0-1 16,-25-24-16,25 25 0,-24 0 15,24-25-15,0 24 0,0 1 16,0-1 0,24 25-16,1-24 0,-1 24 15,1 0-15,-1 24 16,0 1-1,-24-1-15,0 1 16,0-1 0,-24-24-16,0 25 0,-1-1 15,1-24 1,-1 0-16,25 24 0</inkml:trace>
-  <inkml:trace contextRef="#ctx0" brushRef="#br0" timeOffset="-138600.73">4008 16705 0,'-24'0'0,"0"0"16,-1 0-1,25 25 16,0-1-15,25 1-16,-25-1 16,0 0-16,24 1 0,0-1 15,-24 1-15,25-1 16,-1-24-16,1 25 16,-1-25-16,1-25 15,-1 25-15,-24-24 16,24-1-16,1 1 0,-25-1 15,0 1-15,0-25 16,0 25-16,0-1 0,0-24 16,0 25-16,0 0 15,-25-1-15,25 1 16,0 48 0,25-24-16,-25 25 15</inkml:trace>
-  <inkml:trace contextRef="#ctx0" brushRef="#br0" timeOffset="-137993.73">7110 15753 0,'0'24'16,"25"-24"-1,-1 0-15,0 25 0,1-1 16,24 0-16,-25 1 0,49-1 15,-24 1-15,0-1 16,0 25-16,0-25 0,-25 25 16,25-24-16,-25-1 15,1 25-15,-25-25 0,24 1 16,-24-1-16,0 1 0</inkml:trace>
-  <inkml:trace contextRef="#ctx0" brushRef="#br0" timeOffset="-137646.73">7916 16510 0,'25'-25'31,"-50"25"0,1 0-31,-1 25 16,1-25 0,-1 24-16,1 1 0,0-25 15,-1 24-15,25 25 0,0-25 16,0 1-16,0-1 15,25-24-15,-1 25 0,0-1 16,1-24-16,24 0 16,-25 0-16,25-24 0,0 24 15</inkml:trace>
-  <inkml:trace contextRef="#ctx0" brushRef="#br0" timeOffset="-137153.73">8136 16510 0,'24'0'31,"1"0"1,-1 24-17,-24 1 1,0-1-16,25-24 0,-25 25 15,0-1-15,0 0 16,0 1-16,24-1 0,-24 1 16,0-1-1,0-48 17,-24-1-32,24 1 15,-25-1-15,25 1 16,-24-25-16,24 25 0,0-1 15,0-24-15,0 25 16,0 0-16,0-1 0,24 1 16,1-1-16,-1 25 15,0 0-15,1 0 16,-25 25-16,24-25 0,1 24 16,-25 1-16,24-25 15,-24 24-15,0 0 0,-24-24 16,24 25-16,-25-25 0,1 24 15,-1-24-15,1 0 16,0 0-16</inkml:trace>
-  <inkml:trace contextRef="#ctx0" brushRef="#br0" timeOffset="-136781.73">8527 16412 0,'24'0'16,"1"0"-16,-25 25 47,0-1-31,0 0-16,0 1 15,0-1 1,24 1-16,0-1 0,-24 1 15,25-1-15,-1 0 0,1 1 16,-1-25-16,25 24 16,-25-24-16,25 0 0,0-24 15,-25 24-15,25-25 0,-24 1 16,-1 0-16,-24-1 16,0-24-16,0 25 0,0-25 15,-24 25-15,24-25 16,-25 0-16,-24 25 0,49-1 15,-24 1-15,0 24 0,-1-25 16,1 25 0</inkml:trace>
-  <inkml:trace contextRef="#ctx0" brushRef="#br0" timeOffset="-136002.73">7574 14507 0,'25'0'15,"-1"-24"1,25 24-16,0-25 16,24 25-16,0-24 0,1 24 15,23 0-15,1-25 16,-25 25-16,25 0 0,-25-24 15,0 24-15,1 0 0,-25 0 16,-1-24-16,-23 24 16,-50 0 15,1 0-31</inkml:trace>
-  <inkml:trace contextRef="#ctx0" brushRef="#br0" timeOffset="-135647.73">9357 14385 0,'0'-24'0,"-24"24"31,-1 0-15,1 0-16,-25 0 0,25 24 15,-25 0-15,24 1 16,-24-1-16,25 1 0,0-1 16,-1 1-16,1-1 15,24 0-15,0 1 0,24-1 16,1 1-16,-1-25 15,0 24-15,25-24 0,0 25 16,-24-25-16,23 0 0,1 0 16,0-25-16,0 25 15</inkml:trace>
-  <inkml:trace contextRef="#ctx0" brushRef="#br0" timeOffset="-135143.73">9504 14434 0,'24'0'15,"-24"24"17,0 1-17,0-1 1,0 1-1,0-1-15,0 0 0,0 1 16,24-1 0,-24 1-16,0-1 15,0-48 17,-24-1-17,24 1 1,-24-1-16,24 1 0,-25-25 15,1 25-15,24-1 0,-25-24 16,25 25-16,0-25 16,0 25-16,0-1 0,0 1 15,25 0-15,-1-1 16,1 1-16,-1 24 0,25-25 16,-25 25-16,25 0 0,-24 25 15,-1-1-15,0-24 16,1 25-16,-25-1 0,0 0 15,-25 1-15,25-1 0,-48-24 16,23 25-16,1-1 16,-25-24-16,24 24 0,1-24 15</inkml:trace>
-  <inkml:trace contextRef="#ctx0" brushRef="#br0" timeOffset="-134760.73">9870 14263 0,'24'0'16,"-24"-24"-16,0 48 47,0 0-32,0 1-15,25-1 16,-25 1-16,0 24 0,24-25 16,-24 25-16,25-25 15,-1 1-15,0-1 0,1-24 16,-1 24-16,1-24 0,24 0 16,-25 0-16,0 0 15,1 0-15,-1-24 0,1 0 16,-1-1-16,-24 1 15,0-1-15,0-23 0,0-1 16,0 24-16,-24-24 0,-1 1 16,1-1-16,-1 24 15,1 1-15,0-1 0</inkml:trace>
-  <inkml:trace contextRef="#ctx0" brushRef="#br0" timeOffset="-133889.73">4131 14580 0,'0'-24'16,"24"24"-1,-24-24 1,-24 24 0,-25-25-1,24 25-15,-24 0 0,1 0 16,-26 0-16,-23 0 16,23 25-16,-23-25 0,-25 0 15,24 0-15,0 0 0,0 24 16,25-24-16,0 0 15,24 0-15,0 0 0,0 0 16,25 0-16,0 0 16,-1 24-16</inkml:trace>
-  <inkml:trace contextRef="#ctx0" brushRef="#br0" timeOffset="-132539.73">27 13188 0,'-24'0'16,"24"-24"0,24 24 46,-24 24-62,0 1 16,25-1-16,-25 1 15,24 23-15,-24 1 0,25 0 16,-1 0-16,-24 0 16,25 0-16,-1 24 0,0-24 15,-24-25-15,25 25 16,-25-25-16,24 25 0,-24-24 15,25-25 17,-25-25-32,24 1 15,1-1-15,-25 1 16,24 0-16,0-1 16,1 1-16,-1 24 15,-24-25-15,25 25 16,-1 0-16,1 0 15,-1 0-15,0 0 0,1 0 16,-1 0-16,1 0 16,-1 0-16,0 0 0,1 0 15,-1 0 1,-24-24-16,0 0 16,0-1-1,0 1-15,-24-1 0,-1 1 16,25-1-16,-24-23 0,0 23 15,-1 1-15,1-25 16,24 24-16,-25 1 0,25 0 16,0-1-16,-24 1 15,24 48 1,0 1-16,24-1 16,-24 25-16,25 0 15,-25 0-15,24-1 0,-24 26 16,25-1-16,-1-24 0,0 0 15,1 24-15,-1-24 16,1 0-16,-1-25 0,1 25 16,-1-25-16,0 1 15,-24-1-15,25 1 0,-1-1 16,-24 0 0,25-24-1,-25-24 32</inkml:trace>
-  <inkml:trace contextRef="#ctx0" brushRef="#br0" timeOffset="-132048.73">1273 13433 0,'-24'0'0,"-1"0"0,25-25 15,-24 25-15,-1 0 16,1 0-16,0 25 0,-1-1 15,1 0-15,-1 1 16,25-1-16,-24 25 0,24-24 16,0 23-16,24 1 0,1-24 15,-1 24-15,1-25 16,23 0-16,1 1 0,24-1 16,-24-24-16,0 25 15,0-25-15,0 0 0,0-25 16,0 25-16,-25-24 0,0-1 15,1 1-15,-1 0 16,-24-1-16</inkml:trace>
-  <inkml:trace contextRef="#ctx0" brushRef="#br0" timeOffset="-131544.73">1664 13457 0,'0'-24'16,"0"-1"0,-25 25-1,25 25-15,0-1 16,0 0-16,25 1 0,-25-1 16,24 1-16,-24-1 15,25 25-15,-25-25 0,24 1 16,0-1-16,-24 1 15,0-1-15,25-24 0,-25 25 16,-25-50 0,1 1-1,0-1-15,24 1 16,-25-1-16,1-23 16,-1 23-16,1-24 0,0 0 15,-1 1-15,1-1 0,-1 0 16,25 0-16,0 0 15,25 25-15,-25-1 0,24 1 16,25-1-16,-25 25 16,25 0-16,-24 0 0,23 25 15,1-25-15,-24 24 0,-1 1 16,-24-1-16,0 1 16,0-1-16,0 0 0,-24 1 15,-1-1-15,1 1 0,-25-1 16,25 1-16,-1-25 15,1 24-15,-1-24 0,1 0 16</inkml:trace>
-  <inkml:trace contextRef="#ctx0" brushRef="#br0" timeOffset="-131123.73">2030 13213 0,'0'-25'16,"-24"25"0,-1 0 15,25 25-31,0-1 16,25 25-1,-25-25-15,24 25 0,-24 0 16,25 0-16,-25 0 0,24-25 15,-24 25-15,24-24 16,1 23-16,-25-23 0,24-25 16,1 24-16,-1-24 15,1-24-15,-1-1 16,0 1-16,1-25 0,-1 0 16,-24 0-16,25 1 15,-25-1-15,0 0 0,0 0 16,0 0-16,-25 25 15,25-25-15,0 24 0,-24 1 16,24 0-16,-25 24 16,25 24-1,25-24-15,-25 24 16,24 1-16</inkml:trace>
+  <inkml:trace contextRef="#ctx0" brushRef="#br0" timeOffset="-165630.75">3813 14898 0,'-24'24'16,"24"1"15,0-1-31,0 1 16,0-1-16,-25 0 16,25 1-16,0-1 0,0 1 15,0-1-15,0 25 0,25-25 16,-25 1-16,24-1 15,-24 25-15,0-24 0,24 23 16,-24-23-16,0-1 16,25 25-16,-25-24 0,0 23 15,0-23-15,0 24 0,0-25 16,0 1-16,0 23 16,0-23-16,0 24 0,0-25 15,0 0-15,0 1 16,0-1-16,0 1 0,0-1 15,0 1-15,0-1 0,0 0 16,24 1-16,-24-1 16,0 1-16,0-1 0,0 1 15,25-1-15,-25 0 16,0 1 0,0-1-16,24-24 15,-24 25-15,0-1 16,25-24-16,-25 24 15,24-24 1,-24 25-16,24-25 16,1 0-16,-1 0 15,1 0-15,-1 0 16,1 0-16,23 0 16,-23-25-16,-1 25 15,25 0-15,-25 0 0,25 0 16,25-24-16,-26 24 0,1 0 15,25 0-15,-1 0 16,0-24-16,0 24 0,1 0 16,-1 0-16,0 0 0,0 0 15,25 0-15,-25 0 16,1 0-16,-1 0 0,0-25 16,0 25-16,1 0 15,23 0-15,-23 0 0,-1 0 16,25-24-16,-25 24 0,0 0 15,25 0-15,0-25 16,-25 25-16,0 0 0,0 0 16,25-24-16,-25 24 15,-24 0-15,24 0 0,1 0 16,-1 0-16,-24 0 16,24 0-16,0-24 0,-24 24 15,25 0-15,-26 0 0,26 0 16,-25 0-16,-1 0 15,26 0-15,-26 0 0,1 0 16,0 0-16,-24 0 0,23 0 16,1 0-16,0 0 15,-24-25-15,23 25 0,-23 0 16,24 0-16,-25 0 16,0 0-16,1 0 0,-1 0 15,1 0-15,-1 0 0,1 0 16,-1 0-1,0 0-15,1 0 16,-1 0 0,-24-24-16,25 24 15,-1-25-15,1 1 32,-25-1-32,0 1 15,0 0 1,0-1-16,0 1 15,0-1-15,0 1 16,0-1-16,-25 1 16,25 0-16,0-25 0,0 24 15,0 1-15,0 0 16,0-1-16,0-24 0,0 25 16,0-1-16,0-23 0,0 23 15,0-24-15,0 25 16,0-25-16,0 25 0,0-25 15,0 24-15,0-24 16,0 25-16,0-25 0,0 25 16,0-25-16,0 24 0,0 1 15,0-25-15,0 25 16,-24-1-16,24 1 0,0 0 16,0-1-16,0 1 15,0-1 1,0 1-16,24-1 15,-24 1 1,0 0-16,0-1 16,-24 1-16,-1-1 15,25 1 1,-24-1-16,24 1 16,0 0-1,0-1 1,0 1-16,0-1 15,0 1 1,0 0 0,24-1-1,-24 1 1,0-1 0,0 1 15,0-1-16,0 1 1,0 0 0,0-1-1,0 1 1,0-1 0,0 1-16,25 24 0,-25-25 15,0 1-15,0 0 16,24 24-1,-24-25-15,0 1 16,0-1-16,0 1 16,0-1-1,-24 25 1,-1 0 0,1 0-1,-1 0-15,1 0 16,0 0-1,-1 0-15,1 0 32,-1 0-17,1 0 1,-1 0 0,1-24 15,0 24-16,-1 0 1,25-24 0,-24 24-16,-1 0 15,1 0-15,0 0 16,-1-25-16,1 25 0,-25 0 16,24 0-16,-23 0 15,23 0-15,-24 0 0,25 0 16,-25 0-16,25 0 0,-25-24 15,24 24-15,-23 0 16,23 0-16,1 0 0,-25 0 16,24 0-16,-23 0 0,23 0 15,1 0-15,-25 0 16,24 0-16,-23 0 0,-1 0 16,0 0-16,0 0 15,0 0-15,0 24 0,0-24 16,1 0-16,-26 0 15,26 0-15,-1 0 0,-25 0 16,26 0-16,-26 25 0,25-25 16,1 0-16,-26 0 15,26 0-15,-26 0 0,25 0 16,1 0-16,-26 0 0,25 0 16,1 0-16,-26 0 15,25 0-15,1 0 0,-1 24 16,0-24-16,0 0 15,0 0-15,0 0 0,25 24 16,-25-24-16,0 0 0,0 0 16,1 25-16,-1-25 15,0 0-15,0 0 0,0 0 16,0 0-16,25 24 16,-25-24-16,25 0 0,-25 0 15,24 0-15,-23 0 0,23 0 16,1 0-16,-1 0 15,-24 0-15,25 25 0,0-25 16,-1 0-16,1 0 16,-1 0-16,1 0 0,-1 24 15,-23-24-15,23 0 0,1 0 16,-1 0-16,1 0 16,-1 0-16,-23 0 0,23 25 15,1-25-15,-1 0 16,1 0-16,0 0 0,-1 0 15,1 0-15,-25 24 0,24-24 16,1 0-16,0 0 16,24 24-16,-25-24 0,1 0 15,-1 0-15,1 0 16,-1 25 0,1-25-1,0 0 1,-1 0-1,1 0 1,-1 0-16,1 0 16,0 0-1,-1 0 1,1 0 0,-1 0-1,25 24 173,0 1-173,25-25 1</inkml:trace>
+  <inkml:trace contextRef="#ctx0" brushRef="#br0" timeOffset="-163812.75">4253 14312 0,'0'24'94,"0"1"-78,0-1-1,0 0-15,0 1 0,0-1 16,0 1-16,0-1 16,0 25-16,24-25 0,-24 1 15,0-1-15,0 25 0,24-24 16,-24-1-16,0 0 16,0 1-16,0-1 0,0 1 15,0-1 1,0 1-1,25-25 1,-1 0 0,1-25-1,-1 25-15,1 0 16,-1 0 0,0 0-16,1 0 0,-1 0 15,1 0-15,-1 0 16,1 0-16,-1 0 0,25 0 15,-25 0-15,1 0 16,-1 0-16,1 0 0,-1 0 16,25 0-16,-25 0 0,1 0 15,-1 0 1,1 0-16,-1 0 0,0 0 16,1 0-16,-25-24 0,24 24 15,1 0-15,-25-25 16,24 25-16,-24-24 15,0-1 1,0 1 0,-24 24-16,24-24 15,-25-1 1,25 1-16,0-1 16,-24 1-16,24-1 15,0 1-15,0-25 0,0 25 16,0-1-16,0 1 0,0-1 15,-25 1-15,25 0 16,0-1-16,0 1 16,-24 24-1,24-25 17,0 1 30,-24 24-62,-1 0 31,1 0-31,-1 0 16,1 0 0,-25 0-16,25 0 0,-1 0 15,-24 0-15,0 0 0,1 0 16,-1 24-16,0-24 15,0 0-15,25 0 0,-25 25 16,24-25-16,1 0 16,-1 0-1</inkml:trace>
+  <inkml:trace contextRef="#ctx0" brushRef="#br0" timeOffset="-161928.75">6109 14165 0,'0'25'62,"0"-1"-46,0 1 0,0-1-16,0 0 0,24 1 15,-24-1-15,0 1 0,25-1 16,-25 25-16,0-25 16,0 1-16,0-1 0,24 1 15,-24-1-15,0 0 16,0 1-16,0-1 0,24-24 15,-24 25-15,25-25 79,-1 0-48,1 0-31,-1 0 15,1 0-15,-1 0 16,0-25 0,1 25-16,-1 0 15,1 0-15,-1 0 16,1 0-16,-1 0 0,0 0 16,1 0-16,24 0 0,-25 0 15,1 0-15,-1 0 16,0 0-16,25-24 0,-24 24 15,-1 0-15,25 0 16,-25 0-16,25 0 0,-24-25 16,23 25-16,1 0 0,0 0 15,-24 0-15,23 0 16,1-24-16,0 24 0,0 0 16,-25 0-16,25 0 15,-24 0-15,23 0 0,-23 0 16,-1 0-16,1 0 15,-25-24 17,0-1-1,-25 25-15,25-24-16,0-1 15,-24 25-15,24-24 16,0 0-1,-25 24-15,25-25 0,-24 1 16,24-1-16,0 1 16,-24-1-1,24 1-15,0 0 0,0-1 16,-25 25 0,25-24-16,0-1 15,0 1 32,0-1-16,0 1 1,-24 24-17,24-24 1,-25 24-16,1 0 15,0 0 1,-1 0-16,1 0 16,-1 0-16,1 0 0,-25 0 15,25 0-15,-25 0 0,0 0 16,0 0-16,0 0 16,0 0-16,1 0 0,-1 0 15,0 0-15,0 24 16,0-24-16,0 0 0,0 0 15,25 0-15,-25 0 16,25 0-16,-1 0 0,-24 0 16,25 0-16,0 0 0,-25 0 15,24 24-15,1-24 16,-1 0-16,1 0 0,0 0 16,-1 0-16,1 0 15,-1 0-15,1 0 16,0 0 15</inkml:trace>
+  <inkml:trace contextRef="#ctx0" brushRef="#br0" timeOffset="-160206.75">4521 15484 0,'0'-24'16,"0"-1"-1,25 25 1,-25-24 0,0 48 15,0 1-16,0-1-15,0 25 16,0-25-16,0 1 0,0 24 16,0-25-16,0 25 15,24-25-15,-24 25 0,0-24 16,25-1-16,-25 25 0,0-25 16,24 1-16,-24-1 15,0 1-15,24-1 0,-24 0 16,0 1-16,25-25 15,-25 24-15,24-24 79,1-24-64,-1 24 1,1 0-16,-1-25 15,0 25-15,25 0 0,0-24 16,0 24-16,0 0 16,0-24-16,24 24 0,-24 0 15,24 0-15,-24 0 0,0-25 16,24 25-16,-49 0 16,25 0-16,-24 0 0,24 0 15,-25 0-15,0 0 16,1 0-16,-1-24 15,1 24 1,-25-25 0,24 25-16,-24-24 15,0-1 1,0 1 0,0 0-1,-24-1-15,24 1 16,-25-1-16,25-23 15,0 23-15,0 1 16,-24-25-16,24 24 0,0 1 16,0-25-16,0 25 0,0-1 15,0 1-15,0-1 16,0 1-16,0 0 0,0-1 16,0 1-16,0-1 31,-25 25 63,1 0-79,0 0 1,-1 0-16,1 0 0,-1 0 15,-24 0-15,25 0 16,-25 0-16,0 0 0,0 0 16,-24 0-16,24 0 15,-24 25-15,24-25 0,0 0 16,-24 0-16,24 0 16,0 0-16,1 0 0,-1 0 15,0 0-15,0 0 0,25 0 16,-1 0-16,1 0 15,-1 0-15,1 0 0,-1 0 16,25 24 15,-24-24-15,24 25 0,-24-1-1,48-24 1</inkml:trace>
+  <inkml:trace contextRef="#ctx0" brushRef="#br0" timeOffset="-158688.75">6158 15289 0,'0'-25'0,"0"1"15,24 24-15,-24-25 16,0 1 0,0 48 15,0 1-15,0-1-1,25 25-15,-25-24 0,24 23 16,-24-23-16,24 24 15,-24 0-15,25-25 0,-25 25 16,24-25-16,-24 1 0,25-1 16,-25 25-16,24-25 15,-24 1-15,0-1 16,0 1-16,0-1 16,0 0-1,24-24 16,1 0 1,-1 0-17,1 0-15,-1 0 16,1 0 0,-1 0-16,25 0 15,-25 0-15,1-24 0,-1 24 16,25 0-16,-25 0 15,25-24-15,0 24 0,0 0 16,0-25-16,24 25 16,-24 0-16,24-24 0,0 24 15,1 0-15,-1 0 0,0-25 16,1 25-16,-26 0 16,26 0-16,-26 0 0,1 0 15,0 0-15,0 0 16,-25 0-16,1 0 0,-1 0 15,1 0-15,-1 0 0,1 0 32,-25-24-32,0 0 47,0-1-47,-25 1 15,25-25 1,-24 24-16,24 1 15,-25 0-15,1-25 0,24 24 16,-25-24-16,1 1 16,0-1-16,24 24 0,-25-24 15,25 1-15,-24 23 16,-1-24-16,25 25 0,-24-1 16,24 1-16,-25 0 15,25-1-15,0 1 16,-24 24-16,24-25 15,0 50 48,-24-25-32,-1 24-31,1-24 16,-1 0-16,1 0 0,0 25 15,-1-25-15,-24 0 16,25 0-16,-25 0 0,0 24 16,0-24-16,0 0 15,-24 0-15,24 0 0,-24 0 16,24 0-16,-24 0 0,0 0 16,24 0-16,-24 0 15,24 0-15,0 0 0,-24 0 16,24 0-16,0 0 15,0 0-15,25 0 0,-25 24 16,24-24-16,-23 0 0,23 25 16,1-25-16,-1 24 15,1 1 1,24-1 0,24-24 15</inkml:trace>
+  <inkml:trace contextRef="#ctx0" brushRef="#br0" timeOffset="-157966.75">4497 14507 0,'-25'0'31,"1"0"-31,24 25 0,-24-25 16,-1 0-16,25 24 15,-24 0-15,24 1 16,-25-25-16,25 24 0,0 1 16,25-25-1,-1 24-15,1-24 16,-1 0-16,0 0 16,1 0-16,-1 0 0,1 0 15,-1 0-15</inkml:trace>
+  <inkml:trace contextRef="#ctx0" brushRef="#br0" timeOffset="-157733.75">4717 14532 0,'24'24'63,"-24"0"-63,0 1 15,25-1 1,-25 1-16,24-1 16,-24 1-16</inkml:trace>
+  <inkml:trace contextRef="#ctx0" brushRef="#br0" timeOffset="-157103.75">6573 14385 0,'0'-24'0,"-25"24"15,25-25-15,-24 25 16,24-24 0,-24 24-1,24 24 1,-25-24-1,25 25-15,-24-1 16,24 1-16,0-1 16,0 0-16,24-24 15,1 25-15,-1-25 16,25 0-16,-25 0 16,25 0-16,-24 0 0</inkml:trace>
+  <inkml:trace contextRef="#ctx0" brushRef="#br0" timeOffset="-156761.75">6817 14312 0,'-24'0'0,"24"-25"16,24 1-1,0 24 1,1-24-16,-1 24 16,1 0-16,-1 0 0,1 0 15,-1 0 1,-24 24-16,0 0 0,-24 1 16,-1-1-16,1 1 15,-1-1-15,1 1 16,24-1-16,-25-24 0,25 24 15,25-24-15,-1 0 16,1 25-16,24-25 0,24 0 16,0 0-16,0-25 0,1 25 15,23-24-15</inkml:trace>
+  <inkml:trace contextRef="#ctx0" brushRef="#br0" timeOffset="-155837.75">4814 15533 0,'25'0'0,"-25"24"47,-25-24-47,25 25 15,-24-1-15,24 1 16,-24-1-16,24 0 16,0 1-16,0-1 15,0 1-15,24-1 16,0-24-16,1 25 0,-1-25 16,1 0-16,23 0 15,-23-25-15,24 25 0</inkml:trace>
+  <inkml:trace contextRef="#ctx0" brushRef="#br0" timeOffset="-155406.75">5083 15606 0,'0'-24'15,"24"-1"16,1 1-31,-1 0 16,1 24 0,-1-25-16,1 25 15,-1 0 1,-24 25 0,0-1-16,-24 0 15,24 1 1,-25-25-16,25 24 15,0 1-15,25-25 16,-1 24 0,0-24-16,1 0 15,-1 0-15,25 0 0,-24 25 16,-1-25-16,0 0 16,1 0-16,-1 24 0,1-24 15,-1 0-15,-24 24 16,-24-24-16,-1 25 15,1-25-15,-25 24 0,25-24 16,-25 0-16,0 0 16,24 0-16</inkml:trace>
+  <inkml:trace contextRef="#ctx0" brushRef="#br0" timeOffset="-154890.75">6695 15362 0,'-24'0'16,"24"-24"-16,-25 24 16,25-25-1,-24 25 1,-1 25 0,1-1-1,-1 0-15,25 1 0,-24-1 16,24 1-16,0-1 15,0 1-15,24-25 0,1 24 16,-1 0-16,1-24 16,24 0-16,-1 0 0,1 0 15,0 0-15</inkml:trace>
+  <inkml:trace contextRef="#ctx0" brushRef="#br0" timeOffset="-154457.75">6988 15240 0,'0'-25'16,"24"25"31,1 25-32,-1-1 1,-24 1-16,0-1 16,25-24-16,-25 25 15,24-25-15,-24 24 16,25-24-16,-1 0 16,0 0-1,1-24-15,-1-1 16,-24 1-16,25-1 15,-25 1-15,0-1 16,0 1-16,24 0 0,-24-1 16,25 25-1,-25 25-15,0-1 16,24 25-16,-24-25 0,24 50 16,1-26-16,-25 1 15,24 25-15,1-26 0,-25 26 16</inkml:trace>
+  <inkml:trace contextRef="#ctx0" brushRef="#br0" timeOffset="-140142.75">4570 16021 0,'0'-24'16,"-24"24"46,24 24-46,-25 1-16,-24-1 15,25 25-15,-25-24 16,0 23-16,-24-23 0,24 24 16,-24-25-16,0 25 15,24-25-15,-24 1 0,24-1 16,0 1-16,24-1 15,1-24-15,0 24 0,-1-24 16,1 25-16</inkml:trace>
+  <inkml:trace contextRef="#ctx0" brushRef="#br0" timeOffset="-139500.75">3373 16705 0,'-24'0'15,"0"0"1,-1 0-16,1 25 16,-1-25-16,1 24 0,-1 25 15,1-25-15,0 1 16,-1 24-16,1-25 0,24 0 15,0 25-15,24-24 16,1-1-16,-1-24 0,0 25 16,25-25-16,-24 24 0,24-24 15,-1 0-15,1-24 16,-24 24-16</inkml:trace>
+  <inkml:trace contextRef="#ctx0" brushRef="#br0" timeOffset="-138991.75">3618 16803 0,'-25'-24'16,"25"48"30,0 0-46,0 1 16,25-1-16,-25 1 0,0-1 16,0 1-16,24-1 15,-24 0-15,25 1 16,-25-1 0,0-48 15,0-1-16,-25 1-15,25 0 0,-24-1 16,24 1-16,0-1 16,-25-24-16,25 25 0,-24 0 15,24-25-15,0 24 0,0 1 16,0-1 0,24 25-16,1-24 0,-1 24 15,1 0-15,-1 24 16,0 1-1,-24-1-15,0 1 16,0-1 0,-24-24-16,0 25 0,-1-1 15,1-24 1,-1 0-16,25 24 0</inkml:trace>
+  <inkml:trace contextRef="#ctx0" brushRef="#br0" timeOffset="-138600.75">4008 16705 0,'-24'0'0,"0"0"16,-1 0-1,25 25 16,0-1-15,25 1-16,-25-1 16,0 0-16,24 1 0,0-1 15,-24 1-15,25-1 16,-1-24-16,1 25 16,-1-25-16,1-25 15,-1 25-15,-24-24 16,24-1-16,1 1 0,-25-1 15,0 1-15,0-25 16,0 25-16,0-1 0,0-24 16,0 25-16,0 0 15,-25-1-15,25 1 16,0 48 0,25-24-16,-25 25 15</inkml:trace>
+  <inkml:trace contextRef="#ctx0" brushRef="#br0" timeOffset="-137993.75">7110 15753 0,'0'24'16,"25"-24"-1,-1 0-15,0 25 0,1-1 16,24 0-16,-25 1 0,49-1 15,-24 1-15,0-1 16,0 25-16,0-25 0,-25 25 16,25-24-16,-25-1 15,1 25-15,-25-25 0,24 1 16,-24-1-16,0 1 0</inkml:trace>
+  <inkml:trace contextRef="#ctx0" brushRef="#br0" timeOffset="-137646.75">7916 16510 0,'25'-25'31,"-50"25"0,1 0-31,-1 25 16,1-25 0,-1 24-16,1 1 0,0-25 15,-1 24-15,25 25 0,0-25 16,0 1-16,0-1 15,25-24-15,-1 25 0,0-1 16,1-24-16,24 0 16,-25 0-16,25-24 0,0 24 15</inkml:trace>
+  <inkml:trace contextRef="#ctx0" brushRef="#br0" timeOffset="-137153.75">8136 16510 0,'24'0'31,"1"0"1,-1 24-17,-24 1 1,0-1-16,25-24 0,-25 25 15,0-1-15,0 0 16,0 1-16,24-1 0,-24 1 16,0-1-1,0-48 17,-24-1-32,24 1 15,-25-1-15,25 1 16,-24-25-16,24 25 0,0-1 15,0-24-15,0 25 16,0 0-16,0-1 0,24 1 16,1-1-16,-1 25 15,0 0-15,1 0 16,-25 25-16,24-25 0,1 24 16,-25 1-16,24-25 15,-24 24-15,0 0 0,-24-24 16,24 25-16,-25-25 0,1 24 15,-1-24-15,1 0 16,0 0-16</inkml:trace>
+  <inkml:trace contextRef="#ctx0" brushRef="#br0" timeOffset="-136781.75">8527 16412 0,'24'0'16,"1"0"-16,-25 25 47,0-1-31,0 0-16,0 1 15,0-1 1,24 1-16,0-1 0,-24 1 15,25-1-15,-1 0 0,1 1 16,-1-25-16,25 24 16,-25-24-16,25 0 0,0-24 15,-25 24-15,25-25 0,-24 1 16,-1 0-16,-24-1 16,0-24-16,0 25 0,0-25 15,-24 25-15,24-25 16,-25 0-16,-24 25 0,49-1 15,-24 1-15,0 24 0,-1-25 16,1 25 0</inkml:trace>
+  <inkml:trace contextRef="#ctx0" brushRef="#br0" timeOffset="-136002.75">7574 14507 0,'25'0'15,"-1"-24"1,25 24-16,0-25 16,24 25-16,0-24 0,1 24 15,23 0-15,1-25 16,-25 25-16,25 0 0,-25-24 15,0 24-15,1 0 0,-25 0 16,-1-24-16,-23 24 16,-50 0 15,1 0-31</inkml:trace>
+  <inkml:trace contextRef="#ctx0" brushRef="#br0" timeOffset="-135647.75">9357 14385 0,'0'-24'0,"-24"24"31,-1 0-15,1 0-16,-25 0 0,25 24 15,-25 0-15,24 1 16,-24-1-16,25 1 0,0-1 16,-1 1-16,1-1 15,24 0-15,0 1 0,24-1 16,1 1-16,-1-25 15,0 24-15,25-24 0,0 25 16,-24-25-16,23 0 0,1 0 16,0-25-16,0 25 15</inkml:trace>
+  <inkml:trace contextRef="#ctx0" brushRef="#br0" timeOffset="-135143.75">9504 14434 0,'24'0'15,"-24"24"17,0 1-17,0-1 1,0 1-1,0-1-15,0 0 0,0 1 16,24-1 0,-24 1-16,0-1 15,0-48 17,-24-1-17,24 1 1,-24-1-16,24 1 0,-25-25 15,1 25-15,24-1 0,-25-24 16,25 25-16,0-25 16,0 25-16,0-1 0,0 1 15,25 0-15,-1-1 16,1 1-16,-1 24 0,25-25 16,-25 25-16,25 0 0,-24 25 15,-1-1-15,0-24 16,1 25-16,-25-1 0,0 0 15,-25 1-15,25-1 0,-48-24 16,23 25-16,1-1 16,-25-24-16,24 24 0,1-24 15</inkml:trace>
+  <inkml:trace contextRef="#ctx0" brushRef="#br0" timeOffset="-134760.75">9870 14263 0,'24'0'16,"-24"-24"-16,0 48 47,0 0-32,0 1-15,25-1 16,-25 1-16,0 24 0,24-25 16,-24 25-16,25-25 15,-1 1-15,0-1 0,1-24 16,-1 24-16,1-24 0,24 0 16,-25 0-16,0 0 15,1 0-15,-1-24 0,1 0 16,-1-1-16,-24 1 15,0-1-15,0-23 0,0-1 16,0 24-16,-24-24 0,-1 1 16,1-1-16,-1 24 15,1 1-15,0-1 0</inkml:trace>
+  <inkml:trace contextRef="#ctx0" brushRef="#br0" timeOffset="-133889.75">4131 14580 0,'0'-24'16,"24"24"-1,-24-24 1,-24 24 0,-25-25-1,24 25-15,-24 0 0,1 0 16,-26 0-16,-23 0 16,23 25-16,-23-25 0,-25 0 15,24 0-15,0 0 0,0 24 16,25-24-16,0 0 15,24 0-15,0 0 0,0 0 16,25 0-16,0 0 16,-1 24-16</inkml:trace>
+  <inkml:trace contextRef="#ctx0" brushRef="#br0" timeOffset="-132539.75">27 13188 0,'-24'0'16,"24"-24"0,24 24 46,-24 24-62,0 1 16,25-1-16,-25 1 15,24 23-15,-24 1 0,25 0 16,-1 0-16,-24 0 16,25 0-16,-1 24 0,0-24 15,-24-25-15,25 25 16,-25-25-16,24 25 0,-24-24 15,25-25 17,-25-25-32,24 1 15,1-1-15,-25 1 16,24 0-16,0-1 16,1 1-16,-1 24 15,-24-25-15,25 25 16,-1 0-16,1 0 15,-1 0-15,0 0 0,1 0 16,-1 0-16,1 0 16,-1 0-16,0 0 0,1 0 15,-1 0 1,-24-24-16,0 0 16,0-1-1,0 1-15,-24-1 0,-1 1 16,25-1-16,-24-23 0,0 23 15,-1 1-15,1-25 16,24 24-16,-25 1 0,25 0 16,0-1-16,-24 1 15,24 48 1,0 1-16,24-1 16,-24 25-16,25 0 15,-25 0-15,24-1 0,-24 26 16,25-1-16,-1-24 0,0 0 15,1 24-15,-1-24 16,1 0-16,-1-25 0,1 25 16,-1-25-16,0 1 15,-24-1-15,25 1 0,-1-1 16,-24 0 0,25-24-1,-25-24 32</inkml:trace>
+  <inkml:trace contextRef="#ctx0" brushRef="#br0" timeOffset="-132048.75">1273 13433 0,'-24'0'0,"-1"0"0,25-25 15,-24 25-15,-1 0 16,1 0-16,0 25 0,-1-1 15,1 0-15,-1 1 16,25-1-16,-24 25 0,24-24 16,0 23-16,24 1 0,1-24 15,-1 24-15,1-25 16,23 0-16,1 1 0,24-1 16,-24-24-16,0 25 15,0-25-15,0 0 0,0-25 16,0 25-16,-25-24 0,0-1 15,1 1-15,-1 0 16,-24-1-16</inkml:trace>
+  <inkml:trace contextRef="#ctx0" brushRef="#br0" timeOffset="-131544.75">1664 13457 0,'0'-24'16,"0"-1"0,-25 25-1,25 25-15,0-1 16,0 0-16,25 1 0,-25-1 16,24 1-16,-24-1 15,25 25-15,-25-25 0,24 1 16,0-1-16,-24 1 15,0-1-15,25-24 0,-25 25 16,-25-50 0,1 1-1,0-1-15,24 1 16,-25-1-16,1-23 16,-1 23-16,1-24 0,0 0 15,-1 1-15,1-1 0,-1 0 16,25 0-16,0 0 15,25 25-15,-25-1 0,24 1 16,25-1-16,-25 25 16,25 0-16,-24 0 0,23 25 15,1-25-15,-24 24 0,-1 1 16,-24-1-16,0 1 16,0-1-16,0 0 0,-24 1 15,-1-1-15,1 1 0,-25-1 16,25 1-16,-1-25 15,1 24-15,-1-24 0,1 0 16</inkml:trace>
+  <inkml:trace contextRef="#ctx0" brushRef="#br0" timeOffset="-131123.75">2030 13213 0,'0'-25'16,"-24"25"0,-1 0 15,25 25-31,0-1 16,25 25-1,-25-25-15,24 25 0,-24 0 16,25 0-16,-25 0 0,24-25 15,-24 25-15,24-24 16,1 23-16,-25-23 0,24-25 16,1 24-16,-1-24 15,1-24-15,-1-1 16,0 1-16,1-25 0,-1 0 16,-24 0-16,25 1 15,-25-1-15,0 0 0,0 0 16,0 0-16,-25 25 15,25-25-15,0 24 0,-24 1 16,24 0-16,-25 24 16,25 24-1,25-24-15,-25 24 16,24 1-16</inkml:trace>
   <inkml:trace contextRef="#ctx0" brushRef="#br0" timeOffset="-130476.73">2787 13701 0,'-24'-24'16,"24"-1"-16,-25 1 15,25 0-15,-24-1 16,24 1-16,0-1 16,0 1-16,24 24 31,1 0-31,-1 0 16,1 24-16,24 1 0,-1-25 15,1 49-15,0-25 16,24 25-16,-24-25 0,0 25 15,24-25-15,-24 25 16,0-24-16,0-1 0,-25 1 16,25-1-16,-24 0 0,-25 1 15,24-25-15,-24-25 47</inkml:trace>
   <inkml:trace contextRef="#ctx0" brushRef="#br0" timeOffset="-130133.73">3447 13774 0,'0'-24'32,"0"0"-17,24 24 1,1 0-1,-25 24-15,24 0 16,-24 1-16,0-1 16,24 1-16,-24-1 15,0 1-15,25-1 0,-25 0 16,0 1 0,0-1-16,0 1 15,-25-25 16,1 0-31,0 24 0,-1-24 16,1 0-16,-25 0 16,24 25-16,-23-25 0,-1 24 15,0 0-15,24 1 0</inkml:trace>
   <inkml:trace contextRef="#ctx0" brushRef="#br0" timeOffset="-128820.73">1566 14849 0,'-24'0'16,"-1"0"-1,1 0-15,-1 0 16,-23 0-16,23 0 15,-24 25-15,25-1 0,-25 0 16,25 1-16,-1-1 0,1 25 16,24 0-16,0 0 15,0-25-15,24 25 0,1-25 16,-1 1-16,0-1 16,25-24-16,0 0 0,0 0 15,0 0-15,0 0 0,0-24 16,24-1-16,-49 1 15</inkml:trace>
@@ -3598,16 +4271,16 @@
   <inkml:trace contextRef="#ctx0" brushRef="#br0" timeOffset="78692.72">15610 5886 0,'0'24'15,"0"0"17,0 1-1,-24-1-16,24 1-15,-24-1 16,-1 0-16,25 25 0,-24 0 16,-1-24-16,25 23 15,-24 1-15,24-24 0,0 24 16,24-25-16,1-24 16,24 24-16,24-24 0,0-24 15,0 24-15,50-49 0,-1 25 16,0-25-16,24 0 15,25 0-15,-24 0 0,24 0 16,24 1-16,-24-1 0,0 0 16,0 0-16,0 25 15,-24-1-15,-25 1 0,0 24 16,0-25-16,-49 25 16,0 0-16,-24 0 0,0 0 15,-24 0-15,-1 0 0,0-24 16,-24 0 15,-24 24-15,24-25-16,-24 25 15,-1 0-15</inkml:trace>
   <inkml:trace contextRef="#ctx0" brushRef="#br0" timeOffset="198308.72">5817 2515 0,'-25'0'16,"1"0"-16,0 0 0,-25 0 16,24 0-16,-24 0 15,1 25-15,-1-25 0,0 24 16,0 0-16,0 1 16,0-1-16,1 25 0,23 0 15,1 24-15,-1-24 0,25 24 16,0 1-16,49-26 15,-24 26-15,23-25 0,26 24 16,-26-49-16,50 25 16,-25-24-16,25-1 0,0-24 15,-25 0-15,25-24 0,-1-1 16,1-24-16,-25 0 16,1 1-16,-25-1 0,24-25 15,-49 1-15,1-25 16,-25 25-16,-25 0 0,-24 0 15,1-1-15,-50 26 0,0-1 16,-24 24-16,-25 25 16,1 25-16,-49-1 0,24 25 15</inkml:trace>
   <inkml:trace contextRef="#ctx0" brushRef="#br0" timeOffset="199951.72">6061 7253 0,'-24'0'16,"-1"0"-16,1 0 0,-25 0 15,0 25-15,0-25 0,-24 24 16,0 0-16,-1 1 16,1-1-16,0 25 0,0 0 15,-1 24-15,26-24 16,-1 24-16,24 1 0,1 23 15,24-23-15,0-1 0,0 0 16,49 0-16,0 1 16,24-25-16,0-1 0,25 1 15,24-24-15,0-1 16,24-24-16,1 0 0,-25-24 16,25-1-16,-25-24 0,0-24 15,-24 24-15,-25-48 16,-24 23-16,-25-23 0,-24-1 15,0 0-15,-49 25 16,-24-25-16,-25 49 0,-24 1 16,-49-1-16,0 49 0,-24 0 15,-25 24-15,25 25 16,-1 0-16</inkml:trace>
-  <inkml:trace contextRef="#ctx0" brushRef="#br0" timeOffset="53458.72">10579 7351 0,'25'24'16,"-1"-24"0,1 0-1,-25 25 1,24-1-16,-24 1 15,0-1 1,0 0-16,-24 25 0,24-24 16,0 24-16,0-1 0,0 1 15,0 0-15,0 0 16,0 0-16,0 0 0,0-1 16,24 1-16,0 0 15,-24 0-15,25 0 0,-25 24 16,0-24-16,24 24 0,-24 0 15,0 1-15,0-1 16,0 0-16,0 25 0,0-25 16,0 1-16,0-1 15,0 25-15,0-50 0,0 26 16,25-1-16,-25-24 0,0 0 16,0 24-16,0-49 15,0 25-15,0 0 0,0 0 16,0-25-16,0 25 15,0-25-15,0 1 0,0 24 16,0-25-16,0 1 0,0-1 16,0 0-16,0 1 15,0-1-15,0 1 0,0-1 16,0 1-16,0 23 0,0-23 16,0-1-16,0 1 15,0-1-15,0 1 0,0-1 16,0 0-1,0 1-15,0-1 0,0 1 16,0-1-16,0 1 16,24-1-16,-24 0 0,25 1 15,-1-25 1,0 0 0,-24 24 15,25-24-16,-25 25-15,24-25 16,1 0 0,-1 0-16,1-25 15,-1 25-15,0 0 0,1 0 16,-1 0-16,25-24 16,0 24-16,0 0 0,0 0 15,-1 0-15,26 0 16,-1-25-16,25 25 0,-1 0 15,1-24-15,24 0 16,0 24-16,0-25 0,25 1 16,-25 24-16,0-25 0,-24 25 15,24 0-15,-49-24 16,25 24-16,-49 0 0,24 0 16,-24-25-16,0 25 0,0 0 15,-1-24-15,1 24 16,0-24-16,-24 24 0,23-25 15,-23 25-15,24-24 16,-25 24-16,1 0 0,-1 0 16,-24-25-16,0 1 31,0-1-31</inkml:trace>
-  <inkml:trace contextRef="#ctx0" brushRef="#br0" timeOffset="54513.72">13754 7351 0,'0'24'47,"0"1"-31,0-1-16,25 25 15,-25-25-15,0 50 0,0-25 16,0 24-16,0 0 16,0 0-16,0 1 0,0-1 15,0 25-15,0-25 16,24 25-16,-24-25 0,25 0 15,-25 25-15,24-25 0,-24 25 16,24-25-16,-24 0 16,0 25-16,0-25 0,0 1 15,0-1-15,0-24 16,0 24-16,25 0 0,-25-24 16,0 24-16,24-24 0,-24 0 15,0 0-15,25 0 16,-25-1-16,24-23 0,-24-1 15,0 25-15,0-24 16,0-1-16,0 0 16,0 1-16,0-1 31,0 1-15,0-1-1,0 1 1,0-1-16,0 0 15,0 1 1,0-1-16,0 1 31,0-1 1,0-48 30,0-1-46,-24 25-16,-1-24 15,1 24-15,-1-25 0,-23 25 16,-1 0-16,0 0 16,-24 25-16,-25-25 0,0 24 15,1-24-15,-1 25 0,25-25 16,-25 0-16,25 0 15,-1 0-15</inkml:trace>
-  <inkml:trace contextRef="#ctx0" brushRef="#br0" timeOffset="55496.72">11214 8352 0,'-24'0'16,"-1"0"-1,1 0 1,0 0-16,-1 0 16,1 0-16,-1-24 0,1 24 15,-1 0-15,25-25 16,25 25 46,-1 0-62,25 0 0,0 0 16,0 0-16,49 0 16,-1 0-16,25-24 0,1 24 15,47-24-15,1 24 16,0-25-16,25 1 0,-1 24 15,-24-25-15,0 25 0,-24 0 16,-1-24-16,-24 24 16,-24 0-16,-25 0 0,0 0 15,-24-25-15,0 25 0,-24 0 16,-1 0-16,0 0 16,1 0-16,-1 0 0,1 0 15</inkml:trace>
-  <inkml:trace contextRef="#ctx0" brushRef="#br0" timeOffset="56260.72">11043 9329 0,'-24'0'0,"-1"0"15,1 25 16,24-1 1,24-24-32,1 0 15,-1 0-15,25 0 0,24-24 16,1 24-16,23 0 16,26-25-16,23 25 0,1-24 15,24-1-15,0 25 0,-1-24 16,1-1-16,25 25 15,-25-24-15,0 24 0,-25 0 16,1-24-16,-1 24 16,-24-25-16,1 25 0,-26 0 15,-23 0-15,-1 0 16,-49 0-16,25-24 0,-73 24 47,-1 0-32</inkml:trace>
-  <inkml:trace contextRef="#ctx0" brushRef="#br0" timeOffset="62458.72">11288 6594 0,'0'-25'15,"24"25"1,-24-24-16,24 0 15,-24-1-15,0 1 16,0-1-16,0 1 16,-24-1-16,0 25 0,-1-24 15,-24 24-15,0 24 16,25 1-16,-25-1 0,0 1 16,25-1-16,-1 1 0,1 23 15,24-23-15,0-1 16,0 1-16,0-1 0,0 0 15,24-24-15,1 25 0,24-25 16,-25 0-16,25 0 16,-25-25-16,25 25 0,0-24 15,-24 0-15,-1-1 16,0 25-16,1-24 0,-25-1 16,24 1-16,-24 48 31,0 1-31,0-1 15,0 25-15,0 0 16,-24 0-16,24 0 0,0-1 16,0 26-16,0-25 0,0-1 15,0-23-15,0-1 16,0 1-16,24-1 0</inkml:trace>
-  <inkml:trace contextRef="#ctx0" brushRef="#br0" timeOffset="62920.72">11825 6862 0,'0'-24'0,"-25"0"16,1 24 0,24 24-1,-24 0-15,24 1 0,-25-1 16,25 1-16,0-1 15,0 25-15,25-25 0,-1 1 16,0-1-16,1 1 0,24-25 16,-25 24-16,25-24 15,-25 0-15,25 0 0,-24-24 16,-1 24-16,-24-25 16,0 1-16,0-1 0,0 1 15,-24-25-15,-1 25 0,-24-25 16,1 0-16,-1 25 15,0-25-15,0 0 0,0 0 16,25 0-16,-1 25 16,25-25-16,0 25 0,25-1 15,-1 1-15,25-1 0,0 25 16,0 0-16,0 0 16,-1 0-16,-23 0 0,-1 25 15,1 24-15,-25-25 0,0 25 16,-25 0-16,1-1 15,-1 1-15,-23 0 0,23 0 16,-24 0-16,25-25 16,-1 1-16</inkml:trace>
-  <inkml:trace contextRef="#ctx0" brushRef="#br0" timeOffset="63261.72">12387 6691 0,'24'0'0,"-48"0"32,-1 0-17,1 25 1,-1-1-16,1 1 0,0 24 16,24-25-16,0 25 0,0 0 15,0 0-15,0-25 16,24 25-16,0-25 0,25-24 15,-24 25-15,23-25 16,1 0-16,0-25 0,0 1 16,0-1-16,-25-23 0,1-1 15,-1 0-15,-24-24 16,-24 24-16,24 0 0,-49 0 16,0 0-16,0 25 15,-24 24-15,24 0 0,-24 0 16,0 24-16,24 1 0,0 23 15</inkml:trace>
-  <inkml:trace contextRef="#ctx0" brushRef="#br0" timeOffset="63945.72">11239 7620 0,'-25'0'0,"-24"0"0,49-25 15,-24 25-15,0-24 16,24-1-16,0 1 15,24-1-15,25 25 16,-25-24-16,1 24 16,24 0-16,-1 0 0,-23 0 15,24 0-15,-25 24 0,1-24 16,-1 25-16,-24-1 16,0 1-16,0-1 0,-24 1 15,24-1-15,-25 0 16,1 1-16,-25-1 0,24 1 15,1-1 1,0 1-16,48-1 16,0-24-16,1 24 15,-1-24-15,25 25 16,0-25-16,-25 24 0,25-24 16,-24 25-16,-1-1 0,1-24 15,-25 24-15,0 1 16,-25-1-16,25 1 0,-49-25 15,25 24-15,-25 1 16,0-25-16,0 0 0,25 0 16,-25 0-16,0 0 0,25-25 15,-1 25-15,1-24 16</inkml:trace>
-  <inkml:trace contextRef="#ctx0" brushRef="#br0" timeOffset="64317.72">11874 7742 0,'0'-25'0,"-25"25"0,1-24 16,-1-1-16,25 1 16,25 0-1,-1 24-15,1 0 0,-1 0 16,1 0-16,23 0 15,-23 24-15,24 0 0,-25-24 16,-24 25-16,0-1 0,0 1 16,0-1-16,-24 0 15,-1 25-15,1-49 0,-25 25 16,25-1-16,-1 1 16,1-25-16,24 24 0,-25-24 15,50 24 1,-1-24-1,1 0-15,-1 0 0,25 0 16,0 0-16,0 0 16,-1 0-16,1 0 0,0-24 15,0 24-15,0-24 0</inkml:trace>
-  <inkml:trace contextRef="#ctx0" brushRef="#br0" timeOffset="64665.72">12533 7766 0,'25'-24'0,"-1"-1"15,-24 1 1,24 24 0,-24 24-1,-24 1-15,0-25 16,24 24-16,-25 25 16,1-25-16,-1 1 0,25 24 15,-24-25-15,24 25 16,0-25-16,0 1 0,24-1 15,1 1-15,24-25 0,-1 24 16,1-24-16,0 0 16,-24-24-16,23 24 0,1-25 15,0 1-15,-25-1 16,1 1-16,-1-1 0,-24-23 16,0-1-16,0 24 15,-24-23-15,24 23 0,-49 1 16,25-1-16,-25 25 0,0 0 15,0 0-15,0 0 16,0 0-16,1 25 0,-1-25 16</inkml:trace>
+  <inkml:trace contextRef="#ctx0" brushRef="#br0" timeOffset="53458.71">10579 7351 0,'25'24'16,"-1"-24"0,1 0-1,-25 25 1,24-1-16,-24 1 15,0-1 1,0 0-16,-24 25 0,24-24 16,0 24-16,0-1 0,0 1 15,0 0-15,0 0 16,0 0-16,0 0 0,0-1 16,24 1-16,0 0 15,-24 0-15,25 0 0,-25 24 16,0-24-16,24 24 0,-24 0 15,0 1-15,0-1 16,0 0-16,0 25 0,0-25 16,0 1-16,0-1 15,0 25-15,0-50 0,0 26 16,25-1-16,-25-24 0,0 0 16,0 24-16,0-49 15,0 25-15,0 0 0,0 0 16,0-25-16,0 25 15,0-25-15,0 1 0,0 24 16,0-25-16,0 1 0,0-1 16,0 0-16,0 1 15,0-1-15,0 1 0,0-1 16,0 1-16,0 23 0,0-23 16,0-1-16,0 1 15,0-1-15,0 1 0,0-1 16,0 0-1,0 1-15,0-1 0,0 1 16,0-1-16,0 1 16,24-1-16,-24 0 0,25 1 15,-1-25 1,0 0 0,-24 24 15,25-24-16,-25 25-15,24-25 16,1 0 0,-1 0-16,1-25 15,-1 25-15,0 0 0,1 0 16,-1 0-16,25-24 16,0 24-16,0 0 0,0 0 15,-1 0-15,26 0 16,-1-25-16,25 25 0,-1 0 15,1-24-15,24 0 16,0 24-16,0-25 0,25 1 16,-25 24-16,0-25 0,-24 25 15,24 0-15,-49-24 16,25 24-16,-49 0 0,24 0 16,-24-25-16,0 25 0,0 0 15,-1-24-15,1 24 16,0-24-16,-24 24 0,23-25 15,-23 25-15,24-24 16,-25 24-16,1 0 0,-1 0 16,-24-25-16,0 1 31,0-1-31</inkml:trace>
+  <inkml:trace contextRef="#ctx0" brushRef="#br0" timeOffset="54513.71">13754 7351 0,'0'24'47,"0"1"-31,0-1-16,25 25 15,-25-25-15,0 50 0,0-25 16,0 24-16,0 0 16,0 0-16,0 1 0,0-1 15,0 25-15,0-25 16,24 25-16,-24-25 0,25 0 15,-25 25-15,24-25 0,-24 25 16,24-25-16,-24 0 16,0 25-16,0-25 0,0 1 15,0-1-15,0-24 16,0 24-16,25 0 0,-25-24 16,0 24-16,24-24 0,-24 0 15,0 0-15,25 0 16,-25-1-16,24-23 0,-24-1 15,0 25-15,0-24 16,0-1-16,0 0 16,0 1-16,0-1 31,0 1-15,0-1-1,0 1 1,0-1-16,0 0 15,0 1 1,0-1-16,0 1 31,0-1 1,0-48 30,0-1-46,-24 25-16,-1-24 15,1 24-15,-1-25 0,-23 25 16,-1 0-16,0 0 16,-24 25-16,-25-25 0,0 24 15,1-24-15,-1 25 0,25-25 16,-25 0-16,25 0 15,-1 0-15</inkml:trace>
+  <inkml:trace contextRef="#ctx0" brushRef="#br0" timeOffset="55496.71">11214 8352 0,'-24'0'16,"-1"0"-1,1 0 1,0 0-16,-1 0 16,1 0-16,-1-24 0,1 24 15,-1 0-15,25-25 16,25 25 46,-1 0-62,25 0 0,0 0 16,0 0-16,49 0 16,-1 0-16,25-24 0,1 24 15,47-24-15,1 24 16,0-25-16,25 1 0,-1 24 15,-24-25-15,0 25 0,-24 0 16,-1-24-16,-24 24 16,-24 0-16,-25 0 0,0 0 15,-24-25-15,0 25 0,-24 0 16,-1 0-16,0 0 16,1 0-16,-1 0 0,1 0 15</inkml:trace>
+  <inkml:trace contextRef="#ctx0" brushRef="#br0" timeOffset="56260.71">11043 9329 0,'-24'0'0,"-1"0"15,1 25 16,24-1 1,24-24-32,1 0 15,-1 0-15,25 0 0,24-24 16,1 24-16,23 0 16,26-25-16,23 25 0,1-24 15,24-1-15,0 25 0,-1-24 16,1-1-16,25 25 15,-25-24-15,0 24 0,-25 0 16,1-24-16,-1 24 16,-24-25-16,1 25 0,-26 0 15,-23 0-15,-1 0 16,-49 0-16,25-24 0,-73 24 47,-1 0-32</inkml:trace>
+  <inkml:trace contextRef="#ctx0" brushRef="#br0" timeOffset="62458.71">11288 6594 0,'0'-25'15,"24"25"1,-24-24-16,24 0 15,-24-1-15,0 1 16,0-1-16,0 1 16,-24-1-16,0 25 0,-1-24 15,-24 24-15,0 24 16,25 1-16,-25-1 0,0 1 16,25-1-16,-1 1 0,1 23 15,24-23-15,0-1 16,0 1-16,0-1 0,0 0 15,24-24-15,1 25 0,24-25 16,-25 0-16,25 0 16,-25-25-16,25 25 0,0-24 15,-24 0-15,-1-1 16,0 25-16,1-24 0,-25-1 16,24 1-16,-24 48 31,0 1-31,0-1 15,0 25-15,0 0 16,-24 0-16,24 0 0,0-1 16,0 26-16,0-25 0,0-1 15,0-23-15,0-1 16,0 1-16,24-1 0</inkml:trace>
+  <inkml:trace contextRef="#ctx0" brushRef="#br0" timeOffset="62920.71">11825 6862 0,'0'-24'0,"-25"0"16,1 24 0,24 24-1,-24 0-15,24 1 0,-25-1 16,25 1-16,0-1 15,0 25-15,25-25 0,-1 1 16,0-1-16,1 1 0,24-25 16,-25 24-16,25-24 15,-25 0-15,25 0 0,-24-24 16,-1 24-16,-24-25 16,0 1-16,0-1 0,0 1 15,-24-25-15,-1 25 0,-24-25 16,1 0-16,-1 25 15,0-25-15,0 0 0,0 0 16,25 0-16,-1 25 16,25-25-16,0 25 0,25-1 15,-1 1-15,25-1 0,0 25 16,0 0-16,0 0 16,-1 0-16,-23 0 0,-1 25 15,1 24-15,-25-25 0,0 25 16,-25 0-16,1-1 15,-1 1-15,-23 0 0,23 0 16,-24 0-16,25-25 16,-1 1-16</inkml:trace>
+  <inkml:trace contextRef="#ctx0" brushRef="#br0" timeOffset="63261.71">12387 6691 0,'24'0'0,"-48"0"32,-1 0-17,1 25 1,-1-1-16,1 1 0,0 24 16,24-25-16,0 25 0,0 0 15,0 0-15,0-25 16,24 25-16,0-25 0,25-24 15,-24 25-15,23-25 16,1 0-16,0-25 0,0 1 16,0-1-16,-25-23 0,1-1 15,-1 0-15,-24-24 16,-24 24-16,24 0 0,-49 0 16,0 0-16,0 25 15,-24 24-15,24 0 0,-24 0 16,0 24-16,24 1 0,0 23 15</inkml:trace>
+  <inkml:trace contextRef="#ctx0" brushRef="#br0" timeOffset="63945.71">11239 7620 0,'-25'0'0,"-24"0"0,49-25 15,-24 25-15,0-24 16,24-1-16,0 1 15,24-1-15,25 25 16,-25-24-16,1 24 16,24 0-16,-1 0 0,-23 0 15,24 0-15,-25 24 0,1-24 16,-1 25-16,-24-1 16,0 1-16,0-1 0,-24 1 15,24-1-15,-25 0 16,1 1-16,-25-1 0,24 1 15,1-1 1,0 1-16,48-1 16,0-24-16,1 24 15,-1-24-15,25 25 16,0-25-16,-25 24 0,25-24 16,-24 25-16,-1-1 0,1-24 15,-25 24-15,0 1 16,-25-1-16,25 1 0,-49-25 15,25 24-15,-25 1 16,0-25-16,0 0 0,25 0 16,-25 0-16,0 0 0,25-25 15,-1 25-15,1-24 16</inkml:trace>
+  <inkml:trace contextRef="#ctx0" brushRef="#br0" timeOffset="64317.71">11874 7742 0,'0'-25'0,"-25"25"0,1-24 16,-1-1-16,25 1 16,25 0-1,-1 24-15,1 0 0,-1 0 16,1 0-16,23 0 15,-23 24-15,24 0 0,-25-24 16,-24 25-16,0-1 0,0 1 16,0-1-16,-24 0 15,-1 25-15,1-49 0,-25 25 16,25-1-16,-1 1 16,1-25-16,24 24 0,-25-24 15,50 24 1,-1-24-1,1 0-15,-1 0 0,25 0 16,0 0-16,0 0 16,-1 0-16,1 0 0,0-24 15,0 24-15,0-24 0</inkml:trace>
+  <inkml:trace contextRef="#ctx0" brushRef="#br0" timeOffset="64665.71">12533 7766 0,'25'-24'0,"-1"-1"15,-24 1 1,24 24 0,-24 24-1,-24 1-15,0-25 16,24 24-16,-25 25 16,1-25-16,-1 1 0,25 24 15,-24-25-15,24 25 16,0-25-16,0 1 0,24-1 15,1 1-15,24-25 0,-1 24 16,1-24-16,0 0 16,-24-24-16,23 24 0,1-25 15,0 1-15,-25-1 16,1 1-16,-1-1 0,-24-23 16,0-1-16,0 24 15,-24-23-15,24 23 0,-49 1 16,25-1-16,-25 25 0,0 0 15,0 0-15,0 0 16,0 0-16,1 25 0,-1-25 16</inkml:trace>
   <inkml:trace contextRef="#ctx0" brushRef="#br0" timeOffset="65811.72">11410 8767 0,'24'0'0,"-24"-24"16,0 48 15,0 1-15,0-1-16,0 1 15,-24-1-15,24 25 0,0-25 16,0 25-16,0 0 0,24 0 16,-24 0-16,25-25 15,-1 25-15,25-25 0,-25-24 16,25 0-16,-25 0 0,25 0 15,-24-24-15,24 24 16,-25-49-16,25 25 0,-49-1 16,24-23-16,1 23 15,-25-24-15,24 25 0,-24-1 16,0 1-16,0 0 0,0 48 31,-24 0-31,24 25 0,0 0 16,0 0-16,0 24 15,24-24-15,-24 24 0,25-24 16,-1 0-16,0-25 0,-24 1 16,25-1-16,-1-24 15,1 0-15</inkml:trace>
   <inkml:trace contextRef="#ctx0" brushRef="#br0" timeOffset="66219.72">12216 8890 0,'0'-25'16,"-25"1"-1,25-1 1,0 50 0,25-25-1,-25 24-15,0 25 16,0-25-16,24 1 0,-24 24 15,0-25-15,0 1 0,24-1 16,1 0 0,-1-24-16,1 0 0,-1 0 15,1-24-15,-1 24 16,0-24-16,1-1 0,-1 1 16,-24-25-16,25 24 0,-25 1 15,0 0-15,0-1 16,24 1-16,-24-1 0,0 50 15,0-1 1,0 1-16,0-1 0,0 25 16,0 0-16,0 0 15,25 24-15,-25-49 0,0 25 16,24-25-16,-24 25 0,0-24 16</inkml:trace>
   <inkml:trace contextRef="#ctx0" brushRef="#br0" timeOffset="66597.72">12924 8816 0,'0'-24'0,"-24"24"16,24-25-1,-25 25-15,1 25 16,24-1-1,0 25-15,0-24 16,0-1-16,0 25 0,0 0 16,0 0-16,24-25 15,-24 25-15,25-25 0,-1 1 16,0-25-16,25 0 16,0 0-16,-25 0 0,25 0 15,0-25-15,-24-24 0,23 25 16,-23-25-16,-25 0 15,0 0-15,0 1 0,0-1 16,-49 0-16,25 24 0,-25-23 16,24 23-16,-24 25 15,1 0-15,-1 0 0,0 0 16,25 25-16,-25-25 16,24 24-16,1 0 0</inkml:trace>
@@ -5989,7 +6662,7 @@
   <inkml:trace contextRef="#ctx0" brushRef="#br0" timeOffset="-168655.73">26060 13897 0,'0'-25'16,"0"1"0,25 24-1,-25-25-15,24 1 31,1-1-15,-1 25 0,-24-24-1,24 24-15,-24-24 0,25 24 16,-25-25-16,0 1 16,0-1-1,0 1-15,-25 24 0,25-25 16,-24 25-16,0-24 15,-1 24-15,1 0 0,24 24 16,-25-24-16,25 25 0,-24-1 16,24 1-16,0-1 15,0 1-15,0-1 0,0 0 16,24 1-16,1 24 16,-25-25-16,24-24 0,25 25 15,-25-1-15,1-24 0,-1 24 16,25-24-16,-24 0 15,-1-24-15,0 24 0,1-24 16</inkml:trace>
   <inkml:trace contextRef="#ctx0" brushRef="#br0" timeOffset="-168175.73">26353 13555 0,'0'-25'0,"0"1"16,-24-1-16,24 1 15,-24 24-15,24 24 16,0 1-16,0-1 16,-25 1-16,25 23 0,0-23 15,0 24-15,0 0 16,0-1-16,0 1 0,0 0 16,0 0-16,0-25 0,25 25 15,-25-24-15,0 23 16,0-23-16,0-1 0,24-24 15,-24 25 1,0-50 0,-24 25-16,24-24 15,0-1-15,-25 1 16,25 0-16,0-1 0,0 1 16,0-1-16,0 1 0,0 0 15,0-1-15,0 1 16,0-25-16,25 24 0,-25 1 15,24 0-15,0 24 16,-24-25-16,25 25 0,-1 0 16,1 0-16,-25 25 15,0-1 1,0 0-16,0 1 0,0-1 16,0 1-16,0-1 15,-25 1-15,1-1 16,-1 0-16</inkml:trace>
   <inkml:trace contextRef="#ctx0" brushRef="#br0" timeOffset="-167888.73">26500 13481 0,'0'25'47,"24"-1"-47,-24 25 16,0-25-16,0 25 16,0-24-16,0 24 0,0-1 15,0-23-15,0 24 0,25 0 16,-25-25-16,24 25 15,1-25-15,-1 1 0,0-25 16,1 24-16,-1-24 16</inkml:trace>
-  <inkml:trace contextRef="#ctx0" brushRef="#br0" timeOffset="-167713.73">26500 13750 0,'-24'-24'16,"-1"24"-16,50-25 31,-1 25-31,25 0 0,-25 0 16,1-24-16,24 24 16,-1 0-16</inkml:trace>
+  <inkml:trace contextRef="#ctx0" brushRef="#br0" timeOffset="-167713.75">26500 13750 0,'-24'-24'16,"-1"24"-16,50-25 31,-1 25-31,25 0 0,-25 0 16,1-24-16,24 24 16,-1 0-16</inkml:trace>
 </inkml:ink>
 </file>
 
@@ -16947,6 +17620,720 @@
           </a:p>
         </p:txBody>
       </p:sp>
+      <mc:AlternateContent xmlns:mc="http://schemas.openxmlformats.org/markup-compatibility/2006" xmlns:p14="http://schemas.microsoft.com/office/powerpoint/2010/main">
+        <mc:Choice Requires="p14">
+          <p:contentPart p14:bwMode="auto" r:id="rId4">
+            <p14:nvContentPartPr>
+              <p14:cNvPr id="3" name="Ink 2">
+                <a:extLst>
+                  <a:ext uri="{FF2B5EF4-FFF2-40B4-BE49-F238E27FC236}">
+                    <a16:creationId xmlns:a16="http://schemas.microsoft.com/office/drawing/2014/main" id="{0FE4A321-130A-4DEE-9990-0FAB2A3C432F}"/>
+                  </a:ext>
+                </a:extLst>
+              </p14:cNvPr>
+              <p14:cNvContentPartPr/>
+              <p14:nvPr/>
+            </p14:nvContentPartPr>
+            <p14:xfrm>
+              <a:off x="2004286" y="1872651"/>
+              <a:ext cx="7421400" cy="668520"/>
+            </p14:xfrm>
+          </p:contentPart>
+        </mc:Choice>
+        <mc:Fallback xmlns="">
+          <p:pic>
+            <p:nvPicPr>
+              <p:cNvPr id="3" name="Ink 2">
+                <a:extLst>
+                  <a:ext uri="{FF2B5EF4-FFF2-40B4-BE49-F238E27FC236}">
+                    <a16:creationId xmlns:a16="http://schemas.microsoft.com/office/drawing/2014/main" id="{0FE4A321-130A-4DEE-9990-0FAB2A3C432F}"/>
+                  </a:ext>
+                </a:extLst>
+              </p:cNvPr>
+              <p:cNvPicPr/>
+              <p:nvPr/>
+            </p:nvPicPr>
+            <p:blipFill>
+              <a:blip r:embed="rId5"/>
+              <a:stretch>
+                <a:fillRect/>
+              </a:stretch>
+            </p:blipFill>
+            <p:spPr>
+              <a:xfrm>
+                <a:off x="1995286" y="1863651"/>
+                <a:ext cx="7439040" cy="686160"/>
+              </a:xfrm>
+              <a:prstGeom prst="rect">
+                <a:avLst/>
+              </a:prstGeom>
+            </p:spPr>
+          </p:pic>
+        </mc:Fallback>
+      </mc:AlternateContent>
+      <mc:AlternateContent xmlns:mc="http://schemas.openxmlformats.org/markup-compatibility/2006" xmlns:p14="http://schemas.microsoft.com/office/powerpoint/2010/main">
+        <mc:Choice Requires="p14">
+          <p:contentPart p14:bwMode="auto" r:id="rId6">
+            <p14:nvContentPartPr>
+              <p14:cNvPr id="28" name="Ink 27">
+                <a:extLst>
+                  <a:ext uri="{FF2B5EF4-FFF2-40B4-BE49-F238E27FC236}">
+                    <a16:creationId xmlns:a16="http://schemas.microsoft.com/office/drawing/2014/main" id="{FFAEFC43-A48B-4888-BCDA-2A319BB0384D}"/>
+                  </a:ext>
+                </a:extLst>
+              </p14:cNvPr>
+              <p14:cNvContentPartPr/>
+              <p14:nvPr/>
+            </p14:nvContentPartPr>
+            <p14:xfrm>
+              <a:off x="2057566" y="1579611"/>
+              <a:ext cx="7737480" cy="917640"/>
+            </p14:xfrm>
+          </p:contentPart>
+        </mc:Choice>
+        <mc:Fallback xmlns="">
+          <p:pic>
+            <p:nvPicPr>
+              <p:cNvPr id="28" name="Ink 27">
+                <a:extLst>
+                  <a:ext uri="{FF2B5EF4-FFF2-40B4-BE49-F238E27FC236}">
+                    <a16:creationId xmlns:a16="http://schemas.microsoft.com/office/drawing/2014/main" id="{FFAEFC43-A48B-4888-BCDA-2A319BB0384D}"/>
+                  </a:ext>
+                </a:extLst>
+              </p:cNvPr>
+              <p:cNvPicPr/>
+              <p:nvPr/>
+            </p:nvPicPr>
+            <p:blipFill>
+              <a:blip r:embed="rId7"/>
+              <a:stretch>
+                <a:fillRect/>
+              </a:stretch>
+            </p:blipFill>
+            <p:spPr>
+              <a:xfrm>
+                <a:off x="2048566" y="1570611"/>
+                <a:ext cx="7755120" cy="935280"/>
+              </a:xfrm>
+              <a:prstGeom prst="rect">
+                <a:avLst/>
+              </a:prstGeom>
+            </p:spPr>
+          </p:pic>
+        </mc:Fallback>
+      </mc:AlternateContent>
+      <mc:AlternateContent xmlns:mc="http://schemas.openxmlformats.org/markup-compatibility/2006" xmlns:p14="http://schemas.microsoft.com/office/powerpoint/2010/main">
+        <mc:Choice Requires="p14">
+          <p:contentPart p14:bwMode="auto" r:id="rId8">
+            <p14:nvContentPartPr>
+              <p14:cNvPr id="40" name="Ink 39">
+                <a:extLst>
+                  <a:ext uri="{FF2B5EF4-FFF2-40B4-BE49-F238E27FC236}">
+                    <a16:creationId xmlns:a16="http://schemas.microsoft.com/office/drawing/2014/main" id="{5A2D53A4-6482-4BF1-89BC-255D2C9D172E}"/>
+                  </a:ext>
+                </a:extLst>
+              </p14:cNvPr>
+              <p14:cNvContentPartPr/>
+              <p14:nvPr/>
+            </p14:nvContentPartPr>
+            <p14:xfrm>
+              <a:off x="6734326" y="1837371"/>
+              <a:ext cx="2374920" cy="361440"/>
+            </p14:xfrm>
+          </p:contentPart>
+        </mc:Choice>
+        <mc:Fallback xmlns="">
+          <p:pic>
+            <p:nvPicPr>
+              <p:cNvPr id="40" name="Ink 39">
+                <a:extLst>
+                  <a:ext uri="{FF2B5EF4-FFF2-40B4-BE49-F238E27FC236}">
+                    <a16:creationId xmlns:a16="http://schemas.microsoft.com/office/drawing/2014/main" id="{5A2D53A4-6482-4BF1-89BC-255D2C9D172E}"/>
+                  </a:ext>
+                </a:extLst>
+              </p:cNvPr>
+              <p:cNvPicPr/>
+              <p:nvPr/>
+            </p:nvPicPr>
+            <p:blipFill>
+              <a:blip r:embed="rId9"/>
+              <a:stretch>
+                <a:fillRect/>
+              </a:stretch>
+            </p:blipFill>
+            <p:spPr>
+              <a:xfrm>
+                <a:off x="6725326" y="1828371"/>
+                <a:ext cx="2392560" cy="379080"/>
+              </a:xfrm>
+              <a:prstGeom prst="rect">
+                <a:avLst/>
+              </a:prstGeom>
+            </p:spPr>
+          </p:pic>
+        </mc:Fallback>
+      </mc:AlternateContent>
+      <mc:AlternateContent xmlns:mc="http://schemas.openxmlformats.org/markup-compatibility/2006" xmlns:p14="http://schemas.microsoft.com/office/powerpoint/2010/main">
+        <mc:Choice Requires="p14">
+          <p:contentPart p14:bwMode="auto" r:id="rId10">
+            <p14:nvContentPartPr>
+              <p14:cNvPr id="71" name="Ink 70">
+                <a:extLst>
+                  <a:ext uri="{FF2B5EF4-FFF2-40B4-BE49-F238E27FC236}">
+                    <a16:creationId xmlns:a16="http://schemas.microsoft.com/office/drawing/2014/main" id="{E4368F06-4302-42FD-8610-A578AB09DCBB}"/>
+                  </a:ext>
+                </a:extLst>
+              </p14:cNvPr>
+              <p14:cNvContentPartPr/>
+              <p14:nvPr/>
+            </p14:nvContentPartPr>
+            <p14:xfrm>
+              <a:off x="8482846" y="5282571"/>
+              <a:ext cx="1648800" cy="329760"/>
+            </p14:xfrm>
+          </p:contentPart>
+        </mc:Choice>
+        <mc:Fallback xmlns="">
+          <p:pic>
+            <p:nvPicPr>
+              <p:cNvPr id="71" name="Ink 70">
+                <a:extLst>
+                  <a:ext uri="{FF2B5EF4-FFF2-40B4-BE49-F238E27FC236}">
+                    <a16:creationId xmlns:a16="http://schemas.microsoft.com/office/drawing/2014/main" id="{E4368F06-4302-42FD-8610-A578AB09DCBB}"/>
+                  </a:ext>
+                </a:extLst>
+              </p:cNvPr>
+              <p:cNvPicPr/>
+              <p:nvPr/>
+            </p:nvPicPr>
+            <p:blipFill>
+              <a:blip r:embed="rId11"/>
+              <a:stretch>
+                <a:fillRect/>
+              </a:stretch>
+            </p:blipFill>
+            <p:spPr>
+              <a:xfrm>
+                <a:off x="8473846" y="5273571"/>
+                <a:ext cx="1666440" cy="347400"/>
+              </a:xfrm>
+              <a:prstGeom prst="rect">
+                <a:avLst/>
+              </a:prstGeom>
+            </p:spPr>
+          </p:pic>
+        </mc:Fallback>
+      </mc:AlternateContent>
+      <mc:AlternateContent xmlns:mc="http://schemas.openxmlformats.org/markup-compatibility/2006" xmlns:p14="http://schemas.microsoft.com/office/powerpoint/2010/main">
+        <mc:Choice Requires="p14">
+          <p:contentPart p14:bwMode="auto" r:id="rId12">
+            <p14:nvContentPartPr>
+              <p14:cNvPr id="83" name="Ink 82">
+                <a:extLst>
+                  <a:ext uri="{FF2B5EF4-FFF2-40B4-BE49-F238E27FC236}">
+                    <a16:creationId xmlns:a16="http://schemas.microsoft.com/office/drawing/2014/main" id="{400864A8-3CF9-4C2A-A3BB-46B24F3DF404}"/>
+                  </a:ext>
+                </a:extLst>
+              </p14:cNvPr>
+              <p14:cNvContentPartPr/>
+              <p14:nvPr/>
+            </p14:nvContentPartPr>
+            <p14:xfrm>
+              <a:off x="4563166" y="5442411"/>
+              <a:ext cx="4616280" cy="765360"/>
+            </p14:xfrm>
+          </p:contentPart>
+        </mc:Choice>
+        <mc:Fallback xmlns="">
+          <p:pic>
+            <p:nvPicPr>
+              <p:cNvPr id="83" name="Ink 82">
+                <a:extLst>
+                  <a:ext uri="{FF2B5EF4-FFF2-40B4-BE49-F238E27FC236}">
+                    <a16:creationId xmlns:a16="http://schemas.microsoft.com/office/drawing/2014/main" id="{400864A8-3CF9-4C2A-A3BB-46B24F3DF404}"/>
+                  </a:ext>
+                </a:extLst>
+              </p:cNvPr>
+              <p:cNvPicPr/>
+              <p:nvPr/>
+            </p:nvPicPr>
+            <p:blipFill>
+              <a:blip r:embed="rId13"/>
+              <a:stretch>
+                <a:fillRect/>
+              </a:stretch>
+            </p:blipFill>
+            <p:spPr>
+              <a:xfrm>
+                <a:off x="4554166" y="5433411"/>
+                <a:ext cx="4633920" cy="783000"/>
+              </a:xfrm>
+              <a:prstGeom prst="rect">
+                <a:avLst/>
+              </a:prstGeom>
+            </p:spPr>
+          </p:pic>
+        </mc:Fallback>
+      </mc:AlternateContent>
+      <mc:AlternateContent xmlns:mc="http://schemas.openxmlformats.org/markup-compatibility/2006" xmlns:p14="http://schemas.microsoft.com/office/powerpoint/2010/main">
+        <mc:Choice Requires="p14">
+          <p:contentPart p14:bwMode="auto" r:id="rId14">
+            <p14:nvContentPartPr>
+              <p14:cNvPr id="87" name="Ink 86">
+                <a:extLst>
+                  <a:ext uri="{FF2B5EF4-FFF2-40B4-BE49-F238E27FC236}">
+                    <a16:creationId xmlns:a16="http://schemas.microsoft.com/office/drawing/2014/main" id="{7F74E6C5-5F09-4E59-B2AA-9F2A1860386D}"/>
+                  </a:ext>
+                </a:extLst>
+              </p14:cNvPr>
+              <p14:cNvContentPartPr/>
+              <p14:nvPr/>
+            </p14:nvContentPartPr>
+            <p14:xfrm>
+              <a:off x="4809406" y="2471691"/>
+              <a:ext cx="264240" cy="544320"/>
+            </p14:xfrm>
+          </p:contentPart>
+        </mc:Choice>
+        <mc:Fallback xmlns="">
+          <p:pic>
+            <p:nvPicPr>
+              <p:cNvPr id="87" name="Ink 86">
+                <a:extLst>
+                  <a:ext uri="{FF2B5EF4-FFF2-40B4-BE49-F238E27FC236}">
+                    <a16:creationId xmlns:a16="http://schemas.microsoft.com/office/drawing/2014/main" id="{7F74E6C5-5F09-4E59-B2AA-9F2A1860386D}"/>
+                  </a:ext>
+                </a:extLst>
+              </p:cNvPr>
+              <p:cNvPicPr/>
+              <p:nvPr/>
+            </p:nvPicPr>
+            <p:blipFill>
+              <a:blip r:embed="rId15"/>
+              <a:stretch>
+                <a:fillRect/>
+              </a:stretch>
+            </p:blipFill>
+            <p:spPr>
+              <a:xfrm>
+                <a:off x="4800406" y="2462691"/>
+                <a:ext cx="281880" cy="561960"/>
+              </a:xfrm>
+              <a:prstGeom prst="rect">
+                <a:avLst/>
+              </a:prstGeom>
+            </p:spPr>
+          </p:pic>
+        </mc:Fallback>
+      </mc:AlternateContent>
+      <mc:AlternateContent xmlns:mc="http://schemas.openxmlformats.org/markup-compatibility/2006" xmlns:p14="http://schemas.microsoft.com/office/powerpoint/2010/main">
+        <mc:Choice Requires="p14">
+          <p:contentPart p14:bwMode="auto" r:id="rId16">
+            <p14:nvContentPartPr>
+              <p14:cNvPr id="91" name="Ink 90">
+                <a:extLst>
+                  <a:ext uri="{FF2B5EF4-FFF2-40B4-BE49-F238E27FC236}">
+                    <a16:creationId xmlns:a16="http://schemas.microsoft.com/office/drawing/2014/main" id="{A520EBE1-63D0-4DE6-A52D-7F981A3EB5A6}"/>
+                  </a:ext>
+                </a:extLst>
+              </p14:cNvPr>
+              <p14:cNvContentPartPr/>
+              <p14:nvPr/>
+            </p14:nvContentPartPr>
+            <p14:xfrm>
+              <a:off x="7306366" y="2482491"/>
+              <a:ext cx="264240" cy="445680"/>
+            </p14:xfrm>
+          </p:contentPart>
+        </mc:Choice>
+        <mc:Fallback xmlns="">
+          <p:pic>
+            <p:nvPicPr>
+              <p:cNvPr id="91" name="Ink 90">
+                <a:extLst>
+                  <a:ext uri="{FF2B5EF4-FFF2-40B4-BE49-F238E27FC236}">
+                    <a16:creationId xmlns:a16="http://schemas.microsoft.com/office/drawing/2014/main" id="{A520EBE1-63D0-4DE6-A52D-7F981A3EB5A6}"/>
+                  </a:ext>
+                </a:extLst>
+              </p:cNvPr>
+              <p:cNvPicPr/>
+              <p:nvPr/>
+            </p:nvPicPr>
+            <p:blipFill>
+              <a:blip r:embed="rId17"/>
+              <a:stretch>
+                <a:fillRect/>
+              </a:stretch>
+            </p:blipFill>
+            <p:spPr>
+              <a:xfrm>
+                <a:off x="7297366" y="2473491"/>
+                <a:ext cx="281880" cy="463320"/>
+              </a:xfrm>
+              <a:prstGeom prst="rect">
+                <a:avLst/>
+              </a:prstGeom>
+            </p:spPr>
+          </p:pic>
+        </mc:Fallback>
+      </mc:AlternateContent>
+      <mc:AlternateContent xmlns:mc="http://schemas.openxmlformats.org/markup-compatibility/2006" xmlns:p14="http://schemas.microsoft.com/office/powerpoint/2010/main">
+        <mc:Choice Requires="p14">
+          <p:contentPart p14:bwMode="auto" r:id="rId18">
+            <p14:nvContentPartPr>
+              <p14:cNvPr id="131" name="Ink 130">
+                <a:extLst>
+                  <a:ext uri="{FF2B5EF4-FFF2-40B4-BE49-F238E27FC236}">
+                    <a16:creationId xmlns:a16="http://schemas.microsoft.com/office/drawing/2014/main" id="{96332096-AAA4-4B75-B829-E61BA16033BE}"/>
+                  </a:ext>
+                </a:extLst>
+              </p14:cNvPr>
+              <p14:cNvContentPartPr/>
+              <p14:nvPr/>
+            </p14:nvContentPartPr>
+            <p14:xfrm>
+              <a:off x="3453286" y="3508131"/>
+              <a:ext cx="1655280" cy="325800"/>
+            </p14:xfrm>
+          </p:contentPart>
+        </mc:Choice>
+        <mc:Fallback xmlns="">
+          <p:pic>
+            <p:nvPicPr>
+              <p:cNvPr id="131" name="Ink 130">
+                <a:extLst>
+                  <a:ext uri="{FF2B5EF4-FFF2-40B4-BE49-F238E27FC236}">
+                    <a16:creationId xmlns:a16="http://schemas.microsoft.com/office/drawing/2014/main" id="{96332096-AAA4-4B75-B829-E61BA16033BE}"/>
+                  </a:ext>
+                </a:extLst>
+              </p:cNvPr>
+              <p:cNvPicPr/>
+              <p:nvPr/>
+            </p:nvPicPr>
+            <p:blipFill>
+              <a:blip r:embed="rId19"/>
+              <a:stretch>
+                <a:fillRect/>
+              </a:stretch>
+            </p:blipFill>
+            <p:spPr>
+              <a:xfrm>
+                <a:off x="3444286" y="3499131"/>
+                <a:ext cx="1672920" cy="343440"/>
+              </a:xfrm>
+              <a:prstGeom prst="rect">
+                <a:avLst/>
+              </a:prstGeom>
+            </p:spPr>
+          </p:pic>
+        </mc:Fallback>
+      </mc:AlternateContent>
+      <mc:AlternateContent xmlns:mc="http://schemas.openxmlformats.org/markup-compatibility/2006" xmlns:p14="http://schemas.microsoft.com/office/powerpoint/2010/main">
+        <mc:Choice Requires="p14">
+          <p:contentPart p14:bwMode="auto" r:id="rId20">
+            <p14:nvContentPartPr>
+              <p14:cNvPr id="144" name="Ink 143">
+                <a:extLst>
+                  <a:ext uri="{FF2B5EF4-FFF2-40B4-BE49-F238E27FC236}">
+                    <a16:creationId xmlns:a16="http://schemas.microsoft.com/office/drawing/2014/main" id="{EFE3831D-A0BA-48CE-A416-2DEB12F371E4}"/>
+                  </a:ext>
+                </a:extLst>
+              </p14:cNvPr>
+              <p14:cNvContentPartPr/>
+              <p14:nvPr/>
+            </p14:nvContentPartPr>
+            <p14:xfrm>
+              <a:off x="6795166" y="3426051"/>
+              <a:ext cx="2472120" cy="360720"/>
+            </p14:xfrm>
+          </p:contentPart>
+        </mc:Choice>
+        <mc:Fallback xmlns="">
+          <p:pic>
+            <p:nvPicPr>
+              <p:cNvPr id="144" name="Ink 143">
+                <a:extLst>
+                  <a:ext uri="{FF2B5EF4-FFF2-40B4-BE49-F238E27FC236}">
+                    <a16:creationId xmlns:a16="http://schemas.microsoft.com/office/drawing/2014/main" id="{EFE3831D-A0BA-48CE-A416-2DEB12F371E4}"/>
+                  </a:ext>
+                </a:extLst>
+              </p:cNvPr>
+              <p:cNvPicPr/>
+              <p:nvPr/>
+            </p:nvPicPr>
+            <p:blipFill>
+              <a:blip r:embed="rId21"/>
+              <a:stretch>
+                <a:fillRect/>
+              </a:stretch>
+            </p:blipFill>
+            <p:spPr>
+              <a:xfrm>
+                <a:off x="6786166" y="3417051"/>
+                <a:ext cx="2489760" cy="378360"/>
+              </a:xfrm>
+              <a:prstGeom prst="rect">
+                <a:avLst/>
+              </a:prstGeom>
+            </p:spPr>
+          </p:pic>
+        </mc:Fallback>
+      </mc:AlternateContent>
+      <mc:AlternateContent xmlns:mc="http://schemas.openxmlformats.org/markup-compatibility/2006" xmlns:p14="http://schemas.microsoft.com/office/powerpoint/2010/main">
+        <mc:Choice Requires="p14">
+          <p:contentPart p14:bwMode="auto" r:id="rId22">
+            <p14:nvContentPartPr>
+              <p14:cNvPr id="166" name="Ink 165">
+                <a:extLst>
+                  <a:ext uri="{FF2B5EF4-FFF2-40B4-BE49-F238E27FC236}">
+                    <a16:creationId xmlns:a16="http://schemas.microsoft.com/office/drawing/2014/main" id="{7E0D75A8-9EA6-45B5-B613-AECEEF27E874}"/>
+                  </a:ext>
+                </a:extLst>
+              </p14:cNvPr>
+              <p14:cNvContentPartPr/>
+              <p14:nvPr/>
+            </p14:nvContentPartPr>
+            <p14:xfrm>
+              <a:off x="9170446" y="3392931"/>
+              <a:ext cx="2752200" cy="692640"/>
+            </p14:xfrm>
+          </p:contentPart>
+        </mc:Choice>
+        <mc:Fallback xmlns="">
+          <p:pic>
+            <p:nvPicPr>
+              <p:cNvPr id="166" name="Ink 165">
+                <a:extLst>
+                  <a:ext uri="{FF2B5EF4-FFF2-40B4-BE49-F238E27FC236}">
+                    <a16:creationId xmlns:a16="http://schemas.microsoft.com/office/drawing/2014/main" id="{7E0D75A8-9EA6-45B5-B613-AECEEF27E874}"/>
+                  </a:ext>
+                </a:extLst>
+              </p:cNvPr>
+              <p:cNvPicPr/>
+              <p:nvPr/>
+            </p:nvPicPr>
+            <p:blipFill>
+              <a:blip r:embed="rId23"/>
+              <a:stretch>
+                <a:fillRect/>
+              </a:stretch>
+            </p:blipFill>
+            <p:spPr>
+              <a:xfrm>
+                <a:off x="9161446" y="3383926"/>
+                <a:ext cx="2769840" cy="710289"/>
+              </a:xfrm>
+              <a:prstGeom prst="rect">
+                <a:avLst/>
+              </a:prstGeom>
+            </p:spPr>
+          </p:pic>
+        </mc:Fallback>
+      </mc:AlternateContent>
+      <mc:AlternateContent xmlns:mc="http://schemas.openxmlformats.org/markup-compatibility/2006" xmlns:p14="http://schemas.microsoft.com/office/powerpoint/2010/main">
+        <mc:Choice Requires="p14">
+          <p:contentPart p14:bwMode="auto" r:id="rId24">
+            <p14:nvContentPartPr>
+              <p14:cNvPr id="175" name="Ink 174">
+                <a:extLst>
+                  <a:ext uri="{FF2B5EF4-FFF2-40B4-BE49-F238E27FC236}">
+                    <a16:creationId xmlns:a16="http://schemas.microsoft.com/office/drawing/2014/main" id="{CB07669F-D316-4C89-AC3F-EB5B4C09F18A}"/>
+                  </a:ext>
+                </a:extLst>
+              </p14:cNvPr>
+              <p14:cNvContentPartPr/>
+              <p14:nvPr/>
+            </p14:nvContentPartPr>
+            <p14:xfrm>
+              <a:off x="297886" y="3422811"/>
+              <a:ext cx="3061080" cy="1131840"/>
+            </p14:xfrm>
+          </p:contentPart>
+        </mc:Choice>
+        <mc:Fallback xmlns="">
+          <p:pic>
+            <p:nvPicPr>
+              <p:cNvPr id="175" name="Ink 174">
+                <a:extLst>
+                  <a:ext uri="{FF2B5EF4-FFF2-40B4-BE49-F238E27FC236}">
+                    <a16:creationId xmlns:a16="http://schemas.microsoft.com/office/drawing/2014/main" id="{CB07669F-D316-4C89-AC3F-EB5B4C09F18A}"/>
+                  </a:ext>
+                </a:extLst>
+              </p:cNvPr>
+              <p:cNvPicPr/>
+              <p:nvPr/>
+            </p:nvPicPr>
+            <p:blipFill>
+              <a:blip r:embed="rId25"/>
+              <a:stretch>
+                <a:fillRect/>
+              </a:stretch>
+            </p:blipFill>
+            <p:spPr>
+              <a:xfrm>
+                <a:off x="288886" y="3413811"/>
+                <a:ext cx="3078720" cy="1149480"/>
+              </a:xfrm>
+              <a:prstGeom prst="rect">
+                <a:avLst/>
+              </a:prstGeom>
+            </p:spPr>
+          </p:pic>
+        </mc:Fallback>
+      </mc:AlternateContent>
+      <mc:AlternateContent xmlns:mc="http://schemas.openxmlformats.org/markup-compatibility/2006" xmlns:p14="http://schemas.microsoft.com/office/powerpoint/2010/main">
+        <mc:Choice Requires="p14">
+          <p:contentPart p14:bwMode="auto" r:id="rId26">
+            <p14:nvContentPartPr>
+              <p14:cNvPr id="182" name="Ink 181">
+                <a:extLst>
+                  <a:ext uri="{FF2B5EF4-FFF2-40B4-BE49-F238E27FC236}">
+                    <a16:creationId xmlns:a16="http://schemas.microsoft.com/office/drawing/2014/main" id="{405F7CEE-6476-48CF-A5E5-6BA61C736E90}"/>
+                  </a:ext>
+                </a:extLst>
+              </p14:cNvPr>
+              <p14:cNvContentPartPr/>
+              <p14:nvPr/>
+            </p14:nvContentPartPr>
+            <p14:xfrm>
+              <a:off x="3283006" y="3151011"/>
+              <a:ext cx="5926320" cy="2257200"/>
+            </p14:xfrm>
+          </p:contentPart>
+        </mc:Choice>
+        <mc:Fallback xmlns="">
+          <p:pic>
+            <p:nvPicPr>
+              <p:cNvPr id="182" name="Ink 181">
+                <a:extLst>
+                  <a:ext uri="{FF2B5EF4-FFF2-40B4-BE49-F238E27FC236}">
+                    <a16:creationId xmlns:a16="http://schemas.microsoft.com/office/drawing/2014/main" id="{405F7CEE-6476-48CF-A5E5-6BA61C736E90}"/>
+                  </a:ext>
+                </a:extLst>
+              </p:cNvPr>
+              <p:cNvPicPr/>
+              <p:nvPr/>
+            </p:nvPicPr>
+            <p:blipFill>
+              <a:blip r:embed="rId27"/>
+              <a:stretch>
+                <a:fillRect/>
+              </a:stretch>
+            </p:blipFill>
+            <p:spPr>
+              <a:xfrm>
+                <a:off x="3274005" y="3142011"/>
+                <a:ext cx="5943961" cy="2274840"/>
+              </a:xfrm>
+              <a:prstGeom prst="rect">
+                <a:avLst/>
+              </a:prstGeom>
+            </p:spPr>
+          </p:pic>
+        </mc:Fallback>
+      </mc:AlternateContent>
+      <mc:AlternateContent xmlns:mc="http://schemas.openxmlformats.org/markup-compatibility/2006" xmlns:p14="http://schemas.microsoft.com/office/powerpoint/2010/main">
+        <mc:Choice Requires="p14">
+          <p:contentPart p14:bwMode="auto" r:id="rId28">
+            <p14:nvContentPartPr>
+              <p14:cNvPr id="186" name="Ink 185">
+                <a:extLst>
+                  <a:ext uri="{FF2B5EF4-FFF2-40B4-BE49-F238E27FC236}">
+                    <a16:creationId xmlns:a16="http://schemas.microsoft.com/office/drawing/2014/main" id="{8EF31982-88F6-4002-AAC5-45A1E87D66B6}"/>
+                  </a:ext>
+                </a:extLst>
+              </p14:cNvPr>
+              <p14:cNvContentPartPr/>
+              <p14:nvPr/>
+            </p14:nvContentPartPr>
+            <p14:xfrm>
+              <a:off x="9873886" y="5679651"/>
+              <a:ext cx="334440" cy="299520"/>
+            </p14:xfrm>
+          </p:contentPart>
+        </mc:Choice>
+        <mc:Fallback xmlns="">
+          <p:pic>
+            <p:nvPicPr>
+              <p:cNvPr id="186" name="Ink 185">
+                <a:extLst>
+                  <a:ext uri="{FF2B5EF4-FFF2-40B4-BE49-F238E27FC236}">
+                    <a16:creationId xmlns:a16="http://schemas.microsoft.com/office/drawing/2014/main" id="{8EF31982-88F6-4002-AAC5-45A1E87D66B6}"/>
+                  </a:ext>
+                </a:extLst>
+              </p:cNvPr>
+              <p:cNvPicPr/>
+              <p:nvPr/>
+            </p:nvPicPr>
+            <p:blipFill>
+              <a:blip r:embed="rId29"/>
+              <a:stretch>
+                <a:fillRect/>
+              </a:stretch>
+            </p:blipFill>
+            <p:spPr>
+              <a:xfrm>
+                <a:off x="9864886" y="5670651"/>
+                <a:ext cx="352080" cy="317160"/>
+              </a:xfrm>
+              <a:prstGeom prst="rect">
+                <a:avLst/>
+              </a:prstGeom>
+            </p:spPr>
+          </p:pic>
+        </mc:Fallback>
+      </mc:AlternateContent>
+      <mc:AlternateContent xmlns:mc="http://schemas.openxmlformats.org/markup-compatibility/2006" xmlns:p14="http://schemas.microsoft.com/office/powerpoint/2010/main">
+        <mc:Choice Requires="p14">
+          <p:contentPart p14:bwMode="auto" r:id="rId30">
+            <p14:nvContentPartPr>
+              <p14:cNvPr id="189" name="Ink 188">
+                <a:extLst>
+                  <a:ext uri="{FF2B5EF4-FFF2-40B4-BE49-F238E27FC236}">
+                    <a16:creationId xmlns:a16="http://schemas.microsoft.com/office/drawing/2014/main" id="{2567F803-CE9F-4E86-AD68-42C2071CBCAB}"/>
+                  </a:ext>
+                </a:extLst>
+              </p14:cNvPr>
+              <p14:cNvContentPartPr/>
+              <p14:nvPr/>
+            </p14:nvContentPartPr>
+            <p14:xfrm>
+              <a:off x="9900166" y="6109131"/>
+              <a:ext cx="442440" cy="195480"/>
+            </p14:xfrm>
+          </p:contentPart>
+        </mc:Choice>
+        <mc:Fallback xmlns="">
+          <p:pic>
+            <p:nvPicPr>
+              <p:cNvPr id="189" name="Ink 188">
+                <a:extLst>
+                  <a:ext uri="{FF2B5EF4-FFF2-40B4-BE49-F238E27FC236}">
+                    <a16:creationId xmlns:a16="http://schemas.microsoft.com/office/drawing/2014/main" id="{2567F803-CE9F-4E86-AD68-42C2071CBCAB}"/>
+                  </a:ext>
+                </a:extLst>
+              </p:cNvPr>
+              <p:cNvPicPr/>
+              <p:nvPr/>
+            </p:nvPicPr>
+            <p:blipFill>
+              <a:blip r:embed="rId31"/>
+              <a:stretch>
+                <a:fillRect/>
+              </a:stretch>
+            </p:blipFill>
+            <p:spPr>
+              <a:xfrm>
+                <a:off x="9891166" y="6100148"/>
+                <a:ext cx="460080" cy="213088"/>
+              </a:xfrm>
+              <a:prstGeom prst="rect">
+                <a:avLst/>
+              </a:prstGeom>
+            </p:spPr>
+          </p:pic>
+        </mc:Fallback>
+      </mc:AlternateContent>
     </p:spTree>
     <p:extLst>
       <p:ext uri="{BB962C8B-B14F-4D97-AF65-F5344CB8AC3E}">
@@ -17153,6 +18540,108 @@
           </a:extLst>
         </p:spPr>
       </p:pic>
+      <mc:AlternateContent xmlns:mc="http://schemas.openxmlformats.org/markup-compatibility/2006" xmlns:p14="http://schemas.microsoft.com/office/powerpoint/2010/main">
+        <mc:Choice Requires="p14">
+          <p:contentPart p14:bwMode="auto" r:id="rId4">
+            <p14:nvContentPartPr>
+              <p14:cNvPr id="78" name="Ink 77">
+                <a:extLst>
+                  <a:ext uri="{FF2B5EF4-FFF2-40B4-BE49-F238E27FC236}">
+                    <a16:creationId xmlns:a16="http://schemas.microsoft.com/office/drawing/2014/main" id="{00B85F51-F26C-4C0B-89D0-43FD853564C4}"/>
+                  </a:ext>
+                </a:extLst>
+              </p14:cNvPr>
+              <p14:cNvContentPartPr/>
+              <p14:nvPr/>
+            </p14:nvContentPartPr>
+            <p14:xfrm>
+              <a:off x="3297046" y="3504171"/>
+              <a:ext cx="1398240" cy="1340640"/>
+            </p14:xfrm>
+          </p:contentPart>
+        </mc:Choice>
+        <mc:Fallback xmlns="">
+          <p:pic>
+            <p:nvPicPr>
+              <p:cNvPr id="78" name="Ink 77">
+                <a:extLst>
+                  <a:ext uri="{FF2B5EF4-FFF2-40B4-BE49-F238E27FC236}">
+                    <a16:creationId xmlns:a16="http://schemas.microsoft.com/office/drawing/2014/main" id="{00B85F51-F26C-4C0B-89D0-43FD853564C4}"/>
+                  </a:ext>
+                </a:extLst>
+              </p:cNvPr>
+              <p:cNvPicPr/>
+              <p:nvPr/>
+            </p:nvPicPr>
+            <p:blipFill>
+              <a:blip r:embed="rId5"/>
+              <a:stretch>
+                <a:fillRect/>
+              </a:stretch>
+            </p:blipFill>
+            <p:spPr>
+              <a:xfrm>
+                <a:off x="3288046" y="3495171"/>
+                <a:ext cx="1415880" cy="1358280"/>
+              </a:xfrm>
+              <a:prstGeom prst="rect">
+                <a:avLst/>
+              </a:prstGeom>
+            </p:spPr>
+          </p:pic>
+        </mc:Fallback>
+      </mc:AlternateContent>
+      <mc:AlternateContent xmlns:mc="http://schemas.openxmlformats.org/markup-compatibility/2006" xmlns:p14="http://schemas.microsoft.com/office/powerpoint/2010/main">
+        <mc:Choice Requires="p14">
+          <p:contentPart p14:bwMode="auto" r:id="rId6">
+            <p14:nvContentPartPr>
+              <p14:cNvPr id="128" name="Ink 127">
+                <a:extLst>
+                  <a:ext uri="{FF2B5EF4-FFF2-40B4-BE49-F238E27FC236}">
+                    <a16:creationId xmlns:a16="http://schemas.microsoft.com/office/drawing/2014/main" id="{6AFA06DE-D414-4D6B-9BAF-2A5BBD4FA0DF}"/>
+                  </a:ext>
+                </a:extLst>
+              </p14:cNvPr>
+              <p14:cNvContentPartPr/>
+              <p14:nvPr/>
+            </p14:nvContentPartPr>
+            <p14:xfrm>
+              <a:off x="1441606" y="905691"/>
+              <a:ext cx="7368480" cy="4493520"/>
+            </p14:xfrm>
+          </p:contentPart>
+        </mc:Choice>
+        <mc:Fallback xmlns="">
+          <p:pic>
+            <p:nvPicPr>
+              <p:cNvPr id="128" name="Ink 127">
+                <a:extLst>
+                  <a:ext uri="{FF2B5EF4-FFF2-40B4-BE49-F238E27FC236}">
+                    <a16:creationId xmlns:a16="http://schemas.microsoft.com/office/drawing/2014/main" id="{6AFA06DE-D414-4D6B-9BAF-2A5BBD4FA0DF}"/>
+                  </a:ext>
+                </a:extLst>
+              </p:cNvPr>
+              <p:cNvPicPr/>
+              <p:nvPr/>
+            </p:nvPicPr>
+            <p:blipFill>
+              <a:blip r:embed="rId7"/>
+              <a:stretch>
+                <a:fillRect/>
+              </a:stretch>
+            </p:blipFill>
+            <p:spPr>
+              <a:xfrm>
+                <a:off x="1432606" y="896691"/>
+                <a:ext cx="7386120" cy="4511160"/>
+              </a:xfrm>
+              <a:prstGeom prst="rect">
+                <a:avLst/>
+              </a:prstGeom>
+            </p:spPr>
+          </p:pic>
+        </mc:Fallback>
+      </mc:AlternateContent>
     </p:spTree>
     <p:extLst>
       <p:ext uri="{BB962C8B-B14F-4D97-AF65-F5344CB8AC3E}">
@@ -17231,478 +18720,78 @@
           </a:extLst>
         </p:spPr>
       </p:pic>
-    </p:spTree>
-    <p:extLst>
-      <p:ext uri="{BB962C8B-B14F-4D97-AF65-F5344CB8AC3E}">
-        <p14:creationId xmlns:p14="http://schemas.microsoft.com/office/powerpoint/2010/main" val="827647038"/>
-      </p:ext>
-    </p:extLst>
-  </p:cSld>
-  <p:clrMapOvr>
-    <a:masterClrMapping/>
-  </p:clrMapOvr>
-</p:sld>
-</file>
-
-<file path=ppt/slides/slide22.xml><?xml version="1.0" encoding="utf-8"?>
-<p:sld xmlns:a="http://schemas.openxmlformats.org/drawingml/2006/main" xmlns:r="http://schemas.openxmlformats.org/officeDocument/2006/relationships" xmlns:p="http://schemas.openxmlformats.org/presentationml/2006/main">
-  <p:cSld>
-    <p:spTree>
-      <p:nvGrpSpPr>
-        <p:cNvPr id="1" name=""/>
-        <p:cNvGrpSpPr/>
-        <p:nvPr/>
-      </p:nvGrpSpPr>
-      <p:grpSpPr>
-        <a:xfrm>
-          <a:off x="0" y="0"/>
-          <a:ext cx="0" cy="0"/>
-          <a:chOff x="0" y="0"/>
-          <a:chExt cx="0" cy="0"/>
-        </a:xfrm>
-      </p:grpSpPr>
-      <p:pic>
-        <p:nvPicPr>
-          <p:cNvPr id="5" name="Picture 2" descr="NetCom Logo">
-            <a:hlinkClick r:id="rId2"/>
+      <p:sp>
+        <p:nvSpPr>
+          <p:cNvPr id="2" name="TextBox 1">
             <a:extLst>
               <a:ext uri="{FF2B5EF4-FFF2-40B4-BE49-F238E27FC236}">
-                <a16:creationId xmlns:a16="http://schemas.microsoft.com/office/drawing/2014/main" id="{1072A803-B99B-4E8E-98E7-C991203DA0FC}"/>
+                <a16:creationId xmlns:a16="http://schemas.microsoft.com/office/drawing/2014/main" id="{BCC9E181-7CC0-48B3-9055-8DE82A36771C}"/>
               </a:ext>
             </a:extLst>
           </p:cNvPr>
-          <p:cNvPicPr>
-            <a:picLocks noChangeAspect="1" noChangeArrowheads="1"/>
-          </p:cNvPicPr>
+          <p:cNvSpPr txBox="1"/>
           <p:nvPr/>
-        </p:nvPicPr>
-        <p:blipFill>
-          <a:blip r:embed="rId3" cstate="print">
-            <a:extLst>
-              <a:ext uri="{28A0092B-C50C-407E-A947-70E740481C1C}">
-                <a14:useLocalDpi xmlns:a14="http://schemas.microsoft.com/office/drawing/2010/main" val="0"/>
-              </a:ext>
-            </a:extLst>
-          </a:blip>
-          <a:srcRect/>
-          <a:stretch>
-            <a:fillRect/>
-          </a:stretch>
-        </p:blipFill>
-        <p:spPr bwMode="auto">
+        </p:nvSpPr>
+        <p:spPr>
           <a:xfrm>
-            <a:off x="8580082" y="123090"/>
-            <a:ext cx="3412626" cy="915793"/>
+            <a:off x="254977" y="949569"/>
+            <a:ext cx="11517923" cy="2585323"/>
           </a:xfrm>
           <a:prstGeom prst="rect">
             <a:avLst/>
           </a:prstGeom>
           <a:noFill/>
-          <a:extLst>
-            <a:ext uri="{909E8E84-426E-40DD-AFC4-6F175D3DCCD1}">
-              <a14:hiddenFill xmlns:a14="http://schemas.microsoft.com/office/drawing/2010/main">
-                <a:solidFill>
-                  <a:srgbClr val="FFFFFF"/>
-                </a:solidFill>
-              </a14:hiddenFill>
-            </a:ext>
-          </a:extLst>
         </p:spPr>
-      </p:pic>
+        <p:txBody>
+          <a:bodyPr wrap="square" rtlCol="0">
+            <a:spAutoFit/>
+          </a:bodyPr>
+          <a:lstStyle/>
+          <a:p>
+            <a:r>
+              <a:rPr lang="en-US" dirty="0"/>
+              <a:t>Exercise</a:t>
+            </a:r>
+          </a:p>
+          <a:p>
+            <a:endParaRPr lang="en-US" dirty="0"/>
+          </a:p>
+          <a:p>
+            <a:r>
+              <a:rPr lang="en-US" dirty="0"/>
+              <a:t>Pick one order from SNWD_SO table, Copy NODE_KEY</a:t>
+            </a:r>
+          </a:p>
+          <a:p>
+            <a:r>
+              <a:rPr lang="en-US" dirty="0"/>
+              <a:t>Check Items of that Order in SNWD_SO_I table by passing PARENT_KEY</a:t>
+            </a:r>
+          </a:p>
+          <a:p>
+            <a:r>
+              <a:rPr lang="en-US" dirty="0"/>
+              <a:t>Copy the PRODUCT_GUID of an Item and pass that to NODE_KEY or SNWD_PD (product table)</a:t>
+            </a:r>
+          </a:p>
+          <a:p>
+            <a:r>
+              <a:rPr lang="en-US" dirty="0"/>
+              <a:t>Copt the DESCRIPTION_GUID of the product and pass that to PARENT_KEY of the SNWD_TEXTS table to check name of the product</a:t>
+            </a:r>
+          </a:p>
+          <a:p>
+            <a:r>
+              <a:rPr lang="en-US" dirty="0"/>
+              <a:t>Copy the SUPPLIER_GUID from SNWD_PD table and check who is the supplier of that product in SNWD_BPA table by passing the copied ID to NODE_KEY</a:t>
+            </a:r>
+          </a:p>
+        </p:txBody>
+      </p:sp>
     </p:spTree>
     <p:extLst>
       <p:ext uri="{BB962C8B-B14F-4D97-AF65-F5344CB8AC3E}">
-        <p14:creationId xmlns:p14="http://schemas.microsoft.com/office/powerpoint/2010/main" val="3596437305"/>
-      </p:ext>
-    </p:extLst>
-  </p:cSld>
-  <p:clrMapOvr>
-    <a:masterClrMapping/>
-  </p:clrMapOvr>
-</p:sld>
-</file>
-
-<file path=ppt/slides/slide23.xml><?xml version="1.0" encoding="utf-8"?>
-<p:sld xmlns:a="http://schemas.openxmlformats.org/drawingml/2006/main" xmlns:r="http://schemas.openxmlformats.org/officeDocument/2006/relationships" xmlns:p="http://schemas.openxmlformats.org/presentationml/2006/main">
-  <p:cSld>
-    <p:spTree>
-      <p:nvGrpSpPr>
-        <p:cNvPr id="1" name=""/>
-        <p:cNvGrpSpPr/>
-        <p:nvPr/>
-      </p:nvGrpSpPr>
-      <p:grpSpPr>
-        <a:xfrm>
-          <a:off x="0" y="0"/>
-          <a:ext cx="0" cy="0"/>
-          <a:chOff x="0" y="0"/>
-          <a:chExt cx="0" cy="0"/>
-        </a:xfrm>
-      </p:grpSpPr>
-      <p:pic>
-        <p:nvPicPr>
-          <p:cNvPr id="5" name="Picture 2" descr="NetCom Logo">
-            <a:hlinkClick r:id="rId2"/>
-            <a:extLst>
-              <a:ext uri="{FF2B5EF4-FFF2-40B4-BE49-F238E27FC236}">
-                <a16:creationId xmlns:a16="http://schemas.microsoft.com/office/drawing/2014/main" id="{1072A803-B99B-4E8E-98E7-C991203DA0FC}"/>
-              </a:ext>
-            </a:extLst>
-          </p:cNvPr>
-          <p:cNvPicPr>
-            <a:picLocks noChangeAspect="1" noChangeArrowheads="1"/>
-          </p:cNvPicPr>
-          <p:nvPr/>
-        </p:nvPicPr>
-        <p:blipFill>
-          <a:blip r:embed="rId3" cstate="print">
-            <a:extLst>
-              <a:ext uri="{28A0092B-C50C-407E-A947-70E740481C1C}">
-                <a14:useLocalDpi xmlns:a14="http://schemas.microsoft.com/office/drawing/2010/main" val="0"/>
-              </a:ext>
-            </a:extLst>
-          </a:blip>
-          <a:srcRect/>
-          <a:stretch>
-            <a:fillRect/>
-          </a:stretch>
-        </p:blipFill>
-        <p:spPr bwMode="auto">
-          <a:xfrm>
-            <a:off x="8580082" y="123090"/>
-            <a:ext cx="3412626" cy="915793"/>
-          </a:xfrm>
-          <a:prstGeom prst="rect">
-            <a:avLst/>
-          </a:prstGeom>
-          <a:noFill/>
-          <a:extLst>
-            <a:ext uri="{909E8E84-426E-40DD-AFC4-6F175D3DCCD1}">
-              <a14:hiddenFill xmlns:a14="http://schemas.microsoft.com/office/drawing/2010/main">
-                <a:solidFill>
-                  <a:srgbClr val="FFFFFF"/>
-                </a:solidFill>
-              </a14:hiddenFill>
-            </a:ext>
-          </a:extLst>
-        </p:spPr>
-      </p:pic>
-    </p:spTree>
-    <p:extLst>
-      <p:ext uri="{BB962C8B-B14F-4D97-AF65-F5344CB8AC3E}">
-        <p14:creationId xmlns:p14="http://schemas.microsoft.com/office/powerpoint/2010/main" val="697243834"/>
-      </p:ext>
-    </p:extLst>
-  </p:cSld>
-  <p:clrMapOvr>
-    <a:masterClrMapping/>
-  </p:clrMapOvr>
-</p:sld>
-</file>
-
-<file path=ppt/slides/slide24.xml><?xml version="1.0" encoding="utf-8"?>
-<p:sld xmlns:a="http://schemas.openxmlformats.org/drawingml/2006/main" xmlns:r="http://schemas.openxmlformats.org/officeDocument/2006/relationships" xmlns:p="http://schemas.openxmlformats.org/presentationml/2006/main">
-  <p:cSld>
-    <p:spTree>
-      <p:nvGrpSpPr>
-        <p:cNvPr id="1" name=""/>
-        <p:cNvGrpSpPr/>
-        <p:nvPr/>
-      </p:nvGrpSpPr>
-      <p:grpSpPr>
-        <a:xfrm>
-          <a:off x="0" y="0"/>
-          <a:ext cx="0" cy="0"/>
-          <a:chOff x="0" y="0"/>
-          <a:chExt cx="0" cy="0"/>
-        </a:xfrm>
-      </p:grpSpPr>
-      <p:pic>
-        <p:nvPicPr>
-          <p:cNvPr id="5" name="Picture 2" descr="NetCom Logo">
-            <a:hlinkClick r:id="rId2"/>
-            <a:extLst>
-              <a:ext uri="{FF2B5EF4-FFF2-40B4-BE49-F238E27FC236}">
-                <a16:creationId xmlns:a16="http://schemas.microsoft.com/office/drawing/2014/main" id="{1072A803-B99B-4E8E-98E7-C991203DA0FC}"/>
-              </a:ext>
-            </a:extLst>
-          </p:cNvPr>
-          <p:cNvPicPr>
-            <a:picLocks noChangeAspect="1" noChangeArrowheads="1"/>
-          </p:cNvPicPr>
-          <p:nvPr/>
-        </p:nvPicPr>
-        <p:blipFill>
-          <a:blip r:embed="rId3" cstate="print">
-            <a:extLst>
-              <a:ext uri="{28A0092B-C50C-407E-A947-70E740481C1C}">
-                <a14:useLocalDpi xmlns:a14="http://schemas.microsoft.com/office/drawing/2010/main" val="0"/>
-              </a:ext>
-            </a:extLst>
-          </a:blip>
-          <a:srcRect/>
-          <a:stretch>
-            <a:fillRect/>
-          </a:stretch>
-        </p:blipFill>
-        <p:spPr bwMode="auto">
-          <a:xfrm>
-            <a:off x="8580082" y="123090"/>
-            <a:ext cx="3412626" cy="915793"/>
-          </a:xfrm>
-          <a:prstGeom prst="rect">
-            <a:avLst/>
-          </a:prstGeom>
-          <a:noFill/>
-          <a:extLst>
-            <a:ext uri="{909E8E84-426E-40DD-AFC4-6F175D3DCCD1}">
-              <a14:hiddenFill xmlns:a14="http://schemas.microsoft.com/office/drawing/2010/main">
-                <a:solidFill>
-                  <a:srgbClr val="FFFFFF"/>
-                </a:solidFill>
-              </a14:hiddenFill>
-            </a:ext>
-          </a:extLst>
-        </p:spPr>
-      </p:pic>
-    </p:spTree>
-    <p:extLst>
-      <p:ext uri="{BB962C8B-B14F-4D97-AF65-F5344CB8AC3E}">
-        <p14:creationId xmlns:p14="http://schemas.microsoft.com/office/powerpoint/2010/main" val="1984016255"/>
-      </p:ext>
-    </p:extLst>
-  </p:cSld>
-  <p:clrMapOvr>
-    <a:masterClrMapping/>
-  </p:clrMapOvr>
-</p:sld>
-</file>
-
-<file path=ppt/slides/slide25.xml><?xml version="1.0" encoding="utf-8"?>
-<p:sld xmlns:a="http://schemas.openxmlformats.org/drawingml/2006/main" xmlns:r="http://schemas.openxmlformats.org/officeDocument/2006/relationships" xmlns:p="http://schemas.openxmlformats.org/presentationml/2006/main">
-  <p:cSld>
-    <p:spTree>
-      <p:nvGrpSpPr>
-        <p:cNvPr id="1" name=""/>
-        <p:cNvGrpSpPr/>
-        <p:nvPr/>
-      </p:nvGrpSpPr>
-      <p:grpSpPr>
-        <a:xfrm>
-          <a:off x="0" y="0"/>
-          <a:ext cx="0" cy="0"/>
-          <a:chOff x="0" y="0"/>
-          <a:chExt cx="0" cy="0"/>
-        </a:xfrm>
-      </p:grpSpPr>
-      <p:pic>
-        <p:nvPicPr>
-          <p:cNvPr id="5" name="Picture 2" descr="NetCom Logo">
-            <a:hlinkClick r:id="rId2"/>
-            <a:extLst>
-              <a:ext uri="{FF2B5EF4-FFF2-40B4-BE49-F238E27FC236}">
-                <a16:creationId xmlns:a16="http://schemas.microsoft.com/office/drawing/2014/main" id="{1072A803-B99B-4E8E-98E7-C991203DA0FC}"/>
-              </a:ext>
-            </a:extLst>
-          </p:cNvPr>
-          <p:cNvPicPr>
-            <a:picLocks noChangeAspect="1" noChangeArrowheads="1"/>
-          </p:cNvPicPr>
-          <p:nvPr/>
-        </p:nvPicPr>
-        <p:blipFill>
-          <a:blip r:embed="rId3" cstate="print">
-            <a:extLst>
-              <a:ext uri="{28A0092B-C50C-407E-A947-70E740481C1C}">
-                <a14:useLocalDpi xmlns:a14="http://schemas.microsoft.com/office/drawing/2010/main" val="0"/>
-              </a:ext>
-            </a:extLst>
-          </a:blip>
-          <a:srcRect/>
-          <a:stretch>
-            <a:fillRect/>
-          </a:stretch>
-        </p:blipFill>
-        <p:spPr bwMode="auto">
-          <a:xfrm>
-            <a:off x="8580082" y="123090"/>
-            <a:ext cx="3412626" cy="915793"/>
-          </a:xfrm>
-          <a:prstGeom prst="rect">
-            <a:avLst/>
-          </a:prstGeom>
-          <a:noFill/>
-          <a:extLst>
-            <a:ext uri="{909E8E84-426E-40DD-AFC4-6F175D3DCCD1}">
-              <a14:hiddenFill xmlns:a14="http://schemas.microsoft.com/office/drawing/2010/main">
-                <a:solidFill>
-                  <a:srgbClr val="FFFFFF"/>
-                </a:solidFill>
-              </a14:hiddenFill>
-            </a:ext>
-          </a:extLst>
-        </p:spPr>
-      </p:pic>
-    </p:spTree>
-    <p:extLst>
-      <p:ext uri="{BB962C8B-B14F-4D97-AF65-F5344CB8AC3E}">
-        <p14:creationId xmlns:p14="http://schemas.microsoft.com/office/powerpoint/2010/main" val="988724444"/>
-      </p:ext>
-    </p:extLst>
-  </p:cSld>
-  <p:clrMapOvr>
-    <a:masterClrMapping/>
-  </p:clrMapOvr>
-</p:sld>
-</file>
-
-<file path=ppt/slides/slide26.xml><?xml version="1.0" encoding="utf-8"?>
-<p:sld xmlns:a="http://schemas.openxmlformats.org/drawingml/2006/main" xmlns:r="http://schemas.openxmlformats.org/officeDocument/2006/relationships" xmlns:p="http://schemas.openxmlformats.org/presentationml/2006/main">
-  <p:cSld>
-    <p:spTree>
-      <p:nvGrpSpPr>
-        <p:cNvPr id="1" name=""/>
-        <p:cNvGrpSpPr/>
-        <p:nvPr/>
-      </p:nvGrpSpPr>
-      <p:grpSpPr>
-        <a:xfrm>
-          <a:off x="0" y="0"/>
-          <a:ext cx="0" cy="0"/>
-          <a:chOff x="0" y="0"/>
-          <a:chExt cx="0" cy="0"/>
-        </a:xfrm>
-      </p:grpSpPr>
-      <p:pic>
-        <p:nvPicPr>
-          <p:cNvPr id="5" name="Picture 2" descr="NetCom Logo">
-            <a:hlinkClick r:id="rId2"/>
-            <a:extLst>
-              <a:ext uri="{FF2B5EF4-FFF2-40B4-BE49-F238E27FC236}">
-                <a16:creationId xmlns:a16="http://schemas.microsoft.com/office/drawing/2014/main" id="{1072A803-B99B-4E8E-98E7-C991203DA0FC}"/>
-              </a:ext>
-            </a:extLst>
-          </p:cNvPr>
-          <p:cNvPicPr>
-            <a:picLocks noChangeAspect="1" noChangeArrowheads="1"/>
-          </p:cNvPicPr>
-          <p:nvPr/>
-        </p:nvPicPr>
-        <p:blipFill>
-          <a:blip r:embed="rId3" cstate="print">
-            <a:extLst>
-              <a:ext uri="{28A0092B-C50C-407E-A947-70E740481C1C}">
-                <a14:useLocalDpi xmlns:a14="http://schemas.microsoft.com/office/drawing/2010/main" val="0"/>
-              </a:ext>
-            </a:extLst>
-          </a:blip>
-          <a:srcRect/>
-          <a:stretch>
-            <a:fillRect/>
-          </a:stretch>
-        </p:blipFill>
-        <p:spPr bwMode="auto">
-          <a:xfrm>
-            <a:off x="8580082" y="123090"/>
-            <a:ext cx="3412626" cy="915793"/>
-          </a:xfrm>
-          <a:prstGeom prst="rect">
-            <a:avLst/>
-          </a:prstGeom>
-          <a:noFill/>
-          <a:extLst>
-            <a:ext uri="{909E8E84-426E-40DD-AFC4-6F175D3DCCD1}">
-              <a14:hiddenFill xmlns:a14="http://schemas.microsoft.com/office/drawing/2010/main">
-                <a:solidFill>
-                  <a:srgbClr val="FFFFFF"/>
-                </a:solidFill>
-              </a14:hiddenFill>
-            </a:ext>
-          </a:extLst>
-        </p:spPr>
-      </p:pic>
-    </p:spTree>
-    <p:extLst>
-      <p:ext uri="{BB962C8B-B14F-4D97-AF65-F5344CB8AC3E}">
-        <p14:creationId xmlns:p14="http://schemas.microsoft.com/office/powerpoint/2010/main" val="1462129074"/>
-      </p:ext>
-    </p:extLst>
-  </p:cSld>
-  <p:clrMapOvr>
-    <a:masterClrMapping/>
-  </p:clrMapOvr>
-</p:sld>
-</file>
-
-<file path=ppt/slides/slide27.xml><?xml version="1.0" encoding="utf-8"?>
-<p:sld xmlns:a="http://schemas.openxmlformats.org/drawingml/2006/main" xmlns:r="http://schemas.openxmlformats.org/officeDocument/2006/relationships" xmlns:p="http://schemas.openxmlformats.org/presentationml/2006/main">
-  <p:cSld>
-    <p:spTree>
-      <p:nvGrpSpPr>
-        <p:cNvPr id="1" name=""/>
-        <p:cNvGrpSpPr/>
-        <p:nvPr/>
-      </p:nvGrpSpPr>
-      <p:grpSpPr>
-        <a:xfrm>
-          <a:off x="0" y="0"/>
-          <a:ext cx="0" cy="0"/>
-          <a:chOff x="0" y="0"/>
-          <a:chExt cx="0" cy="0"/>
-        </a:xfrm>
-      </p:grpSpPr>
-      <p:pic>
-        <p:nvPicPr>
-          <p:cNvPr id="5" name="Picture 2" descr="NetCom Logo">
-            <a:hlinkClick r:id="rId2"/>
-            <a:extLst>
-              <a:ext uri="{FF2B5EF4-FFF2-40B4-BE49-F238E27FC236}">
-                <a16:creationId xmlns:a16="http://schemas.microsoft.com/office/drawing/2014/main" id="{1072A803-B99B-4E8E-98E7-C991203DA0FC}"/>
-              </a:ext>
-            </a:extLst>
-          </p:cNvPr>
-          <p:cNvPicPr>
-            <a:picLocks noChangeAspect="1" noChangeArrowheads="1"/>
-          </p:cNvPicPr>
-          <p:nvPr/>
-        </p:nvPicPr>
-        <p:blipFill>
-          <a:blip r:embed="rId3" cstate="print">
-            <a:extLst>
-              <a:ext uri="{28A0092B-C50C-407E-A947-70E740481C1C}">
-                <a14:useLocalDpi xmlns:a14="http://schemas.microsoft.com/office/drawing/2010/main" val="0"/>
-              </a:ext>
-            </a:extLst>
-          </a:blip>
-          <a:srcRect/>
-          <a:stretch>
-            <a:fillRect/>
-          </a:stretch>
-        </p:blipFill>
-        <p:spPr bwMode="auto">
-          <a:xfrm>
-            <a:off x="8580082" y="123090"/>
-            <a:ext cx="3412626" cy="915793"/>
-          </a:xfrm>
-          <a:prstGeom prst="rect">
-            <a:avLst/>
-          </a:prstGeom>
-          <a:noFill/>
-          <a:extLst>
-            <a:ext uri="{909E8E84-426E-40DD-AFC4-6F175D3DCCD1}">
-              <a14:hiddenFill xmlns:a14="http://schemas.microsoft.com/office/drawing/2010/main">
-                <a:solidFill>
-                  <a:srgbClr val="FFFFFF"/>
-                </a:solidFill>
-              </a14:hiddenFill>
-            </a:ext>
-          </a:extLst>
-        </p:spPr>
-      </p:pic>
-    </p:spTree>
-    <p:extLst>
-      <p:ext uri="{BB962C8B-B14F-4D97-AF65-F5344CB8AC3E}">
-        <p14:creationId xmlns:p14="http://schemas.microsoft.com/office/powerpoint/2010/main" val="3857346497"/>
+        <p14:creationId xmlns:p14="http://schemas.microsoft.com/office/powerpoint/2010/main" val="827647038"/>
       </p:ext>
     </p:extLst>
   </p:cSld>

</xml_diff>